<commit_message>
Updated ppt after latest cadec meating
</commit_message>
<xml_diff>
--- a/Cadec-vårdens-apier.pptx
+++ b/Cadec-vårdens-apier.pptx
@@ -5,23 +5,28 @@
     <p:sldMasterId id="2147483648" r:id="rId1"/>
   </p:sldMasterIdLst>
   <p:notesMasterIdLst>
-    <p:notesMasterId r:id="rId13"/>
+    <p:notesMasterId r:id="rId18"/>
   </p:notesMasterIdLst>
   <p:handoutMasterIdLst>
-    <p:handoutMasterId r:id="rId14"/>
+    <p:handoutMasterId r:id="rId19"/>
   </p:handoutMasterIdLst>
   <p:sldIdLst>
     <p:sldId id="256" r:id="rId2"/>
     <p:sldId id="260" r:id="rId3"/>
     <p:sldId id="262" r:id="rId4"/>
-    <p:sldId id="263" r:id="rId5"/>
-    <p:sldId id="257" r:id="rId6"/>
-    <p:sldId id="258" r:id="rId7"/>
-    <p:sldId id="259" r:id="rId8"/>
-    <p:sldId id="261" r:id="rId9"/>
-    <p:sldId id="264" r:id="rId10"/>
-    <p:sldId id="266" r:id="rId11"/>
-    <p:sldId id="265" r:id="rId12"/>
+    <p:sldId id="268" r:id="rId5"/>
+    <p:sldId id="263" r:id="rId6"/>
+    <p:sldId id="257" r:id="rId7"/>
+    <p:sldId id="258" r:id="rId8"/>
+    <p:sldId id="259" r:id="rId9"/>
+    <p:sldId id="261" r:id="rId10"/>
+    <p:sldId id="264" r:id="rId11"/>
+    <p:sldId id="266" r:id="rId12"/>
+    <p:sldId id="265" r:id="rId13"/>
+    <p:sldId id="267" r:id="rId14"/>
+    <p:sldId id="269" r:id="rId15"/>
+    <p:sldId id="271" r:id="rId16"/>
+    <p:sldId id="270" r:id="rId17"/>
   </p:sldIdLst>
   <p:sldSz cx="9144000" cy="6858000" type="screen4x3"/>
   <p:notesSz cx="6858000" cy="9144000"/>
@@ -252,7 +257,7 @@
               <a:pPr>
                 <a:defRPr/>
               </a:pPr>
-              <a:t>2012-12-19</a:t>
+              <a:t>2012-12-20</a:t>
             </a:fld>
             <a:endParaRPr lang="sv-SE"/>
           </a:p>
@@ -452,7 +457,7 @@
               <a:pPr>
                 <a:defRPr/>
               </a:pPr>
-              <a:t>2012-12-19</a:t>
+              <a:t>2012-12-20</a:t>
             </a:fld>
             <a:endParaRPr lang="sv-SE"/>
           </a:p>
@@ -905,382 +910,7 @@
           <a:bodyPr/>
           <a:lstStyle/>
           <a:p>
-            <a:r>
-              <a:rPr lang="en-US" dirty="0" err="1" smtClean="0"/>
-              <a:t>Projektet</a:t>
-            </a:r>
-            <a:r>
-              <a:rPr lang="en-US" dirty="0" smtClean="0"/>
-              <a:t> </a:t>
-            </a:r>
-            <a:r>
-              <a:rPr lang="en-US" dirty="0" err="1" smtClean="0"/>
-              <a:t>drivs</a:t>
-            </a:r>
-            <a:r>
-              <a:rPr lang="en-US" dirty="0" smtClean="0"/>
-              <a:t> </a:t>
-            </a:r>
-            <a:r>
-              <a:rPr lang="en-US" dirty="0" err="1" smtClean="0"/>
-              <a:t>av</a:t>
-            </a:r>
-            <a:r>
-              <a:rPr lang="en-US" dirty="0" smtClean="0"/>
-              <a:t> SLL</a:t>
-            </a:r>
-            <a:r>
-              <a:rPr lang="en-US" baseline="0" dirty="0" smtClean="0"/>
-              <a:t> </a:t>
-            </a:r>
-            <a:r>
-              <a:rPr lang="en-US" baseline="0" dirty="0" err="1" smtClean="0"/>
-              <a:t>ihop</a:t>
-            </a:r>
-            <a:r>
-              <a:rPr lang="en-US" baseline="0" dirty="0" smtClean="0"/>
-              <a:t> med </a:t>
-            </a:r>
-            <a:r>
-              <a:rPr lang="en-US" baseline="0" dirty="0" err="1" smtClean="0"/>
-              <a:t>Vinnova</a:t>
-            </a:r>
-            <a:r>
-              <a:rPr lang="en-US" baseline="0" dirty="0" smtClean="0"/>
-              <a:t>. </a:t>
-            </a:r>
-          </a:p>
-          <a:p>
-            <a:r>
-              <a:rPr lang="en-US" baseline="0" dirty="0" err="1" smtClean="0"/>
-              <a:t>Vinnova</a:t>
-            </a:r>
-            <a:r>
-              <a:rPr lang="en-US" baseline="0" dirty="0" smtClean="0"/>
-              <a:t> </a:t>
-            </a:r>
-            <a:r>
-              <a:rPr lang="en-US" baseline="0" dirty="0" err="1" smtClean="0"/>
-              <a:t>är</a:t>
-            </a:r>
-            <a:r>
-              <a:rPr lang="en-US" baseline="0" dirty="0" smtClean="0"/>
-              <a:t> </a:t>
-            </a:r>
-            <a:r>
-              <a:rPr lang="en-US" baseline="0" dirty="0" err="1" smtClean="0"/>
-              <a:t>Sveriges</a:t>
-            </a:r>
-            <a:r>
-              <a:rPr lang="en-US" baseline="0" dirty="0" smtClean="0"/>
-              <a:t> </a:t>
-            </a:r>
-            <a:r>
-              <a:rPr lang="en-US" baseline="0" dirty="0" err="1" smtClean="0"/>
-              <a:t>innovationsmyndighet</a:t>
-            </a:r>
-            <a:r>
-              <a:rPr lang="en-US" baseline="0" dirty="0" smtClean="0"/>
-              <a:t> </a:t>
-            </a:r>
-            <a:r>
-              <a:rPr lang="en-US" baseline="0" dirty="0" err="1" smtClean="0"/>
-              <a:t>som</a:t>
-            </a:r>
-            <a:r>
-              <a:rPr lang="en-US" baseline="0" dirty="0" smtClean="0"/>
-              <a:t> </a:t>
-            </a:r>
-            <a:r>
-              <a:rPr lang="en-US" baseline="0" dirty="0" err="1" smtClean="0"/>
-              <a:t>bla</a:t>
-            </a:r>
-            <a:r>
-              <a:rPr lang="en-US" baseline="0" dirty="0" smtClean="0"/>
-              <a:t> </a:t>
-            </a:r>
-            <a:r>
-              <a:rPr lang="en-US" baseline="0" dirty="0" err="1" smtClean="0"/>
-              <a:t>sponsrar</a:t>
-            </a:r>
-            <a:r>
-              <a:rPr lang="en-US" baseline="0" dirty="0" smtClean="0"/>
-              <a:t> </a:t>
-            </a:r>
-            <a:r>
-              <a:rPr lang="en-US" baseline="0" dirty="0" err="1" smtClean="0"/>
-              <a:t>forskningsprojekt</a:t>
-            </a:r>
-            <a:r>
-              <a:rPr lang="en-US" baseline="0" dirty="0" smtClean="0"/>
-              <a:t>. </a:t>
-            </a:r>
-          </a:p>
-          <a:p>
-            <a:r>
-              <a:rPr lang="en-US" baseline="0" dirty="0" smtClean="0"/>
-              <a:t>SDKs </a:t>
-            </a:r>
-            <a:r>
-              <a:rPr lang="en-US" baseline="0" dirty="0" err="1" smtClean="0"/>
-              <a:t>syfte</a:t>
-            </a:r>
-            <a:r>
-              <a:rPr lang="en-US" baseline="0" dirty="0" smtClean="0"/>
-              <a:t> </a:t>
-            </a:r>
-            <a:r>
-              <a:rPr lang="en-US" baseline="0" dirty="0" err="1" smtClean="0"/>
-              <a:t>är</a:t>
-            </a:r>
-            <a:r>
-              <a:rPr lang="en-US" baseline="0" dirty="0" smtClean="0"/>
-              <a:t> </a:t>
-            </a:r>
-            <a:r>
-              <a:rPr lang="en-US" baseline="0" dirty="0" err="1" smtClean="0"/>
-              <a:t>att</a:t>
-            </a:r>
-            <a:r>
-              <a:rPr lang="en-US" baseline="0" dirty="0" smtClean="0"/>
-              <a:t> </a:t>
-            </a:r>
-            <a:r>
-              <a:rPr lang="en-US" baseline="0" dirty="0" err="1" smtClean="0"/>
-              <a:t>tillgängliggöra</a:t>
-            </a:r>
-            <a:r>
-              <a:rPr lang="en-US" baseline="0" dirty="0" smtClean="0"/>
-              <a:t> </a:t>
-            </a:r>
-            <a:r>
-              <a:rPr lang="en-US" baseline="0" dirty="0" err="1" smtClean="0"/>
-              <a:t>vårdinformation</a:t>
-            </a:r>
-            <a:r>
-              <a:rPr lang="en-US" baseline="0" dirty="0" smtClean="0"/>
-              <a:t> </a:t>
-            </a:r>
-            <a:r>
-              <a:rPr lang="en-US" baseline="0" dirty="0" err="1" smtClean="0"/>
-              <a:t>för</a:t>
-            </a:r>
-            <a:r>
-              <a:rPr lang="en-US" baseline="0" dirty="0" smtClean="0"/>
-              <a:t> </a:t>
-            </a:r>
-            <a:r>
-              <a:rPr lang="en-US" baseline="0" dirty="0" err="1" smtClean="0"/>
-              <a:t>invårnarna</a:t>
-            </a:r>
-            <a:r>
-              <a:rPr lang="en-US" baseline="0" dirty="0" smtClean="0"/>
-              <a:t> via </a:t>
-            </a:r>
-            <a:r>
-              <a:rPr lang="en-US" baseline="0" dirty="0" err="1" smtClean="0"/>
-              <a:t>APIer</a:t>
-            </a:r>
-            <a:endParaRPr lang="en-US" baseline="0" dirty="0" smtClean="0"/>
-          </a:p>
-          <a:p>
-            <a:r>
-              <a:rPr lang="en-US" baseline="0" dirty="0" err="1" smtClean="0"/>
-              <a:t>APIerna</a:t>
-            </a:r>
-            <a:r>
-              <a:rPr lang="en-US" baseline="0" dirty="0" smtClean="0"/>
-              <a:t> </a:t>
-            </a:r>
-            <a:r>
-              <a:rPr lang="en-US" baseline="0" dirty="0" err="1" smtClean="0"/>
-              <a:t>är</a:t>
-            </a:r>
-            <a:r>
-              <a:rPr lang="en-US" baseline="0" dirty="0" smtClean="0"/>
-              <a:t> </a:t>
-            </a:r>
-            <a:r>
-              <a:rPr lang="en-US" baseline="0" dirty="0" err="1" smtClean="0"/>
-              <a:t>uppdelade</a:t>
-            </a:r>
-            <a:r>
-              <a:rPr lang="en-US" baseline="0" dirty="0" smtClean="0"/>
-              <a:t> I </a:t>
-            </a:r>
-            <a:r>
-              <a:rPr lang="en-US" baseline="0" dirty="0" err="1" smtClean="0"/>
-              <a:t>tre</a:t>
-            </a:r>
-            <a:r>
-              <a:rPr lang="en-US" baseline="0" dirty="0" smtClean="0"/>
-              <a:t> </a:t>
-            </a:r>
-            <a:r>
-              <a:rPr lang="en-US" baseline="0" dirty="0" err="1" smtClean="0"/>
-              <a:t>kategorier</a:t>
-            </a:r>
-            <a:endParaRPr lang="en-US" baseline="0" dirty="0" smtClean="0"/>
-          </a:p>
-          <a:p>
-            <a:r>
-              <a:rPr lang="en-US" baseline="0" dirty="0" smtClean="0"/>
-              <a:t>	1. </a:t>
-            </a:r>
-            <a:r>
-              <a:rPr lang="en-US" baseline="0" dirty="0" err="1" smtClean="0"/>
-              <a:t>Öppen</a:t>
-            </a:r>
-            <a:r>
-              <a:rPr lang="en-US" baseline="0" dirty="0" smtClean="0"/>
-              <a:t>-data-</a:t>
-            </a:r>
-            <a:r>
-              <a:rPr lang="en-US" baseline="0" dirty="0" err="1" smtClean="0"/>
-              <a:t>APIer</a:t>
-            </a:r>
-            <a:r>
-              <a:rPr lang="en-US" baseline="0" dirty="0" smtClean="0"/>
-              <a:t> (</a:t>
-            </a:r>
-            <a:r>
-              <a:rPr lang="en-US" baseline="0" dirty="0" err="1" smtClean="0"/>
-              <a:t>APIer</a:t>
-            </a:r>
-            <a:r>
-              <a:rPr lang="en-US" baseline="0" dirty="0" smtClean="0"/>
-              <a:t> </a:t>
-            </a:r>
-            <a:r>
-              <a:rPr lang="en-US" baseline="0" dirty="0" err="1" smtClean="0"/>
-              <a:t>för</a:t>
-            </a:r>
-            <a:r>
-              <a:rPr lang="en-US" baseline="0" dirty="0" smtClean="0"/>
-              <a:t> </a:t>
-            </a:r>
-            <a:r>
-              <a:rPr lang="en-US" baseline="0" dirty="0" err="1" smtClean="0"/>
-              <a:t>offentlig</a:t>
-            </a:r>
-            <a:r>
-              <a:rPr lang="en-US" baseline="0" dirty="0" smtClean="0"/>
-              <a:t> data)</a:t>
-            </a:r>
-          </a:p>
-          <a:p>
-            <a:r>
-              <a:rPr lang="en-US" baseline="0" dirty="0" smtClean="0"/>
-              <a:t>	2. </a:t>
-            </a:r>
-            <a:r>
-              <a:rPr lang="en-US" baseline="0" dirty="0" err="1" smtClean="0"/>
-              <a:t>Patientdata-APIer</a:t>
-            </a:r>
-            <a:r>
-              <a:rPr lang="en-US" baseline="0" dirty="0" smtClean="0"/>
-              <a:t> (</a:t>
-            </a:r>
-            <a:r>
-              <a:rPr lang="en-US" baseline="0" dirty="0" err="1" smtClean="0"/>
-              <a:t>APIer</a:t>
-            </a:r>
-            <a:r>
-              <a:rPr lang="en-US" baseline="0" dirty="0" smtClean="0"/>
-              <a:t> </a:t>
-            </a:r>
-            <a:r>
-              <a:rPr lang="en-US" baseline="0" dirty="0" err="1" smtClean="0"/>
-              <a:t>för</a:t>
-            </a:r>
-            <a:r>
-              <a:rPr lang="en-US" baseline="0" dirty="0" smtClean="0"/>
-              <a:t> </a:t>
-            </a:r>
-            <a:r>
-              <a:rPr lang="en-US" baseline="0" dirty="0" err="1" smtClean="0"/>
-              <a:t>patientbunden</a:t>
-            </a:r>
-            <a:r>
-              <a:rPr lang="en-US" baseline="0" dirty="0" smtClean="0"/>
-              <a:t> data </a:t>
-            </a:r>
-            <a:r>
-              <a:rPr lang="en-US" baseline="0" dirty="0" err="1" smtClean="0"/>
-              <a:t>för</a:t>
-            </a:r>
-            <a:r>
-              <a:rPr lang="en-US" baseline="0" dirty="0" smtClean="0"/>
-              <a:t> </a:t>
-            </a:r>
-            <a:r>
-              <a:rPr lang="en-US" baseline="0" dirty="0" err="1" smtClean="0"/>
-              <a:t>tredje</a:t>
-            </a:r>
-            <a:r>
-              <a:rPr lang="en-US" baseline="0" dirty="0" smtClean="0"/>
-              <a:t> part)</a:t>
-            </a:r>
-          </a:p>
-          <a:p>
-            <a:r>
-              <a:rPr lang="en-US" baseline="0" dirty="0" smtClean="0"/>
-              <a:t>	3. </a:t>
-            </a:r>
-            <a:r>
-              <a:rPr lang="en-US" baseline="0" dirty="0" err="1" smtClean="0"/>
-              <a:t>Vårdgivar-APIer</a:t>
-            </a:r>
-            <a:r>
-              <a:rPr lang="en-US" baseline="0" dirty="0" smtClean="0"/>
-              <a:t> (</a:t>
-            </a:r>
-            <a:r>
-              <a:rPr lang="en-US" baseline="0" dirty="0" err="1" smtClean="0"/>
-              <a:t>APIer</a:t>
-            </a:r>
-            <a:r>
-              <a:rPr lang="en-US" baseline="0" dirty="0" smtClean="0"/>
-              <a:t> </a:t>
-            </a:r>
-            <a:r>
-              <a:rPr lang="en-US" baseline="0" dirty="0" err="1" smtClean="0"/>
-              <a:t>för</a:t>
-            </a:r>
-            <a:r>
-              <a:rPr lang="en-US" baseline="0" dirty="0" smtClean="0"/>
-              <a:t> </a:t>
-            </a:r>
-            <a:r>
-              <a:rPr lang="en-US" baseline="0" dirty="0" err="1" smtClean="0"/>
-              <a:t>patientbunden</a:t>
-            </a:r>
-            <a:r>
-              <a:rPr lang="en-US" baseline="0" dirty="0" smtClean="0"/>
-              <a:t> data </a:t>
-            </a:r>
-            <a:r>
-              <a:rPr lang="en-US" baseline="0" dirty="0" err="1" smtClean="0"/>
-              <a:t>för</a:t>
-            </a:r>
-            <a:r>
-              <a:rPr lang="en-US" baseline="0" dirty="0" smtClean="0"/>
-              <a:t> </a:t>
-            </a:r>
-            <a:r>
-              <a:rPr lang="en-US" baseline="0" dirty="0" err="1" smtClean="0"/>
-              <a:t>vårdgivare</a:t>
-            </a:r>
-            <a:r>
-              <a:rPr lang="en-US" baseline="0" dirty="0" smtClean="0"/>
-              <a:t>)</a:t>
-            </a:r>
-          </a:p>
-          <a:p>
-            <a:endParaRPr lang="en-US" smtClean="0"/>
-          </a:p>
-          <a:p>
-            <a:endParaRPr lang="en-US"/>
+            <a:endParaRPr lang="en-US" dirty="0"/>
           </a:p>
         </p:txBody>
       </p:sp>
@@ -1316,7 +946,7 @@
     </p:spTree>
     <p:extLst>
       <p:ext uri="{BB962C8B-B14F-4D97-AF65-F5344CB8AC3E}">
-        <p14:creationId xmlns:p14="http://schemas.microsoft.com/office/powerpoint/2010/main" val="1770856474"/>
+        <p14:creationId xmlns:p14="http://schemas.microsoft.com/office/powerpoint/2010/main" val="1433702104"/>
       </p:ext>
     </p:extLst>
   </p:cSld>
@@ -1372,7 +1002,7 @@
           <a:p>
             <a:r>
               <a:rPr lang="en-US" dirty="0" err="1" smtClean="0"/>
-              <a:t>Kort</a:t>
+              <a:t>Projektet</a:t>
             </a:r>
             <a:r>
               <a:rPr lang="en-US" dirty="0" smtClean="0"/>
@@ -1380,7 +1010,7 @@
             </a:r>
             <a:r>
               <a:rPr lang="en-US" dirty="0" err="1" smtClean="0"/>
-              <a:t>om</a:t>
+              <a:t>drivs</a:t>
             </a:r>
             <a:r>
               <a:rPr lang="en-US" dirty="0" smtClean="0"/>
@@ -1388,56 +1018,329 @@
             </a:r>
             <a:r>
               <a:rPr lang="en-US" dirty="0" err="1" smtClean="0"/>
-              <a:t>API’er</a:t>
+              <a:t>av</a:t>
             </a:r>
             <a:r>
               <a:rPr lang="en-US" dirty="0" smtClean="0"/>
+              <a:t> SLL</a:t>
+            </a:r>
+            <a:r>
+              <a:rPr lang="en-US" baseline="0" dirty="0" smtClean="0"/>
               <a:t> </a:t>
             </a:r>
             <a:r>
-              <a:rPr lang="en-US" dirty="0" err="1" smtClean="0"/>
+              <a:rPr lang="en-US" baseline="0" dirty="0" err="1" smtClean="0"/>
+              <a:t>ihop</a:t>
+            </a:r>
+            <a:r>
+              <a:rPr lang="en-US" baseline="0" dirty="0" smtClean="0"/>
+              <a:t> med </a:t>
+            </a:r>
+            <a:r>
+              <a:rPr lang="en-US" baseline="0" dirty="0" err="1" smtClean="0"/>
+              <a:t>Vinnova</a:t>
+            </a:r>
+            <a:r>
+              <a:rPr lang="en-US" baseline="0" dirty="0" smtClean="0"/>
+              <a:t>. </a:t>
+            </a:r>
+          </a:p>
+          <a:p>
+            <a:r>
+              <a:rPr lang="en-US" baseline="0" dirty="0" err="1" smtClean="0"/>
+              <a:t>Vinnova</a:t>
+            </a:r>
+            <a:r>
+              <a:rPr lang="en-US" baseline="0" dirty="0" smtClean="0"/>
+              <a:t> </a:t>
+            </a:r>
+            <a:r>
+              <a:rPr lang="en-US" baseline="0" dirty="0" err="1" smtClean="0"/>
+              <a:t>är</a:t>
+            </a:r>
+            <a:r>
+              <a:rPr lang="en-US" baseline="0" dirty="0" smtClean="0"/>
+              <a:t> </a:t>
+            </a:r>
+            <a:r>
+              <a:rPr lang="en-US" baseline="0" dirty="0" err="1" smtClean="0"/>
+              <a:t>Sveriges</a:t>
+            </a:r>
+            <a:r>
+              <a:rPr lang="en-US" baseline="0" dirty="0" smtClean="0"/>
+              <a:t> </a:t>
+            </a:r>
+            <a:r>
+              <a:rPr lang="en-US" baseline="0" dirty="0" err="1" smtClean="0"/>
+              <a:t>innovationsmyndighet</a:t>
+            </a:r>
+            <a:r>
+              <a:rPr lang="en-US" baseline="0" dirty="0" smtClean="0"/>
+              <a:t> </a:t>
+            </a:r>
+            <a:r>
+              <a:rPr lang="en-US" baseline="0" dirty="0" err="1" smtClean="0"/>
+              <a:t>som</a:t>
+            </a:r>
+            <a:r>
+              <a:rPr lang="en-US" baseline="0" dirty="0" smtClean="0"/>
+              <a:t> </a:t>
+            </a:r>
+            <a:r>
+              <a:rPr lang="en-US" baseline="0" dirty="0" err="1" smtClean="0"/>
+              <a:t>bla</a:t>
+            </a:r>
+            <a:r>
+              <a:rPr lang="en-US" baseline="0" dirty="0" smtClean="0"/>
+              <a:t> </a:t>
+            </a:r>
+            <a:r>
+              <a:rPr lang="en-US" baseline="0" dirty="0" err="1" smtClean="0"/>
+              <a:t>sponsrar</a:t>
+            </a:r>
+            <a:r>
+              <a:rPr lang="en-US" baseline="0" dirty="0" smtClean="0"/>
+              <a:t> </a:t>
+            </a:r>
+            <a:r>
+              <a:rPr lang="en-US" baseline="0" dirty="0" err="1" smtClean="0"/>
+              <a:t>forskningsprojekt</a:t>
+            </a:r>
+            <a:r>
+              <a:rPr lang="en-US" baseline="0" dirty="0" smtClean="0"/>
+              <a:t>. </a:t>
+            </a:r>
+          </a:p>
+          <a:p>
+            <a:r>
+              <a:rPr lang="en-US" baseline="0" dirty="0" smtClean="0"/>
+              <a:t>SDKs </a:t>
+            </a:r>
+            <a:r>
+              <a:rPr lang="en-US" baseline="0" dirty="0" err="1" smtClean="0"/>
+              <a:t>syfte</a:t>
+            </a:r>
+            <a:r>
+              <a:rPr lang="en-US" baseline="0" dirty="0" smtClean="0"/>
+              <a:t> </a:t>
+            </a:r>
+            <a:r>
+              <a:rPr lang="en-US" baseline="0" dirty="0" err="1" smtClean="0"/>
+              <a:t>är</a:t>
+            </a:r>
+            <a:r>
+              <a:rPr lang="en-US" baseline="0" dirty="0" smtClean="0"/>
+              <a:t> </a:t>
+            </a:r>
+            <a:r>
+              <a:rPr lang="en-US" baseline="0" dirty="0" err="1" smtClean="0"/>
+              <a:t>att</a:t>
+            </a:r>
+            <a:r>
+              <a:rPr lang="en-US" baseline="0" dirty="0" smtClean="0"/>
+              <a:t> </a:t>
+            </a:r>
+            <a:r>
+              <a:rPr lang="en-US" baseline="0" dirty="0" err="1" smtClean="0"/>
+              <a:t>tillgängliggöra</a:t>
+            </a:r>
+            <a:r>
+              <a:rPr lang="en-US" baseline="0" dirty="0" smtClean="0"/>
+              <a:t> </a:t>
+            </a:r>
+            <a:r>
+              <a:rPr lang="en-US" baseline="0" dirty="0" err="1" smtClean="0"/>
+              <a:t>vårdinformation</a:t>
+            </a:r>
+            <a:r>
+              <a:rPr lang="en-US" baseline="0" dirty="0" smtClean="0"/>
+              <a:t> </a:t>
+            </a:r>
+            <a:r>
+              <a:rPr lang="en-US" baseline="0" dirty="0" err="1" smtClean="0"/>
               <a:t>för</a:t>
             </a:r>
             <a:r>
-              <a:rPr lang="en-US" dirty="0" smtClean="0"/>
+              <a:rPr lang="en-US" baseline="0" dirty="0" smtClean="0"/>
               <a:t> </a:t>
             </a:r>
             <a:r>
-              <a:rPr lang="en-US" dirty="0" err="1" smtClean="0"/>
+              <a:rPr lang="en-US" baseline="0" dirty="0" err="1" smtClean="0"/>
+              <a:t>invårnarna</a:t>
+            </a:r>
+            <a:r>
+              <a:rPr lang="en-US" baseline="0" dirty="0" smtClean="0"/>
+              <a:t> via </a:t>
+            </a:r>
+            <a:r>
+              <a:rPr lang="en-US" baseline="0" dirty="0" err="1" smtClean="0"/>
+              <a:t>APIer</a:t>
+            </a:r>
+            <a:endParaRPr lang="en-US" baseline="0" dirty="0" smtClean="0"/>
+          </a:p>
+          <a:p>
+            <a:r>
+              <a:rPr lang="en-US" baseline="0" dirty="0" err="1" smtClean="0"/>
+              <a:t>APIerna</a:t>
+            </a:r>
+            <a:r>
+              <a:rPr lang="en-US" baseline="0" dirty="0" smtClean="0"/>
+              <a:t> </a:t>
+            </a:r>
+            <a:r>
+              <a:rPr lang="en-US" baseline="0" dirty="0" err="1" smtClean="0"/>
+              <a:t>är</a:t>
+            </a:r>
+            <a:r>
+              <a:rPr lang="en-US" baseline="0" dirty="0" smtClean="0"/>
+              <a:t> </a:t>
+            </a:r>
+            <a:r>
+              <a:rPr lang="en-US" baseline="0" dirty="0" err="1" smtClean="0"/>
+              <a:t>uppdelade</a:t>
+            </a:r>
+            <a:r>
+              <a:rPr lang="en-US" baseline="0" dirty="0" smtClean="0"/>
+              <a:t> I </a:t>
+            </a:r>
+            <a:r>
+              <a:rPr lang="en-US" baseline="0" dirty="0" err="1" smtClean="0"/>
+              <a:t>tre</a:t>
+            </a:r>
+            <a:r>
+              <a:rPr lang="en-US" baseline="0" dirty="0" smtClean="0"/>
+              <a:t> </a:t>
+            </a:r>
+            <a:r>
+              <a:rPr lang="en-US" baseline="0" dirty="0" err="1" smtClean="0"/>
+              <a:t>kategorier</a:t>
+            </a:r>
+            <a:endParaRPr lang="en-US" baseline="0" dirty="0" smtClean="0"/>
+          </a:p>
+          <a:p>
+            <a:r>
+              <a:rPr lang="en-US" baseline="0" dirty="0" smtClean="0"/>
+              <a:t>	1. </a:t>
+            </a:r>
+            <a:r>
+              <a:rPr lang="en-US" baseline="0" dirty="0" err="1" smtClean="0"/>
+              <a:t>Öppen</a:t>
+            </a:r>
+            <a:r>
+              <a:rPr lang="en-US" baseline="0" dirty="0" smtClean="0"/>
+              <a:t>-data-</a:t>
+            </a:r>
+            <a:r>
+              <a:rPr lang="en-US" baseline="0" dirty="0" err="1" smtClean="0"/>
+              <a:t>APIer</a:t>
+            </a:r>
+            <a:r>
+              <a:rPr lang="en-US" baseline="0" dirty="0" smtClean="0"/>
+              <a:t> (</a:t>
+            </a:r>
+            <a:r>
+              <a:rPr lang="en-US" baseline="0" dirty="0" err="1" smtClean="0"/>
+              <a:t>APIer</a:t>
+            </a:r>
+            <a:r>
+              <a:rPr lang="en-US" baseline="0" dirty="0" smtClean="0"/>
+              <a:t> </a:t>
+            </a:r>
+            <a:r>
+              <a:rPr lang="en-US" baseline="0" dirty="0" err="1" smtClean="0"/>
+              <a:t>för</a:t>
+            </a:r>
+            <a:r>
+              <a:rPr lang="en-US" baseline="0" dirty="0" smtClean="0"/>
+              <a:t> </a:t>
+            </a:r>
+            <a:r>
+              <a:rPr lang="en-US" baseline="0" dirty="0" err="1" smtClean="0"/>
+              <a:t>offentlig</a:t>
+            </a:r>
+            <a:r>
+              <a:rPr lang="en-US" baseline="0" dirty="0" smtClean="0"/>
+              <a:t> data)</a:t>
+            </a:r>
+          </a:p>
+          <a:p>
+            <a:r>
+              <a:rPr lang="en-US" baseline="0" dirty="0" smtClean="0"/>
+              <a:t>	2. </a:t>
+            </a:r>
+            <a:r>
+              <a:rPr lang="en-US" baseline="0" dirty="0" err="1" smtClean="0"/>
+              <a:t>Patientdata-APIer</a:t>
+            </a:r>
+            <a:r>
+              <a:rPr lang="en-US" baseline="0" dirty="0" smtClean="0"/>
+              <a:t> (</a:t>
+            </a:r>
+            <a:r>
+              <a:rPr lang="en-US" baseline="0" dirty="0" err="1" smtClean="0"/>
+              <a:t>APIer</a:t>
+            </a:r>
+            <a:r>
+              <a:rPr lang="en-US" baseline="0" dirty="0" smtClean="0"/>
+              <a:t> </a:t>
+            </a:r>
+            <a:r>
+              <a:rPr lang="en-US" baseline="0" dirty="0" err="1" smtClean="0"/>
+              <a:t>för</a:t>
+            </a:r>
+            <a:r>
+              <a:rPr lang="en-US" baseline="0" dirty="0" smtClean="0"/>
+              <a:t> </a:t>
+            </a:r>
+            <a:r>
+              <a:rPr lang="en-US" baseline="0" dirty="0" err="1" smtClean="0"/>
               <a:t>patientbunden</a:t>
             </a:r>
             <a:r>
-              <a:rPr lang="en-US" dirty="0" smtClean="0"/>
-              <a:t> data</a:t>
-            </a:r>
-          </a:p>
-          <a:p>
-            <a:endParaRPr lang="en-US" dirty="0" smtClean="0"/>
-          </a:p>
-          <a:p>
-            <a:r>
-              <a:rPr lang="en-US" dirty="0" smtClean="0"/>
-              <a:t>Nu </a:t>
-            </a:r>
-            <a:r>
-              <a:rPr lang="en-US" dirty="0" err="1" smtClean="0"/>
-              <a:t>har</a:t>
-            </a:r>
-            <a:r>
-              <a:rPr lang="en-US" dirty="0" smtClean="0"/>
+              <a:rPr lang="en-US" baseline="0" dirty="0" smtClean="0"/>
+              <a:t> data </a:t>
+            </a:r>
+            <a:r>
+              <a:rPr lang="en-US" baseline="0" dirty="0" err="1" smtClean="0"/>
+              <a:t>för</a:t>
+            </a:r>
+            <a:r>
+              <a:rPr lang="en-US" baseline="0" dirty="0" smtClean="0"/>
               <a:t> </a:t>
             </a:r>
             <a:r>
-              <a:rPr lang="en-US" dirty="0" err="1" smtClean="0"/>
-              <a:t>ni</a:t>
-            </a:r>
-            <a:r>
-              <a:rPr lang="en-US" dirty="0" smtClean="0"/>
+              <a:rPr lang="en-US" baseline="0" dirty="0" err="1" smtClean="0"/>
+              <a:t>tredje</a:t>
+            </a:r>
+            <a:r>
+              <a:rPr lang="en-US" baseline="0" dirty="0" smtClean="0"/>
+              <a:t> part)</a:t>
+            </a:r>
+          </a:p>
+          <a:p>
+            <a:r>
+              <a:rPr lang="en-US" baseline="0" dirty="0" smtClean="0"/>
+              <a:t>	3. </a:t>
+            </a:r>
+            <a:r>
+              <a:rPr lang="en-US" baseline="0" dirty="0" err="1" smtClean="0"/>
+              <a:t>Vårdgivar-APIer</a:t>
+            </a:r>
+            <a:r>
+              <a:rPr lang="en-US" baseline="0" dirty="0" smtClean="0"/>
+              <a:t> (</a:t>
+            </a:r>
+            <a:r>
+              <a:rPr lang="en-US" baseline="0" dirty="0" err="1" smtClean="0"/>
+              <a:t>APIer</a:t>
+            </a:r>
+            <a:r>
+              <a:rPr lang="en-US" baseline="0" dirty="0" smtClean="0"/>
               <a:t> </a:t>
             </a:r>
             <a:r>
-              <a:rPr lang="en-US" dirty="0" err="1" smtClean="0"/>
-              <a:t>testat</a:t>
+              <a:rPr lang="en-US" baseline="0" dirty="0" err="1" smtClean="0"/>
+              <a:t>för</a:t>
             </a:r>
             <a:r>
               <a:rPr lang="en-US" baseline="0" dirty="0" smtClean="0"/>
@@ -1445,7 +1348,15 @@
             </a:r>
             <a:r>
               <a:rPr lang="en-US" baseline="0" dirty="0" err="1" smtClean="0"/>
-              <a:t>APIer</a:t>
+              <a:t>patientbunden</a:t>
+            </a:r>
+            <a:r>
+              <a:rPr lang="en-US" baseline="0" dirty="0" smtClean="0"/>
+              <a:t> data </a:t>
+            </a:r>
+            <a:r>
+              <a:rPr lang="en-US" baseline="0" dirty="0" err="1" smtClean="0"/>
+              <a:t>för</a:t>
             </a:r>
             <a:r>
               <a:rPr lang="en-US" baseline="0" dirty="0" smtClean="0"/>
@@ -1453,279 +1364,18 @@
             </a:r>
             <a:r>
               <a:rPr lang="en-US" baseline="0" dirty="0" err="1" smtClean="0"/>
-              <a:t>för</a:t>
-            </a:r>
-            <a:r>
-              <a:rPr lang="en-US" baseline="0" dirty="0" smtClean="0"/>
-              <a:t> </a:t>
-            </a:r>
-            <a:r>
-              <a:rPr lang="en-US" baseline="0" dirty="0" err="1" smtClean="0"/>
-              <a:t>offentlig</a:t>
-            </a:r>
-            <a:r>
-              <a:rPr lang="en-US" baseline="0" dirty="0" smtClean="0"/>
-              <a:t> data </a:t>
-            </a:r>
-            <a:r>
-              <a:rPr lang="en-US" baseline="0" dirty="0" err="1" smtClean="0"/>
-              <a:t>som</a:t>
-            </a:r>
-            <a:r>
-              <a:rPr lang="en-US" baseline="0" dirty="0" smtClean="0"/>
-              <a:t> </a:t>
-            </a:r>
-            <a:r>
-              <a:rPr lang="en-US" baseline="0" dirty="0" err="1" smtClean="0"/>
-              <a:t>är</a:t>
-            </a:r>
-            <a:r>
-              <a:rPr lang="en-US" baseline="0" dirty="0" smtClean="0"/>
-              <a:t> </a:t>
-            </a:r>
-            <a:r>
-              <a:rPr lang="en-US" baseline="0" dirty="0" err="1" smtClean="0"/>
-              <a:t>helt</a:t>
-            </a:r>
-            <a:r>
-              <a:rPr lang="en-US" baseline="0" dirty="0" smtClean="0"/>
-              <a:t> </a:t>
-            </a:r>
-            <a:r>
-              <a:rPr lang="en-US" baseline="0" dirty="0" err="1" smtClean="0"/>
-              <a:t>öppna</a:t>
-            </a:r>
-            <a:endParaRPr lang="en-US" baseline="0" dirty="0" smtClean="0"/>
-          </a:p>
-          <a:p>
-            <a:endParaRPr lang="en-US" baseline="0" dirty="0" smtClean="0"/>
-          </a:p>
-          <a:p>
-            <a:r>
-              <a:rPr lang="en-US" baseline="0" dirty="0" err="1" smtClean="0"/>
-              <a:t>Apier</a:t>
-            </a:r>
-            <a:r>
-              <a:rPr lang="en-US" baseline="0" dirty="0" smtClean="0"/>
-              <a:t> </a:t>
-            </a:r>
-            <a:r>
-              <a:rPr lang="en-US" baseline="0" dirty="0" err="1" smtClean="0"/>
-              <a:t>för</a:t>
-            </a:r>
-            <a:r>
-              <a:rPr lang="en-US" baseline="0" dirty="0" smtClean="0"/>
-              <a:t> </a:t>
-            </a:r>
-            <a:r>
-              <a:rPr lang="en-US" baseline="0" dirty="0" err="1" smtClean="0"/>
-              <a:t>patientbunden</a:t>
-            </a:r>
-            <a:r>
-              <a:rPr lang="en-US" baseline="0" dirty="0" smtClean="0"/>
-              <a:t> data </a:t>
-            </a:r>
-            <a:r>
-              <a:rPr lang="en-US" baseline="0" dirty="0" err="1" smtClean="0"/>
-              <a:t>kräver</a:t>
-            </a:r>
-            <a:r>
-              <a:rPr lang="en-US" baseline="0" dirty="0" smtClean="0"/>
-              <a:t> en </a:t>
-            </a:r>
-            <a:r>
-              <a:rPr lang="en-US" baseline="0" dirty="0" err="1" smtClean="0"/>
-              <a:t>strikt</a:t>
-            </a:r>
-            <a:r>
-              <a:rPr lang="en-US" baseline="0" dirty="0" smtClean="0"/>
-              <a:t> </a:t>
-            </a:r>
-            <a:r>
-              <a:rPr lang="en-US" baseline="0" dirty="0" err="1" smtClean="0"/>
-              <a:t>åtkomstkontroll</a:t>
-            </a:r>
-            <a:r>
-              <a:rPr lang="en-US" baseline="0" dirty="0" smtClean="0"/>
-              <a:t> </a:t>
-            </a:r>
-            <a:r>
-              <a:rPr lang="en-US" baseline="0" dirty="0" err="1" smtClean="0"/>
-              <a:t>för</a:t>
-            </a:r>
-            <a:r>
-              <a:rPr lang="en-US" baseline="0" dirty="0" smtClean="0"/>
-              <a:t> </a:t>
-            </a:r>
-            <a:r>
-              <a:rPr lang="en-US" baseline="0" dirty="0" err="1" smtClean="0"/>
-              <a:t>att</a:t>
-            </a:r>
-            <a:r>
-              <a:rPr lang="en-US" baseline="0" dirty="0" smtClean="0"/>
-              <a:t> </a:t>
-            </a:r>
-            <a:r>
-              <a:rPr lang="en-US" baseline="0" dirty="0" err="1" smtClean="0"/>
-              <a:t>inte</a:t>
-            </a:r>
-            <a:r>
-              <a:rPr lang="en-US" baseline="0" dirty="0" smtClean="0"/>
-              <a:t> data </a:t>
-            </a:r>
-            <a:r>
-              <a:rPr lang="en-US" baseline="0" dirty="0" err="1" smtClean="0"/>
-              <a:t>skall</a:t>
-            </a:r>
-            <a:r>
-              <a:rPr lang="en-US" baseline="0" dirty="0" smtClean="0"/>
-              <a:t> </a:t>
-            </a:r>
-            <a:r>
-              <a:rPr lang="en-US" baseline="0" dirty="0" err="1" smtClean="0"/>
-              <a:t>hamna</a:t>
-            </a:r>
-            <a:r>
-              <a:rPr lang="en-US" baseline="0" dirty="0" smtClean="0"/>
-              <a:t> </a:t>
-            </a:r>
-            <a:r>
-              <a:rPr lang="en-US" baseline="0" dirty="0" err="1" smtClean="0"/>
-              <a:t>i</a:t>
-            </a:r>
-            <a:r>
-              <a:rPr lang="en-US" baseline="0" dirty="0" smtClean="0"/>
-              <a:t> </a:t>
-            </a:r>
-            <a:r>
-              <a:rPr lang="en-US" baseline="0" dirty="0" err="1" smtClean="0"/>
-              <a:t>orätta</a:t>
-            </a:r>
-            <a:r>
-              <a:rPr lang="en-US" baseline="0" dirty="0" smtClean="0"/>
-              <a:t> </a:t>
-            </a:r>
-            <a:r>
-              <a:rPr lang="en-US" baseline="0" dirty="0" err="1" smtClean="0"/>
-              <a:t>händer</a:t>
-            </a:r>
-            <a:endParaRPr lang="en-US" baseline="0" dirty="0" smtClean="0"/>
-          </a:p>
-          <a:p>
-            <a:endParaRPr lang="en-US" baseline="0" dirty="0" smtClean="0"/>
-          </a:p>
-          <a:p>
-            <a:r>
-              <a:rPr lang="en-US" baseline="0" dirty="0" err="1" smtClean="0"/>
-              <a:t>Förtroende</a:t>
-            </a:r>
-            <a:r>
-              <a:rPr lang="en-US" baseline="0" dirty="0" smtClean="0"/>
-              <a:t> -&gt; </a:t>
-            </a:r>
-            <a:r>
-              <a:rPr lang="en-US" baseline="0" dirty="0" err="1" smtClean="0"/>
-              <a:t>www.minavardkontakter.se</a:t>
-            </a:r>
-            <a:endParaRPr lang="en-US" baseline="0" dirty="0" smtClean="0"/>
-          </a:p>
-          <a:p>
-            <a:r>
-              <a:rPr lang="en-US" baseline="0" dirty="0" err="1" smtClean="0"/>
-              <a:t>Identifiering</a:t>
-            </a:r>
-            <a:r>
-              <a:rPr lang="en-US" baseline="0" dirty="0" smtClean="0"/>
-              <a:t> -&gt; </a:t>
-            </a:r>
-            <a:r>
-              <a:rPr lang="en-US" baseline="0" dirty="0" err="1" smtClean="0"/>
-              <a:t>inloggning</a:t>
-            </a:r>
-            <a:r>
-              <a:rPr lang="en-US" baseline="0" dirty="0" smtClean="0"/>
-              <a:t> via </a:t>
-            </a:r>
-            <a:r>
-              <a:rPr lang="en-US" baseline="0" dirty="0" err="1" smtClean="0"/>
-              <a:t>mvk</a:t>
-            </a:r>
-            <a:r>
-              <a:rPr lang="en-US" baseline="0" dirty="0" smtClean="0"/>
-              <a:t> med 2-faktorsautenticering till </a:t>
-            </a:r>
-            <a:r>
-              <a:rPr lang="en-US" baseline="0" dirty="0" err="1" smtClean="0"/>
-              <a:t>excempel</a:t>
-            </a:r>
-            <a:r>
-              <a:rPr lang="en-US" baseline="0" dirty="0" smtClean="0"/>
-              <a:t> e-leg. </a:t>
-            </a:r>
-            <a:r>
-              <a:rPr lang="en-US" baseline="0" dirty="0" err="1" smtClean="0"/>
-              <a:t>Krav</a:t>
-            </a:r>
-            <a:r>
-              <a:rPr lang="en-US" baseline="0" dirty="0" smtClean="0"/>
-              <a:t> </a:t>
-            </a:r>
-            <a:r>
-              <a:rPr lang="en-US" baseline="0" dirty="0" err="1" smtClean="0"/>
-              <a:t>från</a:t>
-            </a:r>
-            <a:r>
-              <a:rPr lang="en-US" baseline="0" dirty="0" smtClean="0"/>
-              <a:t> </a:t>
-            </a:r>
-            <a:r>
-              <a:rPr lang="en-US" baseline="0" dirty="0" err="1" smtClean="0"/>
-              <a:t>datainspektionen</a:t>
-            </a:r>
-            <a:r>
-              <a:rPr lang="en-US" baseline="0" dirty="0" smtClean="0"/>
-              <a:t>.</a:t>
-            </a:r>
-          </a:p>
-          <a:p>
-            <a:r>
-              <a:rPr lang="en-US" baseline="0" dirty="0" err="1" smtClean="0"/>
-              <a:t>Auktorisation</a:t>
-            </a:r>
-            <a:r>
-              <a:rPr lang="en-US" baseline="0" dirty="0" smtClean="0"/>
-              <a:t>….</a:t>
-            </a:r>
-          </a:p>
-          <a:p>
-            <a:r>
-              <a:rPr lang="en-US" baseline="0" dirty="0" smtClean="0"/>
-              <a:t>   </a:t>
-            </a:r>
-            <a:r>
-              <a:rPr lang="en-US" baseline="0" dirty="0" err="1" smtClean="0"/>
-              <a:t>Oauth</a:t>
-            </a:r>
-            <a:r>
-              <a:rPr lang="en-US" baseline="0" dirty="0" smtClean="0"/>
-              <a:t> 2.0 TADA… </a:t>
-            </a:r>
-            <a:r>
-              <a:rPr lang="en-US" baseline="0" dirty="0" err="1" smtClean="0"/>
-              <a:t>vänd</a:t>
-            </a:r>
-            <a:r>
-              <a:rPr lang="en-US" baseline="0" dirty="0" smtClean="0"/>
-              <a:t> </a:t>
-            </a:r>
-            <a:r>
-              <a:rPr lang="en-US" baseline="0" dirty="0" err="1" smtClean="0"/>
-              <a:t>blad</a:t>
-            </a:r>
-            <a:endParaRPr lang="en-US" baseline="0" dirty="0" smtClean="0"/>
-          </a:p>
-          <a:p>
-            <a:endParaRPr lang="en-US" baseline="0" dirty="0" smtClean="0"/>
+              <a:t>vårdgivare</a:t>
+            </a:r>
+            <a:r>
+              <a:rPr lang="en-US" baseline="0" dirty="0" smtClean="0"/>
+              <a:t>)</a:t>
+            </a:r>
+          </a:p>
+          <a:p>
+            <a:endParaRPr lang="en-US" smtClean="0"/>
+          </a:p>
+          <a:p>
+            <a:endParaRPr lang="en-US"/>
           </a:p>
         </p:txBody>
       </p:sp>
@@ -1752,7 +1402,7 @@
               <a:pPr>
                 <a:defRPr/>
               </a:pPr>
-              <a:t>9</a:t>
+              <a:t>5</a:t>
             </a:fld>
             <a:endParaRPr lang="sv-SE"/>
           </a:p>
@@ -1761,7 +1411,7 @@
     </p:spTree>
     <p:extLst>
       <p:ext uri="{BB962C8B-B14F-4D97-AF65-F5344CB8AC3E}">
-        <p14:creationId xmlns:p14="http://schemas.microsoft.com/office/powerpoint/2010/main" val="422046913"/>
+        <p14:creationId xmlns:p14="http://schemas.microsoft.com/office/powerpoint/2010/main" val="1770856474"/>
       </p:ext>
     </p:extLst>
   </p:cSld>
@@ -1816,12 +1466,8 @@
           <a:lstStyle/>
           <a:p>
             <a:r>
-              <a:rPr lang="en-US" dirty="0" smtClean="0"/>
-              <a:t>Visa </a:t>
-            </a:r>
-            <a:r>
               <a:rPr lang="en-US" dirty="0" err="1" smtClean="0"/>
-              <a:t>på</a:t>
+              <a:t>Kort</a:t>
             </a:r>
             <a:r>
               <a:rPr lang="en-US" dirty="0" smtClean="0"/>
@@ -1829,33 +1475,64 @@
             </a:r>
             <a:r>
               <a:rPr lang="en-US" dirty="0" err="1" smtClean="0"/>
-              <a:t>problemet</a:t>
-            </a:r>
+              <a:t>om</a:t>
+            </a:r>
+            <a:r>
+              <a:rPr lang="en-US" dirty="0" smtClean="0"/>
+              <a:t> </a:t>
+            </a:r>
+            <a:r>
+              <a:rPr lang="en-US" dirty="0" err="1" smtClean="0"/>
+              <a:t>API’er</a:t>
+            </a:r>
+            <a:r>
+              <a:rPr lang="en-US" dirty="0" smtClean="0"/>
+              <a:t> </a:t>
+            </a:r>
+            <a:r>
+              <a:rPr lang="en-US" dirty="0" err="1" smtClean="0"/>
+              <a:t>för</a:t>
+            </a:r>
+            <a:r>
+              <a:rPr lang="en-US" dirty="0" smtClean="0"/>
+              <a:t> </a:t>
+            </a:r>
+            <a:r>
+              <a:rPr lang="en-US" dirty="0" err="1" smtClean="0"/>
+              <a:t>patientbunden</a:t>
+            </a:r>
+            <a:r>
+              <a:rPr lang="en-US" dirty="0" smtClean="0"/>
+              <a:t> data</a:t>
+            </a:r>
+          </a:p>
+          <a:p>
             <a:endParaRPr lang="en-US" dirty="0" smtClean="0"/>
           </a:p>
           <a:p>
-            <a:endParaRPr lang="en-US" dirty="0" smtClean="0"/>
-          </a:p>
-          <a:p>
             <a:r>
               <a:rPr lang="en-US" dirty="0" smtClean="0"/>
-              <a:t>Den</a:t>
-            </a:r>
-            <a:r>
-              <a:rPr lang="en-US" baseline="0" dirty="0" smtClean="0"/>
+              <a:t>Nu </a:t>
+            </a:r>
+            <a:r>
+              <a:rPr lang="en-US" dirty="0" err="1" smtClean="0"/>
+              <a:t>har</a:t>
+            </a:r>
+            <a:r>
+              <a:rPr lang="en-US" dirty="0" smtClean="0"/>
               <a:t> </a:t>
             </a:r>
             <a:r>
-              <a:rPr lang="en-US" baseline="0" dirty="0" err="1" smtClean="0"/>
-              <a:t>naiva</a:t>
-            </a:r>
-            <a:r>
-              <a:rPr lang="en-US" baseline="0" dirty="0" smtClean="0"/>
+              <a:rPr lang="en-US" dirty="0" err="1" smtClean="0"/>
+              <a:t>ni</a:t>
+            </a:r>
+            <a:r>
+              <a:rPr lang="en-US" dirty="0" smtClean="0"/>
               <a:t> </a:t>
             </a:r>
             <a:r>
-              <a:rPr lang="en-US" baseline="0" dirty="0" err="1" smtClean="0"/>
-              <a:t>approachen</a:t>
+              <a:rPr lang="en-US" dirty="0" err="1" smtClean="0"/>
+              <a:t>testat</a:t>
             </a:r>
             <a:r>
               <a:rPr lang="en-US" baseline="0" dirty="0" smtClean="0"/>
@@ -1863,6 +1540,38 @@
             </a:r>
             <a:r>
               <a:rPr lang="en-US" baseline="0" dirty="0" err="1" smtClean="0"/>
+              <a:t>APIer</a:t>
+            </a:r>
+            <a:r>
+              <a:rPr lang="en-US" baseline="0" dirty="0" smtClean="0"/>
+              <a:t> </a:t>
+            </a:r>
+            <a:r>
+              <a:rPr lang="en-US" baseline="0" dirty="0" err="1" smtClean="0"/>
+              <a:t>för</a:t>
+            </a:r>
+            <a:r>
+              <a:rPr lang="en-US" baseline="0" dirty="0" smtClean="0"/>
+              <a:t> </a:t>
+            </a:r>
+            <a:r>
+              <a:rPr lang="en-US" baseline="0" dirty="0" err="1" smtClean="0"/>
+              <a:t>offentlig</a:t>
+            </a:r>
+            <a:r>
+              <a:rPr lang="en-US" baseline="0" dirty="0" smtClean="0"/>
+              <a:t> data </a:t>
+            </a:r>
+            <a:r>
+              <a:rPr lang="en-US" baseline="0" dirty="0" err="1" smtClean="0"/>
+              <a:t>som</a:t>
+            </a:r>
+            <a:r>
+              <a:rPr lang="en-US" baseline="0" dirty="0" smtClean="0"/>
+              <a:t> </a:t>
+            </a:r>
+            <a:r>
+              <a:rPr lang="en-US" baseline="0" dirty="0" err="1" smtClean="0"/>
               <a:t>är</a:t>
             </a:r>
             <a:r>
@@ -1871,23 +1580,97 @@
             </a:r>
             <a:r>
               <a:rPr lang="en-US" baseline="0" dirty="0" err="1" smtClean="0"/>
+              <a:t>helt</a:t>
+            </a:r>
+            <a:r>
+              <a:rPr lang="en-US" baseline="0" dirty="0" smtClean="0"/>
+              <a:t> </a:t>
+            </a:r>
+            <a:r>
+              <a:rPr lang="en-US" baseline="0" dirty="0" err="1" smtClean="0"/>
+              <a:t>öppna</a:t>
+            </a:r>
+            <a:endParaRPr lang="en-US" baseline="0" dirty="0" smtClean="0"/>
+          </a:p>
+          <a:p>
+            <a:endParaRPr lang="en-US" baseline="0" dirty="0" smtClean="0"/>
+          </a:p>
+          <a:p>
+            <a:r>
+              <a:rPr lang="en-US" baseline="0" dirty="0" err="1" smtClean="0"/>
+              <a:t>Apier</a:t>
+            </a:r>
+            <a:r>
+              <a:rPr lang="en-US" baseline="0" dirty="0" smtClean="0"/>
+              <a:t> </a:t>
+            </a:r>
+            <a:r>
+              <a:rPr lang="en-US" baseline="0" dirty="0" err="1" smtClean="0"/>
+              <a:t>för</a:t>
+            </a:r>
+            <a:r>
+              <a:rPr lang="en-US" baseline="0" dirty="0" smtClean="0"/>
+              <a:t> </a:t>
+            </a:r>
+            <a:r>
+              <a:rPr lang="en-US" baseline="0" dirty="0" err="1" smtClean="0"/>
+              <a:t>patientbunden</a:t>
+            </a:r>
+            <a:r>
+              <a:rPr lang="en-US" baseline="0" dirty="0" smtClean="0"/>
+              <a:t> data </a:t>
+            </a:r>
+            <a:r>
+              <a:rPr lang="en-US" baseline="0" dirty="0" err="1" smtClean="0"/>
+              <a:t>kräver</a:t>
+            </a:r>
+            <a:r>
+              <a:rPr lang="en-US" baseline="0" dirty="0" smtClean="0"/>
+              <a:t> en </a:t>
+            </a:r>
+            <a:r>
+              <a:rPr lang="en-US" baseline="0" dirty="0" err="1" smtClean="0"/>
+              <a:t>strikt</a:t>
+            </a:r>
+            <a:r>
+              <a:rPr lang="en-US" baseline="0" dirty="0" smtClean="0"/>
+              <a:t> </a:t>
+            </a:r>
+            <a:r>
+              <a:rPr lang="en-US" baseline="0" dirty="0" err="1" smtClean="0"/>
+              <a:t>åtkomstkontroll</a:t>
+            </a:r>
+            <a:r>
+              <a:rPr lang="en-US" baseline="0" dirty="0" smtClean="0"/>
+              <a:t> </a:t>
+            </a:r>
+            <a:r>
+              <a:rPr lang="en-US" baseline="0" dirty="0" err="1" smtClean="0"/>
+              <a:t>för</a:t>
+            </a:r>
+            <a:r>
+              <a:rPr lang="en-US" baseline="0" dirty="0" smtClean="0"/>
+              <a:t> </a:t>
+            </a:r>
+            <a:r>
+              <a:rPr lang="en-US" baseline="0" dirty="0" err="1" smtClean="0"/>
               <a:t>att</a:t>
             </a:r>
             <a:r>
               <a:rPr lang="en-US" baseline="0" dirty="0" smtClean="0"/>
-              <a:t> en </a:t>
-            </a:r>
-            <a:r>
-              <a:rPr lang="en-US" baseline="0" dirty="0" err="1" smtClean="0"/>
-              <a:t>betrodd</a:t>
-            </a:r>
-            <a:r>
-              <a:rPr lang="en-US" baseline="0" dirty="0" smtClean="0"/>
               <a:t> </a:t>
             </a:r>
             <a:r>
               <a:rPr lang="en-US" baseline="0" dirty="0" err="1" smtClean="0"/>
-              <a:t>klient</a:t>
+              <a:t>inte</a:t>
+            </a:r>
+            <a:r>
+              <a:rPr lang="en-US" baseline="0" dirty="0" smtClean="0"/>
+              <a:t> data </a:t>
+            </a:r>
+            <a:r>
+              <a:rPr lang="en-US" baseline="0" dirty="0" err="1" smtClean="0"/>
+              <a:t>skall</a:t>
             </a:r>
             <a:r>
               <a:rPr lang="en-US" baseline="0" dirty="0" smtClean="0"/>
@@ -1895,7 +1678,7 @@
             </a:r>
             <a:r>
               <a:rPr lang="en-US" baseline="0" dirty="0" err="1" smtClean="0"/>
-              <a:t>kan</a:t>
+              <a:t>hamna</a:t>
             </a:r>
             <a:r>
               <a:rPr lang="en-US" baseline="0" dirty="0" smtClean="0"/>
@@ -1903,7 +1686,7 @@
             </a:r>
             <a:r>
               <a:rPr lang="en-US" baseline="0" dirty="0" err="1" smtClean="0"/>
-              <a:t>anropa</a:t>
+              <a:t>i</a:t>
             </a:r>
             <a:r>
               <a:rPr lang="en-US" baseline="0" dirty="0" smtClean="0"/>
@@ -1911,7 +1694,7 @@
             </a:r>
             <a:r>
               <a:rPr lang="en-US" baseline="0" dirty="0" err="1" smtClean="0"/>
-              <a:t>APIet</a:t>
+              <a:t>orätta</a:t>
             </a:r>
             <a:r>
               <a:rPr lang="en-US" baseline="0" dirty="0" smtClean="0"/>
@@ -1919,7 +1702,64 @@
             </a:r>
             <a:r>
               <a:rPr lang="en-US" baseline="0" dirty="0" err="1" smtClean="0"/>
-              <a:t>och</a:t>
+              <a:t>händer</a:t>
+            </a:r>
+            <a:endParaRPr lang="en-US" baseline="0" dirty="0" smtClean="0"/>
+          </a:p>
+          <a:p>
+            <a:endParaRPr lang="en-US" baseline="0" dirty="0" smtClean="0"/>
+          </a:p>
+          <a:p>
+            <a:r>
+              <a:rPr lang="en-US" baseline="0" dirty="0" err="1" smtClean="0"/>
+              <a:t>Förtroende</a:t>
+            </a:r>
+            <a:r>
+              <a:rPr lang="en-US" baseline="0" dirty="0" smtClean="0"/>
+              <a:t> -&gt; </a:t>
+            </a:r>
+            <a:r>
+              <a:rPr lang="en-US" baseline="0" dirty="0" err="1" smtClean="0"/>
+              <a:t>www.minavardkontakter.se</a:t>
+            </a:r>
+            <a:endParaRPr lang="en-US" baseline="0" dirty="0" smtClean="0"/>
+          </a:p>
+          <a:p>
+            <a:r>
+              <a:rPr lang="en-US" baseline="0" dirty="0" err="1" smtClean="0"/>
+              <a:t>Identifiering</a:t>
+            </a:r>
+            <a:r>
+              <a:rPr lang="en-US" baseline="0" dirty="0" smtClean="0"/>
+              <a:t> -&gt; </a:t>
+            </a:r>
+            <a:r>
+              <a:rPr lang="en-US" baseline="0" dirty="0" err="1" smtClean="0"/>
+              <a:t>inloggning</a:t>
+            </a:r>
+            <a:r>
+              <a:rPr lang="en-US" baseline="0" dirty="0" smtClean="0"/>
+              <a:t> via </a:t>
+            </a:r>
+            <a:r>
+              <a:rPr lang="en-US" baseline="0" dirty="0" err="1" smtClean="0"/>
+              <a:t>mvk</a:t>
+            </a:r>
+            <a:r>
+              <a:rPr lang="en-US" baseline="0" dirty="0" smtClean="0"/>
+              <a:t> med 2-faktorsautenticering till </a:t>
+            </a:r>
+            <a:r>
+              <a:rPr lang="en-US" baseline="0" dirty="0" err="1" smtClean="0"/>
+              <a:t>excempel</a:t>
+            </a:r>
+            <a:r>
+              <a:rPr lang="en-US" baseline="0" dirty="0" smtClean="0"/>
+              <a:t> e-leg. </a:t>
+            </a:r>
+            <a:r>
+              <a:rPr lang="en-US" baseline="0" dirty="0" err="1" smtClean="0"/>
+              <a:t>Krav</a:t>
             </a:r>
             <a:r>
               <a:rPr lang="en-US" baseline="0" dirty="0" smtClean="0"/>
@@ -1927,7 +1767,7 @@
             </a:r>
             <a:r>
               <a:rPr lang="en-US" baseline="0" dirty="0" err="1" smtClean="0"/>
-              <a:t>begära</a:t>
+              <a:t>från</a:t>
             </a:r>
             <a:r>
               <a:rPr lang="en-US" baseline="0" dirty="0" smtClean="0"/>
@@ -1935,15 +1775,39 @@
             </a:r>
             <a:r>
               <a:rPr lang="en-US" baseline="0" dirty="0" err="1" smtClean="0"/>
-              <a:t>ut</a:t>
-            </a:r>
-            <a:r>
-              <a:rPr lang="en-US" baseline="0" dirty="0" smtClean="0"/>
-              <a:t> den information </a:t>
-            </a:r>
-            <a:r>
-              <a:rPr lang="en-US" baseline="0" dirty="0" err="1" smtClean="0"/>
-              <a:t>som</a:t>
+              <a:t>datainspektionen</a:t>
+            </a:r>
+            <a:r>
+              <a:rPr lang="en-US" baseline="0" dirty="0" smtClean="0"/>
+              <a:t>.</a:t>
+            </a:r>
+          </a:p>
+          <a:p>
+            <a:r>
+              <a:rPr lang="en-US" baseline="0" dirty="0" err="1" smtClean="0"/>
+              <a:t>Auktorisation</a:t>
+            </a:r>
+            <a:r>
+              <a:rPr lang="en-US" baseline="0" dirty="0" smtClean="0"/>
+              <a:t>….</a:t>
+            </a:r>
+          </a:p>
+          <a:p>
+            <a:r>
+              <a:rPr lang="en-US" baseline="0" dirty="0" smtClean="0"/>
+              <a:t>   </a:t>
+            </a:r>
+            <a:r>
+              <a:rPr lang="en-US" baseline="0" dirty="0" err="1" smtClean="0"/>
+              <a:t>Oauth</a:t>
+            </a:r>
+            <a:r>
+              <a:rPr lang="en-US" baseline="0" dirty="0" smtClean="0"/>
+              <a:t> 2.0 TADA… </a:t>
+            </a:r>
+            <a:r>
+              <a:rPr lang="en-US" baseline="0" dirty="0" err="1" smtClean="0"/>
+              <a:t>vänd</a:t>
             </a:r>
             <a:r>
               <a:rPr lang="en-US" baseline="0" dirty="0" smtClean="0"/>
@@ -1951,383 +1815,12 @@
             </a:r>
             <a:r>
               <a:rPr lang="en-US" baseline="0" dirty="0" err="1" smtClean="0"/>
-              <a:t>behövs</a:t>
+              <a:t>blad</a:t>
             </a:r>
             <a:endParaRPr lang="en-US" baseline="0" dirty="0" smtClean="0"/>
           </a:p>
           <a:p>
             <a:endParaRPr lang="en-US" baseline="0" dirty="0" smtClean="0"/>
-          </a:p>
-          <a:p>
-            <a:r>
-              <a:rPr lang="en-US" baseline="0" dirty="0" smtClean="0"/>
-              <a:t>MEN… </a:t>
-            </a:r>
-            <a:r>
-              <a:rPr lang="en-US" baseline="0" dirty="0" err="1" smtClean="0"/>
-              <a:t>är</a:t>
-            </a:r>
-            <a:r>
-              <a:rPr lang="en-US" baseline="0" dirty="0" smtClean="0"/>
-              <a:t> </a:t>
-            </a:r>
-            <a:r>
-              <a:rPr lang="en-US" baseline="0" dirty="0" err="1" smtClean="0"/>
-              <a:t>det</a:t>
-            </a:r>
-            <a:r>
-              <a:rPr lang="en-US" baseline="0" dirty="0" smtClean="0"/>
-              <a:t> </a:t>
-            </a:r>
-            <a:r>
-              <a:rPr lang="en-US" baseline="0" dirty="0" err="1" smtClean="0"/>
-              <a:t>säkert</a:t>
-            </a:r>
-            <a:r>
-              <a:rPr lang="en-US" baseline="0" dirty="0" smtClean="0"/>
-              <a:t> </a:t>
-            </a:r>
-            <a:r>
-              <a:rPr lang="en-US" baseline="0" dirty="0" err="1" smtClean="0"/>
-              <a:t>att</a:t>
-            </a:r>
-            <a:r>
-              <a:rPr lang="en-US" baseline="0" dirty="0" smtClean="0"/>
-              <a:t> </a:t>
-            </a:r>
-            <a:r>
-              <a:rPr lang="en-US" baseline="0" dirty="0" err="1" smtClean="0"/>
-              <a:t>invånaren</a:t>
-            </a:r>
-            <a:r>
-              <a:rPr lang="en-US" baseline="0" dirty="0" smtClean="0"/>
-              <a:t> </a:t>
-            </a:r>
-            <a:r>
-              <a:rPr lang="en-US" baseline="0" dirty="0" err="1" smtClean="0"/>
-              <a:t>kan</a:t>
-            </a:r>
-            <a:r>
-              <a:rPr lang="en-US" baseline="0" dirty="0" smtClean="0"/>
-              <a:t> </a:t>
-            </a:r>
-            <a:r>
-              <a:rPr lang="en-US" baseline="0" dirty="0" err="1" smtClean="0"/>
-              <a:t>lita</a:t>
-            </a:r>
-            <a:r>
-              <a:rPr lang="en-US" baseline="0" dirty="0" smtClean="0"/>
-              <a:t> </a:t>
-            </a:r>
-            <a:r>
-              <a:rPr lang="en-US" baseline="0" dirty="0" err="1" smtClean="0"/>
-              <a:t>på</a:t>
-            </a:r>
-            <a:r>
-              <a:rPr lang="en-US" baseline="0" dirty="0" smtClean="0"/>
-              <a:t> </a:t>
-            </a:r>
-            <a:r>
-              <a:rPr lang="en-US" baseline="0" dirty="0" err="1" smtClean="0"/>
-              <a:t>att</a:t>
-            </a:r>
-            <a:r>
-              <a:rPr lang="en-US" baseline="0" dirty="0" smtClean="0"/>
-              <a:t> </a:t>
-            </a:r>
-            <a:r>
-              <a:rPr lang="en-US" baseline="0" dirty="0" err="1" smtClean="0"/>
-              <a:t>klieneten</a:t>
-            </a:r>
-            <a:r>
-              <a:rPr lang="en-US" baseline="0" dirty="0" smtClean="0"/>
-              <a:t> </a:t>
-            </a:r>
-            <a:r>
-              <a:rPr lang="en-US" baseline="0" dirty="0" err="1" smtClean="0"/>
-              <a:t>inte</a:t>
-            </a:r>
-            <a:r>
-              <a:rPr lang="en-US" baseline="0" dirty="0" smtClean="0"/>
-              <a:t> </a:t>
-            </a:r>
-            <a:r>
-              <a:rPr lang="en-US" baseline="0" dirty="0" err="1" smtClean="0"/>
-              <a:t>begär</a:t>
-            </a:r>
-            <a:r>
-              <a:rPr lang="en-US" baseline="0" dirty="0" smtClean="0"/>
-              <a:t> </a:t>
-            </a:r>
-            <a:r>
-              <a:rPr lang="en-US" baseline="0" dirty="0" err="1" smtClean="0"/>
-              <a:t>ut</a:t>
-            </a:r>
-            <a:r>
-              <a:rPr lang="en-US" baseline="0" dirty="0" smtClean="0"/>
-              <a:t> information </a:t>
-            </a:r>
-            <a:r>
-              <a:rPr lang="en-US" baseline="0" dirty="0" err="1" smtClean="0"/>
-              <a:t>utan</a:t>
-            </a:r>
-            <a:r>
-              <a:rPr lang="en-US" baseline="0" dirty="0" smtClean="0"/>
-              <a:t> </a:t>
-            </a:r>
-            <a:r>
-              <a:rPr lang="en-US" baseline="0" dirty="0" err="1" smtClean="0"/>
-              <a:t>att</a:t>
-            </a:r>
-            <a:r>
-              <a:rPr lang="en-US" baseline="0" dirty="0" smtClean="0"/>
-              <a:t> </a:t>
-            </a:r>
-            <a:r>
-              <a:rPr lang="en-US" baseline="0" dirty="0" err="1" smtClean="0"/>
-              <a:t>invånaren</a:t>
-            </a:r>
-            <a:r>
-              <a:rPr lang="en-US" baseline="0" dirty="0" smtClean="0"/>
-              <a:t> </a:t>
-            </a:r>
-            <a:r>
-              <a:rPr lang="en-US" baseline="0" dirty="0" err="1" smtClean="0"/>
-              <a:t>godkänt</a:t>
-            </a:r>
-            <a:r>
-              <a:rPr lang="en-US" baseline="0" dirty="0" smtClean="0"/>
-              <a:t>.</a:t>
-            </a:r>
-          </a:p>
-          <a:p>
-            <a:endParaRPr lang="en-US" baseline="0" dirty="0" smtClean="0"/>
-          </a:p>
-          <a:p>
-            <a:r>
-              <a:rPr lang="en-US" baseline="0" dirty="0" err="1" smtClean="0"/>
-              <a:t>För</a:t>
-            </a:r>
-            <a:r>
-              <a:rPr lang="en-US" baseline="0" dirty="0" smtClean="0"/>
-              <a:t> </a:t>
-            </a:r>
-            <a:r>
-              <a:rPr lang="en-US" baseline="0" dirty="0" err="1" smtClean="0"/>
-              <a:t>att</a:t>
-            </a:r>
-            <a:r>
-              <a:rPr lang="en-US" baseline="0" dirty="0" smtClean="0"/>
-              <a:t> </a:t>
-            </a:r>
-            <a:r>
-              <a:rPr lang="en-US" baseline="0" dirty="0" err="1" smtClean="0"/>
-              <a:t>få</a:t>
-            </a:r>
-            <a:r>
-              <a:rPr lang="en-US" baseline="0" dirty="0" smtClean="0"/>
-              <a:t> </a:t>
-            </a:r>
-            <a:r>
-              <a:rPr lang="en-US" baseline="0" dirty="0" err="1" smtClean="0"/>
-              <a:t>tillit</a:t>
-            </a:r>
-            <a:r>
-              <a:rPr lang="en-US" baseline="0" dirty="0" smtClean="0"/>
-              <a:t> I </a:t>
-            </a:r>
-            <a:r>
-              <a:rPr lang="en-US" baseline="0" dirty="0" err="1" smtClean="0"/>
-              <a:t>systemet</a:t>
-            </a:r>
-            <a:r>
-              <a:rPr lang="en-US" baseline="0" dirty="0" smtClean="0"/>
-              <a:t> </a:t>
-            </a:r>
-            <a:r>
-              <a:rPr lang="en-US" baseline="0" dirty="0" err="1" smtClean="0"/>
-              <a:t>behöver</a:t>
-            </a:r>
-            <a:r>
-              <a:rPr lang="en-US" baseline="0" dirty="0" smtClean="0"/>
-              <a:t> </a:t>
-            </a:r>
-            <a:r>
-              <a:rPr lang="en-US" baseline="0" dirty="0" err="1" smtClean="0"/>
-              <a:t>det</a:t>
-            </a:r>
-            <a:r>
-              <a:rPr lang="en-US" baseline="0" dirty="0" smtClean="0"/>
-              <a:t> </a:t>
-            </a:r>
-            <a:r>
-              <a:rPr lang="en-US" baseline="0" dirty="0" err="1" smtClean="0"/>
-              <a:t>finnas</a:t>
-            </a:r>
-            <a:r>
-              <a:rPr lang="en-US" baseline="0" dirty="0" smtClean="0"/>
-              <a:t> en </a:t>
-            </a:r>
-            <a:r>
-              <a:rPr lang="en-US" baseline="0" dirty="0" err="1" smtClean="0"/>
-              <a:t>mekanism</a:t>
-            </a:r>
-            <a:r>
-              <a:rPr lang="en-US" baseline="0" dirty="0" smtClean="0"/>
-              <a:t> </a:t>
-            </a:r>
-            <a:r>
-              <a:rPr lang="en-US" baseline="0" dirty="0" err="1" smtClean="0"/>
-              <a:t>som</a:t>
-            </a:r>
-            <a:r>
-              <a:rPr lang="en-US" baseline="0" dirty="0" smtClean="0"/>
-              <a:t> </a:t>
-            </a:r>
-            <a:r>
-              <a:rPr lang="en-US" baseline="0" dirty="0" err="1" smtClean="0"/>
-              <a:t>gör</a:t>
-            </a:r>
-            <a:r>
-              <a:rPr lang="en-US" baseline="0" dirty="0" smtClean="0"/>
-              <a:t> </a:t>
-            </a:r>
-            <a:r>
-              <a:rPr lang="en-US" baseline="0" dirty="0" err="1" smtClean="0"/>
-              <a:t>att</a:t>
-            </a:r>
-            <a:r>
-              <a:rPr lang="en-US" baseline="0" dirty="0" smtClean="0"/>
-              <a:t> </a:t>
-            </a:r>
-            <a:r>
-              <a:rPr lang="en-US" baseline="0" dirty="0" err="1" smtClean="0"/>
-              <a:t>klienten</a:t>
-            </a:r>
-            <a:r>
-              <a:rPr lang="en-US" baseline="0" dirty="0" smtClean="0"/>
-              <a:t> </a:t>
-            </a:r>
-            <a:r>
-              <a:rPr lang="en-US" baseline="0" dirty="0" err="1" smtClean="0"/>
-              <a:t>endast</a:t>
-            </a:r>
-            <a:r>
-              <a:rPr lang="en-US" baseline="0" dirty="0" smtClean="0"/>
-              <a:t> </a:t>
-            </a:r>
-            <a:r>
-              <a:rPr lang="en-US" baseline="0" dirty="0" err="1" smtClean="0"/>
-              <a:t>kan</a:t>
-            </a:r>
-            <a:r>
-              <a:rPr lang="en-US" baseline="0" dirty="0" smtClean="0"/>
-              <a:t> </a:t>
-            </a:r>
-            <a:r>
-              <a:rPr lang="en-US" baseline="0" dirty="0" err="1" smtClean="0"/>
-              <a:t>hämta</a:t>
-            </a:r>
-            <a:r>
-              <a:rPr lang="en-US" baseline="0" dirty="0" smtClean="0"/>
-              <a:t> </a:t>
-            </a:r>
-            <a:r>
-              <a:rPr lang="en-US" baseline="0" dirty="0" err="1" smtClean="0"/>
-              <a:t>ut</a:t>
-            </a:r>
-            <a:r>
-              <a:rPr lang="en-US" baseline="0" dirty="0" smtClean="0"/>
-              <a:t> information </a:t>
-            </a:r>
-            <a:r>
-              <a:rPr lang="en-US" baseline="0" dirty="0" err="1" smtClean="0"/>
-              <a:t>som</a:t>
-            </a:r>
-            <a:r>
-              <a:rPr lang="en-US" baseline="0" dirty="0" smtClean="0"/>
-              <a:t> </a:t>
-            </a:r>
-            <a:r>
-              <a:rPr lang="en-US" baseline="0" dirty="0" err="1" smtClean="0"/>
-              <a:t>invånaren</a:t>
-            </a:r>
-            <a:r>
-              <a:rPr lang="en-US" baseline="0" dirty="0" smtClean="0"/>
-              <a:t> </a:t>
-            </a:r>
-            <a:r>
-              <a:rPr lang="en-US" baseline="0" dirty="0" err="1" smtClean="0"/>
-              <a:t>har</a:t>
-            </a:r>
-            <a:r>
-              <a:rPr lang="en-US" baseline="0" dirty="0" smtClean="0"/>
-              <a:t> </a:t>
-            </a:r>
-            <a:r>
-              <a:rPr lang="en-US" baseline="0" dirty="0" err="1" smtClean="0"/>
-              <a:t>godkänt</a:t>
-            </a:r>
-            <a:r>
-              <a:rPr lang="en-US" baseline="0" dirty="0" smtClean="0"/>
-              <a:t>.</a:t>
-            </a:r>
-          </a:p>
-          <a:p>
-            <a:r>
-              <a:rPr lang="en-US" baseline="0" dirty="0" err="1" smtClean="0"/>
-              <a:t>APIet</a:t>
-            </a:r>
-            <a:r>
-              <a:rPr lang="en-US" baseline="0" dirty="0" smtClean="0"/>
-              <a:t> </a:t>
-            </a:r>
-            <a:r>
-              <a:rPr lang="en-US" baseline="0" dirty="0" err="1" smtClean="0"/>
-              <a:t>behöver</a:t>
-            </a:r>
-            <a:r>
-              <a:rPr lang="en-US" baseline="0" dirty="0" smtClean="0"/>
-              <a:t> </a:t>
-            </a:r>
-            <a:r>
-              <a:rPr lang="en-US" baseline="0" dirty="0" err="1" smtClean="0"/>
-              <a:t>verifiera</a:t>
-            </a:r>
-            <a:r>
-              <a:rPr lang="en-US" baseline="0" dirty="0" smtClean="0"/>
-              <a:t> </a:t>
-            </a:r>
-            <a:r>
-              <a:rPr lang="en-US" baseline="0" dirty="0" err="1" smtClean="0"/>
-              <a:t>detta</a:t>
-            </a:r>
-            <a:r>
-              <a:rPr lang="en-US" baseline="0" dirty="0" smtClean="0"/>
-              <a:t>.</a:t>
-            </a:r>
-          </a:p>
-          <a:p>
-            <a:endParaRPr lang="en-US" baseline="0" dirty="0" smtClean="0"/>
-          </a:p>
-          <a:p>
-            <a:r>
-              <a:rPr lang="en-US" baseline="0" dirty="0" err="1" smtClean="0"/>
-              <a:t>Såååå</a:t>
-            </a:r>
-            <a:r>
-              <a:rPr lang="en-US" baseline="0" dirty="0" smtClean="0"/>
-              <a:t>…… OAUTH 2.0 </a:t>
-            </a:r>
-            <a:r>
-              <a:rPr lang="en-US" baseline="0" dirty="0" err="1" smtClean="0"/>
-              <a:t>nästa</a:t>
-            </a:r>
-            <a:r>
-              <a:rPr lang="en-US" baseline="0" dirty="0" smtClean="0"/>
-              <a:t> slide…</a:t>
-            </a:r>
-            <a:endParaRPr lang="en-US" dirty="0"/>
           </a:p>
         </p:txBody>
       </p:sp>
@@ -2363,7 +1856,7 @@
     </p:spTree>
     <p:extLst>
       <p:ext uri="{BB962C8B-B14F-4D97-AF65-F5344CB8AC3E}">
-        <p14:creationId xmlns:p14="http://schemas.microsoft.com/office/powerpoint/2010/main" val="1531746770"/>
+        <p14:creationId xmlns:p14="http://schemas.microsoft.com/office/powerpoint/2010/main" val="422046913"/>
       </p:ext>
     </p:extLst>
   </p:cSld>
@@ -2417,7 +1910,519 @@
           <a:bodyPr/>
           <a:lstStyle/>
           <a:p>
+            <a:r>
+              <a:rPr lang="en-US" dirty="0" smtClean="0"/>
+              <a:t>Visa </a:t>
+            </a:r>
+            <a:r>
+              <a:rPr lang="en-US" dirty="0" err="1" smtClean="0"/>
+              <a:t>på</a:t>
+            </a:r>
+            <a:r>
+              <a:rPr lang="en-US" dirty="0" smtClean="0"/>
+              <a:t> </a:t>
+            </a:r>
+            <a:r>
+              <a:rPr lang="en-US" dirty="0" err="1" smtClean="0"/>
+              <a:t>problemet</a:t>
+            </a:r>
+            <a:endParaRPr lang="en-US" dirty="0" smtClean="0"/>
+          </a:p>
+          <a:p>
+            <a:endParaRPr lang="en-US" dirty="0" smtClean="0"/>
+          </a:p>
+          <a:p>
+            <a:r>
+              <a:rPr lang="en-US" dirty="0" smtClean="0"/>
+              <a:t>Den</a:t>
+            </a:r>
+            <a:r>
+              <a:rPr lang="en-US" baseline="0" dirty="0" smtClean="0"/>
+              <a:t> </a:t>
+            </a:r>
+            <a:r>
+              <a:rPr lang="en-US" baseline="0" dirty="0" err="1" smtClean="0"/>
+              <a:t>naiva</a:t>
+            </a:r>
+            <a:r>
+              <a:rPr lang="en-US" baseline="0" dirty="0" smtClean="0"/>
+              <a:t> </a:t>
+            </a:r>
+            <a:r>
+              <a:rPr lang="en-US" baseline="0" dirty="0" err="1" smtClean="0"/>
+              <a:t>approachen</a:t>
+            </a:r>
+            <a:r>
+              <a:rPr lang="en-US" baseline="0" dirty="0" smtClean="0"/>
+              <a:t> </a:t>
+            </a:r>
+            <a:r>
+              <a:rPr lang="en-US" baseline="0" dirty="0" err="1" smtClean="0"/>
+              <a:t>är</a:t>
+            </a:r>
+            <a:r>
+              <a:rPr lang="en-US" baseline="0" dirty="0" smtClean="0"/>
+              <a:t> </a:t>
+            </a:r>
+            <a:r>
+              <a:rPr lang="en-US" baseline="0" dirty="0" err="1" smtClean="0"/>
+              <a:t>att</a:t>
+            </a:r>
+            <a:r>
+              <a:rPr lang="en-US" baseline="0" dirty="0" smtClean="0"/>
+              <a:t> en </a:t>
+            </a:r>
+            <a:r>
+              <a:rPr lang="en-US" baseline="0" dirty="0" err="1" smtClean="0"/>
+              <a:t>betrodd</a:t>
+            </a:r>
+            <a:r>
+              <a:rPr lang="en-US" baseline="0" dirty="0" smtClean="0"/>
+              <a:t> </a:t>
+            </a:r>
+            <a:r>
+              <a:rPr lang="en-US" baseline="0" dirty="0" err="1" smtClean="0"/>
+              <a:t>klient</a:t>
+            </a:r>
+            <a:r>
+              <a:rPr lang="en-US" baseline="0" dirty="0" smtClean="0"/>
+              <a:t> </a:t>
+            </a:r>
+            <a:r>
+              <a:rPr lang="en-US" baseline="0" dirty="0" err="1" smtClean="0"/>
+              <a:t>kan</a:t>
+            </a:r>
+            <a:r>
+              <a:rPr lang="en-US" baseline="0" dirty="0" smtClean="0"/>
+              <a:t> </a:t>
+            </a:r>
+            <a:r>
+              <a:rPr lang="en-US" baseline="0" dirty="0" err="1" smtClean="0"/>
+              <a:t>anropa</a:t>
+            </a:r>
+            <a:r>
+              <a:rPr lang="en-US" baseline="0" dirty="0" smtClean="0"/>
+              <a:t> </a:t>
+            </a:r>
+            <a:r>
+              <a:rPr lang="en-US" baseline="0" dirty="0" err="1" smtClean="0"/>
+              <a:t>APIet</a:t>
+            </a:r>
+            <a:r>
+              <a:rPr lang="en-US" baseline="0" dirty="0" smtClean="0"/>
+              <a:t> </a:t>
+            </a:r>
+            <a:r>
+              <a:rPr lang="en-US" baseline="0" dirty="0" err="1" smtClean="0"/>
+              <a:t>och</a:t>
+            </a:r>
+            <a:r>
+              <a:rPr lang="en-US" baseline="0" dirty="0" smtClean="0"/>
+              <a:t> </a:t>
+            </a:r>
+            <a:r>
+              <a:rPr lang="en-US" baseline="0" dirty="0" err="1" smtClean="0"/>
+              <a:t>begära</a:t>
+            </a:r>
+            <a:r>
+              <a:rPr lang="en-US" baseline="0" dirty="0" smtClean="0"/>
+              <a:t> </a:t>
+            </a:r>
+            <a:r>
+              <a:rPr lang="en-US" baseline="0" dirty="0" err="1" smtClean="0"/>
+              <a:t>ut</a:t>
+            </a:r>
+            <a:r>
+              <a:rPr lang="en-US" baseline="0" dirty="0" smtClean="0"/>
+              <a:t> den information </a:t>
+            </a:r>
+            <a:r>
+              <a:rPr lang="en-US" baseline="0" dirty="0" err="1" smtClean="0"/>
+              <a:t>som</a:t>
+            </a:r>
+            <a:r>
+              <a:rPr lang="en-US" baseline="0" dirty="0" smtClean="0"/>
+              <a:t> </a:t>
+            </a:r>
+            <a:r>
+              <a:rPr lang="en-US" baseline="0" dirty="0" err="1" smtClean="0"/>
+              <a:t>behövs</a:t>
+            </a:r>
             <a:endParaRPr lang="en-US" baseline="0" dirty="0" smtClean="0"/>
+          </a:p>
+          <a:p>
+            <a:endParaRPr lang="en-US" baseline="0" dirty="0" smtClean="0"/>
+          </a:p>
+          <a:p>
+            <a:r>
+              <a:rPr lang="en-US" baseline="0" dirty="0" smtClean="0"/>
+              <a:t>MEN… </a:t>
+            </a:r>
+            <a:r>
+              <a:rPr lang="en-US" baseline="0" dirty="0" err="1" smtClean="0"/>
+              <a:t>är</a:t>
+            </a:r>
+            <a:r>
+              <a:rPr lang="en-US" baseline="0" dirty="0" smtClean="0"/>
+              <a:t> </a:t>
+            </a:r>
+            <a:r>
+              <a:rPr lang="en-US" baseline="0" dirty="0" err="1" smtClean="0"/>
+              <a:t>det</a:t>
+            </a:r>
+            <a:r>
+              <a:rPr lang="en-US" baseline="0" dirty="0" smtClean="0"/>
+              <a:t> </a:t>
+            </a:r>
+            <a:r>
+              <a:rPr lang="en-US" baseline="0" dirty="0" err="1" smtClean="0"/>
+              <a:t>säkert</a:t>
+            </a:r>
+            <a:r>
+              <a:rPr lang="en-US" baseline="0" dirty="0" smtClean="0"/>
+              <a:t> </a:t>
+            </a:r>
+            <a:r>
+              <a:rPr lang="en-US" baseline="0" dirty="0" err="1" smtClean="0"/>
+              <a:t>att</a:t>
+            </a:r>
+            <a:r>
+              <a:rPr lang="en-US" baseline="0" dirty="0" smtClean="0"/>
+              <a:t> </a:t>
+            </a:r>
+            <a:r>
+              <a:rPr lang="en-US" baseline="0" dirty="0" err="1" smtClean="0"/>
+              <a:t>invånaren</a:t>
+            </a:r>
+            <a:r>
+              <a:rPr lang="en-US" baseline="0" dirty="0" smtClean="0"/>
+              <a:t> </a:t>
+            </a:r>
+            <a:r>
+              <a:rPr lang="en-US" baseline="0" dirty="0" err="1" smtClean="0"/>
+              <a:t>kan</a:t>
+            </a:r>
+            <a:r>
+              <a:rPr lang="en-US" baseline="0" dirty="0" smtClean="0"/>
+              <a:t> </a:t>
+            </a:r>
+            <a:r>
+              <a:rPr lang="en-US" baseline="0" dirty="0" err="1" smtClean="0"/>
+              <a:t>lita</a:t>
+            </a:r>
+            <a:r>
+              <a:rPr lang="en-US" baseline="0" dirty="0" smtClean="0"/>
+              <a:t> </a:t>
+            </a:r>
+            <a:r>
+              <a:rPr lang="en-US" baseline="0" dirty="0" err="1" smtClean="0"/>
+              <a:t>på</a:t>
+            </a:r>
+            <a:r>
+              <a:rPr lang="en-US" baseline="0" dirty="0" smtClean="0"/>
+              <a:t> </a:t>
+            </a:r>
+            <a:r>
+              <a:rPr lang="en-US" baseline="0" dirty="0" err="1" smtClean="0"/>
+              <a:t>att</a:t>
+            </a:r>
+            <a:r>
+              <a:rPr lang="en-US" baseline="0" dirty="0" smtClean="0"/>
+              <a:t> </a:t>
+            </a:r>
+            <a:r>
+              <a:rPr lang="en-US" baseline="0" dirty="0" err="1" smtClean="0"/>
+              <a:t>klieneten</a:t>
+            </a:r>
+            <a:r>
+              <a:rPr lang="en-US" baseline="0" dirty="0" smtClean="0"/>
+              <a:t> </a:t>
+            </a:r>
+            <a:r>
+              <a:rPr lang="en-US" baseline="0" dirty="0" err="1" smtClean="0"/>
+              <a:t>inte</a:t>
+            </a:r>
+            <a:r>
+              <a:rPr lang="en-US" baseline="0" dirty="0" smtClean="0"/>
+              <a:t> </a:t>
+            </a:r>
+            <a:r>
+              <a:rPr lang="en-US" baseline="0" dirty="0" err="1" smtClean="0"/>
+              <a:t>begär</a:t>
+            </a:r>
+            <a:r>
+              <a:rPr lang="en-US" baseline="0" dirty="0" smtClean="0"/>
+              <a:t> </a:t>
+            </a:r>
+            <a:r>
+              <a:rPr lang="en-US" baseline="0" dirty="0" err="1" smtClean="0"/>
+              <a:t>ut</a:t>
+            </a:r>
+            <a:r>
+              <a:rPr lang="en-US" baseline="0" dirty="0" smtClean="0"/>
+              <a:t> information </a:t>
+            </a:r>
+            <a:r>
+              <a:rPr lang="en-US" baseline="0" dirty="0" err="1" smtClean="0"/>
+              <a:t>utan</a:t>
+            </a:r>
+            <a:r>
+              <a:rPr lang="en-US" baseline="0" dirty="0" smtClean="0"/>
+              <a:t> </a:t>
+            </a:r>
+            <a:r>
+              <a:rPr lang="en-US" baseline="0" dirty="0" err="1" smtClean="0"/>
+              <a:t>att</a:t>
+            </a:r>
+            <a:r>
+              <a:rPr lang="en-US" baseline="0" dirty="0" smtClean="0"/>
+              <a:t> </a:t>
+            </a:r>
+            <a:r>
+              <a:rPr lang="en-US" baseline="0" dirty="0" err="1" smtClean="0"/>
+              <a:t>invånaren</a:t>
+            </a:r>
+            <a:r>
+              <a:rPr lang="en-US" baseline="0" dirty="0" smtClean="0"/>
+              <a:t> </a:t>
+            </a:r>
+            <a:r>
+              <a:rPr lang="en-US" baseline="0" dirty="0" err="1" smtClean="0"/>
+              <a:t>godkänt</a:t>
+            </a:r>
+            <a:r>
+              <a:rPr lang="en-US" baseline="0" dirty="0" smtClean="0"/>
+              <a:t>.</a:t>
+            </a:r>
+          </a:p>
+          <a:p>
+            <a:endParaRPr lang="en-US" baseline="0" dirty="0" smtClean="0"/>
+          </a:p>
+          <a:p>
+            <a:r>
+              <a:rPr lang="en-US" baseline="0" dirty="0" err="1" smtClean="0"/>
+              <a:t>För</a:t>
+            </a:r>
+            <a:r>
+              <a:rPr lang="en-US" baseline="0" dirty="0" smtClean="0"/>
+              <a:t> </a:t>
+            </a:r>
+            <a:r>
+              <a:rPr lang="en-US" baseline="0" dirty="0" err="1" smtClean="0"/>
+              <a:t>att</a:t>
+            </a:r>
+            <a:r>
+              <a:rPr lang="en-US" baseline="0" dirty="0" smtClean="0"/>
+              <a:t> </a:t>
+            </a:r>
+            <a:r>
+              <a:rPr lang="en-US" baseline="0" dirty="0" err="1" smtClean="0"/>
+              <a:t>få</a:t>
+            </a:r>
+            <a:r>
+              <a:rPr lang="en-US" baseline="0" dirty="0" smtClean="0"/>
+              <a:t> </a:t>
+            </a:r>
+            <a:r>
+              <a:rPr lang="en-US" baseline="0" dirty="0" err="1" smtClean="0"/>
+              <a:t>tillit</a:t>
+            </a:r>
+            <a:r>
+              <a:rPr lang="en-US" baseline="0" dirty="0" smtClean="0"/>
+              <a:t> I </a:t>
+            </a:r>
+            <a:r>
+              <a:rPr lang="en-US" baseline="0" dirty="0" err="1" smtClean="0"/>
+              <a:t>systemet</a:t>
+            </a:r>
+            <a:r>
+              <a:rPr lang="en-US" baseline="0" dirty="0" smtClean="0"/>
+              <a:t> </a:t>
+            </a:r>
+            <a:r>
+              <a:rPr lang="en-US" baseline="0" dirty="0" err="1" smtClean="0"/>
+              <a:t>behöver</a:t>
+            </a:r>
+            <a:r>
+              <a:rPr lang="en-US" baseline="0" dirty="0" smtClean="0"/>
+              <a:t> </a:t>
+            </a:r>
+            <a:r>
+              <a:rPr lang="en-US" baseline="0" dirty="0" err="1" smtClean="0"/>
+              <a:t>det</a:t>
+            </a:r>
+            <a:r>
+              <a:rPr lang="en-US" baseline="0" dirty="0" smtClean="0"/>
+              <a:t> </a:t>
+            </a:r>
+            <a:r>
+              <a:rPr lang="en-US" baseline="0" dirty="0" err="1" smtClean="0"/>
+              <a:t>finnas</a:t>
+            </a:r>
+            <a:r>
+              <a:rPr lang="en-US" baseline="0" dirty="0" smtClean="0"/>
+              <a:t> en </a:t>
+            </a:r>
+            <a:r>
+              <a:rPr lang="en-US" baseline="0" dirty="0" err="1" smtClean="0"/>
+              <a:t>mekanism</a:t>
+            </a:r>
+            <a:r>
+              <a:rPr lang="en-US" baseline="0" dirty="0" smtClean="0"/>
+              <a:t> </a:t>
+            </a:r>
+            <a:r>
+              <a:rPr lang="en-US" baseline="0" dirty="0" err="1" smtClean="0"/>
+              <a:t>som</a:t>
+            </a:r>
+            <a:r>
+              <a:rPr lang="en-US" baseline="0" dirty="0" smtClean="0"/>
+              <a:t> </a:t>
+            </a:r>
+            <a:r>
+              <a:rPr lang="en-US" baseline="0" dirty="0" err="1" smtClean="0"/>
+              <a:t>gör</a:t>
+            </a:r>
+            <a:r>
+              <a:rPr lang="en-US" baseline="0" dirty="0" smtClean="0"/>
+              <a:t> </a:t>
+            </a:r>
+            <a:r>
+              <a:rPr lang="en-US" baseline="0" dirty="0" err="1" smtClean="0"/>
+              <a:t>att</a:t>
+            </a:r>
+            <a:r>
+              <a:rPr lang="en-US" baseline="0" dirty="0" smtClean="0"/>
+              <a:t> </a:t>
+            </a:r>
+            <a:r>
+              <a:rPr lang="en-US" baseline="0" dirty="0" err="1" smtClean="0"/>
+              <a:t>klienten</a:t>
+            </a:r>
+            <a:r>
+              <a:rPr lang="en-US" baseline="0" dirty="0" smtClean="0"/>
+              <a:t> </a:t>
+            </a:r>
+            <a:r>
+              <a:rPr lang="en-US" baseline="0" dirty="0" err="1" smtClean="0"/>
+              <a:t>endast</a:t>
+            </a:r>
+            <a:r>
+              <a:rPr lang="en-US" baseline="0" dirty="0" smtClean="0"/>
+              <a:t> </a:t>
+            </a:r>
+            <a:r>
+              <a:rPr lang="en-US" baseline="0" dirty="0" err="1" smtClean="0"/>
+              <a:t>kan</a:t>
+            </a:r>
+            <a:r>
+              <a:rPr lang="en-US" baseline="0" dirty="0" smtClean="0"/>
+              <a:t> </a:t>
+            </a:r>
+            <a:r>
+              <a:rPr lang="en-US" baseline="0" dirty="0" err="1" smtClean="0"/>
+              <a:t>hämta</a:t>
+            </a:r>
+            <a:r>
+              <a:rPr lang="en-US" baseline="0" dirty="0" smtClean="0"/>
+              <a:t> </a:t>
+            </a:r>
+            <a:r>
+              <a:rPr lang="en-US" baseline="0" dirty="0" err="1" smtClean="0"/>
+              <a:t>ut</a:t>
+            </a:r>
+            <a:r>
+              <a:rPr lang="en-US" baseline="0" dirty="0" smtClean="0"/>
+              <a:t> information </a:t>
+            </a:r>
+            <a:r>
+              <a:rPr lang="en-US" baseline="0" dirty="0" err="1" smtClean="0"/>
+              <a:t>som</a:t>
+            </a:r>
+            <a:r>
+              <a:rPr lang="en-US" baseline="0" dirty="0" smtClean="0"/>
+              <a:t> </a:t>
+            </a:r>
+            <a:r>
+              <a:rPr lang="en-US" baseline="0" dirty="0" err="1" smtClean="0"/>
+              <a:t>invånaren</a:t>
+            </a:r>
+            <a:r>
+              <a:rPr lang="en-US" baseline="0" dirty="0" smtClean="0"/>
+              <a:t> </a:t>
+            </a:r>
+            <a:r>
+              <a:rPr lang="en-US" baseline="0" dirty="0" err="1" smtClean="0"/>
+              <a:t>har</a:t>
+            </a:r>
+            <a:r>
+              <a:rPr lang="en-US" baseline="0" dirty="0" smtClean="0"/>
+              <a:t> </a:t>
+            </a:r>
+            <a:r>
+              <a:rPr lang="en-US" baseline="0" dirty="0" err="1" smtClean="0"/>
+              <a:t>godkänt</a:t>
+            </a:r>
+            <a:r>
+              <a:rPr lang="en-US" baseline="0" dirty="0" smtClean="0"/>
+              <a:t>.</a:t>
+            </a:r>
+          </a:p>
+          <a:p>
+            <a:r>
+              <a:rPr lang="en-US" baseline="0" dirty="0" err="1" smtClean="0"/>
+              <a:t>APIet</a:t>
+            </a:r>
+            <a:r>
+              <a:rPr lang="en-US" baseline="0" dirty="0" smtClean="0"/>
+              <a:t> </a:t>
+            </a:r>
+            <a:r>
+              <a:rPr lang="en-US" baseline="0" dirty="0" err="1" smtClean="0"/>
+              <a:t>behöver</a:t>
+            </a:r>
+            <a:r>
+              <a:rPr lang="en-US" baseline="0" dirty="0" smtClean="0"/>
+              <a:t> </a:t>
+            </a:r>
+            <a:r>
+              <a:rPr lang="en-US" baseline="0" dirty="0" err="1" smtClean="0"/>
+              <a:t>verifiera</a:t>
+            </a:r>
+            <a:r>
+              <a:rPr lang="en-US" baseline="0" dirty="0" smtClean="0"/>
+              <a:t> </a:t>
+            </a:r>
+            <a:r>
+              <a:rPr lang="en-US" baseline="0" dirty="0" err="1" smtClean="0"/>
+              <a:t>detta</a:t>
+            </a:r>
+            <a:r>
+              <a:rPr lang="en-US" baseline="0" dirty="0" smtClean="0"/>
+              <a:t>.</a:t>
+            </a:r>
+          </a:p>
+          <a:p>
+            <a:endParaRPr lang="en-US" baseline="0" dirty="0" smtClean="0"/>
+          </a:p>
+          <a:p>
+            <a:r>
+              <a:rPr lang="en-US" baseline="0" dirty="0" err="1" smtClean="0"/>
+              <a:t>Såååå</a:t>
+            </a:r>
+            <a:r>
+              <a:rPr lang="en-US" baseline="0" dirty="0" smtClean="0"/>
+              <a:t>…… OAUTH 2.0 </a:t>
+            </a:r>
+            <a:r>
+              <a:rPr lang="en-US" baseline="0" dirty="0" err="1" smtClean="0"/>
+              <a:t>nästa</a:t>
+            </a:r>
+            <a:r>
+              <a:rPr lang="en-US" baseline="0" dirty="0" smtClean="0"/>
+              <a:t> slide…</a:t>
+            </a:r>
+            <a:endParaRPr lang="en-US" dirty="0"/>
           </a:p>
         </p:txBody>
       </p:sp>
@@ -2445,6 +2450,96 @@
                 <a:defRPr/>
               </a:pPr>
               <a:t>11</a:t>
+            </a:fld>
+            <a:endParaRPr lang="sv-SE"/>
+          </a:p>
+        </p:txBody>
+      </p:sp>
+    </p:spTree>
+    <p:extLst>
+      <p:ext uri="{BB962C8B-B14F-4D97-AF65-F5344CB8AC3E}">
+        <p14:creationId xmlns:p14="http://schemas.microsoft.com/office/powerpoint/2010/main" val="1531746770"/>
+      </p:ext>
+    </p:extLst>
+  </p:cSld>
+  <p:clrMapOvr>
+    <a:masterClrMapping/>
+  </p:clrMapOvr>
+</p:notes>
+</file>
+
+<file path=ppt/notesSlides/notesSlide6.xml><?xml version="1.0" encoding="utf-8"?>
+<p:notes xmlns:a="http://schemas.openxmlformats.org/drawingml/2006/main" xmlns:r="http://schemas.openxmlformats.org/officeDocument/2006/relationships" xmlns:p="http://schemas.openxmlformats.org/presentationml/2006/main">
+  <p:cSld>
+    <p:spTree>
+      <p:nvGrpSpPr>
+        <p:cNvPr id="1" name=""/>
+        <p:cNvGrpSpPr/>
+        <p:nvPr/>
+      </p:nvGrpSpPr>
+      <p:grpSpPr>
+        <a:xfrm>
+          <a:off x="0" y="0"/>
+          <a:ext cx="0" cy="0"/>
+          <a:chOff x="0" y="0"/>
+          <a:chExt cx="0" cy="0"/>
+        </a:xfrm>
+      </p:grpSpPr>
+      <p:sp>
+        <p:nvSpPr>
+          <p:cNvPr id="2" name="Slide Image Placeholder 1"/>
+          <p:cNvSpPr>
+            <a:spLocks noGrp="1" noRot="1" noChangeAspect="1"/>
+          </p:cNvSpPr>
+          <p:nvPr>
+            <p:ph type="sldImg"/>
+          </p:nvPr>
+        </p:nvSpPr>
+        <p:spPr/>
+      </p:sp>
+      <p:sp>
+        <p:nvSpPr>
+          <p:cNvPr id="3" name="Notes Placeholder 2"/>
+          <p:cNvSpPr>
+            <a:spLocks noGrp="1"/>
+          </p:cNvSpPr>
+          <p:nvPr>
+            <p:ph type="body" idx="1"/>
+          </p:nvPr>
+        </p:nvSpPr>
+        <p:spPr/>
+        <p:txBody>
+          <a:bodyPr/>
+          <a:lstStyle/>
+          <a:p>
+            <a:endParaRPr lang="en-US" baseline="0" dirty="0" smtClean="0"/>
+          </a:p>
+        </p:txBody>
+      </p:sp>
+      <p:sp>
+        <p:nvSpPr>
+          <p:cNvPr id="4" name="Slide Number Placeholder 3"/>
+          <p:cNvSpPr>
+            <a:spLocks noGrp="1"/>
+          </p:cNvSpPr>
+          <p:nvPr>
+            <p:ph type="sldNum" sz="quarter" idx="10"/>
+          </p:nvPr>
+        </p:nvSpPr>
+        <p:spPr/>
+        <p:txBody>
+          <a:bodyPr/>
+          <a:lstStyle/>
+          <a:p>
+            <a:pPr>
+              <a:defRPr/>
+            </a:pPr>
+            <a:fld id="{72F66423-05E2-6345-AF5A-73942C9C3A7C}" type="slidenum">
+              <a:rPr lang="sv-SE" smtClean="0"/>
+              <a:pPr>
+                <a:defRPr/>
+              </a:pPr>
+              <a:t>12</a:t>
             </a:fld>
             <a:endParaRPr lang="sv-SE"/>
           </a:p>
@@ -6417,7 +6512,15 @@
           <a:lstStyle/>
           <a:p>
             <a:pPr eaLnBrk="1" hangingPunct="1"/>
-            <a:endParaRPr lang="en-US">
+            <a:r>
+              <a:rPr lang="en-US" dirty="0" err="1" smtClean="0">
+                <a:latin typeface="Cambria" charset="0"/>
+                <a:ea typeface="ＭＳ Ｐゴシック" charset="0"/>
+                <a:cs typeface="Cambria" charset="0"/>
+              </a:rPr>
+              <a:t>Rubrik</a:t>
+            </a:r>
+            <a:endParaRPr lang="en-US" dirty="0">
               <a:latin typeface="Cambria" charset="0"/>
               <a:ea typeface="ＭＳ Ｐゴシック" charset="0"/>
               <a:cs typeface="Cambria" charset="0"/>
@@ -6477,27 +6580,31 @@
             </a:pPr>
             <a:r>
               <a:rPr lang="sv-SE" dirty="0" smtClean="0"/>
-              <a:t>Your </a:t>
-            </a:r>
-            <a:r>
-              <a:rPr lang="sv-SE" dirty="0" err="1" smtClean="0"/>
-              <a:t>Name</a:t>
-            </a:r>
-            <a:r>
-              <a:rPr lang="sv-SE" dirty="0" smtClean="0"/>
-              <a:t> | </a:t>
-            </a:r>
-            <a:r>
-              <a:rPr lang="sv-SE" dirty="0" err="1" smtClean="0"/>
-              <a:t>your.name@callistaenterprise.se</a:t>
+              <a:t>Christian Hilmersson, Hans Thunberg</a:t>
             </a:r>
             <a:r>
               <a:rPr lang="sv-SE" dirty="0" smtClean="0"/>
               <a:t> </a:t>
             </a:r>
             <a:r>
-              <a:rPr lang="sv-SE" smtClean="0"/>
-              <a:t>| 201x-xx-xx</a:t>
+              <a:rPr lang="sv-SE" dirty="0" smtClean="0"/>
+              <a:t>| </a:t>
+            </a:r>
+            <a:r>
+              <a:rPr lang="sv-SE" dirty="0" err="1" smtClean="0"/>
+              <a:t>callistaenterprise.se</a:t>
+            </a:r>
+            <a:r>
+              <a:rPr lang="sv-SE" dirty="0" smtClean="0"/>
+              <a:t> </a:t>
+            </a:r>
+            <a:r>
+              <a:rPr lang="sv-SE" dirty="0" smtClean="0"/>
+              <a:t>| </a:t>
+            </a:r>
+            <a:r>
+              <a:rPr lang="sv-SE" dirty="0" smtClean="0"/>
+              <a:t>2013-01-16</a:t>
             </a:r>
             <a:endParaRPr lang="sv-SE" dirty="0" smtClean="0"/>
           </a:p>
@@ -6553,12 +6660,14 @@
         </p:nvSpPr>
         <p:spPr/>
         <p:txBody>
-          <a:bodyPr/>
+          <a:bodyPr>
+            <a:normAutofit fontScale="90000"/>
+          </a:bodyPr>
           <a:lstStyle/>
           <a:p>
             <a:r>
               <a:rPr lang="en-US" dirty="0" smtClean="0"/>
-              <a:t>The problem</a:t>
+              <a:t>API’s for patient related information</a:t>
             </a:r>
             <a:endParaRPr lang="en-US" dirty="0"/>
           </a:p>
@@ -6581,6 +6690,10 @@
           </a:bodyPr>
           <a:lstStyle/>
           <a:p>
+            <a:r>
+              <a:rPr lang="en-US" dirty="0" smtClean="0"/>
+              <a:t>Introduction</a:t>
+            </a:r>
             <a:endParaRPr lang="en-US" dirty="0"/>
           </a:p>
         </p:txBody>
@@ -6595,70 +6708,84 @@
             <p:ph type="body" sz="quarter" idx="13"/>
           </p:nvPr>
         </p:nvSpPr>
-        <p:spPr>
-          <a:ln w="38100" cmpd="sng">
-            <a:solidFill>
-              <a:srgbClr val="4F81BD"/>
-            </a:solidFill>
-          </a:ln>
-        </p:spPr>
+        <p:spPr/>
         <p:txBody>
           <a:bodyPr/>
           <a:lstStyle/>
           <a:p>
-            <a:pPr marL="0" indent="0">
-              <a:buNone/>
-            </a:pPr>
             <a:r>
               <a:rPr lang="en-US" sz="1800" dirty="0" smtClean="0"/>
-              <a:t>Simple solution??</a:t>
-            </a:r>
-          </a:p>
-          <a:p>
-            <a:pPr marL="0" indent="0">
-              <a:buNone/>
-            </a:pPr>
+              <a:t>As opposed to the public API’s, not open data API’s</a:t>
+            </a:r>
+          </a:p>
+          <a:p>
             <a:r>
               <a:rPr lang="en-US" sz="1800" dirty="0" smtClean="0"/>
-              <a:t>Are you sure 20121212-1212 </a:t>
-            </a:r>
-            <a:r>
-              <a:rPr lang="sv-SE" sz="1800" dirty="0" err="1" smtClean="0"/>
-              <a:t>approves</a:t>
-            </a:r>
-            <a:r>
-              <a:rPr lang="sv-SE" sz="1800" dirty="0" smtClean="0"/>
-              <a:t> </a:t>
-            </a:r>
-            <a:r>
-              <a:rPr lang="sv-SE" sz="1800" dirty="0" err="1" smtClean="0"/>
-              <a:t>this</a:t>
-            </a:r>
+              <a:t>Strong authentication of citizens</a:t>
+            </a:r>
+          </a:p>
+          <a:p>
+            <a:pPr lvl="1"/>
             <a:r>
               <a:rPr lang="en-US" sz="1800" dirty="0" smtClean="0"/>
-              <a:t> request?</a:t>
-            </a:r>
-          </a:p>
-          <a:p>
-            <a:pPr marL="0" indent="0">
-              <a:buNone/>
-            </a:pPr>
+              <a:t>Demand from </a:t>
+            </a:r>
+            <a:r>
+              <a:rPr lang="en-US" sz="1800" dirty="0" err="1" smtClean="0"/>
+              <a:t>Datainspektionen</a:t>
+            </a:r>
+            <a:endParaRPr lang="en-US" sz="1800" dirty="0" smtClean="0"/>
+          </a:p>
+          <a:p>
+            <a:pPr lvl="1"/>
             <a:r>
               <a:rPr lang="en-US" sz="1800" dirty="0" smtClean="0"/>
-              <a:t>API must verify approval from the citizen</a:t>
-            </a:r>
-          </a:p>
-          <a:p>
-            <a:pPr marL="0" indent="0">
-              <a:buNone/>
-            </a:pPr>
+              <a:t>2 factor</a:t>
+            </a:r>
+          </a:p>
+          <a:p>
+            <a:r>
+              <a:rPr lang="en-US" sz="1800" dirty="0" smtClean="0"/>
+              <a:t>Strong authentication of API clients</a:t>
+            </a:r>
+          </a:p>
+          <a:p>
+            <a:pPr lvl="1"/>
+            <a:r>
+              <a:rPr lang="en-US" sz="1800" dirty="0" smtClean="0"/>
+              <a:t>SSL/TLS certificate</a:t>
+            </a:r>
+          </a:p>
+          <a:p>
+            <a:pPr lvl="1"/>
+            <a:r>
+              <a:rPr lang="en-US" sz="1800" dirty="0" smtClean="0"/>
+              <a:t>Mutual </a:t>
+            </a:r>
+            <a:r>
+              <a:rPr lang="en-US" sz="1800" dirty="0" err="1" smtClean="0"/>
+              <a:t>authenticaton</a:t>
+            </a:r>
             <a:endParaRPr lang="en-US" sz="1800" dirty="0" smtClean="0"/>
           </a:p>
           <a:p>
-            <a:pPr marL="0" indent="0">
-              <a:buNone/>
-            </a:pPr>
-            <a:endParaRPr lang="en-US" sz="1800" dirty="0"/>
+            <a:r>
+              <a:rPr lang="en-US" sz="1800" dirty="0" smtClean="0"/>
+              <a:t>Strict authorization control</a:t>
+            </a:r>
+          </a:p>
+          <a:p>
+            <a:pPr lvl="1"/>
+            <a:r>
+              <a:rPr lang="en-US" sz="1600" dirty="0" smtClean="0"/>
+              <a:t>Citizen approved </a:t>
+            </a:r>
+          </a:p>
+          <a:p>
+            <a:r>
+              <a:rPr lang="en-US" sz="1800" dirty="0" smtClean="0"/>
+              <a:t>So what’s the problem???</a:t>
+            </a:r>
           </a:p>
         </p:txBody>
       </p:sp>
@@ -6686,6 +6813,186 @@
                 <a:defRPr/>
               </a:pPr>
               <a:t>10</a:t>
+            </a:fld>
+            <a:endParaRPr lang="sv-SE"/>
+          </a:p>
+        </p:txBody>
+      </p:sp>
+    </p:spTree>
+    <p:extLst>
+      <p:ext uri="{BB962C8B-B14F-4D97-AF65-F5344CB8AC3E}">
+        <p14:creationId xmlns:p14="http://schemas.microsoft.com/office/powerpoint/2010/main" val="910791665"/>
+      </p:ext>
+    </p:extLst>
+  </p:cSld>
+  <p:clrMapOvr>
+    <a:masterClrMapping/>
+  </p:clrMapOvr>
+</p:sld>
+</file>
+
+<file path=ppt/slides/slide11.xml><?xml version="1.0" encoding="utf-8"?>
+<p:sld xmlns:a="http://schemas.openxmlformats.org/drawingml/2006/main" xmlns:r="http://schemas.openxmlformats.org/officeDocument/2006/relationships" xmlns:p="http://schemas.openxmlformats.org/presentationml/2006/main">
+  <p:cSld>
+    <p:spTree>
+      <p:nvGrpSpPr>
+        <p:cNvPr id="1" name=""/>
+        <p:cNvGrpSpPr/>
+        <p:nvPr/>
+      </p:nvGrpSpPr>
+      <p:grpSpPr>
+        <a:xfrm>
+          <a:off x="0" y="0"/>
+          <a:ext cx="0" cy="0"/>
+          <a:chOff x="0" y="0"/>
+          <a:chExt cx="0" cy="0"/>
+        </a:xfrm>
+      </p:grpSpPr>
+      <p:sp>
+        <p:nvSpPr>
+          <p:cNvPr id="2" name="Title 1"/>
+          <p:cNvSpPr>
+            <a:spLocks noGrp="1"/>
+          </p:cNvSpPr>
+          <p:nvPr>
+            <p:ph type="ctrTitle"/>
+          </p:nvPr>
+        </p:nvSpPr>
+        <p:spPr/>
+        <p:txBody>
+          <a:bodyPr/>
+          <a:lstStyle/>
+          <a:p>
+            <a:r>
+              <a:rPr lang="en-US" dirty="0" smtClean="0"/>
+              <a:t>The problem</a:t>
+            </a:r>
+            <a:endParaRPr lang="en-US" dirty="0"/>
+          </a:p>
+        </p:txBody>
+      </p:sp>
+      <p:sp>
+        <p:nvSpPr>
+          <p:cNvPr id="3" name="Subtitle 2"/>
+          <p:cNvSpPr>
+            <a:spLocks noGrp="1"/>
+          </p:cNvSpPr>
+          <p:nvPr>
+            <p:ph type="subTitle" idx="1"/>
+          </p:nvPr>
+        </p:nvSpPr>
+        <p:spPr/>
+        <p:txBody>
+          <a:bodyPr>
+            <a:normAutofit fontScale="92500" lnSpcReduction="10000"/>
+          </a:bodyPr>
+          <a:lstStyle/>
+          <a:p>
+            <a:endParaRPr lang="en-US" dirty="0"/>
+          </a:p>
+        </p:txBody>
+      </p:sp>
+      <p:sp>
+        <p:nvSpPr>
+          <p:cNvPr id="4" name="Text Placeholder 3"/>
+          <p:cNvSpPr>
+            <a:spLocks noGrp="1"/>
+          </p:cNvSpPr>
+          <p:nvPr>
+            <p:ph type="body" sz="quarter" idx="13"/>
+          </p:nvPr>
+        </p:nvSpPr>
+        <p:spPr>
+          <a:ln w="38100" cmpd="sng">
+            <a:solidFill>
+              <a:srgbClr val="4F81BD"/>
+            </a:solidFill>
+          </a:ln>
+        </p:spPr>
+        <p:txBody>
+          <a:bodyPr/>
+          <a:lstStyle/>
+          <a:p>
+            <a:pPr marL="0" indent="0">
+              <a:buNone/>
+            </a:pPr>
+            <a:r>
+              <a:rPr lang="en-US" sz="1800" dirty="0" smtClean="0"/>
+              <a:t>Simple solution??</a:t>
+            </a:r>
+          </a:p>
+          <a:p>
+            <a:pPr marL="0" indent="0">
+              <a:buNone/>
+            </a:pPr>
+            <a:r>
+              <a:rPr lang="en-US" sz="1800" dirty="0" smtClean="0"/>
+              <a:t>Are you sure 20121212-1212 </a:t>
+            </a:r>
+            <a:r>
+              <a:rPr lang="sv-SE" sz="1800" dirty="0" err="1" smtClean="0"/>
+              <a:t>approves</a:t>
+            </a:r>
+            <a:r>
+              <a:rPr lang="sv-SE" sz="1800" dirty="0" smtClean="0"/>
+              <a:t> </a:t>
+            </a:r>
+            <a:r>
+              <a:rPr lang="sv-SE" sz="1800" dirty="0" err="1" smtClean="0"/>
+              <a:t>this</a:t>
+            </a:r>
+            <a:r>
+              <a:rPr lang="en-US" sz="1800" dirty="0" smtClean="0"/>
+              <a:t> request?</a:t>
+            </a:r>
+          </a:p>
+          <a:p>
+            <a:pPr marL="0" indent="0">
+              <a:buNone/>
+            </a:pPr>
+            <a:r>
+              <a:rPr lang="en-US" sz="1800" dirty="0" smtClean="0"/>
+              <a:t>API must verify approval from the citizen</a:t>
+            </a:r>
+          </a:p>
+          <a:p>
+            <a:pPr marL="0" indent="0">
+              <a:buNone/>
+            </a:pPr>
+            <a:endParaRPr lang="en-US" sz="1800" dirty="0" smtClean="0"/>
+          </a:p>
+          <a:p>
+            <a:pPr marL="0" indent="0">
+              <a:buNone/>
+            </a:pPr>
+            <a:endParaRPr lang="en-US" sz="1800" dirty="0"/>
+          </a:p>
+        </p:txBody>
+      </p:sp>
+      <p:sp>
+        <p:nvSpPr>
+          <p:cNvPr id="5" name="Slide Number Placeholder 4"/>
+          <p:cNvSpPr>
+            <a:spLocks noGrp="1"/>
+          </p:cNvSpPr>
+          <p:nvPr>
+            <p:ph type="sldNum" sz="quarter" idx="14"/>
+          </p:nvPr>
+        </p:nvSpPr>
+        <p:spPr/>
+        <p:txBody>
+          <a:bodyPr/>
+          <a:lstStyle/>
+          <a:p>
+            <a:pPr>
+              <a:defRPr/>
+            </a:pPr>
+            <a:fld id="{4AA01602-B999-AA4E-80A6-B21CED3A9C3C}" type="slidenum">
+              <a:rPr lang="sv-SE" smtClean="0"/>
+              <a:pPr>
+                <a:defRPr/>
+              </a:pPr>
+              <a:t>11</a:t>
             </a:fld>
             <a:endParaRPr lang="sv-SE"/>
           </a:p>
@@ -7146,7 +7453,7 @@
 </p:sld>
 </file>
 
-<file path=ppt/slides/slide11.xml><?xml version="1.0" encoding="utf-8"?>
+<file path=ppt/slides/slide12.xml><?xml version="1.0" encoding="utf-8"?>
 <p:sld xmlns:a="http://schemas.openxmlformats.org/drawingml/2006/main" xmlns:r="http://schemas.openxmlformats.org/officeDocument/2006/relationships" xmlns:p="http://schemas.openxmlformats.org/presentationml/2006/main">
   <p:cSld>
     <p:spTree>
@@ -7304,7 +7611,7 @@
               <a:pPr>
                 <a:defRPr/>
               </a:pPr>
-              <a:t>11</a:t>
+              <a:t>12</a:t>
             </a:fld>
             <a:endParaRPr lang="sv-SE"/>
           </a:p>
@@ -7314,6 +7621,600 @@
     <p:extLst>
       <p:ext uri="{BB962C8B-B14F-4D97-AF65-F5344CB8AC3E}">
         <p14:creationId xmlns:p14="http://schemas.microsoft.com/office/powerpoint/2010/main" val="25701892"/>
+      </p:ext>
+    </p:extLst>
+  </p:cSld>
+  <p:clrMapOvr>
+    <a:masterClrMapping/>
+  </p:clrMapOvr>
+</p:sld>
+</file>
+
+<file path=ppt/slides/slide13.xml><?xml version="1.0" encoding="utf-8"?>
+<p:sld xmlns:a="http://schemas.openxmlformats.org/drawingml/2006/main" xmlns:r="http://schemas.openxmlformats.org/officeDocument/2006/relationships" xmlns:p="http://schemas.openxmlformats.org/presentationml/2006/main">
+  <p:cSld>
+    <p:spTree>
+      <p:nvGrpSpPr>
+        <p:cNvPr id="1" name=""/>
+        <p:cNvGrpSpPr/>
+        <p:nvPr/>
+      </p:nvGrpSpPr>
+      <p:grpSpPr>
+        <a:xfrm>
+          <a:off x="0" y="0"/>
+          <a:ext cx="0" cy="0"/>
+          <a:chOff x="0" y="0"/>
+          <a:chExt cx="0" cy="0"/>
+        </a:xfrm>
+      </p:grpSpPr>
+      <p:sp>
+        <p:nvSpPr>
+          <p:cNvPr id="2" name="Title 1"/>
+          <p:cNvSpPr>
+            <a:spLocks noGrp="1"/>
+          </p:cNvSpPr>
+          <p:nvPr>
+            <p:ph type="ctrTitle"/>
+          </p:nvPr>
+        </p:nvSpPr>
+        <p:spPr/>
+        <p:txBody>
+          <a:bodyPr/>
+          <a:lstStyle/>
+          <a:p>
+            <a:r>
+              <a:rPr lang="en-US" dirty="0" smtClean="0"/>
+              <a:t>Simple </a:t>
+            </a:r>
+            <a:r>
+              <a:rPr lang="en-US" dirty="0" err="1" smtClean="0"/>
+              <a:t>OAuth</a:t>
+            </a:r>
+            <a:r>
+              <a:rPr lang="en-US" dirty="0" smtClean="0"/>
+              <a:t> 2.0 API Client</a:t>
+            </a:r>
+            <a:endParaRPr lang="en-US" dirty="0"/>
+          </a:p>
+        </p:txBody>
+      </p:sp>
+      <p:sp>
+        <p:nvSpPr>
+          <p:cNvPr id="3" name="Subtitle 2"/>
+          <p:cNvSpPr>
+            <a:spLocks noGrp="1"/>
+          </p:cNvSpPr>
+          <p:nvPr>
+            <p:ph type="subTitle" idx="1"/>
+          </p:nvPr>
+        </p:nvSpPr>
+        <p:spPr/>
+        <p:txBody>
+          <a:bodyPr>
+            <a:normAutofit fontScale="92500" lnSpcReduction="10000"/>
+          </a:bodyPr>
+          <a:lstStyle/>
+          <a:p>
+            <a:r>
+              <a:rPr lang="en-US" dirty="0" smtClean="0"/>
+              <a:t>Exercise </a:t>
+            </a:r>
+            <a:r>
+              <a:rPr lang="en-US" dirty="0" smtClean="0"/>
+              <a:t>3</a:t>
+            </a:r>
+            <a:endParaRPr lang="en-US" dirty="0"/>
+          </a:p>
+        </p:txBody>
+      </p:sp>
+      <p:sp>
+        <p:nvSpPr>
+          <p:cNvPr id="4" name="Text Placeholder 3"/>
+          <p:cNvSpPr>
+            <a:spLocks noGrp="1"/>
+          </p:cNvSpPr>
+          <p:nvPr>
+            <p:ph type="body" sz="quarter" idx="13"/>
+          </p:nvPr>
+        </p:nvSpPr>
+        <p:spPr/>
+        <p:txBody>
+          <a:bodyPr/>
+          <a:lstStyle/>
+          <a:p>
+            <a:pPr marL="0" indent="0">
+              <a:buNone/>
+            </a:pPr>
+            <a:r>
+              <a:rPr lang="en-US" dirty="0" smtClean="0"/>
+              <a:t>Get familiar with </a:t>
+            </a:r>
+            <a:r>
+              <a:rPr lang="en-US" dirty="0" err="1" smtClean="0"/>
+              <a:t>OAuth</a:t>
+            </a:r>
+            <a:r>
+              <a:rPr lang="en-US" dirty="0" smtClean="0"/>
+              <a:t> 2.0 and SDK by using a simple client letting the user authorize access.</a:t>
+            </a:r>
+            <a:endParaRPr lang="en-US" dirty="0" smtClean="0"/>
+          </a:p>
+        </p:txBody>
+      </p:sp>
+      <p:sp>
+        <p:nvSpPr>
+          <p:cNvPr id="5" name="Slide Number Placeholder 4"/>
+          <p:cNvSpPr>
+            <a:spLocks noGrp="1"/>
+          </p:cNvSpPr>
+          <p:nvPr>
+            <p:ph type="sldNum" sz="quarter" idx="14"/>
+          </p:nvPr>
+        </p:nvSpPr>
+        <p:spPr/>
+        <p:txBody>
+          <a:bodyPr/>
+          <a:lstStyle/>
+          <a:p>
+            <a:pPr>
+              <a:defRPr/>
+            </a:pPr>
+            <a:fld id="{4AA01602-B999-AA4E-80A6-B21CED3A9C3C}" type="slidenum">
+              <a:rPr lang="sv-SE" smtClean="0"/>
+              <a:pPr>
+                <a:defRPr/>
+              </a:pPr>
+              <a:t>13</a:t>
+            </a:fld>
+            <a:endParaRPr lang="sv-SE"/>
+          </a:p>
+        </p:txBody>
+      </p:sp>
+    </p:spTree>
+    <p:extLst>
+      <p:ext uri="{BB962C8B-B14F-4D97-AF65-F5344CB8AC3E}">
+        <p14:creationId xmlns:p14="http://schemas.microsoft.com/office/powerpoint/2010/main" val="3636441538"/>
+      </p:ext>
+    </p:extLst>
+  </p:cSld>
+  <p:clrMapOvr>
+    <a:masterClrMapping/>
+  </p:clrMapOvr>
+</p:sld>
+</file>
+
+<file path=ppt/slides/slide14.xml><?xml version="1.0" encoding="utf-8"?>
+<p:sld xmlns:a="http://schemas.openxmlformats.org/drawingml/2006/main" xmlns:r="http://schemas.openxmlformats.org/officeDocument/2006/relationships" xmlns:p="http://schemas.openxmlformats.org/presentationml/2006/main">
+  <p:cSld>
+    <p:spTree>
+      <p:nvGrpSpPr>
+        <p:cNvPr id="1" name=""/>
+        <p:cNvGrpSpPr/>
+        <p:nvPr/>
+      </p:nvGrpSpPr>
+      <p:grpSpPr>
+        <a:xfrm>
+          <a:off x="0" y="0"/>
+          <a:ext cx="0" cy="0"/>
+          <a:chOff x="0" y="0"/>
+          <a:chExt cx="0" cy="0"/>
+        </a:xfrm>
+      </p:grpSpPr>
+      <p:sp>
+        <p:nvSpPr>
+          <p:cNvPr id="2" name="Title 1"/>
+          <p:cNvSpPr>
+            <a:spLocks noGrp="1"/>
+          </p:cNvSpPr>
+          <p:nvPr>
+            <p:ph type="ctrTitle"/>
+          </p:nvPr>
+        </p:nvSpPr>
+        <p:spPr/>
+        <p:txBody>
+          <a:bodyPr/>
+          <a:lstStyle/>
+          <a:p>
+            <a:r>
+              <a:rPr lang="en-US" dirty="0" smtClean="0"/>
+              <a:t>Backend</a:t>
+            </a:r>
+            <a:endParaRPr lang="en-US" dirty="0"/>
+          </a:p>
+        </p:txBody>
+      </p:sp>
+      <p:sp>
+        <p:nvSpPr>
+          <p:cNvPr id="3" name="Subtitle 2"/>
+          <p:cNvSpPr>
+            <a:spLocks noGrp="1"/>
+          </p:cNvSpPr>
+          <p:nvPr>
+            <p:ph type="subTitle" idx="1"/>
+          </p:nvPr>
+        </p:nvSpPr>
+        <p:spPr/>
+        <p:txBody>
+          <a:bodyPr>
+            <a:normAutofit fontScale="92500" lnSpcReduction="10000"/>
+          </a:bodyPr>
+          <a:lstStyle/>
+          <a:p>
+            <a:r>
+              <a:rPr lang="en-US" dirty="0" smtClean="0"/>
+              <a:t>Exercise </a:t>
+            </a:r>
+            <a:r>
+              <a:rPr lang="en-US" dirty="0"/>
+              <a:t>4</a:t>
+            </a:r>
+            <a:endParaRPr lang="en-US" dirty="0"/>
+          </a:p>
+        </p:txBody>
+      </p:sp>
+      <p:sp>
+        <p:nvSpPr>
+          <p:cNvPr id="4" name="Text Placeholder 3"/>
+          <p:cNvSpPr>
+            <a:spLocks noGrp="1"/>
+          </p:cNvSpPr>
+          <p:nvPr>
+            <p:ph type="body" sz="quarter" idx="13"/>
+          </p:nvPr>
+        </p:nvSpPr>
+        <p:spPr/>
+        <p:txBody>
+          <a:bodyPr/>
+          <a:lstStyle/>
+          <a:p>
+            <a:pPr marL="0" indent="0">
+              <a:buNone/>
+            </a:pPr>
+            <a:r>
+              <a:rPr lang="en-US" dirty="0" smtClean="0"/>
+              <a:t>Build the app backend to handle the </a:t>
+            </a:r>
+            <a:r>
+              <a:rPr lang="en-US" dirty="0" err="1" smtClean="0"/>
+              <a:t>OAuth</a:t>
+            </a:r>
+            <a:r>
+              <a:rPr lang="en-US" dirty="0" smtClean="0"/>
+              <a:t> 2.0 </a:t>
+            </a:r>
+            <a:r>
+              <a:rPr lang="en-US" dirty="0" smtClean="0"/>
+              <a:t>integration with SDK and to provide an API for the app. </a:t>
+            </a:r>
+          </a:p>
+          <a:p>
+            <a:endParaRPr lang="en-US" dirty="0" smtClean="0"/>
+          </a:p>
+        </p:txBody>
+      </p:sp>
+      <p:sp>
+        <p:nvSpPr>
+          <p:cNvPr id="5" name="Slide Number Placeholder 4"/>
+          <p:cNvSpPr>
+            <a:spLocks noGrp="1"/>
+          </p:cNvSpPr>
+          <p:nvPr>
+            <p:ph type="sldNum" sz="quarter" idx="14"/>
+          </p:nvPr>
+        </p:nvSpPr>
+        <p:spPr/>
+        <p:txBody>
+          <a:bodyPr/>
+          <a:lstStyle/>
+          <a:p>
+            <a:pPr>
+              <a:defRPr/>
+            </a:pPr>
+            <a:fld id="{4AA01602-B999-AA4E-80A6-B21CED3A9C3C}" type="slidenum">
+              <a:rPr lang="sv-SE" smtClean="0"/>
+              <a:pPr>
+                <a:defRPr/>
+              </a:pPr>
+              <a:t>14</a:t>
+            </a:fld>
+            <a:endParaRPr lang="sv-SE"/>
+          </a:p>
+        </p:txBody>
+      </p:sp>
+    </p:spTree>
+    <p:extLst>
+      <p:ext uri="{BB962C8B-B14F-4D97-AF65-F5344CB8AC3E}">
+        <p14:creationId xmlns:p14="http://schemas.microsoft.com/office/powerpoint/2010/main" val="3668199394"/>
+      </p:ext>
+    </p:extLst>
+  </p:cSld>
+  <p:clrMapOvr>
+    <a:masterClrMapping/>
+  </p:clrMapOvr>
+</p:sld>
+</file>
+
+<file path=ppt/slides/slide15.xml><?xml version="1.0" encoding="utf-8"?>
+<p:sld xmlns:a="http://schemas.openxmlformats.org/drawingml/2006/main" xmlns:r="http://schemas.openxmlformats.org/officeDocument/2006/relationships" xmlns:p="http://schemas.openxmlformats.org/presentationml/2006/main">
+  <p:cSld>
+    <p:spTree>
+      <p:nvGrpSpPr>
+        <p:cNvPr id="1" name=""/>
+        <p:cNvGrpSpPr/>
+        <p:nvPr/>
+      </p:nvGrpSpPr>
+      <p:grpSpPr>
+        <a:xfrm>
+          <a:off x="0" y="0"/>
+          <a:ext cx="0" cy="0"/>
+          <a:chOff x="0" y="0"/>
+          <a:chExt cx="0" cy="0"/>
+        </a:xfrm>
+      </p:grpSpPr>
+      <p:sp>
+        <p:nvSpPr>
+          <p:cNvPr id="2" name="Title 1"/>
+          <p:cNvSpPr>
+            <a:spLocks noGrp="1"/>
+          </p:cNvSpPr>
+          <p:nvPr>
+            <p:ph type="ctrTitle"/>
+          </p:nvPr>
+        </p:nvSpPr>
+        <p:spPr/>
+        <p:txBody>
+          <a:bodyPr/>
+          <a:lstStyle/>
+          <a:p>
+            <a:r>
+              <a:rPr lang="en-US" dirty="0" smtClean="0"/>
+              <a:t>Frontend</a:t>
+            </a:r>
+            <a:endParaRPr lang="en-US" dirty="0"/>
+          </a:p>
+        </p:txBody>
+      </p:sp>
+      <p:sp>
+        <p:nvSpPr>
+          <p:cNvPr id="3" name="Subtitle 2"/>
+          <p:cNvSpPr>
+            <a:spLocks noGrp="1"/>
+          </p:cNvSpPr>
+          <p:nvPr>
+            <p:ph type="subTitle" idx="1"/>
+          </p:nvPr>
+        </p:nvSpPr>
+        <p:spPr/>
+        <p:txBody>
+          <a:bodyPr>
+            <a:normAutofit fontScale="92500" lnSpcReduction="10000"/>
+          </a:bodyPr>
+          <a:lstStyle/>
+          <a:p>
+            <a:endParaRPr lang="en-US" dirty="0"/>
+          </a:p>
+        </p:txBody>
+      </p:sp>
+      <p:sp>
+        <p:nvSpPr>
+          <p:cNvPr id="4" name="Text Placeholder 3"/>
+          <p:cNvSpPr>
+            <a:spLocks noGrp="1"/>
+          </p:cNvSpPr>
+          <p:nvPr>
+            <p:ph type="body" sz="quarter" idx="13"/>
+          </p:nvPr>
+        </p:nvSpPr>
+        <p:spPr/>
+        <p:txBody>
+          <a:bodyPr/>
+          <a:lstStyle/>
+          <a:p>
+            <a:pPr marL="0" indent="0">
+              <a:buNone/>
+            </a:pPr>
+            <a:r>
+              <a:rPr lang="en-US" dirty="0" smtClean="0"/>
+              <a:t>Frontend technologies</a:t>
+            </a:r>
+          </a:p>
+          <a:p>
+            <a:r>
+              <a:rPr lang="en-US" dirty="0" smtClean="0"/>
+              <a:t>What’s happening on the frontend</a:t>
+            </a:r>
+          </a:p>
+          <a:p>
+            <a:r>
+              <a:rPr lang="en-US" dirty="0" smtClean="0"/>
+              <a:t>Short intro to Backbone</a:t>
+            </a:r>
+            <a:endParaRPr lang="en-US" dirty="0" smtClean="0"/>
+          </a:p>
+        </p:txBody>
+      </p:sp>
+      <p:sp>
+        <p:nvSpPr>
+          <p:cNvPr id="5" name="Slide Number Placeholder 4"/>
+          <p:cNvSpPr>
+            <a:spLocks noGrp="1"/>
+          </p:cNvSpPr>
+          <p:nvPr>
+            <p:ph type="sldNum" sz="quarter" idx="14"/>
+          </p:nvPr>
+        </p:nvSpPr>
+        <p:spPr/>
+        <p:txBody>
+          <a:bodyPr/>
+          <a:lstStyle/>
+          <a:p>
+            <a:pPr>
+              <a:defRPr/>
+            </a:pPr>
+            <a:fld id="{4AA01602-B999-AA4E-80A6-B21CED3A9C3C}" type="slidenum">
+              <a:rPr lang="sv-SE" smtClean="0"/>
+              <a:pPr>
+                <a:defRPr/>
+              </a:pPr>
+              <a:t>15</a:t>
+            </a:fld>
+            <a:endParaRPr lang="sv-SE"/>
+          </a:p>
+        </p:txBody>
+      </p:sp>
+    </p:spTree>
+    <p:extLst>
+      <p:ext uri="{BB962C8B-B14F-4D97-AF65-F5344CB8AC3E}">
+        <p14:creationId xmlns:p14="http://schemas.microsoft.com/office/powerpoint/2010/main" val="3753766513"/>
+      </p:ext>
+    </p:extLst>
+  </p:cSld>
+  <p:clrMapOvr>
+    <a:masterClrMapping/>
+  </p:clrMapOvr>
+</p:sld>
+</file>
+
+<file path=ppt/slides/slide16.xml><?xml version="1.0" encoding="utf-8"?>
+<p:sld xmlns:a="http://schemas.openxmlformats.org/drawingml/2006/main" xmlns:r="http://schemas.openxmlformats.org/officeDocument/2006/relationships" xmlns:p="http://schemas.openxmlformats.org/presentationml/2006/main">
+  <p:cSld>
+    <p:spTree>
+      <p:nvGrpSpPr>
+        <p:cNvPr id="1" name=""/>
+        <p:cNvGrpSpPr/>
+        <p:nvPr/>
+      </p:nvGrpSpPr>
+      <p:grpSpPr>
+        <a:xfrm>
+          <a:off x="0" y="0"/>
+          <a:ext cx="0" cy="0"/>
+          <a:chOff x="0" y="0"/>
+          <a:chExt cx="0" cy="0"/>
+        </a:xfrm>
+      </p:grpSpPr>
+      <p:sp>
+        <p:nvSpPr>
+          <p:cNvPr id="2" name="Title 1"/>
+          <p:cNvSpPr>
+            <a:spLocks noGrp="1"/>
+          </p:cNvSpPr>
+          <p:nvPr>
+            <p:ph type="ctrTitle"/>
+          </p:nvPr>
+        </p:nvSpPr>
+        <p:spPr/>
+        <p:txBody>
+          <a:bodyPr/>
+          <a:lstStyle/>
+          <a:p>
+            <a:r>
+              <a:rPr lang="en-US" dirty="0" smtClean="0"/>
+              <a:t>Frontend</a:t>
+            </a:r>
+            <a:endParaRPr lang="en-US" dirty="0"/>
+          </a:p>
+        </p:txBody>
+      </p:sp>
+      <p:sp>
+        <p:nvSpPr>
+          <p:cNvPr id="3" name="Subtitle 2"/>
+          <p:cNvSpPr>
+            <a:spLocks noGrp="1"/>
+          </p:cNvSpPr>
+          <p:nvPr>
+            <p:ph type="subTitle" idx="1"/>
+          </p:nvPr>
+        </p:nvSpPr>
+        <p:spPr/>
+        <p:txBody>
+          <a:bodyPr>
+            <a:normAutofit fontScale="92500" lnSpcReduction="10000"/>
+          </a:bodyPr>
+          <a:lstStyle/>
+          <a:p>
+            <a:r>
+              <a:rPr lang="en-US" dirty="0" smtClean="0"/>
+              <a:t>Exercise </a:t>
+            </a:r>
+            <a:r>
+              <a:rPr lang="en-US" dirty="0"/>
+              <a:t>5</a:t>
+            </a:r>
+            <a:endParaRPr lang="en-US" dirty="0"/>
+          </a:p>
+        </p:txBody>
+      </p:sp>
+      <p:sp>
+        <p:nvSpPr>
+          <p:cNvPr id="4" name="Text Placeholder 3"/>
+          <p:cNvSpPr>
+            <a:spLocks noGrp="1"/>
+          </p:cNvSpPr>
+          <p:nvPr>
+            <p:ph type="body" sz="quarter" idx="13"/>
+          </p:nvPr>
+        </p:nvSpPr>
+        <p:spPr/>
+        <p:txBody>
+          <a:bodyPr/>
+          <a:lstStyle/>
+          <a:p>
+            <a:pPr marL="0" indent="0">
+              <a:buNone/>
+            </a:pPr>
+            <a:r>
+              <a:rPr lang="en-US" dirty="0" smtClean="0"/>
+              <a:t>Build a simple client tha</a:t>
+            </a:r>
+            <a:r>
+              <a:rPr lang="en-US" dirty="0" smtClean="0"/>
+              <a:t>t use the API provided by the backend. </a:t>
+            </a:r>
+          </a:p>
+          <a:p>
+            <a:r>
+              <a:rPr lang="en-US" dirty="0" smtClean="0"/>
+              <a:t>Login user to create a session</a:t>
+            </a:r>
+          </a:p>
+          <a:p>
+            <a:endParaRPr lang="en-US" dirty="0" smtClean="0"/>
+          </a:p>
+        </p:txBody>
+      </p:sp>
+      <p:sp>
+        <p:nvSpPr>
+          <p:cNvPr id="5" name="Slide Number Placeholder 4"/>
+          <p:cNvSpPr>
+            <a:spLocks noGrp="1"/>
+          </p:cNvSpPr>
+          <p:nvPr>
+            <p:ph type="sldNum" sz="quarter" idx="14"/>
+          </p:nvPr>
+        </p:nvSpPr>
+        <p:spPr/>
+        <p:txBody>
+          <a:bodyPr/>
+          <a:lstStyle/>
+          <a:p>
+            <a:pPr>
+              <a:defRPr/>
+            </a:pPr>
+            <a:fld id="{4AA01602-B999-AA4E-80A6-B21CED3A9C3C}" type="slidenum">
+              <a:rPr lang="sv-SE" smtClean="0"/>
+              <a:pPr>
+                <a:defRPr/>
+              </a:pPr>
+              <a:t>16</a:t>
+            </a:fld>
+            <a:endParaRPr lang="sv-SE"/>
+          </a:p>
+        </p:txBody>
+      </p:sp>
+    </p:spTree>
+    <p:extLst>
+      <p:ext uri="{BB962C8B-B14F-4D97-AF65-F5344CB8AC3E}">
+        <p14:creationId xmlns:p14="http://schemas.microsoft.com/office/powerpoint/2010/main" val="3598812586"/>
       </p:ext>
     </p:extLst>
   </p:cSld>
@@ -7532,48 +8433,88 @@
           <a:lstStyle/>
           <a:p>
             <a:r>
-              <a:rPr lang="en-US" dirty="0" smtClean="0"/>
+              <a:rPr lang="en-US" sz="2000" dirty="0" smtClean="0"/>
               <a:t>Introduction to SDK by VINNOVA</a:t>
             </a:r>
           </a:p>
           <a:p>
             <a:r>
-              <a:rPr lang="en-US" dirty="0" smtClean="0"/>
+              <a:rPr lang="en-US" sz="2000" dirty="0" smtClean="0"/>
               <a:t>HTTP overview</a:t>
             </a:r>
           </a:p>
           <a:p>
             <a:pPr lvl="1"/>
             <a:r>
-              <a:rPr lang="en-US" dirty="0" smtClean="0"/>
-              <a:t>Lab on public data API</a:t>
-            </a:r>
-            <a:r>
-              <a:rPr lang="en-US" dirty="0" smtClean="0"/>
-              <a:t>’s</a:t>
-            </a:r>
-            <a:endParaRPr lang="en-US" dirty="0" smtClean="0"/>
-          </a:p>
-          <a:p>
-            <a:r>
-              <a:rPr lang="en-US" dirty="0" smtClean="0"/>
+              <a:rPr lang="en-US" sz="2000" dirty="0" smtClean="0"/>
+              <a:t>Lab on public data API’s</a:t>
+            </a:r>
+          </a:p>
+          <a:p>
+            <a:r>
+              <a:rPr lang="en-US" sz="2000" dirty="0" smtClean="0"/>
               <a:t>API’s for patient related information</a:t>
             </a:r>
           </a:p>
           <a:p>
             <a:pPr lvl="1"/>
             <a:r>
-              <a:rPr lang="en-US" dirty="0" err="1" smtClean="0"/>
+              <a:rPr lang="en-US" sz="2000" dirty="0" err="1" smtClean="0"/>
               <a:t>OAuth</a:t>
             </a:r>
             <a:r>
-              <a:rPr lang="en-US" dirty="0" smtClean="0"/>
+              <a:rPr lang="en-US" sz="2000" dirty="0" smtClean="0"/>
+              <a:t> </a:t>
+            </a:r>
+            <a:r>
+              <a:rPr lang="en-US" sz="2000" dirty="0" smtClean="0"/>
+              <a:t>2.0 intro</a:t>
+            </a:r>
+          </a:p>
+          <a:p>
+            <a:pPr lvl="1"/>
+            <a:r>
+              <a:rPr lang="en-US" sz="2000" dirty="0" smtClean="0"/>
+              <a:t>Lab on </a:t>
+            </a:r>
+            <a:r>
+              <a:rPr lang="en-US" sz="2000" dirty="0" err="1" smtClean="0"/>
+              <a:t>OAuth</a:t>
+            </a:r>
+            <a:r>
+              <a:rPr lang="en-US" sz="2000" dirty="0" smtClean="0"/>
               <a:t> 2.0</a:t>
             </a:r>
-            <a:endParaRPr lang="en-US" dirty="0" smtClean="0"/>
-          </a:p>
-          <a:p>
-            <a:endParaRPr lang="en-US" dirty="0" smtClean="0"/>
+          </a:p>
+          <a:p>
+            <a:pPr lvl="1"/>
+            <a:r>
+              <a:rPr lang="en-US" sz="2000" dirty="0" smtClean="0"/>
+              <a:t>The </a:t>
+            </a:r>
+            <a:r>
+              <a:rPr lang="en-US" sz="2000" dirty="0" err="1" smtClean="0"/>
+              <a:t>OAuth</a:t>
+            </a:r>
+            <a:r>
+              <a:rPr lang="en-US" sz="2000" dirty="0" smtClean="0"/>
+              <a:t> 2.0 dance</a:t>
+            </a:r>
+          </a:p>
+          <a:p>
+            <a:pPr lvl="1"/>
+            <a:r>
+              <a:rPr lang="en-US" sz="2000" dirty="0" smtClean="0"/>
+              <a:t>Lab 3, implement </a:t>
+            </a:r>
+            <a:r>
+              <a:rPr lang="en-US" sz="2000" dirty="0" err="1" smtClean="0"/>
+              <a:t>OAuth</a:t>
+            </a:r>
+            <a:r>
+              <a:rPr lang="en-US" sz="2000" dirty="0" smtClean="0"/>
+              <a:t> 2.0 dance</a:t>
+            </a:r>
           </a:p>
         </p:txBody>
       </p:sp>
@@ -7660,7 +8601,7 @@
           <a:p>
             <a:r>
               <a:rPr lang="en-US" dirty="0" smtClean="0"/>
-              <a:t>Introduction to SDK by VINNOVA</a:t>
+              <a:t>Agenda</a:t>
             </a:r>
             <a:endParaRPr lang="en-US" dirty="0"/>
           </a:p>
@@ -7683,7 +8624,7 @@
           </a:bodyPr>
           <a:lstStyle/>
           <a:p>
-            <a:endParaRPr lang="en-US" dirty="0"/>
+            <a:endParaRPr lang="en-US"/>
           </a:p>
         </p:txBody>
       </p:sp>
@@ -7703,34 +8644,41 @@
           <a:lstStyle/>
           <a:p>
             <a:r>
-              <a:rPr lang="en-US" dirty="0" smtClean="0">
-                <a:hlinkClick r:id="rId3"/>
-              </a:rPr>
-              <a:t>SDK by </a:t>
-            </a:r>
-            <a:r>
-              <a:rPr lang="en-US" dirty="0" smtClean="0">
-                <a:hlinkClick r:id="rId3"/>
-              </a:rPr>
-              <a:t>VINNOVA</a:t>
-            </a:r>
-            <a:endParaRPr lang="en-US" dirty="0" smtClean="0"/>
-          </a:p>
-          <a:p>
-            <a:r>
-              <a:rPr lang="en-US" dirty="0" smtClean="0"/>
-              <a:t>Background</a:t>
-            </a:r>
-          </a:p>
-          <a:p>
-            <a:r>
-              <a:rPr lang="en-US" dirty="0" smtClean="0"/>
-              <a:t>API</a:t>
-            </a:r>
-            <a:r>
-              <a:rPr lang="en-US" dirty="0" smtClean="0"/>
-              <a:t>’s</a:t>
-            </a:r>
+              <a:rPr lang="en-US" sz="2000" dirty="0" smtClean="0"/>
+              <a:t>Building the App </a:t>
+            </a:r>
+          </a:p>
+          <a:p>
+            <a:pPr lvl="1"/>
+            <a:r>
+              <a:rPr lang="en-US" sz="2000" dirty="0" smtClean="0"/>
+              <a:t>Need for an app backend</a:t>
+            </a:r>
+          </a:p>
+          <a:p>
+            <a:pPr lvl="1"/>
+            <a:r>
+              <a:rPr lang="en-US" sz="2000" dirty="0" smtClean="0"/>
+              <a:t>Lab 4, build the app backend</a:t>
+            </a:r>
+          </a:p>
+          <a:p>
+            <a:pPr lvl="1"/>
+            <a:r>
+              <a:rPr lang="en-US" sz="2000" dirty="0" smtClean="0"/>
+              <a:t>Front-end development fro mobile apps, differences ?</a:t>
+            </a:r>
+          </a:p>
+          <a:p>
+            <a:pPr lvl="1"/>
+            <a:r>
+              <a:rPr lang="en-US" sz="2000" dirty="0" smtClean="0"/>
+              <a:t>Lab 5, Applying the app</a:t>
+            </a:r>
+            <a:endParaRPr lang="en-US" sz="2000" dirty="0" smtClean="0"/>
+          </a:p>
+          <a:p>
+            <a:endParaRPr lang="en-US" sz="2000" dirty="0" smtClean="0"/>
           </a:p>
         </p:txBody>
       </p:sp>
@@ -7758,6 +8706,153 @@
                 <a:defRPr/>
               </a:pPr>
               <a:t>4</a:t>
+            </a:fld>
+            <a:endParaRPr lang="sv-SE"/>
+          </a:p>
+        </p:txBody>
+      </p:sp>
+    </p:spTree>
+    <p:extLst>
+      <p:ext uri="{BB962C8B-B14F-4D97-AF65-F5344CB8AC3E}">
+        <p14:creationId xmlns:p14="http://schemas.microsoft.com/office/powerpoint/2010/main" val="2390511196"/>
+      </p:ext>
+    </p:extLst>
+  </p:cSld>
+  <p:clrMapOvr>
+    <a:masterClrMapping/>
+  </p:clrMapOvr>
+  <p:timing>
+    <p:tnLst>
+      <p:par>
+        <p:cTn xmlns:p14="http://schemas.microsoft.com/office/powerpoint/2010/main" id="1" dur="indefinite" restart="never" nodeType="tmRoot"/>
+      </p:par>
+    </p:tnLst>
+  </p:timing>
+</p:sld>
+</file>
+
+<file path=ppt/slides/slide5.xml><?xml version="1.0" encoding="utf-8"?>
+<p:sld xmlns:a="http://schemas.openxmlformats.org/drawingml/2006/main" xmlns:r="http://schemas.openxmlformats.org/officeDocument/2006/relationships" xmlns:p="http://schemas.openxmlformats.org/presentationml/2006/main">
+  <p:cSld>
+    <p:spTree>
+      <p:nvGrpSpPr>
+        <p:cNvPr id="1" name=""/>
+        <p:cNvGrpSpPr/>
+        <p:nvPr/>
+      </p:nvGrpSpPr>
+      <p:grpSpPr>
+        <a:xfrm>
+          <a:off x="0" y="0"/>
+          <a:ext cx="0" cy="0"/>
+          <a:chOff x="0" y="0"/>
+          <a:chExt cx="0" cy="0"/>
+        </a:xfrm>
+      </p:grpSpPr>
+      <p:sp>
+        <p:nvSpPr>
+          <p:cNvPr id="2" name="Title 1"/>
+          <p:cNvSpPr>
+            <a:spLocks noGrp="1"/>
+          </p:cNvSpPr>
+          <p:nvPr>
+            <p:ph type="ctrTitle"/>
+          </p:nvPr>
+        </p:nvSpPr>
+        <p:spPr/>
+        <p:txBody>
+          <a:bodyPr/>
+          <a:lstStyle/>
+          <a:p>
+            <a:r>
+              <a:rPr lang="en-US" dirty="0" smtClean="0"/>
+              <a:t>Introduction to SDK by VINNOVA</a:t>
+            </a:r>
+            <a:endParaRPr lang="en-US" dirty="0"/>
+          </a:p>
+        </p:txBody>
+      </p:sp>
+      <p:sp>
+        <p:nvSpPr>
+          <p:cNvPr id="3" name="Subtitle 2"/>
+          <p:cNvSpPr>
+            <a:spLocks noGrp="1"/>
+          </p:cNvSpPr>
+          <p:nvPr>
+            <p:ph type="subTitle" idx="1"/>
+          </p:nvPr>
+        </p:nvSpPr>
+        <p:spPr/>
+        <p:txBody>
+          <a:bodyPr>
+            <a:normAutofit fontScale="92500" lnSpcReduction="10000"/>
+          </a:bodyPr>
+          <a:lstStyle/>
+          <a:p>
+            <a:endParaRPr lang="en-US" dirty="0"/>
+          </a:p>
+        </p:txBody>
+      </p:sp>
+      <p:sp>
+        <p:nvSpPr>
+          <p:cNvPr id="4" name="Text Placeholder 3"/>
+          <p:cNvSpPr>
+            <a:spLocks noGrp="1"/>
+          </p:cNvSpPr>
+          <p:nvPr>
+            <p:ph type="body" sz="quarter" idx="13"/>
+          </p:nvPr>
+        </p:nvSpPr>
+        <p:spPr/>
+        <p:txBody>
+          <a:bodyPr/>
+          <a:lstStyle/>
+          <a:p>
+            <a:r>
+              <a:rPr lang="en-US" dirty="0" smtClean="0">
+                <a:hlinkClick r:id="rId3"/>
+              </a:rPr>
+              <a:t>SDK by VINNOVA</a:t>
+            </a:r>
+            <a:endParaRPr lang="en-US" dirty="0" smtClean="0"/>
+          </a:p>
+          <a:p>
+            <a:r>
+              <a:rPr lang="en-US" dirty="0" smtClean="0"/>
+              <a:t>Background</a:t>
+            </a:r>
+          </a:p>
+          <a:p>
+            <a:r>
+              <a:rPr lang="en-US" dirty="0" smtClean="0"/>
+              <a:t>API’s</a:t>
+            </a:r>
+          </a:p>
+        </p:txBody>
+      </p:sp>
+      <p:sp>
+        <p:nvSpPr>
+          <p:cNvPr id="5" name="Slide Number Placeholder 4"/>
+          <p:cNvSpPr>
+            <a:spLocks noGrp="1"/>
+          </p:cNvSpPr>
+          <p:nvPr>
+            <p:ph type="sldNum" sz="quarter" idx="14"/>
+          </p:nvPr>
+        </p:nvSpPr>
+        <p:spPr/>
+        <p:txBody>
+          <a:bodyPr/>
+          <a:lstStyle/>
+          <a:p>
+            <a:pPr>
+              <a:defRPr/>
+            </a:pPr>
+            <a:fld id="{4AA01602-B999-AA4E-80A6-B21CED3A9C3C}" type="slidenum">
+              <a:rPr lang="sv-SE" smtClean="0"/>
+              <a:pPr>
+                <a:defRPr/>
+              </a:pPr>
+              <a:t>5</a:t>
             </a:fld>
             <a:endParaRPr lang="sv-SE"/>
           </a:p>
@@ -7813,199 +8908,6 @@
 </p:sld>
 </file>
 
-<file path=ppt/slides/slide5.xml><?xml version="1.0" encoding="utf-8"?>
-<p:sld xmlns:a="http://schemas.openxmlformats.org/drawingml/2006/main" xmlns:r="http://schemas.openxmlformats.org/officeDocument/2006/relationships" xmlns:p="http://schemas.openxmlformats.org/presentationml/2006/main">
-  <p:cSld>
-    <p:spTree>
-      <p:nvGrpSpPr>
-        <p:cNvPr id="1" name=""/>
-        <p:cNvGrpSpPr/>
-        <p:nvPr/>
-      </p:nvGrpSpPr>
-      <p:grpSpPr>
-        <a:xfrm>
-          <a:off x="0" y="0"/>
-          <a:ext cx="0" cy="0"/>
-          <a:chOff x="0" y="0"/>
-          <a:chExt cx="0" cy="0"/>
-        </a:xfrm>
-      </p:grpSpPr>
-      <p:sp>
-        <p:nvSpPr>
-          <p:cNvPr id="2" name="Title 1"/>
-          <p:cNvSpPr>
-            <a:spLocks noGrp="1"/>
-          </p:cNvSpPr>
-          <p:nvPr>
-            <p:ph type="ctrTitle"/>
-          </p:nvPr>
-        </p:nvSpPr>
-        <p:spPr/>
-        <p:txBody>
-          <a:bodyPr/>
-          <a:lstStyle/>
-          <a:p>
-            <a:r>
-              <a:rPr lang="en-US" dirty="0" smtClean="0"/>
-              <a:t>HTTP overview</a:t>
-            </a:r>
-            <a:endParaRPr lang="en-US" dirty="0"/>
-          </a:p>
-        </p:txBody>
-      </p:sp>
-      <p:sp>
-        <p:nvSpPr>
-          <p:cNvPr id="3" name="Subtitle 2"/>
-          <p:cNvSpPr>
-            <a:spLocks noGrp="1"/>
-          </p:cNvSpPr>
-          <p:nvPr>
-            <p:ph type="subTitle" idx="1"/>
-          </p:nvPr>
-        </p:nvSpPr>
-        <p:spPr/>
-        <p:txBody>
-          <a:bodyPr>
-            <a:normAutofit fontScale="92500" lnSpcReduction="10000"/>
-          </a:bodyPr>
-          <a:lstStyle/>
-          <a:p>
-            <a:r>
-              <a:rPr lang="en-US" dirty="0" smtClean="0"/>
-              <a:t>HTTP-request</a:t>
-            </a:r>
-            <a:endParaRPr lang="en-US" dirty="0"/>
-          </a:p>
-        </p:txBody>
-      </p:sp>
-      <p:sp>
-        <p:nvSpPr>
-          <p:cNvPr id="4" name="Text Placeholder 3"/>
-          <p:cNvSpPr>
-            <a:spLocks noGrp="1"/>
-          </p:cNvSpPr>
-          <p:nvPr>
-            <p:ph type="body" sz="quarter" idx="13"/>
-          </p:nvPr>
-        </p:nvSpPr>
-        <p:spPr/>
-        <p:txBody>
-          <a:bodyPr/>
-          <a:lstStyle/>
-          <a:p>
-            <a:r>
-              <a:rPr lang="en-US" sz="1800" dirty="0" smtClean="0"/>
-              <a:t>POST, GET, PUT, DELETE</a:t>
-            </a:r>
-          </a:p>
-          <a:p>
-            <a:pPr lvl="1"/>
-            <a:r>
-              <a:rPr lang="en-US" sz="1800" dirty="0" smtClean="0"/>
-              <a:t>CRUD mappings based on best practices within REST community.</a:t>
-            </a:r>
-          </a:p>
-          <a:p>
-            <a:r>
-              <a:rPr lang="en-US" sz="1800" dirty="0" smtClean="0"/>
-              <a:t>URL</a:t>
-            </a:r>
-          </a:p>
-          <a:p>
-            <a:pPr lvl="1"/>
-            <a:r>
-              <a:rPr lang="en-US" sz="1800" dirty="0" smtClean="0"/>
-              <a:t>Address + parameters</a:t>
-            </a:r>
-          </a:p>
-          <a:p>
-            <a:r>
-              <a:rPr lang="en-US" sz="1800" dirty="0" smtClean="0"/>
-              <a:t>HTTP </a:t>
-            </a:r>
-            <a:r>
-              <a:rPr lang="en-US" sz="1800" dirty="0"/>
-              <a:t>headers</a:t>
-            </a:r>
-          </a:p>
-          <a:p>
-            <a:pPr lvl="1"/>
-            <a:r>
-              <a:rPr lang="en-US" sz="1800" dirty="0" smtClean="0"/>
-              <a:t>Accept</a:t>
-            </a:r>
-          </a:p>
-          <a:p>
-            <a:pPr lvl="1"/>
-            <a:r>
-              <a:rPr lang="en-US" sz="1800" dirty="0" smtClean="0"/>
-              <a:t>Authorization</a:t>
-            </a:r>
-          </a:p>
-          <a:p>
-            <a:pPr lvl="1"/>
-            <a:r>
-              <a:rPr lang="en-US" sz="1800" dirty="0" smtClean="0"/>
-              <a:t>Content-Type</a:t>
-            </a:r>
-          </a:p>
-          <a:p>
-            <a:r>
-              <a:rPr lang="en-US" sz="1800" dirty="0" smtClean="0"/>
-              <a:t>Payload/Content</a:t>
-            </a:r>
-          </a:p>
-        </p:txBody>
-      </p:sp>
-      <p:sp>
-        <p:nvSpPr>
-          <p:cNvPr id="5" name="Slide Number Placeholder 4"/>
-          <p:cNvSpPr>
-            <a:spLocks noGrp="1"/>
-          </p:cNvSpPr>
-          <p:nvPr>
-            <p:ph type="sldNum" sz="quarter" idx="14"/>
-          </p:nvPr>
-        </p:nvSpPr>
-        <p:spPr/>
-        <p:txBody>
-          <a:bodyPr/>
-          <a:lstStyle/>
-          <a:p>
-            <a:pPr>
-              <a:defRPr/>
-            </a:pPr>
-            <a:fld id="{4AA01602-B999-AA4E-80A6-B21CED3A9C3C}" type="slidenum">
-              <a:rPr lang="sv-SE" smtClean="0"/>
-              <a:pPr>
-                <a:defRPr/>
-              </a:pPr>
-              <a:t>5</a:t>
-            </a:fld>
-            <a:endParaRPr lang="sv-SE"/>
-          </a:p>
-        </p:txBody>
-      </p:sp>
-    </p:spTree>
-    <p:extLst>
-      <p:ext uri="{BB962C8B-B14F-4D97-AF65-F5344CB8AC3E}">
-        <p14:creationId xmlns:p14="http://schemas.microsoft.com/office/powerpoint/2010/main" val="292200695"/>
-      </p:ext>
-    </p:extLst>
-  </p:cSld>
-  <p:clrMapOvr>
-    <a:masterClrMapping/>
-  </p:clrMapOvr>
-  <p:timing>
-    <p:tnLst>
-      <p:par>
-        <p:cTn xmlns:p14="http://schemas.microsoft.com/office/powerpoint/2010/main" id="1" dur="indefinite" restart="never" nodeType="tmRoot"/>
-      </p:par>
-    </p:tnLst>
-  </p:timing>
-</p:sld>
-</file>
-
 <file path=ppt/slides/slide6.xml><?xml version="1.0" encoding="utf-8"?>
 <p:sld xmlns:a="http://schemas.openxmlformats.org/drawingml/2006/main" xmlns:r="http://schemas.openxmlformats.org/officeDocument/2006/relationships" xmlns:p="http://schemas.openxmlformats.org/presentationml/2006/main">
   <p:cSld>
@@ -8065,7 +8967,7 @@
           <a:p>
             <a:r>
               <a:rPr lang="en-US" dirty="0" smtClean="0"/>
-              <a:t>HTTP-response</a:t>
+              <a:t>HTTP-request</a:t>
             </a:r>
             <a:endParaRPr lang="en-US" dirty="0"/>
           </a:p>
@@ -8087,73 +8989,66 @@
           <a:lstStyle/>
           <a:p>
             <a:r>
-              <a:rPr lang="en-US" dirty="0" smtClean="0"/>
-              <a:t>Status codes</a:t>
-            </a:r>
-            <a:endParaRPr lang="en-US" dirty="0"/>
+              <a:rPr lang="en-US" sz="1800" dirty="0" smtClean="0"/>
+              <a:t>POST, GET, PUT, DELETE</a:t>
+            </a:r>
           </a:p>
           <a:p>
             <a:pPr lvl="1"/>
             <a:r>
-              <a:rPr lang="en-US" dirty="0" smtClean="0"/>
-              <a:t>2xx, 3xx, 4xx, 5xx</a:t>
+              <a:rPr lang="en-US" sz="1800" dirty="0" smtClean="0"/>
+              <a:t>CRUD mappings based on best practices within REST community.</a:t>
+            </a:r>
+          </a:p>
+          <a:p>
+            <a:r>
+              <a:rPr lang="en-US" sz="1800" dirty="0" smtClean="0"/>
+              <a:t>URL</a:t>
             </a:r>
           </a:p>
           <a:p>
             <a:pPr lvl="1"/>
             <a:r>
-              <a:rPr lang="en-US" dirty="0" smtClean="0"/>
-              <a:t>418 I’m a teapot (RFC2324)</a:t>
-            </a:r>
-          </a:p>
-          <a:p>
-            <a:pPr lvl="2"/>
-            <a:r>
-              <a:rPr lang="en-US" dirty="0" smtClean="0"/>
-              <a:t>Hyper Text Coffee Pot Control Protocol</a:t>
-            </a:r>
-          </a:p>
-          <a:p>
-            <a:r>
-              <a:rPr lang="en-US" dirty="0" smtClean="0"/>
-              <a:t>HTTP Headers</a:t>
+              <a:rPr lang="en-US" sz="1800" dirty="0" smtClean="0"/>
+              <a:t>Address + parameters</a:t>
+            </a:r>
+          </a:p>
+          <a:p>
+            <a:r>
+              <a:rPr lang="en-US" sz="1800" dirty="0" smtClean="0"/>
+              <a:t>HTTP </a:t>
+            </a:r>
+            <a:r>
+              <a:rPr lang="en-US" sz="1800" dirty="0"/>
+              <a:t>headers</a:t>
             </a:r>
           </a:p>
           <a:p>
             <a:pPr lvl="1"/>
             <a:r>
-              <a:rPr lang="en-US" dirty="0" smtClean="0"/>
-              <a:t>Location</a:t>
+              <a:rPr lang="en-US" sz="1800" dirty="0" smtClean="0"/>
+              <a:t>Accept</a:t>
             </a:r>
           </a:p>
           <a:p>
             <a:pPr lvl="1"/>
             <a:r>
-              <a:rPr lang="en-US" sz="2400" dirty="0"/>
-              <a:t>Content-</a:t>
-            </a:r>
-            <a:r>
-              <a:rPr lang="en-US" sz="2400" dirty="0" smtClean="0"/>
-              <a:t>Type</a:t>
-            </a:r>
-            <a:endParaRPr lang="en-US" dirty="0" smtClean="0"/>
-          </a:p>
-          <a:p>
-            <a:pPr marL="342900" lvl="1" indent="-342900">
-              <a:buFont typeface="Arial" charset="0"/>
-              <a:buChar char="•"/>
-            </a:pPr>
-            <a:r>
-              <a:rPr lang="en-US" dirty="0" smtClean="0"/>
-              <a:t>Example: Redirect, how does it work?</a:t>
-            </a:r>
-            <a:endParaRPr lang="en-US" dirty="0"/>
-          </a:p>
-          <a:p>
-            <a:endParaRPr lang="en-US" dirty="0"/>
-          </a:p>
-          <a:p>
-            <a:endParaRPr lang="en-US" dirty="0"/>
+              <a:rPr lang="en-US" sz="1800" dirty="0" smtClean="0"/>
+              <a:t>Authorization</a:t>
+            </a:r>
+          </a:p>
+          <a:p>
+            <a:pPr lvl="1"/>
+            <a:r>
+              <a:rPr lang="en-US" sz="1800" dirty="0" smtClean="0"/>
+              <a:t>Content-Type</a:t>
+            </a:r>
+          </a:p>
+          <a:p>
+            <a:r>
+              <a:rPr lang="en-US" sz="1800" dirty="0" smtClean="0"/>
+              <a:t>Payload/Content</a:t>
+            </a:r>
           </a:p>
         </p:txBody>
       </p:sp>
@@ -8189,7 +9084,7 @@
     </p:spTree>
     <p:extLst>
       <p:ext uri="{BB962C8B-B14F-4D97-AF65-F5344CB8AC3E}">
-        <p14:creationId xmlns:p14="http://schemas.microsoft.com/office/powerpoint/2010/main" val="970070681"/>
+        <p14:creationId xmlns:p14="http://schemas.microsoft.com/office/powerpoint/2010/main" val="292200695"/>
       </p:ext>
     </p:extLst>
   </p:cSld>
@@ -8265,7 +9160,7 @@
           <a:p>
             <a:r>
               <a:rPr lang="en-US" dirty="0" smtClean="0"/>
-              <a:t>Example: Redirect, how does it work?</a:t>
+              <a:t>HTTP-response</a:t>
             </a:r>
             <a:endParaRPr lang="en-US" dirty="0"/>
           </a:p>
@@ -8288,8 +9183,72 @@
           <a:p>
             <a:r>
               <a:rPr lang="en-US" dirty="0" smtClean="0"/>
-              <a:t>{SNYGG BILD}</a:t>
-            </a:r>
+              <a:t>Status codes</a:t>
+            </a:r>
+            <a:endParaRPr lang="en-US" dirty="0"/>
+          </a:p>
+          <a:p>
+            <a:pPr lvl="1"/>
+            <a:r>
+              <a:rPr lang="en-US" dirty="0" smtClean="0"/>
+              <a:t>2xx, 3xx, 4xx, 5xx</a:t>
+            </a:r>
+          </a:p>
+          <a:p>
+            <a:pPr lvl="1"/>
+            <a:r>
+              <a:rPr lang="en-US" dirty="0" smtClean="0"/>
+              <a:t>418 I’m a teapot (RFC2324)</a:t>
+            </a:r>
+          </a:p>
+          <a:p>
+            <a:pPr lvl="2"/>
+            <a:r>
+              <a:rPr lang="en-US" dirty="0" smtClean="0"/>
+              <a:t>Hyper Text Coffee Pot Control Protocol</a:t>
+            </a:r>
+          </a:p>
+          <a:p>
+            <a:r>
+              <a:rPr lang="en-US" dirty="0" smtClean="0"/>
+              <a:t>HTTP Headers</a:t>
+            </a:r>
+          </a:p>
+          <a:p>
+            <a:pPr lvl="1"/>
+            <a:r>
+              <a:rPr lang="en-US" dirty="0" smtClean="0"/>
+              <a:t>Location</a:t>
+            </a:r>
+          </a:p>
+          <a:p>
+            <a:pPr lvl="1"/>
+            <a:r>
+              <a:rPr lang="en-US" sz="2400" dirty="0"/>
+              <a:t>Content-</a:t>
+            </a:r>
+            <a:r>
+              <a:rPr lang="en-US" sz="2400" dirty="0" smtClean="0"/>
+              <a:t>Type</a:t>
+            </a:r>
+            <a:endParaRPr lang="en-US" dirty="0" smtClean="0"/>
+          </a:p>
+          <a:p>
+            <a:pPr marL="342900" lvl="1" indent="-342900">
+              <a:buFont typeface="Arial" charset="0"/>
+              <a:buChar char="•"/>
+            </a:pPr>
+            <a:r>
+              <a:rPr lang="en-US" dirty="0" smtClean="0"/>
+              <a:t>Example: Redirect, how does it work?</a:t>
+            </a:r>
+            <a:endParaRPr lang="en-US" dirty="0"/>
+          </a:p>
+          <a:p>
+            <a:endParaRPr lang="en-US" dirty="0"/>
+          </a:p>
+          <a:p>
+            <a:endParaRPr lang="en-US" dirty="0"/>
           </a:p>
         </p:txBody>
       </p:sp>
@@ -8325,13 +9284,20 @@
     </p:spTree>
     <p:extLst>
       <p:ext uri="{BB962C8B-B14F-4D97-AF65-F5344CB8AC3E}">
-        <p14:creationId xmlns:p14="http://schemas.microsoft.com/office/powerpoint/2010/main" val="2100865221"/>
+        <p14:creationId xmlns:p14="http://schemas.microsoft.com/office/powerpoint/2010/main" val="970070681"/>
       </p:ext>
     </p:extLst>
   </p:cSld>
   <p:clrMapOvr>
     <a:masterClrMapping/>
   </p:clrMapOvr>
+  <p:timing>
+    <p:tnLst>
+      <p:par>
+        <p:cTn xmlns:p14="http://schemas.microsoft.com/office/powerpoint/2010/main" id="1" dur="indefinite" restart="never" nodeType="tmRoot"/>
+      </p:par>
+    </p:tnLst>
+  </p:timing>
 </p:sld>
 </file>
 
@@ -8394,7 +9360,7 @@
           <a:p>
             <a:r>
               <a:rPr lang="en-US" dirty="0" smtClean="0"/>
-              <a:t>Exercise 1</a:t>
+              <a:t>Example: Redirect, how does it work?</a:t>
             </a:r>
             <a:endParaRPr lang="en-US" dirty="0"/>
           </a:p>
@@ -8415,12 +9381,9 @@
           <a:bodyPr/>
           <a:lstStyle/>
           <a:p>
-            <a:pPr marL="0" indent="0">
-              <a:buNone/>
-            </a:pPr>
             <a:r>
               <a:rPr lang="en-US" dirty="0" smtClean="0"/>
-              <a:t>Use Curl to make http requests</a:t>
+              <a:t>{SNYGG BILD}</a:t>
             </a:r>
           </a:p>
         </p:txBody>
@@ -8457,7 +9420,7 @@
     </p:spTree>
     <p:extLst>
       <p:ext uri="{BB962C8B-B14F-4D97-AF65-F5344CB8AC3E}">
-        <p14:creationId xmlns:p14="http://schemas.microsoft.com/office/powerpoint/2010/main" val="3805536355"/>
+        <p14:creationId xmlns:p14="http://schemas.microsoft.com/office/powerpoint/2010/main" val="2100865221"/>
       </p:ext>
     </p:extLst>
   </p:cSld>
@@ -8496,14 +9459,12 @@
         </p:nvSpPr>
         <p:spPr/>
         <p:txBody>
-          <a:bodyPr>
-            <a:normAutofit fontScale="90000"/>
-          </a:bodyPr>
+          <a:bodyPr/>
           <a:lstStyle/>
           <a:p>
             <a:r>
               <a:rPr lang="en-US" dirty="0" smtClean="0"/>
-              <a:t>API’s for patient related information</a:t>
+              <a:t>HTTP overview</a:t>
             </a:r>
             <a:endParaRPr lang="en-US" dirty="0"/>
           </a:p>
@@ -8528,7 +9489,7 @@
           <a:p>
             <a:r>
               <a:rPr lang="en-US" dirty="0" smtClean="0"/>
-              <a:t>Introduction</a:t>
+              <a:t>Exercise 1</a:t>
             </a:r>
             <a:endParaRPr lang="en-US" dirty="0"/>
           </a:p>
@@ -8549,83 +9510,12 @@
           <a:bodyPr/>
           <a:lstStyle/>
           <a:p>
-            <a:r>
-              <a:rPr lang="en-US" sz="1800" dirty="0" smtClean="0"/>
-              <a:t>As opposed to the public API’s, not open data API</a:t>
-            </a:r>
-            <a:r>
-              <a:rPr lang="en-US" sz="1800" dirty="0" smtClean="0"/>
-              <a:t>’s</a:t>
-            </a:r>
-            <a:endParaRPr lang="en-US" sz="1800" dirty="0" smtClean="0"/>
-          </a:p>
-          <a:p>
-            <a:r>
-              <a:rPr lang="en-US" sz="1800" dirty="0" smtClean="0"/>
-              <a:t>Strong authentication of citizens</a:t>
-            </a:r>
-          </a:p>
-          <a:p>
-            <a:pPr lvl="1"/>
-            <a:r>
-              <a:rPr lang="en-US" sz="1800" dirty="0" smtClean="0"/>
-              <a:t>Demand from </a:t>
-            </a:r>
-            <a:r>
-              <a:rPr lang="en-US" sz="1800" dirty="0" err="1" smtClean="0"/>
-              <a:t>Datainspektionen</a:t>
-            </a:r>
-            <a:endParaRPr lang="en-US" sz="1800" dirty="0" smtClean="0"/>
-          </a:p>
-          <a:p>
-            <a:pPr lvl="1"/>
-            <a:r>
-              <a:rPr lang="en-US" sz="1800" dirty="0" smtClean="0"/>
-              <a:t>2 factor</a:t>
-            </a:r>
-          </a:p>
-          <a:p>
-            <a:r>
-              <a:rPr lang="en-US" sz="1800" dirty="0" smtClean="0"/>
-              <a:t>Strong authentication of API clients</a:t>
-            </a:r>
-          </a:p>
-          <a:p>
-            <a:pPr lvl="1"/>
-            <a:r>
-              <a:rPr lang="en-US" sz="1800" dirty="0" smtClean="0"/>
-              <a:t>SSL/TLS certificate</a:t>
-            </a:r>
-          </a:p>
-          <a:p>
-            <a:pPr lvl="1"/>
-            <a:r>
-              <a:rPr lang="en-US" sz="1800" dirty="0" smtClean="0"/>
-              <a:t>Mutual </a:t>
-            </a:r>
-            <a:r>
-              <a:rPr lang="en-US" sz="1800" dirty="0" err="1" smtClean="0"/>
-              <a:t>authenticaton</a:t>
-            </a:r>
-            <a:endParaRPr lang="en-US" sz="1800" dirty="0" smtClean="0"/>
-          </a:p>
-          <a:p>
-            <a:r>
-              <a:rPr lang="en-US" sz="1800" dirty="0" smtClean="0"/>
-              <a:t>Strict authorization control</a:t>
-            </a:r>
-          </a:p>
-          <a:p>
-            <a:pPr lvl="1"/>
-            <a:r>
-              <a:rPr lang="en-US" sz="1600" dirty="0" smtClean="0"/>
-              <a:t>Citizen approved </a:t>
-            </a:r>
-          </a:p>
-          <a:p>
-            <a:r>
-              <a:rPr lang="en-US" sz="1800" dirty="0" smtClean="0"/>
-              <a:t>So what’s the problem???</a:t>
+            <a:pPr marL="0" indent="0">
+              <a:buNone/>
+            </a:pPr>
+            <a:r>
+              <a:rPr lang="en-US" dirty="0" smtClean="0"/>
+              <a:t>Use Curl to make http requests</a:t>
             </a:r>
           </a:p>
         </p:txBody>
@@ -8662,7 +9552,7 @@
     </p:spTree>
     <p:extLst>
       <p:ext uri="{BB962C8B-B14F-4D97-AF65-F5344CB8AC3E}">
-        <p14:creationId xmlns:p14="http://schemas.microsoft.com/office/powerpoint/2010/main" val="910791665"/>
+        <p14:creationId xmlns:p14="http://schemas.microsoft.com/office/powerpoint/2010/main" val="3805536355"/>
       </p:ext>
     </p:extLst>
   </p:cSld>

</xml_diff>

<commit_message>
Updated ppt with OAuth info
</commit_message>
<xml_diff>
--- a/Cadec-vårdens-apier.pptx
+++ b/Cadec-vårdens-apier.pptx
@@ -5,10 +5,10 @@
     <p:sldMasterId id="2147483648" r:id="rId1"/>
   </p:sldMasterIdLst>
   <p:notesMasterIdLst>
-    <p:notesMasterId r:id="rId18"/>
+    <p:notesMasterId r:id="rId21"/>
   </p:notesMasterIdLst>
   <p:handoutMasterIdLst>
-    <p:handoutMasterId r:id="rId19"/>
+    <p:handoutMasterId r:id="rId22"/>
   </p:handoutMasterIdLst>
   <p:sldIdLst>
     <p:sldId id="256" r:id="rId2"/>
@@ -22,11 +22,14 @@
     <p:sldId id="261" r:id="rId10"/>
     <p:sldId id="264" r:id="rId11"/>
     <p:sldId id="266" r:id="rId12"/>
-    <p:sldId id="265" r:id="rId13"/>
-    <p:sldId id="267" r:id="rId14"/>
-    <p:sldId id="269" r:id="rId15"/>
-    <p:sldId id="271" r:id="rId16"/>
-    <p:sldId id="270" r:id="rId17"/>
+    <p:sldId id="272" r:id="rId13"/>
+    <p:sldId id="273" r:id="rId14"/>
+    <p:sldId id="265" r:id="rId15"/>
+    <p:sldId id="267" r:id="rId16"/>
+    <p:sldId id="269" r:id="rId17"/>
+    <p:sldId id="271" r:id="rId18"/>
+    <p:sldId id="270" r:id="rId19"/>
+    <p:sldId id="274" r:id="rId20"/>
   </p:sldIdLst>
   <p:sldSz cx="9144000" cy="6858000" type="screen4x3"/>
   <p:notesSz cx="6858000" cy="9144000"/>
@@ -257,7 +260,7 @@
               <a:pPr>
                 <a:defRPr/>
               </a:pPr>
-              <a:t>2012-12-20</a:t>
+              <a:t>2012-12-27</a:t>
             </a:fld>
             <a:endParaRPr lang="sv-SE"/>
           </a:p>
@@ -457,7 +460,7 @@
               <a:pPr>
                 <a:defRPr/>
               </a:pPr>
-              <a:t>2012-12-20</a:t>
+              <a:t>2012-12-27</a:t>
             </a:fld>
             <a:endParaRPr lang="sv-SE"/>
           </a:p>
@@ -2512,7 +2515,416 @@
           <a:bodyPr/>
           <a:lstStyle/>
           <a:p>
-            <a:endParaRPr lang="en-US" baseline="0" dirty="0" smtClean="0"/>
+            <a:r>
+              <a:rPr lang="en-US" dirty="0" err="1" smtClean="0"/>
+              <a:t>Reaource</a:t>
+            </a:r>
+            <a:r>
+              <a:rPr lang="en-US" dirty="0" smtClean="0"/>
+              <a:t> Owner: En roll </a:t>
+            </a:r>
+            <a:r>
+              <a:rPr lang="en-US" dirty="0" err="1" smtClean="0"/>
+              <a:t>i</a:t>
+            </a:r>
+            <a:r>
+              <a:rPr lang="en-US" dirty="0" smtClean="0"/>
+              <a:t> </a:t>
+            </a:r>
+            <a:r>
+              <a:rPr lang="en-US" dirty="0" err="1" smtClean="0"/>
+              <a:t>OAuth</a:t>
+            </a:r>
+            <a:r>
+              <a:rPr lang="en-US" dirty="0" smtClean="0"/>
+              <a:t> 2.0 </a:t>
+            </a:r>
+            <a:r>
+              <a:rPr lang="en-US" dirty="0" err="1" smtClean="0"/>
+              <a:t>specifikationen</a:t>
+            </a:r>
+            <a:r>
+              <a:rPr lang="en-US" dirty="0" smtClean="0"/>
+              <a:t> </a:t>
+            </a:r>
+            <a:r>
+              <a:rPr lang="en-US" dirty="0" err="1" smtClean="0"/>
+              <a:t>som</a:t>
+            </a:r>
+            <a:r>
+              <a:rPr lang="en-US" dirty="0" smtClean="0"/>
+              <a:t> </a:t>
+            </a:r>
+            <a:r>
+              <a:rPr lang="en-US" dirty="0" err="1" smtClean="0"/>
+              <a:t>pekar</a:t>
+            </a:r>
+            <a:r>
+              <a:rPr lang="en-US" dirty="0" smtClean="0"/>
+              <a:t> </a:t>
+            </a:r>
+            <a:r>
+              <a:rPr lang="en-US" dirty="0" err="1" smtClean="0"/>
+              <a:t>ut</a:t>
+            </a:r>
+            <a:r>
+              <a:rPr lang="en-US" dirty="0" smtClean="0"/>
+              <a:t> </a:t>
+            </a:r>
+            <a:r>
+              <a:rPr lang="en-US" dirty="0" err="1" smtClean="0"/>
+              <a:t>användaren</a:t>
+            </a:r>
+            <a:r>
+              <a:rPr lang="en-US" dirty="0" smtClean="0"/>
+              <a:t> </a:t>
+            </a:r>
+            <a:r>
+              <a:rPr lang="en-US" dirty="0" err="1" smtClean="0"/>
+              <a:t>som</a:t>
+            </a:r>
+            <a:r>
+              <a:rPr lang="en-US" dirty="0" smtClean="0"/>
+              <a:t> </a:t>
+            </a:r>
+            <a:r>
+              <a:rPr lang="en-US" dirty="0" err="1" smtClean="0"/>
+              <a:t>äger</a:t>
+            </a:r>
+            <a:r>
+              <a:rPr lang="en-US" dirty="0" smtClean="0"/>
+              <a:t> en given </a:t>
+            </a:r>
+            <a:r>
+              <a:rPr lang="en-US" dirty="0" err="1" smtClean="0"/>
+              <a:t>resurs</a:t>
+            </a:r>
+            <a:r>
+              <a:rPr lang="en-US" dirty="0" smtClean="0"/>
+              <a:t>.</a:t>
+            </a:r>
+          </a:p>
+          <a:p>
+            <a:r>
+              <a:rPr lang="en-US" dirty="0" smtClean="0"/>
+              <a:t>Client: I </a:t>
+            </a:r>
+            <a:r>
+              <a:rPr lang="en-US" dirty="0" err="1" smtClean="0"/>
+              <a:t>OAuth</a:t>
+            </a:r>
+            <a:r>
+              <a:rPr lang="en-US" dirty="0" smtClean="0"/>
+              <a:t> 2.0-specifikationen </a:t>
+            </a:r>
+            <a:r>
+              <a:rPr lang="en-US" dirty="0" err="1" smtClean="0"/>
+              <a:t>är</a:t>
+            </a:r>
+            <a:r>
+              <a:rPr lang="en-US" dirty="0" smtClean="0"/>
+              <a:t> </a:t>
+            </a:r>
+            <a:r>
+              <a:rPr lang="en-US" dirty="0" err="1" smtClean="0"/>
+              <a:t>klienten</a:t>
+            </a:r>
+            <a:r>
+              <a:rPr lang="en-US" dirty="0" smtClean="0"/>
+              <a:t> </a:t>
+            </a:r>
+            <a:r>
+              <a:rPr lang="en-US" dirty="0" err="1" smtClean="0"/>
+              <a:t>hela</a:t>
+            </a:r>
+            <a:r>
+              <a:rPr lang="en-US" dirty="0" smtClean="0"/>
+              <a:t> </a:t>
+            </a:r>
+            <a:r>
+              <a:rPr lang="en-US" dirty="0" err="1" smtClean="0"/>
+              <a:t>tredjeparts-lösningen</a:t>
+            </a:r>
+            <a:r>
+              <a:rPr lang="en-US" dirty="0" smtClean="0"/>
+              <a:t>. </a:t>
+            </a:r>
+            <a:r>
+              <a:rPr lang="en-US" dirty="0" err="1" smtClean="0"/>
+              <a:t>Det</a:t>
+            </a:r>
+            <a:r>
+              <a:rPr lang="en-US" dirty="0" smtClean="0"/>
+              <a:t> </a:t>
+            </a:r>
+            <a:r>
+              <a:rPr lang="en-US" dirty="0" err="1" smtClean="0"/>
+              <a:t>vill</a:t>
+            </a:r>
+            <a:r>
+              <a:rPr lang="en-US" dirty="0" smtClean="0"/>
+              <a:t> </a:t>
+            </a:r>
+            <a:r>
+              <a:rPr lang="en-US" dirty="0" err="1" smtClean="0"/>
+              <a:t>säga</a:t>
+            </a:r>
+            <a:r>
+              <a:rPr lang="en-US" dirty="0" smtClean="0"/>
+              <a:t> </a:t>
+            </a:r>
+            <a:r>
+              <a:rPr lang="en-US" dirty="0" err="1" smtClean="0"/>
+              <a:t>klienten</a:t>
+            </a:r>
+            <a:r>
+              <a:rPr lang="en-US" dirty="0" smtClean="0"/>
+              <a:t> </a:t>
+            </a:r>
+            <a:r>
+              <a:rPr lang="en-US" dirty="0" err="1" smtClean="0"/>
+              <a:t>är</a:t>
+            </a:r>
+            <a:r>
+              <a:rPr lang="en-US" dirty="0" smtClean="0"/>
+              <a:t> </a:t>
+            </a:r>
+            <a:r>
+              <a:rPr lang="en-US" dirty="0" err="1" smtClean="0"/>
+              <a:t>både</a:t>
+            </a:r>
+            <a:r>
+              <a:rPr lang="en-US" dirty="0" smtClean="0"/>
+              <a:t> back-end </a:t>
+            </a:r>
+            <a:r>
+              <a:rPr lang="en-US" dirty="0" err="1" smtClean="0"/>
+              <a:t>och</a:t>
+            </a:r>
+            <a:r>
+              <a:rPr lang="en-US" dirty="0" smtClean="0"/>
+              <a:t> front-end </a:t>
+            </a:r>
+            <a:r>
+              <a:rPr lang="en-US" dirty="0" err="1" smtClean="0"/>
+              <a:t>av</a:t>
+            </a:r>
+            <a:r>
+              <a:rPr lang="en-US" dirty="0" smtClean="0"/>
+              <a:t> </a:t>
+            </a:r>
+            <a:r>
+              <a:rPr lang="en-US" dirty="0" err="1" smtClean="0"/>
+              <a:t>tredjeparts-lösningen</a:t>
+            </a:r>
+            <a:r>
+              <a:rPr lang="en-US" dirty="0" smtClean="0"/>
+              <a:t>.</a:t>
+            </a:r>
+          </a:p>
+          <a:p>
+            <a:r>
+              <a:rPr lang="en-US" dirty="0" smtClean="0"/>
+              <a:t>Authorization server: En roll </a:t>
+            </a:r>
+            <a:r>
+              <a:rPr lang="en-US" dirty="0" err="1" smtClean="0"/>
+              <a:t>i</a:t>
+            </a:r>
+            <a:r>
+              <a:rPr lang="en-US" dirty="0" smtClean="0"/>
+              <a:t> </a:t>
+            </a:r>
+            <a:r>
+              <a:rPr lang="en-US" dirty="0" err="1" smtClean="0"/>
+              <a:t>OAuth</a:t>
+            </a:r>
+            <a:r>
+              <a:rPr lang="en-US" dirty="0" smtClean="0"/>
+              <a:t> 2.0 </a:t>
+            </a:r>
+            <a:r>
+              <a:rPr lang="en-US" dirty="0" err="1" smtClean="0"/>
+              <a:t>specifikationen</a:t>
+            </a:r>
+            <a:r>
+              <a:rPr lang="en-US" dirty="0" smtClean="0"/>
+              <a:t> </a:t>
+            </a:r>
+            <a:r>
+              <a:rPr lang="en-US" dirty="0" err="1" smtClean="0"/>
+              <a:t>som</a:t>
+            </a:r>
+            <a:r>
+              <a:rPr lang="en-US" dirty="0" smtClean="0"/>
+              <a:t> </a:t>
+            </a:r>
+            <a:r>
+              <a:rPr lang="en-US" dirty="0" err="1" smtClean="0"/>
+              <a:t>pekar</a:t>
+            </a:r>
+            <a:r>
+              <a:rPr lang="en-US" dirty="0" smtClean="0"/>
+              <a:t> </a:t>
+            </a:r>
+            <a:r>
+              <a:rPr lang="en-US" dirty="0" err="1" smtClean="0"/>
+              <a:t>ut</a:t>
+            </a:r>
+            <a:r>
+              <a:rPr lang="en-US" dirty="0" smtClean="0"/>
+              <a:t> den del </a:t>
+            </a:r>
+            <a:r>
+              <a:rPr lang="en-US" dirty="0" err="1" smtClean="0"/>
+              <a:t>som</a:t>
+            </a:r>
+            <a:r>
+              <a:rPr lang="en-US" dirty="0" smtClean="0"/>
+              <a:t> </a:t>
+            </a:r>
+            <a:r>
+              <a:rPr lang="en-US" dirty="0" err="1" smtClean="0"/>
+              <a:t>är</a:t>
+            </a:r>
+            <a:r>
+              <a:rPr lang="en-US" dirty="0" smtClean="0"/>
+              <a:t> </a:t>
+            </a:r>
+            <a:r>
+              <a:rPr lang="en-US" dirty="0" err="1" smtClean="0"/>
+              <a:t>ansvarig</a:t>
+            </a:r>
+            <a:r>
+              <a:rPr lang="en-US" dirty="0" smtClean="0"/>
+              <a:t> </a:t>
+            </a:r>
+            <a:r>
+              <a:rPr lang="en-US" dirty="0" err="1" smtClean="0"/>
+              <a:t>för</a:t>
+            </a:r>
+            <a:r>
+              <a:rPr lang="en-US" dirty="0" smtClean="0"/>
+              <a:t> </a:t>
+            </a:r>
+            <a:r>
+              <a:rPr lang="en-US" dirty="0" err="1" smtClean="0"/>
+              <a:t>auktorisationsadministration</a:t>
+            </a:r>
+            <a:r>
+              <a:rPr lang="en-US" dirty="0" smtClean="0"/>
+              <a:t>.</a:t>
+            </a:r>
+          </a:p>
+          <a:p>
+            <a:r>
+              <a:rPr lang="en-US" dirty="0" smtClean="0"/>
+              <a:t>Resource server:</a:t>
+            </a:r>
+            <a:r>
+              <a:rPr lang="en-US" baseline="0" dirty="0" smtClean="0"/>
+              <a:t> En roll </a:t>
+            </a:r>
+            <a:r>
+              <a:rPr lang="en-US" baseline="0" dirty="0" err="1" smtClean="0"/>
+              <a:t>i</a:t>
+            </a:r>
+            <a:r>
+              <a:rPr lang="en-US" baseline="0" dirty="0" smtClean="0"/>
+              <a:t> </a:t>
+            </a:r>
+            <a:r>
+              <a:rPr lang="en-US" baseline="0" dirty="0" err="1" smtClean="0"/>
+              <a:t>OAuth</a:t>
+            </a:r>
+            <a:r>
+              <a:rPr lang="en-US" baseline="0" dirty="0" smtClean="0"/>
+              <a:t> 2.0 </a:t>
+            </a:r>
+            <a:r>
+              <a:rPr lang="en-US" baseline="0" dirty="0" err="1" smtClean="0"/>
+              <a:t>specifikationen</a:t>
+            </a:r>
+            <a:r>
+              <a:rPr lang="en-US" baseline="0" dirty="0" smtClean="0"/>
+              <a:t> </a:t>
+            </a:r>
+            <a:r>
+              <a:rPr lang="en-US" baseline="0" dirty="0" err="1" smtClean="0"/>
+              <a:t>som</a:t>
+            </a:r>
+            <a:r>
+              <a:rPr lang="en-US" baseline="0" dirty="0" smtClean="0"/>
+              <a:t> </a:t>
+            </a:r>
+            <a:r>
+              <a:rPr lang="en-US" baseline="0" dirty="0" err="1" smtClean="0"/>
+              <a:t>pekar</a:t>
+            </a:r>
+            <a:r>
+              <a:rPr lang="en-US" baseline="0" dirty="0" smtClean="0"/>
+              <a:t> </a:t>
+            </a:r>
+            <a:r>
+              <a:rPr lang="en-US" baseline="0" dirty="0" err="1" smtClean="0"/>
+              <a:t>ut</a:t>
+            </a:r>
+            <a:r>
+              <a:rPr lang="en-US" baseline="0" dirty="0" smtClean="0"/>
+              <a:t> den del </a:t>
+            </a:r>
+            <a:r>
+              <a:rPr lang="en-US" baseline="0" dirty="0" err="1" smtClean="0"/>
+              <a:t>som</a:t>
+            </a:r>
+            <a:r>
+              <a:rPr lang="en-US" baseline="0" dirty="0" smtClean="0"/>
+              <a:t> </a:t>
+            </a:r>
+            <a:r>
+              <a:rPr lang="en-US" baseline="0" dirty="0" err="1" smtClean="0"/>
+              <a:t>är</a:t>
+            </a:r>
+            <a:r>
+              <a:rPr lang="en-US" baseline="0" dirty="0" smtClean="0"/>
+              <a:t> </a:t>
+            </a:r>
+            <a:r>
+              <a:rPr lang="en-US" baseline="0" dirty="0" err="1" smtClean="0"/>
+              <a:t>ansvarig</a:t>
+            </a:r>
+            <a:r>
+              <a:rPr lang="en-US" baseline="0" dirty="0" smtClean="0"/>
+              <a:t> </a:t>
+            </a:r>
+            <a:r>
+              <a:rPr lang="en-US" baseline="0" dirty="0" err="1" smtClean="0"/>
+              <a:t>för</a:t>
+            </a:r>
+            <a:r>
+              <a:rPr lang="en-US" baseline="0" dirty="0" smtClean="0"/>
+              <a:t> </a:t>
+            </a:r>
+            <a:r>
+              <a:rPr lang="en-US" baseline="0" dirty="0" err="1" smtClean="0"/>
+              <a:t>resurshantering</a:t>
+            </a:r>
+            <a:r>
+              <a:rPr lang="en-US" baseline="0" dirty="0" smtClean="0"/>
+              <a:t>/</a:t>
+            </a:r>
+            <a:r>
+              <a:rPr lang="en-US" baseline="0" dirty="0" err="1" smtClean="0"/>
+              <a:t>resursutlämning</a:t>
+            </a:r>
+            <a:r>
+              <a:rPr lang="en-US" baseline="0" dirty="0" smtClean="0"/>
+              <a:t>.</a:t>
+            </a:r>
+            <a:endParaRPr lang="en-US" dirty="0" smtClean="0"/>
+          </a:p>
+          <a:p>
+            <a:endParaRPr lang="en-US" dirty="0"/>
           </a:p>
         </p:txBody>
       </p:sp>
@@ -2540,6 +2952,342 @@
                 <a:defRPr/>
               </a:pPr>
               <a:t>12</a:t>
+            </a:fld>
+            <a:endParaRPr lang="sv-SE"/>
+          </a:p>
+        </p:txBody>
+      </p:sp>
+    </p:spTree>
+    <p:extLst>
+      <p:ext uri="{BB962C8B-B14F-4D97-AF65-F5344CB8AC3E}">
+        <p14:creationId xmlns:p14="http://schemas.microsoft.com/office/powerpoint/2010/main" val="698192533"/>
+      </p:ext>
+    </p:extLst>
+  </p:cSld>
+  <p:clrMapOvr>
+    <a:masterClrMapping/>
+  </p:clrMapOvr>
+</p:notes>
+</file>
+
+<file path=ppt/notesSlides/notesSlide7.xml><?xml version="1.0" encoding="utf-8"?>
+<p:notes xmlns:a="http://schemas.openxmlformats.org/drawingml/2006/main" xmlns:r="http://schemas.openxmlformats.org/officeDocument/2006/relationships" xmlns:p="http://schemas.openxmlformats.org/presentationml/2006/main">
+  <p:cSld>
+    <p:spTree>
+      <p:nvGrpSpPr>
+        <p:cNvPr id="1" name=""/>
+        <p:cNvGrpSpPr/>
+        <p:nvPr/>
+      </p:nvGrpSpPr>
+      <p:grpSpPr>
+        <a:xfrm>
+          <a:off x="0" y="0"/>
+          <a:ext cx="0" cy="0"/>
+          <a:chOff x="0" y="0"/>
+          <a:chExt cx="0" cy="0"/>
+        </a:xfrm>
+      </p:grpSpPr>
+      <p:sp>
+        <p:nvSpPr>
+          <p:cNvPr id="2" name="Slide Image Placeholder 1"/>
+          <p:cNvSpPr>
+            <a:spLocks noGrp="1" noRot="1" noChangeAspect="1"/>
+          </p:cNvSpPr>
+          <p:nvPr>
+            <p:ph type="sldImg"/>
+          </p:nvPr>
+        </p:nvSpPr>
+        <p:spPr/>
+      </p:sp>
+      <p:sp>
+        <p:nvSpPr>
+          <p:cNvPr id="3" name="Notes Placeholder 2"/>
+          <p:cNvSpPr>
+            <a:spLocks noGrp="1"/>
+          </p:cNvSpPr>
+          <p:nvPr>
+            <p:ph type="body" idx="1"/>
+          </p:nvPr>
+        </p:nvSpPr>
+        <p:spPr/>
+        <p:txBody>
+          <a:bodyPr/>
+          <a:lstStyle/>
+          <a:p>
+            <a:r>
+              <a:rPr lang="en-US" dirty="0" smtClean="0"/>
+              <a:t>En </a:t>
+            </a:r>
+            <a:r>
+              <a:rPr lang="en-US" dirty="0" err="1" smtClean="0"/>
+              <a:t>applikation</a:t>
+            </a:r>
+            <a:r>
+              <a:rPr lang="en-US" dirty="0" smtClean="0"/>
+              <a:t>, </a:t>
+            </a:r>
+            <a:r>
+              <a:rPr lang="en-US" dirty="0" err="1" smtClean="0"/>
+              <a:t>tex</a:t>
+            </a:r>
+            <a:r>
+              <a:rPr lang="en-US" dirty="0" smtClean="0"/>
+              <a:t> </a:t>
+            </a:r>
+            <a:r>
+              <a:rPr lang="en-US" dirty="0" err="1" smtClean="0"/>
+              <a:t>Runkeeper</a:t>
+            </a:r>
+            <a:r>
+              <a:rPr lang="en-US" dirty="0" smtClean="0"/>
+              <a:t>, </a:t>
+            </a:r>
+            <a:r>
+              <a:rPr lang="en-US" dirty="0" err="1" smtClean="0"/>
+              <a:t>som</a:t>
+            </a:r>
+            <a:r>
+              <a:rPr lang="en-US" dirty="0" smtClean="0"/>
+              <a:t> du </a:t>
+            </a:r>
+            <a:r>
+              <a:rPr lang="en-US" dirty="0" err="1" smtClean="0"/>
+              <a:t>lagt</a:t>
+            </a:r>
+            <a:r>
+              <a:rPr lang="en-US" dirty="0" smtClean="0"/>
+              <a:t> till </a:t>
+            </a:r>
+            <a:r>
+              <a:rPr lang="en-US" dirty="0" err="1" smtClean="0"/>
+              <a:t>nyligen</a:t>
+            </a:r>
+            <a:r>
+              <a:rPr lang="en-US" dirty="0" smtClean="0"/>
+              <a:t> </a:t>
+            </a:r>
+            <a:r>
+              <a:rPr lang="en-US" dirty="0" err="1" smtClean="0"/>
+              <a:t>vill</a:t>
+            </a:r>
+            <a:r>
+              <a:rPr lang="en-US" dirty="0" smtClean="0"/>
+              <a:t> </a:t>
+            </a:r>
+            <a:r>
+              <a:rPr lang="en-US" dirty="0" err="1" smtClean="0"/>
+              <a:t>komma</a:t>
+            </a:r>
+            <a:r>
+              <a:rPr lang="en-US" dirty="0" smtClean="0"/>
+              <a:t> </a:t>
+            </a:r>
+            <a:r>
+              <a:rPr lang="en-US" dirty="0" err="1" smtClean="0"/>
+              <a:t>åt</a:t>
+            </a:r>
+            <a:r>
+              <a:rPr lang="en-US" dirty="0" smtClean="0"/>
+              <a:t> information</a:t>
+            </a:r>
+            <a:r>
+              <a:rPr lang="en-US" baseline="0" dirty="0" smtClean="0"/>
+              <a:t> </a:t>
+            </a:r>
+            <a:r>
+              <a:rPr lang="en-US" baseline="0" dirty="0" err="1" smtClean="0"/>
+              <a:t>om</a:t>
+            </a:r>
+            <a:r>
+              <a:rPr lang="en-US" baseline="0" dirty="0" smtClean="0"/>
+              <a:t> dig. I </a:t>
+            </a:r>
+            <a:r>
+              <a:rPr lang="en-US" baseline="0" dirty="0" err="1" smtClean="0"/>
+              <a:t>applikationen</a:t>
+            </a:r>
+            <a:r>
+              <a:rPr lang="en-US" baseline="0" dirty="0" smtClean="0"/>
+              <a:t> </a:t>
+            </a:r>
+            <a:r>
+              <a:rPr lang="en-US" baseline="0" dirty="0" err="1" smtClean="0"/>
+              <a:t>är</a:t>
+            </a:r>
+            <a:r>
+              <a:rPr lang="en-US" baseline="0" dirty="0" smtClean="0"/>
+              <a:t> du </a:t>
+            </a:r>
+            <a:r>
+              <a:rPr lang="en-US" baseline="0" dirty="0" err="1" smtClean="0"/>
+              <a:t>inloggad</a:t>
+            </a:r>
+            <a:r>
+              <a:rPr lang="en-US" baseline="0" dirty="0" smtClean="0"/>
+              <a:t> med </a:t>
+            </a:r>
+            <a:r>
+              <a:rPr lang="en-US" baseline="0" dirty="0" err="1" smtClean="0"/>
+              <a:t>ditt</a:t>
+            </a:r>
+            <a:r>
+              <a:rPr lang="en-US" baseline="0" dirty="0" smtClean="0"/>
+              <a:t> </a:t>
+            </a:r>
+            <a:r>
+              <a:rPr lang="en-US" baseline="0" dirty="0" err="1" smtClean="0"/>
+              <a:t>användarnamn</a:t>
+            </a:r>
+            <a:r>
+              <a:rPr lang="en-US" baseline="0" dirty="0" smtClean="0"/>
+              <a:t> </a:t>
+            </a:r>
+            <a:r>
+              <a:rPr lang="en-US" baseline="0" dirty="0" err="1" smtClean="0"/>
+              <a:t>för</a:t>
+            </a:r>
+            <a:r>
+              <a:rPr lang="en-US" baseline="0" dirty="0" smtClean="0"/>
+              <a:t> just den </a:t>
+            </a:r>
+            <a:r>
+              <a:rPr lang="en-US" baseline="0" dirty="0" err="1" smtClean="0"/>
+              <a:t>applikationen</a:t>
+            </a:r>
+            <a:r>
+              <a:rPr lang="en-US" baseline="0" dirty="0" smtClean="0"/>
+              <a:t>, </a:t>
+            </a:r>
+            <a:r>
+              <a:rPr lang="en-US" baseline="0" dirty="0" err="1" smtClean="0"/>
+              <a:t>ett</a:t>
+            </a:r>
+            <a:r>
+              <a:rPr lang="en-US" baseline="0" dirty="0" smtClean="0"/>
+              <a:t> alias </a:t>
+            </a:r>
+            <a:r>
+              <a:rPr lang="en-US" baseline="0" smtClean="0"/>
+              <a:t>tex.</a:t>
+            </a:r>
+            <a:endParaRPr lang="en-US" dirty="0"/>
+          </a:p>
+        </p:txBody>
+      </p:sp>
+      <p:sp>
+        <p:nvSpPr>
+          <p:cNvPr id="4" name="Slide Number Placeholder 3"/>
+          <p:cNvSpPr>
+            <a:spLocks noGrp="1"/>
+          </p:cNvSpPr>
+          <p:nvPr>
+            <p:ph type="sldNum" sz="quarter" idx="10"/>
+          </p:nvPr>
+        </p:nvSpPr>
+        <p:spPr/>
+        <p:txBody>
+          <a:bodyPr/>
+          <a:lstStyle/>
+          <a:p>
+            <a:pPr>
+              <a:defRPr/>
+            </a:pPr>
+            <a:fld id="{72F66423-05E2-6345-AF5A-73942C9C3A7C}" type="slidenum">
+              <a:rPr lang="sv-SE" smtClean="0"/>
+              <a:pPr>
+                <a:defRPr/>
+              </a:pPr>
+              <a:t>13</a:t>
+            </a:fld>
+            <a:endParaRPr lang="sv-SE"/>
+          </a:p>
+        </p:txBody>
+      </p:sp>
+    </p:spTree>
+    <p:extLst>
+      <p:ext uri="{BB962C8B-B14F-4D97-AF65-F5344CB8AC3E}">
+        <p14:creationId xmlns:p14="http://schemas.microsoft.com/office/powerpoint/2010/main" val="698192533"/>
+      </p:ext>
+    </p:extLst>
+  </p:cSld>
+  <p:clrMapOvr>
+    <a:masterClrMapping/>
+  </p:clrMapOvr>
+</p:notes>
+</file>
+
+<file path=ppt/notesSlides/notesSlide8.xml><?xml version="1.0" encoding="utf-8"?>
+<p:notes xmlns:a="http://schemas.openxmlformats.org/drawingml/2006/main" xmlns:r="http://schemas.openxmlformats.org/officeDocument/2006/relationships" xmlns:p="http://schemas.openxmlformats.org/presentationml/2006/main">
+  <p:cSld>
+    <p:spTree>
+      <p:nvGrpSpPr>
+        <p:cNvPr id="1" name=""/>
+        <p:cNvGrpSpPr/>
+        <p:nvPr/>
+      </p:nvGrpSpPr>
+      <p:grpSpPr>
+        <a:xfrm>
+          <a:off x="0" y="0"/>
+          <a:ext cx="0" cy="0"/>
+          <a:chOff x="0" y="0"/>
+          <a:chExt cx="0" cy="0"/>
+        </a:xfrm>
+      </p:grpSpPr>
+      <p:sp>
+        <p:nvSpPr>
+          <p:cNvPr id="2" name="Slide Image Placeholder 1"/>
+          <p:cNvSpPr>
+            <a:spLocks noGrp="1" noRot="1" noChangeAspect="1"/>
+          </p:cNvSpPr>
+          <p:nvPr>
+            <p:ph type="sldImg"/>
+          </p:nvPr>
+        </p:nvSpPr>
+        <p:spPr/>
+      </p:sp>
+      <p:sp>
+        <p:nvSpPr>
+          <p:cNvPr id="3" name="Notes Placeholder 2"/>
+          <p:cNvSpPr>
+            <a:spLocks noGrp="1"/>
+          </p:cNvSpPr>
+          <p:nvPr>
+            <p:ph type="body" idx="1"/>
+          </p:nvPr>
+        </p:nvSpPr>
+        <p:spPr/>
+        <p:txBody>
+          <a:bodyPr/>
+          <a:lstStyle/>
+          <a:p>
+            <a:endParaRPr lang="en-US" baseline="0" dirty="0" smtClean="0"/>
+          </a:p>
+        </p:txBody>
+      </p:sp>
+      <p:sp>
+        <p:nvSpPr>
+          <p:cNvPr id="4" name="Slide Number Placeholder 3"/>
+          <p:cNvSpPr>
+            <a:spLocks noGrp="1"/>
+          </p:cNvSpPr>
+          <p:nvPr>
+            <p:ph type="sldNum" sz="quarter" idx="10"/>
+          </p:nvPr>
+        </p:nvSpPr>
+        <p:spPr/>
+        <p:txBody>
+          <a:bodyPr/>
+          <a:lstStyle/>
+          <a:p>
+            <a:pPr>
+              <a:defRPr/>
+            </a:pPr>
+            <a:fld id="{72F66423-05E2-6345-AF5A-73942C9C3A7C}" type="slidenum">
+              <a:rPr lang="sv-SE" smtClean="0"/>
+              <a:pPr>
+                <a:defRPr/>
+              </a:pPr>
+              <a:t>14</a:t>
             </a:fld>
             <a:endParaRPr lang="sv-SE"/>
           </a:p>
@@ -6580,15 +7328,7 @@
             </a:pPr>
             <a:r>
               <a:rPr lang="sv-SE" dirty="0" smtClean="0"/>
-              <a:t>Christian Hilmersson, Hans Thunberg</a:t>
-            </a:r>
-            <a:r>
-              <a:rPr lang="sv-SE" dirty="0" smtClean="0"/>
-              <a:t> </a:t>
-            </a:r>
-            <a:r>
-              <a:rPr lang="sv-SE" dirty="0" smtClean="0"/>
-              <a:t>| </a:t>
+              <a:t>Christian Hilmersson, Hans Thunberg | </a:t>
             </a:r>
             <a:r>
               <a:rPr lang="sv-SE" dirty="0" err="1" smtClean="0"/>
@@ -6596,17 +7336,8 @@
             </a:r>
             <a:r>
               <a:rPr lang="sv-SE" dirty="0" smtClean="0"/>
-              <a:t> </a:t>
-            </a:r>
-            <a:r>
-              <a:rPr lang="sv-SE" dirty="0" smtClean="0"/>
-              <a:t>| </a:t>
-            </a:r>
-            <a:r>
-              <a:rPr lang="sv-SE" dirty="0" smtClean="0"/>
-              <a:t>2013-01-16</a:t>
-            </a:r>
-            <a:endParaRPr lang="sv-SE" dirty="0" smtClean="0"/>
+              <a:t> | 2013-01-16</a:t>
+            </a:r>
           </a:p>
           <a:p>
             <a:pPr eaLnBrk="1" hangingPunct="1">
@@ -6753,8 +7484,13 @@
             <a:pPr lvl="1"/>
             <a:r>
               <a:rPr lang="en-US" sz="1800" dirty="0" smtClean="0"/>
-              <a:t>SSL/TLS certificate</a:t>
-            </a:r>
+              <a:t>SSL/TLS </a:t>
+            </a:r>
+            <a:r>
+              <a:rPr lang="en-US" sz="1800" dirty="0" smtClean="0"/>
+              <a:t>certificate issued by trusted CA</a:t>
+            </a:r>
+            <a:endParaRPr lang="en-US" sz="1800" dirty="0" smtClean="0"/>
           </a:p>
           <a:p>
             <a:pPr lvl="1"/>
@@ -7482,14 +8218,16 @@
         </p:nvSpPr>
         <p:spPr/>
         <p:txBody>
-          <a:bodyPr>
-            <a:normAutofit fontScale="90000"/>
-          </a:bodyPr>
+          <a:bodyPr/>
           <a:lstStyle/>
           <a:p>
             <a:r>
-              <a:rPr lang="en-US" dirty="0" smtClean="0"/>
-              <a:t>API’s for patient related information</a:t>
+              <a:rPr lang="en-US" dirty="0" err="1" smtClean="0"/>
+              <a:t>OAuth</a:t>
+            </a:r>
+            <a:r>
+              <a:rPr lang="en-US" dirty="0" smtClean="0"/>
+              <a:t> 2.0</a:t>
             </a:r>
             <a:endParaRPr lang="en-US" dirty="0"/>
           </a:p>
@@ -7513,12 +8251,8 @@
           <a:lstStyle/>
           <a:p>
             <a:r>
-              <a:rPr lang="en-US" dirty="0" err="1" smtClean="0"/>
-              <a:t>OAuth</a:t>
-            </a:r>
-            <a:r>
-              <a:rPr lang="en-US" dirty="0" smtClean="0"/>
-              <a:t> 2.0</a:t>
+              <a:rPr lang="en-US" dirty="0" smtClean="0"/>
+              <a:t>Roles</a:t>
             </a:r>
             <a:endParaRPr lang="en-US" dirty="0"/>
           </a:p>
@@ -7539,51 +8273,9 @@
           <a:bodyPr/>
           <a:lstStyle/>
           <a:p>
-            <a:r>
-              <a:rPr lang="en-US" dirty="0" err="1" smtClean="0"/>
-              <a:t>Oauth</a:t>
-            </a:r>
-            <a:r>
-              <a:rPr lang="en-US" dirty="0" smtClean="0"/>
-              <a:t> 2.0 addresses these kind of issues</a:t>
-            </a:r>
-          </a:p>
-          <a:p>
-            <a:r>
-              <a:rPr lang="en-US" dirty="0" smtClean="0"/>
-              <a:t>Possible for the citizen to be anonymous in the app</a:t>
-            </a:r>
-          </a:p>
-          <a:p>
-            <a:pPr lvl="1"/>
-            <a:r>
-              <a:rPr lang="en-US" dirty="0" smtClean="0"/>
-              <a:t>E.g. username </a:t>
-            </a:r>
-            <a:r>
-              <a:rPr lang="en-US" smtClean="0"/>
-              <a:t>kallekula</a:t>
-            </a:r>
-          </a:p>
-          <a:p>
-            <a:pPr lvl="1"/>
-            <a:r>
-              <a:rPr lang="en-US" dirty="0" smtClean="0"/>
-              <a:t>But still authenticated against MVK while authorizing the client</a:t>
-            </a:r>
-          </a:p>
-          <a:p>
-            <a:r>
-              <a:rPr lang="en-US" dirty="0" smtClean="0"/>
-              <a:t>Twitter, Facebook </a:t>
-            </a:r>
-            <a:r>
-              <a:rPr lang="en-US" dirty="0" err="1" smtClean="0"/>
-              <a:t>etc</a:t>
-            </a:r>
-            <a:endParaRPr lang="en-US" dirty="0" smtClean="0"/>
-          </a:p>
-          <a:p>
+            <a:pPr marL="0" indent="0">
+              <a:buNone/>
+            </a:pPr>
             <a:endParaRPr lang="en-US" dirty="0"/>
           </a:p>
         </p:txBody>
@@ -7617,16 +8309,449 @@
           </a:p>
         </p:txBody>
       </p:sp>
+      <p:grpSp>
+        <p:nvGrpSpPr>
+          <p:cNvPr id="16" name="Group 15"/>
+          <p:cNvGrpSpPr/>
+          <p:nvPr/>
+        </p:nvGrpSpPr>
+        <p:grpSpPr>
+          <a:xfrm>
+            <a:off x="1873394" y="3362428"/>
+            <a:ext cx="953043" cy="1301544"/>
+            <a:chOff x="975723" y="3327527"/>
+            <a:chExt cx="953043" cy="1301544"/>
+          </a:xfrm>
+        </p:grpSpPr>
+        <p:pic>
+          <p:nvPicPr>
+            <p:cNvPr id="14" name="Picture 13" descr="resource owner.gif"/>
+            <p:cNvPicPr>
+              <a:picLocks noChangeAspect="1"/>
+            </p:cNvPicPr>
+            <p:nvPr/>
+          </p:nvPicPr>
+          <p:blipFill>
+            <a:blip r:embed="rId3">
+              <a:extLst>
+                <a:ext uri="{28A0092B-C50C-407E-A947-70E740481C1C}">
+                  <a14:useLocalDpi xmlns:a14="http://schemas.microsoft.com/office/drawing/2010/main" val="0"/>
+                </a:ext>
+              </a:extLst>
+            </a:blip>
+            <a:stretch>
+              <a:fillRect/>
+            </a:stretch>
+          </p:blipFill>
+          <p:spPr>
+            <a:xfrm>
+              <a:off x="1090023" y="3327527"/>
+              <a:ext cx="618814" cy="807606"/>
+            </a:xfrm>
+            <a:prstGeom prst="rect">
+              <a:avLst/>
+            </a:prstGeom>
+          </p:spPr>
+        </p:pic>
+        <p:sp>
+          <p:nvSpPr>
+            <p:cNvPr id="15" name="TextBox 14"/>
+            <p:cNvSpPr txBox="1"/>
+            <p:nvPr/>
+          </p:nvSpPr>
+          <p:spPr>
+            <a:xfrm>
+              <a:off x="975723" y="4105851"/>
+              <a:ext cx="953043" cy="523220"/>
+            </a:xfrm>
+            <a:prstGeom prst="rect">
+              <a:avLst/>
+            </a:prstGeom>
+            <a:noFill/>
+          </p:spPr>
+          <p:txBody>
+            <a:bodyPr wrap="none" rtlCol="0">
+              <a:spAutoFit/>
+            </a:bodyPr>
+            <a:lstStyle/>
+            <a:p>
+              <a:r>
+                <a:rPr lang="en-US" sz="1400" dirty="0" smtClean="0"/>
+                <a:t>Resource </a:t>
+              </a:r>
+            </a:p>
+            <a:p>
+              <a:r>
+                <a:rPr lang="en-US" sz="1400" dirty="0" smtClean="0"/>
+                <a:t>Owner </a:t>
+              </a:r>
+              <a:endParaRPr lang="en-US" sz="1400" dirty="0"/>
+            </a:p>
+          </p:txBody>
+        </p:sp>
+      </p:grpSp>
+      <p:grpSp>
+        <p:nvGrpSpPr>
+          <p:cNvPr id="23" name="Group 22"/>
+          <p:cNvGrpSpPr/>
+          <p:nvPr/>
+        </p:nvGrpSpPr>
+        <p:grpSpPr>
+          <a:xfrm>
+            <a:off x="5830551" y="2091660"/>
+            <a:ext cx="990600" cy="1349971"/>
+            <a:chOff x="3708400" y="2100590"/>
+            <a:chExt cx="990600" cy="1349971"/>
+          </a:xfrm>
+        </p:grpSpPr>
+        <p:pic>
+          <p:nvPicPr>
+            <p:cNvPr id="17" name="Picture 16"/>
+            <p:cNvPicPr>
+              <a:picLocks noChangeAspect="1"/>
+            </p:cNvPicPr>
+            <p:nvPr/>
+          </p:nvPicPr>
+          <p:blipFill>
+            <a:blip r:embed="rId4"/>
+            <a:stretch>
+              <a:fillRect/>
+            </a:stretch>
+          </p:blipFill>
+          <p:spPr>
+            <a:xfrm>
+              <a:off x="3708400" y="2547610"/>
+              <a:ext cx="902951" cy="902951"/>
+            </a:xfrm>
+            <a:prstGeom prst="rect">
+              <a:avLst/>
+            </a:prstGeom>
+          </p:spPr>
+        </p:pic>
+        <p:sp>
+          <p:nvSpPr>
+            <p:cNvPr id="18" name="TextBox 17"/>
+            <p:cNvSpPr txBox="1"/>
+            <p:nvPr/>
+          </p:nvSpPr>
+          <p:spPr>
+            <a:xfrm>
+              <a:off x="3745957" y="2100590"/>
+              <a:ext cx="953043" cy="523220"/>
+            </a:xfrm>
+            <a:prstGeom prst="rect">
+              <a:avLst/>
+            </a:prstGeom>
+            <a:noFill/>
+          </p:spPr>
+          <p:txBody>
+            <a:bodyPr wrap="none" rtlCol="0">
+              <a:spAutoFit/>
+            </a:bodyPr>
+            <a:lstStyle/>
+            <a:p>
+              <a:pPr algn="ctr"/>
+              <a:r>
+                <a:rPr lang="en-US" sz="1400" dirty="0" smtClean="0"/>
+                <a:t>Resource</a:t>
+              </a:r>
+            </a:p>
+            <a:p>
+              <a:pPr algn="ctr"/>
+              <a:r>
+                <a:rPr lang="en-US" sz="1400" dirty="0" smtClean="0"/>
+                <a:t>Server</a:t>
+              </a:r>
+              <a:endParaRPr lang="en-US" sz="1400" dirty="0"/>
+            </a:p>
+          </p:txBody>
+        </p:sp>
+      </p:grpSp>
+      <p:grpSp>
+        <p:nvGrpSpPr>
+          <p:cNvPr id="24" name="Group 23"/>
+          <p:cNvGrpSpPr/>
+          <p:nvPr/>
+        </p:nvGrpSpPr>
+        <p:grpSpPr>
+          <a:xfrm>
+            <a:off x="5791201" y="3872801"/>
+            <a:ext cx="1232604" cy="1337271"/>
+            <a:chOff x="4303427" y="3920529"/>
+            <a:chExt cx="1232604" cy="1337271"/>
+          </a:xfrm>
+        </p:grpSpPr>
+        <p:pic>
+          <p:nvPicPr>
+            <p:cNvPr id="19" name="Picture 18"/>
+            <p:cNvPicPr>
+              <a:picLocks noChangeAspect="1"/>
+            </p:cNvPicPr>
+            <p:nvPr/>
+          </p:nvPicPr>
+          <p:blipFill>
+            <a:blip r:embed="rId4"/>
+            <a:stretch>
+              <a:fillRect/>
+            </a:stretch>
+          </p:blipFill>
+          <p:spPr>
+            <a:xfrm>
+              <a:off x="4405649" y="4354849"/>
+              <a:ext cx="902951" cy="902951"/>
+            </a:xfrm>
+            <a:prstGeom prst="rect">
+              <a:avLst/>
+            </a:prstGeom>
+          </p:spPr>
+        </p:pic>
+        <p:sp>
+          <p:nvSpPr>
+            <p:cNvPr id="20" name="TextBox 19"/>
+            <p:cNvSpPr txBox="1"/>
+            <p:nvPr/>
+          </p:nvSpPr>
+          <p:spPr>
+            <a:xfrm>
+              <a:off x="4303427" y="3920529"/>
+              <a:ext cx="1232604" cy="523220"/>
+            </a:xfrm>
+            <a:prstGeom prst="rect">
+              <a:avLst/>
+            </a:prstGeom>
+            <a:noFill/>
+          </p:spPr>
+          <p:txBody>
+            <a:bodyPr wrap="none" rtlCol="0">
+              <a:spAutoFit/>
+            </a:bodyPr>
+            <a:lstStyle/>
+            <a:p>
+              <a:pPr algn="ctr"/>
+              <a:r>
+                <a:rPr lang="en-US" sz="1400" dirty="0" smtClean="0"/>
+                <a:t>Authorization</a:t>
+              </a:r>
+            </a:p>
+            <a:p>
+              <a:pPr algn="ctr"/>
+              <a:r>
+                <a:rPr lang="en-US" sz="1400" dirty="0" smtClean="0"/>
+                <a:t>Server</a:t>
+              </a:r>
+              <a:endParaRPr lang="en-US" sz="1400" dirty="0"/>
+            </a:p>
+          </p:txBody>
+        </p:sp>
+      </p:grpSp>
+      <p:grpSp>
+        <p:nvGrpSpPr>
+          <p:cNvPr id="25" name="Group 24"/>
+          <p:cNvGrpSpPr/>
+          <p:nvPr/>
+        </p:nvGrpSpPr>
+        <p:grpSpPr>
+          <a:xfrm>
+            <a:off x="3524858" y="2766646"/>
+            <a:ext cx="1291327" cy="1616036"/>
+            <a:chOff x="2077058" y="2995246"/>
+            <a:chExt cx="1291327" cy="1616036"/>
+          </a:xfrm>
+        </p:grpSpPr>
+        <p:pic>
+          <p:nvPicPr>
+            <p:cNvPr id="21" name="Picture 20"/>
+            <p:cNvPicPr>
+              <a:picLocks noChangeAspect="1"/>
+            </p:cNvPicPr>
+            <p:nvPr/>
+          </p:nvPicPr>
+          <p:blipFill>
+            <a:blip r:embed="rId4"/>
+            <a:stretch>
+              <a:fillRect/>
+            </a:stretch>
+          </p:blipFill>
+          <p:spPr>
+            <a:xfrm>
+              <a:off x="2197100" y="3708331"/>
+              <a:ext cx="902951" cy="902951"/>
+            </a:xfrm>
+            <a:prstGeom prst="rect">
+              <a:avLst/>
+            </a:prstGeom>
+          </p:spPr>
+        </p:pic>
+        <p:sp>
+          <p:nvSpPr>
+            <p:cNvPr id="22" name="TextBox 21"/>
+            <p:cNvSpPr txBox="1"/>
+            <p:nvPr/>
+          </p:nvSpPr>
+          <p:spPr>
+            <a:xfrm>
+              <a:off x="2077058" y="2995246"/>
+              <a:ext cx="1291327" cy="738664"/>
+            </a:xfrm>
+            <a:prstGeom prst="rect">
+              <a:avLst/>
+            </a:prstGeom>
+            <a:noFill/>
+          </p:spPr>
+          <p:txBody>
+            <a:bodyPr wrap="square" rtlCol="0">
+              <a:spAutoFit/>
+            </a:bodyPr>
+            <a:lstStyle/>
+            <a:p>
+              <a:pPr algn="ctr"/>
+              <a:r>
+                <a:rPr lang="en-US" sz="1400" dirty="0" smtClean="0"/>
+                <a:t>3</a:t>
+              </a:r>
+              <a:r>
+                <a:rPr lang="en-US" sz="1400" baseline="30000" dirty="0" smtClean="0"/>
+                <a:t>rd</a:t>
+              </a:r>
+              <a:r>
+                <a:rPr lang="en-US" sz="1400" dirty="0" smtClean="0"/>
+                <a:t> party </a:t>
+              </a:r>
+            </a:p>
+            <a:p>
+              <a:pPr algn="ctr"/>
+              <a:r>
+                <a:rPr lang="en-US" sz="1400" dirty="0" smtClean="0"/>
+                <a:t>Client</a:t>
+              </a:r>
+            </a:p>
+            <a:p>
+              <a:pPr algn="ctr"/>
+              <a:r>
+                <a:rPr lang="en-US" sz="1400" dirty="0" smtClean="0"/>
+                <a:t> application</a:t>
+              </a:r>
+              <a:endParaRPr lang="en-US" sz="1400" dirty="0"/>
+            </a:p>
+          </p:txBody>
+        </p:sp>
+      </p:grpSp>
+      <p:cxnSp>
+        <p:nvCxnSpPr>
+          <p:cNvPr id="27" name="Straight Arrow Connector 26"/>
+          <p:cNvCxnSpPr/>
+          <p:nvPr/>
+        </p:nvCxnSpPr>
+        <p:spPr>
+          <a:xfrm>
+            <a:off x="2717800" y="3872801"/>
+            <a:ext cx="927100" cy="0"/>
+          </a:xfrm>
+          <a:prstGeom prst="straightConnector1">
+            <a:avLst/>
+          </a:prstGeom>
+          <a:ln>
+            <a:tailEnd type="arrow"/>
+          </a:ln>
+        </p:spPr>
+        <p:style>
+          <a:lnRef idx="2">
+            <a:schemeClr val="accent1"/>
+          </a:lnRef>
+          <a:fillRef idx="0">
+            <a:schemeClr val="accent1"/>
+          </a:fillRef>
+          <a:effectRef idx="1">
+            <a:schemeClr val="accent1"/>
+          </a:effectRef>
+          <a:fontRef idx="minor">
+            <a:schemeClr val="tx1"/>
+          </a:fontRef>
+        </p:style>
+      </p:cxnSp>
+      <p:cxnSp>
+        <p:nvCxnSpPr>
+          <p:cNvPr id="28" name="Straight Arrow Connector 27"/>
+          <p:cNvCxnSpPr/>
+          <p:nvPr/>
+        </p:nvCxnSpPr>
+        <p:spPr>
+          <a:xfrm flipV="1">
+            <a:off x="4394200" y="3111500"/>
+            <a:ext cx="1499223" cy="761301"/>
+          </a:xfrm>
+          <a:prstGeom prst="straightConnector1">
+            <a:avLst/>
+          </a:prstGeom>
+          <a:ln>
+            <a:tailEnd type="arrow"/>
+          </a:ln>
+        </p:spPr>
+        <p:style>
+          <a:lnRef idx="2">
+            <a:schemeClr val="accent1"/>
+          </a:lnRef>
+          <a:fillRef idx="0">
+            <a:schemeClr val="accent1"/>
+          </a:fillRef>
+          <a:effectRef idx="1">
+            <a:schemeClr val="accent1"/>
+          </a:effectRef>
+          <a:fontRef idx="minor">
+            <a:schemeClr val="tx1"/>
+          </a:fontRef>
+        </p:style>
+      </p:cxnSp>
+      <p:cxnSp>
+        <p:nvCxnSpPr>
+          <p:cNvPr id="30" name="Straight Arrow Connector 29"/>
+          <p:cNvCxnSpPr/>
+          <p:nvPr/>
+        </p:nvCxnSpPr>
+        <p:spPr>
+          <a:xfrm>
+            <a:off x="4394200" y="3872801"/>
+            <a:ext cx="1499223" cy="673799"/>
+          </a:xfrm>
+          <a:prstGeom prst="straightConnector1">
+            <a:avLst/>
+          </a:prstGeom>
+          <a:ln>
+            <a:tailEnd type="arrow"/>
+          </a:ln>
+        </p:spPr>
+        <p:style>
+          <a:lnRef idx="2">
+            <a:schemeClr val="accent1"/>
+          </a:lnRef>
+          <a:fillRef idx="0">
+            <a:schemeClr val="accent1"/>
+          </a:fillRef>
+          <a:effectRef idx="1">
+            <a:schemeClr val="accent1"/>
+          </a:effectRef>
+          <a:fontRef idx="minor">
+            <a:schemeClr val="tx1"/>
+          </a:fontRef>
+        </p:style>
+      </p:cxnSp>
     </p:spTree>
     <p:extLst>
       <p:ext uri="{BB962C8B-B14F-4D97-AF65-F5344CB8AC3E}">
-        <p14:creationId xmlns:p14="http://schemas.microsoft.com/office/powerpoint/2010/main" val="25701892"/>
+        <p14:creationId xmlns:p14="http://schemas.microsoft.com/office/powerpoint/2010/main" val="1177100080"/>
       </p:ext>
     </p:extLst>
   </p:cSld>
   <p:clrMapOvr>
     <a:masterClrMapping/>
   </p:clrMapOvr>
+  <p:timing>
+    <p:tnLst>
+      <p:par>
+        <p:cTn xmlns:p14="http://schemas.microsoft.com/office/powerpoint/2010/main" id="1" dur="indefinite" restart="never" nodeType="tmRoot"/>
+      </p:par>
+    </p:tnLst>
+  </p:timing>
 </p:sld>
 </file>
 
@@ -7663,16 +8788,12 @@
           <a:lstStyle/>
           <a:p>
             <a:r>
-              <a:rPr lang="en-US" dirty="0" smtClean="0"/>
-              <a:t>Simple </a:t>
-            </a:r>
-            <a:r>
               <a:rPr lang="en-US" dirty="0" err="1" smtClean="0"/>
               <a:t>OAuth</a:t>
             </a:r>
             <a:r>
               <a:rPr lang="en-US" dirty="0" smtClean="0"/>
-              <a:t> 2.0 API Client</a:t>
+              <a:t> 2.0</a:t>
             </a:r>
             <a:endParaRPr lang="en-US" dirty="0"/>
           </a:p>
@@ -7697,11 +8818,7 @@
           <a:p>
             <a:r>
               <a:rPr lang="en-US" dirty="0" smtClean="0"/>
-              <a:t>Exercise </a:t>
-            </a:r>
-            <a:r>
-              <a:rPr lang="en-US" dirty="0" smtClean="0"/>
-              <a:t>3</a:t>
+              <a:t>Authorization code flow</a:t>
             </a:r>
             <a:endParaRPr lang="en-US" dirty="0"/>
           </a:p>
@@ -7725,19 +8842,7 @@
             <a:pPr marL="0" indent="0">
               <a:buNone/>
             </a:pPr>
-            <a:r>
-              <a:rPr lang="en-US" dirty="0" smtClean="0"/>
-              <a:t>Get familiar with </a:t>
-            </a:r>
-            <a:r>
-              <a:rPr lang="en-US" dirty="0" err="1" smtClean="0"/>
-              <a:t>OAuth</a:t>
-            </a:r>
-            <a:r>
-              <a:rPr lang="en-US" dirty="0" smtClean="0"/>
-              <a:t> 2.0 and SDK by using a simple client letting the user authorize access.</a:t>
-            </a:r>
-            <a:endParaRPr lang="en-US" dirty="0" smtClean="0"/>
+            <a:endParaRPr lang="en-US" dirty="0"/>
           </a:p>
         </p:txBody>
       </p:sp>
@@ -7770,16 +8875,53 @@
           </a:p>
         </p:txBody>
       </p:sp>
+      <p:pic>
+        <p:nvPicPr>
+          <p:cNvPr id="6" name="Picture 5" descr="OAuth20 authcode flow.jpg"/>
+          <p:cNvPicPr>
+            <a:picLocks noChangeAspect="1"/>
+          </p:cNvPicPr>
+          <p:nvPr/>
+        </p:nvPicPr>
+        <p:blipFill>
+          <a:blip r:embed="rId3">
+            <a:extLst>
+              <a:ext uri="{28A0092B-C50C-407E-A947-70E740481C1C}">
+                <a14:useLocalDpi xmlns:a14="http://schemas.microsoft.com/office/drawing/2010/main" val="0"/>
+              </a:ext>
+            </a:extLst>
+          </a:blip>
+          <a:stretch>
+            <a:fillRect/>
+          </a:stretch>
+        </p:blipFill>
+        <p:spPr>
+          <a:xfrm>
+            <a:off x="1346200" y="2011652"/>
+            <a:ext cx="5969000" cy="3500147"/>
+          </a:xfrm>
+          <a:prstGeom prst="rect">
+            <a:avLst/>
+          </a:prstGeom>
+        </p:spPr>
+      </p:pic>
     </p:spTree>
     <p:extLst>
       <p:ext uri="{BB962C8B-B14F-4D97-AF65-F5344CB8AC3E}">
-        <p14:creationId xmlns:p14="http://schemas.microsoft.com/office/powerpoint/2010/main" val="3636441538"/>
+        <p14:creationId xmlns:p14="http://schemas.microsoft.com/office/powerpoint/2010/main" val="3779845909"/>
       </p:ext>
     </p:extLst>
   </p:cSld>
   <p:clrMapOvr>
     <a:masterClrMapping/>
   </p:clrMapOvr>
+  <p:timing>
+    <p:tnLst>
+      <p:par>
+        <p:cTn xmlns:p14="http://schemas.microsoft.com/office/powerpoint/2010/main" id="1" dur="indefinite" restart="never" nodeType="tmRoot"/>
+      </p:par>
+    </p:tnLst>
+  </p:timing>
 </p:sld>
 </file>
 
@@ -7812,12 +8954,14 @@
         </p:nvSpPr>
         <p:spPr/>
         <p:txBody>
-          <a:bodyPr/>
+          <a:bodyPr>
+            <a:normAutofit fontScale="90000"/>
+          </a:bodyPr>
           <a:lstStyle/>
           <a:p>
             <a:r>
               <a:rPr lang="en-US" dirty="0" smtClean="0"/>
-              <a:t>Backend</a:t>
+              <a:t>API’s for patient related information</a:t>
             </a:r>
             <a:endParaRPr lang="en-US" dirty="0"/>
           </a:p>
@@ -7841,12 +8985,12 @@
           <a:lstStyle/>
           <a:p>
             <a:r>
-              <a:rPr lang="en-US" dirty="0" smtClean="0"/>
-              <a:t>Exercise </a:t>
-            </a:r>
-            <a:r>
-              <a:rPr lang="en-US" dirty="0"/>
-              <a:t>4</a:t>
+              <a:rPr lang="en-US" dirty="0" err="1" smtClean="0"/>
+              <a:t>OAuth</a:t>
+            </a:r>
+            <a:r>
+              <a:rPr lang="en-US" dirty="0" smtClean="0"/>
+              <a:t> 2.0</a:t>
             </a:r>
             <a:endParaRPr lang="en-US" dirty="0"/>
           </a:p>
@@ -7867,28 +9011,52 @@
           <a:bodyPr/>
           <a:lstStyle/>
           <a:p>
-            <a:pPr marL="0" indent="0">
-              <a:buNone/>
-            </a:pPr>
-            <a:r>
-              <a:rPr lang="en-US" dirty="0" smtClean="0"/>
-              <a:t>Build the app backend to handle the </a:t>
-            </a:r>
             <a:r>
               <a:rPr lang="en-US" dirty="0" err="1" smtClean="0"/>
-              <a:t>OAuth</a:t>
-            </a:r>
-            <a:r>
-              <a:rPr lang="en-US" dirty="0" smtClean="0"/>
-              <a:t> 2.0 </a:t>
-            </a:r>
-            <a:r>
-              <a:rPr lang="en-US" dirty="0" smtClean="0"/>
-              <a:t>integration with SDK and to provide an API for the app. </a:t>
-            </a:r>
-          </a:p>
-          <a:p>
+              <a:t>Oauth</a:t>
+            </a:r>
+            <a:r>
+              <a:rPr lang="en-US" dirty="0" smtClean="0"/>
+              <a:t> 2.0 addresses these kind of issues</a:t>
+            </a:r>
+          </a:p>
+          <a:p>
+            <a:r>
+              <a:rPr lang="en-US" dirty="0" smtClean="0"/>
+              <a:t>Possible for the citizen to be anonymous in the app</a:t>
+            </a:r>
+          </a:p>
+          <a:p>
+            <a:pPr lvl="1"/>
+            <a:r>
+              <a:rPr lang="en-US" dirty="0" smtClean="0"/>
+              <a:t>E.g. username </a:t>
+            </a:r>
+            <a:r>
+              <a:rPr lang="en-US" smtClean="0"/>
+              <a:t>kallekula</a:t>
+            </a:r>
+          </a:p>
+          <a:p>
+            <a:pPr lvl="1"/>
+            <a:r>
+              <a:rPr lang="en-US" dirty="0" smtClean="0"/>
+              <a:t>But still authenticated against MVK while authorizing the client</a:t>
+            </a:r>
+          </a:p>
+          <a:p>
+            <a:r>
+              <a:rPr lang="en-US" dirty="0" smtClean="0"/>
+              <a:t>Twitter, Facebook </a:t>
+            </a:r>
+            <a:r>
+              <a:rPr lang="en-US" dirty="0" err="1" smtClean="0"/>
+              <a:t>etc</a:t>
+            </a:r>
             <a:endParaRPr lang="en-US" dirty="0" smtClean="0"/>
+          </a:p>
+          <a:p>
+            <a:endParaRPr lang="en-US" dirty="0"/>
           </a:p>
         </p:txBody>
       </p:sp>
@@ -7924,13 +9092,20 @@
     </p:spTree>
     <p:extLst>
       <p:ext uri="{BB962C8B-B14F-4D97-AF65-F5344CB8AC3E}">
-        <p14:creationId xmlns:p14="http://schemas.microsoft.com/office/powerpoint/2010/main" val="3668199394"/>
+        <p14:creationId xmlns:p14="http://schemas.microsoft.com/office/powerpoint/2010/main" val="25701892"/>
       </p:ext>
     </p:extLst>
   </p:cSld>
   <p:clrMapOvr>
     <a:masterClrMapping/>
   </p:clrMapOvr>
+  <p:timing>
+    <p:tnLst>
+      <p:par>
+        <p:cTn xmlns:p14="http://schemas.microsoft.com/office/powerpoint/2010/main" id="1" dur="indefinite" restart="never" nodeType="tmRoot"/>
+      </p:par>
+    </p:tnLst>
+  </p:timing>
 </p:sld>
 </file>
 
@@ -7968,7 +9143,15 @@
           <a:p>
             <a:r>
               <a:rPr lang="en-US" dirty="0" smtClean="0"/>
-              <a:t>Frontend</a:t>
+              <a:t>Simple </a:t>
+            </a:r>
+            <a:r>
+              <a:rPr lang="en-US" dirty="0" err="1" smtClean="0"/>
+              <a:t>OAuth</a:t>
+            </a:r>
+            <a:r>
+              <a:rPr lang="en-US" dirty="0" smtClean="0"/>
+              <a:t> 2.0 API Client</a:t>
             </a:r>
             <a:endParaRPr lang="en-US" dirty="0"/>
           </a:p>
@@ -7991,6 +9174,10 @@
           </a:bodyPr>
           <a:lstStyle/>
           <a:p>
+            <a:r>
+              <a:rPr lang="en-US" dirty="0" smtClean="0"/>
+              <a:t>Exercise 3</a:t>
+            </a:r>
             <a:endParaRPr lang="en-US" dirty="0"/>
           </a:p>
         </p:txBody>
@@ -8015,21 +9202,16 @@
             </a:pPr>
             <a:r>
               <a:rPr lang="en-US" dirty="0" smtClean="0"/>
-              <a:t>Frontend technologies</a:t>
-            </a:r>
-          </a:p>
-          <a:p>
-            <a:r>
-              <a:rPr lang="en-US" dirty="0" smtClean="0"/>
-              <a:t>What’s happening on the frontend</a:t>
-            </a:r>
-          </a:p>
-          <a:p>
-            <a:r>
-              <a:rPr lang="en-US" dirty="0" smtClean="0"/>
-              <a:t>Short intro to Backbone</a:t>
-            </a:r>
-            <a:endParaRPr lang="en-US" dirty="0" smtClean="0"/>
+              <a:t>Get familiar with </a:t>
+            </a:r>
+            <a:r>
+              <a:rPr lang="en-US" dirty="0" err="1" smtClean="0"/>
+              <a:t>OAuth</a:t>
+            </a:r>
+            <a:r>
+              <a:rPr lang="en-US" dirty="0" smtClean="0"/>
+              <a:t> 2.0 and SDK by using a simple client letting the user authorize access.</a:t>
+            </a:r>
           </a:p>
         </p:txBody>
       </p:sp>
@@ -8065,13 +9247,20 @@
     </p:spTree>
     <p:extLst>
       <p:ext uri="{BB962C8B-B14F-4D97-AF65-F5344CB8AC3E}">
-        <p14:creationId xmlns:p14="http://schemas.microsoft.com/office/powerpoint/2010/main" val="3753766513"/>
+        <p14:creationId xmlns:p14="http://schemas.microsoft.com/office/powerpoint/2010/main" val="3636441538"/>
       </p:ext>
     </p:extLst>
   </p:cSld>
   <p:clrMapOvr>
     <a:masterClrMapping/>
   </p:clrMapOvr>
+  <p:timing>
+    <p:tnLst>
+      <p:par>
+        <p:cTn xmlns:p14="http://schemas.microsoft.com/office/powerpoint/2010/main" id="1" dur="indefinite" restart="never" nodeType="tmRoot"/>
+      </p:par>
+    </p:tnLst>
+  </p:timing>
 </p:sld>
 </file>
 
@@ -8109,7 +9298,7 @@
           <a:p>
             <a:r>
               <a:rPr lang="en-US" dirty="0" smtClean="0"/>
-              <a:t>Frontend</a:t>
+              <a:t>Backend</a:t>
             </a:r>
             <a:endParaRPr lang="en-US" dirty="0"/>
           </a:p>
@@ -8138,9 +9327,8 @@
             </a:r>
             <a:r>
               <a:rPr lang="en-US" dirty="0"/>
-              <a:t>5</a:t>
-            </a:r>
-            <a:endParaRPr lang="en-US" dirty="0"/>
+              <a:t>4</a:t>
+            </a:r>
           </a:p>
         </p:txBody>
       </p:sp>
@@ -8164,17 +9352,15 @@
             </a:pPr>
             <a:r>
               <a:rPr lang="en-US" dirty="0" smtClean="0"/>
-              <a:t>Build a simple client tha</a:t>
-            </a:r>
-            <a:r>
-              <a:rPr lang="en-US" dirty="0" smtClean="0"/>
-              <a:t>t use the API provided by the backend. </a:t>
-            </a:r>
-          </a:p>
-          <a:p>
-            <a:r>
-              <a:rPr lang="en-US" dirty="0" smtClean="0"/>
-              <a:t>Login user to create a session</a:t>
+              <a:t>Build the app backend to handle the </a:t>
+            </a:r>
+            <a:r>
+              <a:rPr lang="en-US" dirty="0" err="1" smtClean="0"/>
+              <a:t>OAuth</a:t>
+            </a:r>
+            <a:r>
+              <a:rPr lang="en-US" dirty="0" smtClean="0"/>
+              <a:t> 2.0 integration with SDK and to provide an API for the app. </a:t>
             </a:r>
           </a:p>
           <a:p>
@@ -8214,7 +9400,479 @@
     </p:spTree>
     <p:extLst>
       <p:ext uri="{BB962C8B-B14F-4D97-AF65-F5344CB8AC3E}">
+        <p14:creationId xmlns:p14="http://schemas.microsoft.com/office/powerpoint/2010/main" val="3668199394"/>
+      </p:ext>
+    </p:extLst>
+  </p:cSld>
+  <p:clrMapOvr>
+    <a:masterClrMapping/>
+  </p:clrMapOvr>
+  <p:timing>
+    <p:tnLst>
+      <p:par>
+        <p:cTn xmlns:p14="http://schemas.microsoft.com/office/powerpoint/2010/main" id="1" dur="indefinite" restart="never" nodeType="tmRoot"/>
+      </p:par>
+    </p:tnLst>
+  </p:timing>
+</p:sld>
+</file>
+
+<file path=ppt/slides/slide17.xml><?xml version="1.0" encoding="utf-8"?>
+<p:sld xmlns:a="http://schemas.openxmlformats.org/drawingml/2006/main" xmlns:r="http://schemas.openxmlformats.org/officeDocument/2006/relationships" xmlns:p="http://schemas.openxmlformats.org/presentationml/2006/main">
+  <p:cSld>
+    <p:spTree>
+      <p:nvGrpSpPr>
+        <p:cNvPr id="1" name=""/>
+        <p:cNvGrpSpPr/>
+        <p:nvPr/>
+      </p:nvGrpSpPr>
+      <p:grpSpPr>
+        <a:xfrm>
+          <a:off x="0" y="0"/>
+          <a:ext cx="0" cy="0"/>
+          <a:chOff x="0" y="0"/>
+          <a:chExt cx="0" cy="0"/>
+        </a:xfrm>
+      </p:grpSpPr>
+      <p:sp>
+        <p:nvSpPr>
+          <p:cNvPr id="2" name="Title 1"/>
+          <p:cNvSpPr>
+            <a:spLocks noGrp="1"/>
+          </p:cNvSpPr>
+          <p:nvPr>
+            <p:ph type="ctrTitle"/>
+          </p:nvPr>
+        </p:nvSpPr>
+        <p:spPr/>
+        <p:txBody>
+          <a:bodyPr/>
+          <a:lstStyle/>
+          <a:p>
+            <a:r>
+              <a:rPr lang="en-US" dirty="0" smtClean="0"/>
+              <a:t>Frontend</a:t>
+            </a:r>
+            <a:endParaRPr lang="en-US" dirty="0"/>
+          </a:p>
+        </p:txBody>
+      </p:sp>
+      <p:sp>
+        <p:nvSpPr>
+          <p:cNvPr id="3" name="Subtitle 2"/>
+          <p:cNvSpPr>
+            <a:spLocks noGrp="1"/>
+          </p:cNvSpPr>
+          <p:nvPr>
+            <p:ph type="subTitle" idx="1"/>
+          </p:nvPr>
+        </p:nvSpPr>
+        <p:spPr/>
+        <p:txBody>
+          <a:bodyPr>
+            <a:normAutofit fontScale="92500" lnSpcReduction="10000"/>
+          </a:bodyPr>
+          <a:lstStyle/>
+          <a:p>
+            <a:endParaRPr lang="en-US" dirty="0"/>
+          </a:p>
+        </p:txBody>
+      </p:sp>
+      <p:sp>
+        <p:nvSpPr>
+          <p:cNvPr id="4" name="Text Placeholder 3"/>
+          <p:cNvSpPr>
+            <a:spLocks noGrp="1"/>
+          </p:cNvSpPr>
+          <p:nvPr>
+            <p:ph type="body" sz="quarter" idx="13"/>
+          </p:nvPr>
+        </p:nvSpPr>
+        <p:spPr/>
+        <p:txBody>
+          <a:bodyPr/>
+          <a:lstStyle/>
+          <a:p>
+            <a:pPr marL="0" indent="0">
+              <a:buNone/>
+            </a:pPr>
+            <a:r>
+              <a:rPr lang="en-US" dirty="0" smtClean="0"/>
+              <a:t>Frontend technologies</a:t>
+            </a:r>
+          </a:p>
+          <a:p>
+            <a:r>
+              <a:rPr lang="en-US" dirty="0" smtClean="0"/>
+              <a:t>What’s happening on the frontend</a:t>
+            </a:r>
+          </a:p>
+          <a:p>
+            <a:r>
+              <a:rPr lang="en-US" dirty="0" smtClean="0"/>
+              <a:t>Short intro to Backbone</a:t>
+            </a:r>
+          </a:p>
+        </p:txBody>
+      </p:sp>
+      <p:sp>
+        <p:nvSpPr>
+          <p:cNvPr id="5" name="Slide Number Placeholder 4"/>
+          <p:cNvSpPr>
+            <a:spLocks noGrp="1"/>
+          </p:cNvSpPr>
+          <p:nvPr>
+            <p:ph type="sldNum" sz="quarter" idx="14"/>
+          </p:nvPr>
+        </p:nvSpPr>
+        <p:spPr/>
+        <p:txBody>
+          <a:bodyPr/>
+          <a:lstStyle/>
+          <a:p>
+            <a:pPr>
+              <a:defRPr/>
+            </a:pPr>
+            <a:fld id="{4AA01602-B999-AA4E-80A6-B21CED3A9C3C}" type="slidenum">
+              <a:rPr lang="sv-SE" smtClean="0"/>
+              <a:pPr>
+                <a:defRPr/>
+              </a:pPr>
+              <a:t>17</a:t>
+            </a:fld>
+            <a:endParaRPr lang="sv-SE"/>
+          </a:p>
+        </p:txBody>
+      </p:sp>
+    </p:spTree>
+    <p:extLst>
+      <p:ext uri="{BB962C8B-B14F-4D97-AF65-F5344CB8AC3E}">
+        <p14:creationId xmlns:p14="http://schemas.microsoft.com/office/powerpoint/2010/main" val="3753766513"/>
+      </p:ext>
+    </p:extLst>
+  </p:cSld>
+  <p:clrMapOvr>
+    <a:masterClrMapping/>
+  </p:clrMapOvr>
+</p:sld>
+</file>
+
+<file path=ppt/slides/slide18.xml><?xml version="1.0" encoding="utf-8"?>
+<p:sld xmlns:a="http://schemas.openxmlformats.org/drawingml/2006/main" xmlns:r="http://schemas.openxmlformats.org/officeDocument/2006/relationships" xmlns:p="http://schemas.openxmlformats.org/presentationml/2006/main">
+  <p:cSld>
+    <p:spTree>
+      <p:nvGrpSpPr>
+        <p:cNvPr id="1" name=""/>
+        <p:cNvGrpSpPr/>
+        <p:nvPr/>
+      </p:nvGrpSpPr>
+      <p:grpSpPr>
+        <a:xfrm>
+          <a:off x="0" y="0"/>
+          <a:ext cx="0" cy="0"/>
+          <a:chOff x="0" y="0"/>
+          <a:chExt cx="0" cy="0"/>
+        </a:xfrm>
+      </p:grpSpPr>
+      <p:sp>
+        <p:nvSpPr>
+          <p:cNvPr id="2" name="Title 1"/>
+          <p:cNvSpPr>
+            <a:spLocks noGrp="1"/>
+          </p:cNvSpPr>
+          <p:nvPr>
+            <p:ph type="ctrTitle"/>
+          </p:nvPr>
+        </p:nvSpPr>
+        <p:spPr/>
+        <p:txBody>
+          <a:bodyPr/>
+          <a:lstStyle/>
+          <a:p>
+            <a:r>
+              <a:rPr lang="en-US" dirty="0" smtClean="0"/>
+              <a:t>Frontend</a:t>
+            </a:r>
+            <a:endParaRPr lang="en-US" dirty="0"/>
+          </a:p>
+        </p:txBody>
+      </p:sp>
+      <p:sp>
+        <p:nvSpPr>
+          <p:cNvPr id="3" name="Subtitle 2"/>
+          <p:cNvSpPr>
+            <a:spLocks noGrp="1"/>
+          </p:cNvSpPr>
+          <p:nvPr>
+            <p:ph type="subTitle" idx="1"/>
+          </p:nvPr>
+        </p:nvSpPr>
+        <p:spPr/>
+        <p:txBody>
+          <a:bodyPr>
+            <a:normAutofit fontScale="92500" lnSpcReduction="10000"/>
+          </a:bodyPr>
+          <a:lstStyle/>
+          <a:p>
+            <a:r>
+              <a:rPr lang="en-US" dirty="0" smtClean="0"/>
+              <a:t>Exercise </a:t>
+            </a:r>
+            <a:r>
+              <a:rPr lang="en-US" dirty="0"/>
+              <a:t>5</a:t>
+            </a:r>
+          </a:p>
+        </p:txBody>
+      </p:sp>
+      <p:sp>
+        <p:nvSpPr>
+          <p:cNvPr id="4" name="Text Placeholder 3"/>
+          <p:cNvSpPr>
+            <a:spLocks noGrp="1"/>
+          </p:cNvSpPr>
+          <p:nvPr>
+            <p:ph type="body" sz="quarter" idx="13"/>
+          </p:nvPr>
+        </p:nvSpPr>
+        <p:spPr/>
+        <p:txBody>
+          <a:bodyPr/>
+          <a:lstStyle/>
+          <a:p>
+            <a:pPr marL="0" indent="0">
+              <a:buNone/>
+            </a:pPr>
+            <a:r>
+              <a:rPr lang="en-US" dirty="0" smtClean="0"/>
+              <a:t>Build a simple client that use the API provided by the backend. </a:t>
+            </a:r>
+          </a:p>
+          <a:p>
+            <a:r>
+              <a:rPr lang="en-US" dirty="0" smtClean="0"/>
+              <a:t>Login user to create a session</a:t>
+            </a:r>
+          </a:p>
+          <a:p>
+            <a:endParaRPr lang="en-US" dirty="0" smtClean="0"/>
+          </a:p>
+        </p:txBody>
+      </p:sp>
+      <p:sp>
+        <p:nvSpPr>
+          <p:cNvPr id="5" name="Slide Number Placeholder 4"/>
+          <p:cNvSpPr>
+            <a:spLocks noGrp="1"/>
+          </p:cNvSpPr>
+          <p:nvPr>
+            <p:ph type="sldNum" sz="quarter" idx="14"/>
+          </p:nvPr>
+        </p:nvSpPr>
+        <p:spPr/>
+        <p:txBody>
+          <a:bodyPr/>
+          <a:lstStyle/>
+          <a:p>
+            <a:pPr>
+              <a:defRPr/>
+            </a:pPr>
+            <a:fld id="{4AA01602-B999-AA4E-80A6-B21CED3A9C3C}" type="slidenum">
+              <a:rPr lang="sv-SE" smtClean="0"/>
+              <a:pPr>
+                <a:defRPr/>
+              </a:pPr>
+              <a:t>18</a:t>
+            </a:fld>
+            <a:endParaRPr lang="sv-SE"/>
+          </a:p>
+        </p:txBody>
+      </p:sp>
+    </p:spTree>
+    <p:extLst>
+      <p:ext uri="{BB962C8B-B14F-4D97-AF65-F5344CB8AC3E}">
         <p14:creationId xmlns:p14="http://schemas.microsoft.com/office/powerpoint/2010/main" val="3598812586"/>
+      </p:ext>
+    </p:extLst>
+  </p:cSld>
+  <p:clrMapOvr>
+    <a:masterClrMapping/>
+  </p:clrMapOvr>
+</p:sld>
+</file>
+
+<file path=ppt/slides/slide19.xml><?xml version="1.0" encoding="utf-8"?>
+<p:sld xmlns:a="http://schemas.openxmlformats.org/drawingml/2006/main" xmlns:r="http://schemas.openxmlformats.org/officeDocument/2006/relationships" xmlns:p="http://schemas.openxmlformats.org/presentationml/2006/main">
+  <p:cSld>
+    <p:spTree>
+      <p:nvGrpSpPr>
+        <p:cNvPr id="1" name=""/>
+        <p:cNvGrpSpPr/>
+        <p:nvPr/>
+      </p:nvGrpSpPr>
+      <p:grpSpPr>
+        <a:xfrm>
+          <a:off x="0" y="0"/>
+          <a:ext cx="0" cy="0"/>
+          <a:chOff x="0" y="0"/>
+          <a:chExt cx="0" cy="0"/>
+        </a:xfrm>
+      </p:grpSpPr>
+      <p:sp>
+        <p:nvSpPr>
+          <p:cNvPr id="2" name="Title 1"/>
+          <p:cNvSpPr>
+            <a:spLocks noGrp="1"/>
+          </p:cNvSpPr>
+          <p:nvPr>
+            <p:ph type="ctrTitle"/>
+          </p:nvPr>
+        </p:nvSpPr>
+        <p:spPr/>
+        <p:txBody>
+          <a:bodyPr/>
+          <a:lstStyle/>
+          <a:p>
+            <a:r>
+              <a:rPr lang="en-US" dirty="0" smtClean="0"/>
+              <a:t>Links</a:t>
+            </a:r>
+            <a:endParaRPr lang="en-US" dirty="0"/>
+          </a:p>
+        </p:txBody>
+      </p:sp>
+      <p:sp>
+        <p:nvSpPr>
+          <p:cNvPr id="3" name="Subtitle 2"/>
+          <p:cNvSpPr>
+            <a:spLocks noGrp="1"/>
+          </p:cNvSpPr>
+          <p:nvPr>
+            <p:ph type="subTitle" idx="1"/>
+          </p:nvPr>
+        </p:nvSpPr>
+        <p:spPr/>
+        <p:txBody>
+          <a:bodyPr>
+            <a:normAutofit fontScale="92500" lnSpcReduction="10000"/>
+          </a:bodyPr>
+          <a:lstStyle/>
+          <a:p>
+            <a:endParaRPr lang="en-US"/>
+          </a:p>
+        </p:txBody>
+      </p:sp>
+      <p:sp>
+        <p:nvSpPr>
+          <p:cNvPr id="4" name="Text Placeholder 3"/>
+          <p:cNvSpPr>
+            <a:spLocks noGrp="1"/>
+          </p:cNvSpPr>
+          <p:nvPr>
+            <p:ph type="body" sz="quarter" idx="13"/>
+          </p:nvPr>
+        </p:nvSpPr>
+        <p:spPr/>
+        <p:txBody>
+          <a:bodyPr/>
+          <a:lstStyle/>
+          <a:p>
+            <a:pPr marL="0" indent="0">
+              <a:buNone/>
+            </a:pPr>
+            <a:endParaRPr lang="en-US" sz="1800" dirty="0" smtClean="0">
+              <a:hlinkClick r:id="rId2"/>
+            </a:endParaRPr>
+          </a:p>
+          <a:p>
+            <a:pPr marL="0" indent="0">
+              <a:buNone/>
+            </a:pPr>
+            <a:r>
+              <a:rPr lang="en-US" sz="1800" dirty="0" smtClean="0">
+                <a:hlinkClick r:id="rId2"/>
+              </a:rPr>
+              <a:t>https</a:t>
+            </a:r>
+            <a:r>
+              <a:rPr lang="en-US" sz="1800" dirty="0">
+                <a:hlinkClick r:id="rId2"/>
+              </a:rPr>
+              <a:t>://developers.google.com/accounts/docs/</a:t>
+            </a:r>
+            <a:r>
+              <a:rPr lang="en-US" sz="1800" dirty="0" smtClean="0">
+                <a:hlinkClick r:id="rId2"/>
+              </a:rPr>
+              <a:t>OAuth2</a:t>
+            </a:r>
+            <a:endParaRPr lang="en-US" sz="1800" dirty="0" smtClean="0"/>
+          </a:p>
+          <a:p>
+            <a:pPr marL="0" indent="0">
+              <a:buNone/>
+            </a:pPr>
+            <a:r>
+              <a:rPr lang="en-US" sz="1800" dirty="0">
+                <a:hlinkClick r:id="rId3"/>
+              </a:rPr>
+              <a:t>https://developers.facebook.com/docs/reference/dialogs/oauth</a:t>
+            </a:r>
+            <a:r>
+              <a:rPr lang="en-US" sz="1800" dirty="0" smtClean="0">
+                <a:hlinkClick r:id="rId3"/>
+              </a:rPr>
+              <a:t>/</a:t>
+            </a:r>
+            <a:endParaRPr lang="en-US" sz="1800" dirty="0" smtClean="0"/>
+          </a:p>
+          <a:p>
+            <a:pPr marL="0" indent="0">
+              <a:buNone/>
+            </a:pPr>
+            <a:endParaRPr lang="en-US" sz="1800" dirty="0"/>
+          </a:p>
+          <a:p>
+            <a:pPr marL="0" indent="0">
+              <a:buNone/>
+            </a:pPr>
+            <a:endParaRPr lang="en-US" sz="1800" dirty="0"/>
+          </a:p>
+        </p:txBody>
+      </p:sp>
+      <p:sp>
+        <p:nvSpPr>
+          <p:cNvPr id="5" name="Slide Number Placeholder 4"/>
+          <p:cNvSpPr>
+            <a:spLocks noGrp="1"/>
+          </p:cNvSpPr>
+          <p:nvPr>
+            <p:ph type="sldNum" sz="quarter" idx="14"/>
+          </p:nvPr>
+        </p:nvSpPr>
+        <p:spPr/>
+        <p:txBody>
+          <a:bodyPr/>
+          <a:lstStyle/>
+          <a:p>
+            <a:pPr>
+              <a:defRPr/>
+            </a:pPr>
+            <a:fld id="{4AA01602-B999-AA4E-80A6-B21CED3A9C3C}" type="slidenum">
+              <a:rPr lang="sv-SE" smtClean="0"/>
+              <a:pPr>
+                <a:defRPr/>
+              </a:pPr>
+              <a:t>19</a:t>
+            </a:fld>
+            <a:endParaRPr lang="sv-SE"/>
+          </a:p>
+        </p:txBody>
+      </p:sp>
+    </p:spTree>
+    <p:extLst>
+      <p:ext uri="{BB962C8B-B14F-4D97-AF65-F5344CB8AC3E}">
+        <p14:creationId xmlns:p14="http://schemas.microsoft.com/office/powerpoint/2010/main" val="930752604"/>
       </p:ext>
     </p:extLst>
   </p:cSld>
@@ -8464,11 +10122,7 @@
             </a:r>
             <a:r>
               <a:rPr lang="en-US" sz="2000" dirty="0" smtClean="0"/>
-              <a:t> </a:t>
-            </a:r>
-            <a:r>
-              <a:rPr lang="en-US" sz="2000" dirty="0" smtClean="0"/>
-              <a:t>2.0 intro</a:t>
+              <a:t> 2.0 intro</a:t>
             </a:r>
           </a:p>
           <a:p>
@@ -8675,7 +10329,6 @@
               <a:rPr lang="en-US" sz="2000" dirty="0" smtClean="0"/>
               <a:t>Lab 5, Applying the app</a:t>
             </a:r>
-            <a:endParaRPr lang="en-US" sz="2000" dirty="0" smtClean="0"/>
           </a:p>
           <a:p>
             <a:endParaRPr lang="en-US" sz="2000" dirty="0" smtClean="0"/>
@@ -9515,8 +11168,13 @@
             </a:pPr>
             <a:r>
               <a:rPr lang="en-US" dirty="0" smtClean="0"/>
-              <a:t>Use Curl to make http requests</a:t>
-            </a:r>
+              <a:t>Use Curl to make http </a:t>
+            </a:r>
+            <a:r>
+              <a:rPr lang="en-US" dirty="0" smtClean="0"/>
+              <a:t>requests against public data API</a:t>
+            </a:r>
+            <a:endParaRPr lang="en-US" dirty="0" smtClean="0"/>
           </a:p>
         </p:txBody>
       </p:sp>

</xml_diff>

<commit_message>
Updated ppt with redirect info
</commit_message>
<xml_diff>
--- a/Cadec-vårdens-apier.pptx
+++ b/Cadec-vårdens-apier.pptx
@@ -5,10 +5,10 @@
     <p:sldMasterId id="2147483648" r:id="rId1"/>
   </p:sldMasterIdLst>
   <p:notesMasterIdLst>
-    <p:notesMasterId r:id="rId24"/>
+    <p:notesMasterId r:id="rId25"/>
   </p:notesMasterIdLst>
   <p:handoutMasterIdLst>
-    <p:handoutMasterId r:id="rId25"/>
+    <p:handoutMasterId r:id="rId26"/>
   </p:handoutMasterIdLst>
   <p:sldIdLst>
     <p:sldId id="256" r:id="rId2"/>
@@ -21,18 +21,19 @@
     <p:sldId id="257" r:id="rId9"/>
     <p:sldId id="258" r:id="rId10"/>
     <p:sldId id="259" r:id="rId11"/>
-    <p:sldId id="261" r:id="rId12"/>
-    <p:sldId id="264" r:id="rId13"/>
-    <p:sldId id="277" r:id="rId14"/>
-    <p:sldId id="265" r:id="rId15"/>
-    <p:sldId id="272" r:id="rId16"/>
-    <p:sldId id="273" r:id="rId17"/>
-    <p:sldId id="267" r:id="rId18"/>
-    <p:sldId id="275" r:id="rId19"/>
-    <p:sldId id="269" r:id="rId20"/>
-    <p:sldId id="271" r:id="rId21"/>
-    <p:sldId id="270" r:id="rId22"/>
-    <p:sldId id="274" r:id="rId23"/>
+    <p:sldId id="280" r:id="rId12"/>
+    <p:sldId id="261" r:id="rId13"/>
+    <p:sldId id="264" r:id="rId14"/>
+    <p:sldId id="277" r:id="rId15"/>
+    <p:sldId id="265" r:id="rId16"/>
+    <p:sldId id="272" r:id="rId17"/>
+    <p:sldId id="273" r:id="rId18"/>
+    <p:sldId id="267" r:id="rId19"/>
+    <p:sldId id="275" r:id="rId20"/>
+    <p:sldId id="269" r:id="rId21"/>
+    <p:sldId id="271" r:id="rId22"/>
+    <p:sldId id="270" r:id="rId23"/>
+    <p:sldId id="274" r:id="rId24"/>
   </p:sldIdLst>
   <p:sldSz cx="9144000" cy="6858000" type="screen4x3"/>
   <p:notesSz cx="6858000" cy="9144000"/>
@@ -263,7 +264,7 @@
               <a:pPr>
                 <a:defRPr/>
               </a:pPr>
-              <a:t>2012-12-28</a:t>
+              <a:t>2013-01-02</a:t>
             </a:fld>
             <a:endParaRPr lang="sv-SE"/>
           </a:p>
@@ -463,7 +464,7 @@
               <a:pPr>
                 <a:defRPr/>
               </a:pPr>
-              <a:t>2012-12-28</a:t>
+              <a:t>2013-01-02</a:t>
             </a:fld>
             <a:endParaRPr lang="sv-SE"/>
           </a:p>
@@ -1940,7 +1941,7 @@
               <a:pPr>
                 <a:defRPr/>
               </a:pPr>
-              <a:t>12</a:t>
+              <a:t>13</a:t>
             </a:fld>
             <a:endParaRPr lang="sv-SE"/>
           </a:p>
@@ -2542,7 +2543,7 @@
               <a:pPr>
                 <a:defRPr/>
               </a:pPr>
-              <a:t>13</a:t>
+              <a:t>14</a:t>
             </a:fld>
             <a:endParaRPr lang="sv-SE"/>
           </a:p>
@@ -2632,7 +2633,7 @@
               <a:pPr>
                 <a:defRPr/>
               </a:pPr>
-              <a:t>14</a:t>
+              <a:t>15</a:t>
             </a:fld>
             <a:endParaRPr lang="sv-SE"/>
           </a:p>
@@ -3131,7 +3132,7 @@
               <a:pPr>
                 <a:defRPr/>
               </a:pPr>
-              <a:t>15</a:t>
+              <a:t>16</a:t>
             </a:fld>
             <a:endParaRPr lang="sv-SE"/>
           </a:p>
@@ -3377,7 +3378,7 @@
               <a:pPr>
                 <a:defRPr/>
               </a:pPr>
-              <a:t>16</a:t>
+              <a:t>17</a:t>
             </a:fld>
             <a:endParaRPr lang="sv-SE"/>
           </a:p>
@@ -7647,7 +7648,7 @@
           <a:p>
             <a:r>
               <a:rPr lang="en-US" dirty="0" smtClean="0"/>
-              <a:t>Exercise 1</a:t>
+              <a:t>Example: Redirect, how does it work?</a:t>
             </a:r>
             <a:endParaRPr lang="en-US" dirty="0"/>
           </a:p>
@@ -7671,10 +7672,7 @@
             <a:pPr marL="0" indent="0">
               <a:buNone/>
             </a:pPr>
-            <a:r>
-              <a:rPr lang="en-US" dirty="0" smtClean="0"/>
-              <a:t>Use Curl to make http requests against public data API</a:t>
-            </a:r>
+            <a:endParaRPr lang="en-US" dirty="0" smtClean="0"/>
           </a:p>
         </p:txBody>
       </p:sp>
@@ -7707,10 +7705,868 @@
           </a:p>
         </p:txBody>
       </p:sp>
+      <p:pic>
+        <p:nvPicPr>
+          <p:cNvPr id="9" name="Picture 8"/>
+          <p:cNvPicPr>
+            <a:picLocks noChangeAspect="1"/>
+          </p:cNvPicPr>
+          <p:nvPr/>
+        </p:nvPicPr>
+        <p:blipFill>
+          <a:blip r:embed="rId2"/>
+          <a:stretch>
+            <a:fillRect/>
+          </a:stretch>
+        </p:blipFill>
+        <p:spPr>
+          <a:xfrm>
+            <a:off x="685800" y="3275938"/>
+            <a:ext cx="1041400" cy="998008"/>
+          </a:xfrm>
+          <a:prstGeom prst="rect">
+            <a:avLst/>
+          </a:prstGeom>
+        </p:spPr>
+      </p:pic>
+      <p:sp>
+        <p:nvSpPr>
+          <p:cNvPr id="10" name="TextBox 9"/>
+          <p:cNvSpPr txBox="1"/>
+          <p:nvPr/>
+        </p:nvSpPr>
+        <p:spPr>
+          <a:xfrm>
+            <a:off x="287338" y="2612140"/>
+            <a:ext cx="2364750" cy="523220"/>
+          </a:xfrm>
+          <a:prstGeom prst="rect">
+            <a:avLst/>
+          </a:prstGeom>
+          <a:noFill/>
+        </p:spPr>
+        <p:txBody>
+          <a:bodyPr wrap="none" rtlCol="0">
+            <a:spAutoFit/>
+          </a:bodyPr>
+          <a:lstStyle/>
+          <a:p>
+            <a:r>
+              <a:rPr lang="en-US" sz="1400" dirty="0" smtClean="0"/>
+              <a:t>Issue request from browser</a:t>
+            </a:r>
+          </a:p>
+          <a:p>
+            <a:r>
+              <a:rPr lang="en-US" sz="1400" dirty="0" smtClean="0"/>
+              <a:t>http://</a:t>
+            </a:r>
+            <a:r>
+              <a:rPr lang="en-US" sz="1400" dirty="0" err="1" smtClean="0"/>
+              <a:t>host.com</a:t>
+            </a:r>
+            <a:r>
+              <a:rPr lang="en-US" sz="1400" dirty="0" smtClean="0"/>
+              <a:t>/path</a:t>
+            </a:r>
+            <a:endParaRPr lang="en-US" sz="1400" dirty="0"/>
+          </a:p>
+        </p:txBody>
+      </p:sp>
+      <p:sp>
+        <p:nvSpPr>
+          <p:cNvPr id="12" name="Snip Single Corner Rectangle 11"/>
+          <p:cNvSpPr/>
+          <p:nvPr/>
+        </p:nvSpPr>
+        <p:spPr>
+          <a:xfrm>
+            <a:off x="2667000" y="1795992"/>
+            <a:ext cx="3746500" cy="2318808"/>
+          </a:xfrm>
+          <a:prstGeom prst="snip1Rect">
+            <a:avLst/>
+          </a:prstGeom>
+          <a:solidFill>
+            <a:schemeClr val="tx1"/>
+          </a:solidFill>
+        </p:spPr>
+        <p:style>
+          <a:lnRef idx="1">
+            <a:schemeClr val="accent1"/>
+          </a:lnRef>
+          <a:fillRef idx="3">
+            <a:schemeClr val="accent1"/>
+          </a:fillRef>
+          <a:effectRef idx="2">
+            <a:schemeClr val="accent1"/>
+          </a:effectRef>
+          <a:fontRef idx="minor">
+            <a:schemeClr val="lt1"/>
+          </a:fontRef>
+        </p:style>
+        <p:txBody>
+          <a:bodyPr rtlCol="0" anchor="t" anchorCtr="0"/>
+          <a:lstStyle/>
+          <a:p>
+            <a:r>
+              <a:rPr lang="en-US" sz="1200" dirty="0">
+                <a:solidFill>
+                  <a:schemeClr val="bg1"/>
+                </a:solidFill>
+                <a:latin typeface="Consolas"/>
+                <a:cs typeface="Consolas"/>
+              </a:rPr>
+              <a:t>&gt; GET /path HTTP/1.1</a:t>
+            </a:r>
+          </a:p>
+          <a:p>
+            <a:r>
+              <a:rPr lang="en-US" sz="1200" dirty="0">
+                <a:solidFill>
+                  <a:schemeClr val="bg1"/>
+                </a:solidFill>
+                <a:latin typeface="Consolas"/>
+                <a:cs typeface="Consolas"/>
+              </a:rPr>
+              <a:t>&gt; User-Agent: Mozilla/</a:t>
+            </a:r>
+            <a:r>
+              <a:rPr lang="en-US" sz="1200" dirty="0" smtClean="0">
+                <a:solidFill>
+                  <a:schemeClr val="bg1"/>
+                </a:solidFill>
+                <a:latin typeface="Consolas"/>
+                <a:cs typeface="Consolas"/>
+              </a:rPr>
+              <a:t>5.0</a:t>
+            </a:r>
+            <a:endParaRPr lang="en-US" sz="1200" dirty="0">
+              <a:solidFill>
+                <a:schemeClr val="bg1"/>
+              </a:solidFill>
+              <a:latin typeface="Consolas"/>
+              <a:cs typeface="Consolas"/>
+            </a:endParaRPr>
+          </a:p>
+          <a:p>
+            <a:r>
+              <a:rPr lang="en-US" sz="1200" dirty="0">
+                <a:solidFill>
+                  <a:schemeClr val="bg1"/>
+                </a:solidFill>
+                <a:latin typeface="Consolas"/>
+                <a:cs typeface="Consolas"/>
+              </a:rPr>
+              <a:t>&gt; Host: </a:t>
+            </a:r>
+            <a:r>
+              <a:rPr lang="en-US" sz="1200" dirty="0" err="1">
+                <a:solidFill>
+                  <a:schemeClr val="bg1"/>
+                </a:solidFill>
+                <a:latin typeface="Consolas"/>
+                <a:cs typeface="Consolas"/>
+              </a:rPr>
+              <a:t>host.com</a:t>
+            </a:r>
+            <a:endParaRPr lang="en-US" sz="1200" dirty="0">
+              <a:solidFill>
+                <a:schemeClr val="bg1"/>
+              </a:solidFill>
+              <a:latin typeface="Consolas"/>
+              <a:cs typeface="Consolas"/>
+            </a:endParaRPr>
+          </a:p>
+          <a:p>
+            <a:pPr marL="171450" indent="-171450">
+              <a:buFont typeface="Wingdings" charset="0"/>
+              <a:buChar char="Ø"/>
+            </a:pPr>
+            <a:r>
+              <a:rPr lang="en-US" sz="1200" dirty="0" smtClean="0">
+                <a:solidFill>
+                  <a:schemeClr val="bg1"/>
+                </a:solidFill>
+                <a:latin typeface="Consolas"/>
+                <a:cs typeface="Consolas"/>
+              </a:rPr>
+              <a:t>.</a:t>
+            </a:r>
+            <a:r>
+              <a:rPr lang="en-US" sz="1200" dirty="0">
+                <a:solidFill>
+                  <a:schemeClr val="bg1"/>
+                </a:solidFill>
+                <a:latin typeface="Consolas"/>
+                <a:cs typeface="Consolas"/>
+              </a:rPr>
+              <a:t>.....</a:t>
+            </a:r>
+            <a:r>
+              <a:rPr lang="en-US" sz="1200" dirty="0" smtClean="0">
+                <a:solidFill>
+                  <a:schemeClr val="bg1"/>
+                </a:solidFill>
+                <a:latin typeface="Consolas"/>
+                <a:cs typeface="Consolas"/>
+              </a:rPr>
+              <a:t>.</a:t>
+            </a:r>
+          </a:p>
+          <a:p>
+            <a:pPr marL="171450" indent="-171450">
+              <a:buFont typeface="Wingdings" charset="0"/>
+              <a:buChar char="Ø"/>
+            </a:pPr>
+            <a:endParaRPr lang="en-US" sz="1200" dirty="0">
+              <a:solidFill>
+                <a:schemeClr val="bg1"/>
+              </a:solidFill>
+              <a:latin typeface="Consolas"/>
+              <a:cs typeface="Consolas"/>
+            </a:endParaRPr>
+          </a:p>
+          <a:p>
+            <a:r>
+              <a:rPr lang="en-US" sz="1200" dirty="0">
+                <a:solidFill>
+                  <a:schemeClr val="bg1"/>
+                </a:solidFill>
+                <a:latin typeface="Consolas"/>
+                <a:cs typeface="Consolas"/>
+              </a:rPr>
+              <a:t>&lt; HTTP/1.1 302 Found</a:t>
+            </a:r>
+          </a:p>
+          <a:p>
+            <a:r>
+              <a:rPr lang="en-US" sz="1200" dirty="0">
+                <a:solidFill>
+                  <a:schemeClr val="bg1"/>
+                </a:solidFill>
+                <a:latin typeface="Consolas"/>
+                <a:cs typeface="Consolas"/>
+              </a:rPr>
+              <a:t>&lt; Date: Wed, </a:t>
+            </a:r>
+            <a:r>
+              <a:rPr lang="en-US" sz="1200" dirty="0" smtClean="0">
+                <a:solidFill>
+                  <a:schemeClr val="bg1"/>
+                </a:solidFill>
+                <a:latin typeface="Consolas"/>
+                <a:cs typeface="Consolas"/>
+              </a:rPr>
+              <a:t>01 </a:t>
+            </a:r>
+            <a:r>
+              <a:rPr lang="en-US" sz="1200" dirty="0">
+                <a:solidFill>
+                  <a:schemeClr val="bg1"/>
+                </a:solidFill>
+                <a:latin typeface="Consolas"/>
+                <a:cs typeface="Consolas"/>
+              </a:rPr>
+              <a:t>Jan 2013 20:11:48 GMT</a:t>
+            </a:r>
+          </a:p>
+          <a:p>
+            <a:r>
+              <a:rPr lang="en-US" sz="1200" dirty="0">
+                <a:solidFill>
+                  <a:schemeClr val="bg1"/>
+                </a:solidFill>
+                <a:latin typeface="Consolas"/>
+                <a:cs typeface="Consolas"/>
+              </a:rPr>
+              <a:t>&lt; Server: Apache/2.2.23</a:t>
+            </a:r>
+          </a:p>
+          <a:p>
+            <a:r>
+              <a:rPr lang="en-US" sz="1200" dirty="0">
+                <a:solidFill>
+                  <a:schemeClr val="bg1"/>
+                </a:solidFill>
+                <a:latin typeface="Consolas"/>
+                <a:cs typeface="Consolas"/>
+              </a:rPr>
+              <a:t>&lt; Location: http://</a:t>
+            </a:r>
+            <a:r>
+              <a:rPr lang="en-US" sz="1200" dirty="0" err="1">
+                <a:solidFill>
+                  <a:schemeClr val="bg1"/>
+                </a:solidFill>
+                <a:latin typeface="Consolas"/>
+                <a:cs typeface="Consolas"/>
+              </a:rPr>
+              <a:t>anotherhost.com</a:t>
+            </a:r>
+            <a:r>
+              <a:rPr lang="en-US" sz="1200" dirty="0">
+                <a:solidFill>
+                  <a:schemeClr val="bg1"/>
+                </a:solidFill>
+                <a:latin typeface="Consolas"/>
+                <a:cs typeface="Consolas"/>
+              </a:rPr>
+              <a:t>/path</a:t>
+            </a:r>
+          </a:p>
+          <a:p>
+            <a:r>
+              <a:rPr lang="en-US" sz="1200" dirty="0">
+                <a:solidFill>
+                  <a:schemeClr val="bg1"/>
+                </a:solidFill>
+                <a:latin typeface="Consolas"/>
+                <a:cs typeface="Consolas"/>
+              </a:rPr>
+              <a:t>&lt; ......</a:t>
+            </a:r>
+          </a:p>
+          <a:p>
+            <a:pPr marL="171450" indent="-171450">
+              <a:buFont typeface="Wingdings" charset="0"/>
+              <a:buChar char="Ø"/>
+            </a:pPr>
+            <a:endParaRPr lang="en-US" sz="1200" dirty="0">
+              <a:solidFill>
+                <a:schemeClr val="bg1"/>
+              </a:solidFill>
+              <a:latin typeface="Consolas"/>
+              <a:cs typeface="Consolas"/>
+            </a:endParaRPr>
+          </a:p>
+        </p:txBody>
+      </p:sp>
+      <p:pic>
+        <p:nvPicPr>
+          <p:cNvPr id="13" name="Picture 12"/>
+          <p:cNvPicPr>
+            <a:picLocks noChangeAspect="1"/>
+          </p:cNvPicPr>
+          <p:nvPr/>
+        </p:nvPicPr>
+        <p:blipFill>
+          <a:blip r:embed="rId3"/>
+          <a:stretch>
+            <a:fillRect/>
+          </a:stretch>
+        </p:blipFill>
+        <p:spPr>
+          <a:xfrm>
+            <a:off x="6908503" y="2585844"/>
+            <a:ext cx="961994" cy="921232"/>
+          </a:xfrm>
+          <a:prstGeom prst="rect">
+            <a:avLst/>
+          </a:prstGeom>
+        </p:spPr>
+      </p:pic>
+      <p:sp>
+        <p:nvSpPr>
+          <p:cNvPr id="15" name="TextBox 14"/>
+          <p:cNvSpPr txBox="1"/>
+          <p:nvPr/>
+        </p:nvSpPr>
+        <p:spPr>
+          <a:xfrm>
+            <a:off x="6705303" y="2013157"/>
+            <a:ext cx="913068" cy="307777"/>
+          </a:xfrm>
+          <a:prstGeom prst="rect">
+            <a:avLst/>
+          </a:prstGeom>
+          <a:noFill/>
+        </p:spPr>
+        <p:txBody>
+          <a:bodyPr wrap="none" rtlCol="0">
+            <a:spAutoFit/>
+          </a:bodyPr>
+          <a:lstStyle/>
+          <a:p>
+            <a:r>
+              <a:rPr lang="en-US" sz="1400" dirty="0" err="1"/>
+              <a:t>h</a:t>
+            </a:r>
+            <a:r>
+              <a:rPr lang="en-US" sz="1400" dirty="0" err="1" smtClean="0"/>
+              <a:t>ost.com</a:t>
+            </a:r>
+            <a:endParaRPr lang="en-US" sz="1400" dirty="0"/>
+          </a:p>
+        </p:txBody>
+      </p:sp>
+      <p:sp>
+        <p:nvSpPr>
+          <p:cNvPr id="16" name="Curved Left Arrow 15"/>
+          <p:cNvSpPr/>
+          <p:nvPr/>
+        </p:nvSpPr>
+        <p:spPr>
+          <a:xfrm>
+            <a:off x="6616402" y="2395021"/>
+            <a:ext cx="584200" cy="1302876"/>
+          </a:xfrm>
+          <a:prstGeom prst="curvedLeftArrow">
+            <a:avLst/>
+          </a:prstGeom>
+        </p:spPr>
+        <p:style>
+          <a:lnRef idx="1">
+            <a:schemeClr val="accent1"/>
+          </a:lnRef>
+          <a:fillRef idx="3">
+            <a:schemeClr val="accent1"/>
+          </a:fillRef>
+          <a:effectRef idx="2">
+            <a:schemeClr val="accent1"/>
+          </a:effectRef>
+          <a:fontRef idx="minor">
+            <a:schemeClr val="lt1"/>
+          </a:fontRef>
+        </p:style>
+        <p:txBody>
+          <a:bodyPr rtlCol="0" anchor="ctr"/>
+          <a:lstStyle/>
+          <a:p>
+            <a:pPr algn="ctr"/>
+            <a:endParaRPr lang="en-US">
+              <a:solidFill>
+                <a:schemeClr val="tx1"/>
+              </a:solidFill>
+            </a:endParaRPr>
+          </a:p>
+        </p:txBody>
+      </p:sp>
+      <p:sp>
+        <p:nvSpPr>
+          <p:cNvPr id="17" name="Snip Single Corner Rectangle 16"/>
+          <p:cNvSpPr/>
+          <p:nvPr/>
+        </p:nvSpPr>
+        <p:spPr>
+          <a:xfrm>
+            <a:off x="2667000" y="4221692"/>
+            <a:ext cx="3758902" cy="2255308"/>
+          </a:xfrm>
+          <a:prstGeom prst="snip1Rect">
+            <a:avLst/>
+          </a:prstGeom>
+          <a:solidFill>
+            <a:schemeClr val="tx1"/>
+          </a:solidFill>
+        </p:spPr>
+        <p:style>
+          <a:lnRef idx="1">
+            <a:schemeClr val="accent1"/>
+          </a:lnRef>
+          <a:fillRef idx="3">
+            <a:schemeClr val="accent1"/>
+          </a:fillRef>
+          <a:effectRef idx="2">
+            <a:schemeClr val="accent1"/>
+          </a:effectRef>
+          <a:fontRef idx="minor">
+            <a:schemeClr val="lt1"/>
+          </a:fontRef>
+        </p:style>
+        <p:txBody>
+          <a:bodyPr rtlCol="0" anchor="t" anchorCtr="0"/>
+          <a:lstStyle/>
+          <a:p>
+            <a:r>
+              <a:rPr lang="en-US" sz="1200" dirty="0">
+                <a:solidFill>
+                  <a:schemeClr val="bg1"/>
+                </a:solidFill>
+                <a:latin typeface="Consolas"/>
+                <a:cs typeface="Consolas"/>
+              </a:rPr>
+              <a:t>&gt; GET /path HTTP/1.1</a:t>
+            </a:r>
+          </a:p>
+          <a:p>
+            <a:r>
+              <a:rPr lang="en-US" sz="1200" dirty="0">
+                <a:solidFill>
+                  <a:schemeClr val="bg1"/>
+                </a:solidFill>
+                <a:latin typeface="Consolas"/>
+                <a:cs typeface="Consolas"/>
+              </a:rPr>
+              <a:t>&gt; User-Agent: Mozilla/</a:t>
+            </a:r>
+            <a:r>
+              <a:rPr lang="en-US" sz="1200" dirty="0" smtClean="0">
+                <a:solidFill>
+                  <a:schemeClr val="bg1"/>
+                </a:solidFill>
+                <a:latin typeface="Consolas"/>
+                <a:cs typeface="Consolas"/>
+              </a:rPr>
+              <a:t>5.0</a:t>
+            </a:r>
+            <a:endParaRPr lang="en-US" sz="1200" dirty="0">
+              <a:solidFill>
+                <a:schemeClr val="bg1"/>
+              </a:solidFill>
+              <a:latin typeface="Consolas"/>
+              <a:cs typeface="Consolas"/>
+            </a:endParaRPr>
+          </a:p>
+          <a:p>
+            <a:r>
+              <a:rPr lang="en-US" sz="1200" dirty="0">
+                <a:solidFill>
+                  <a:schemeClr val="bg1"/>
+                </a:solidFill>
+                <a:latin typeface="Consolas"/>
+                <a:cs typeface="Consolas"/>
+              </a:rPr>
+              <a:t>&gt; Host: </a:t>
+            </a:r>
+            <a:r>
+              <a:rPr lang="en-US" sz="1200" dirty="0" err="1" smtClean="0">
+                <a:solidFill>
+                  <a:schemeClr val="bg1"/>
+                </a:solidFill>
+                <a:latin typeface="Consolas"/>
+                <a:cs typeface="Consolas"/>
+              </a:rPr>
+              <a:t>anotherhost.com</a:t>
+            </a:r>
+            <a:endParaRPr lang="en-US" sz="1200" dirty="0">
+              <a:solidFill>
+                <a:schemeClr val="bg1"/>
+              </a:solidFill>
+              <a:latin typeface="Consolas"/>
+              <a:cs typeface="Consolas"/>
+            </a:endParaRPr>
+          </a:p>
+          <a:p>
+            <a:pPr marL="171450" indent="-171450">
+              <a:buFont typeface="Wingdings" charset="0"/>
+              <a:buChar char="Ø"/>
+            </a:pPr>
+            <a:r>
+              <a:rPr lang="en-US" sz="1200" dirty="0" smtClean="0">
+                <a:solidFill>
+                  <a:schemeClr val="bg1"/>
+                </a:solidFill>
+                <a:latin typeface="Consolas"/>
+                <a:cs typeface="Consolas"/>
+              </a:rPr>
+              <a:t>.</a:t>
+            </a:r>
+            <a:r>
+              <a:rPr lang="en-US" sz="1200" dirty="0">
+                <a:solidFill>
+                  <a:schemeClr val="bg1"/>
+                </a:solidFill>
+                <a:latin typeface="Consolas"/>
+                <a:cs typeface="Consolas"/>
+              </a:rPr>
+              <a:t>.....</a:t>
+            </a:r>
+            <a:r>
+              <a:rPr lang="en-US" sz="1200" dirty="0" smtClean="0">
+                <a:solidFill>
+                  <a:schemeClr val="bg1"/>
+                </a:solidFill>
+                <a:latin typeface="Consolas"/>
+                <a:cs typeface="Consolas"/>
+              </a:rPr>
+              <a:t>.</a:t>
+            </a:r>
+          </a:p>
+          <a:p>
+            <a:pPr marL="171450" indent="-171450">
+              <a:buFont typeface="Wingdings" charset="0"/>
+              <a:buChar char="Ø"/>
+            </a:pPr>
+            <a:endParaRPr lang="en-US" sz="1200" dirty="0">
+              <a:solidFill>
+                <a:schemeClr val="bg1"/>
+              </a:solidFill>
+              <a:latin typeface="Consolas"/>
+              <a:cs typeface="Consolas"/>
+            </a:endParaRPr>
+          </a:p>
+          <a:p>
+            <a:r>
+              <a:rPr lang="en-US" sz="1200" dirty="0">
+                <a:solidFill>
+                  <a:schemeClr val="bg1"/>
+                </a:solidFill>
+                <a:latin typeface="Consolas"/>
+                <a:cs typeface="Consolas"/>
+              </a:rPr>
+              <a:t>&lt; HTTP/1.1 200 OK</a:t>
+            </a:r>
+          </a:p>
+          <a:p>
+            <a:r>
+              <a:rPr lang="en-US" sz="1200" dirty="0">
+                <a:solidFill>
+                  <a:schemeClr val="bg1"/>
+                </a:solidFill>
+                <a:latin typeface="Consolas"/>
+                <a:cs typeface="Consolas"/>
+              </a:rPr>
+              <a:t>&lt; Date: Wed, </a:t>
+            </a:r>
+            <a:r>
+              <a:rPr lang="en-US" sz="1200" dirty="0" smtClean="0">
+                <a:solidFill>
+                  <a:schemeClr val="bg1"/>
+                </a:solidFill>
+                <a:latin typeface="Consolas"/>
+                <a:cs typeface="Consolas"/>
+              </a:rPr>
+              <a:t>01 </a:t>
+            </a:r>
+            <a:r>
+              <a:rPr lang="en-US" sz="1200" dirty="0">
+                <a:solidFill>
+                  <a:schemeClr val="bg1"/>
+                </a:solidFill>
+                <a:latin typeface="Consolas"/>
+                <a:cs typeface="Consolas"/>
+              </a:rPr>
+              <a:t>Jan 2013 </a:t>
+            </a:r>
+            <a:r>
+              <a:rPr lang="en-US" sz="1200" dirty="0" smtClean="0">
+                <a:solidFill>
+                  <a:schemeClr val="bg1"/>
+                </a:solidFill>
+                <a:latin typeface="Consolas"/>
+                <a:cs typeface="Consolas"/>
+              </a:rPr>
+              <a:t>20:11:49 </a:t>
+            </a:r>
+            <a:r>
+              <a:rPr lang="en-US" sz="1200" dirty="0">
+                <a:solidFill>
+                  <a:schemeClr val="bg1"/>
+                </a:solidFill>
+                <a:latin typeface="Consolas"/>
+                <a:cs typeface="Consolas"/>
+              </a:rPr>
+              <a:t>GMT</a:t>
+            </a:r>
+          </a:p>
+          <a:p>
+            <a:r>
+              <a:rPr lang="en-US" sz="1200" dirty="0">
+                <a:solidFill>
+                  <a:schemeClr val="bg1"/>
+                </a:solidFill>
+                <a:latin typeface="Consolas"/>
+                <a:cs typeface="Consolas"/>
+              </a:rPr>
+              <a:t>&lt; Server</a:t>
+            </a:r>
+            <a:r>
+              <a:rPr lang="en-US" sz="1200">
+                <a:solidFill>
+                  <a:schemeClr val="bg1"/>
+                </a:solidFill>
+                <a:latin typeface="Consolas"/>
+                <a:cs typeface="Consolas"/>
+              </a:rPr>
+              <a:t>: </a:t>
+            </a:r>
+            <a:r>
+              <a:rPr lang="en-US" sz="1200">
+                <a:solidFill>
+                  <a:schemeClr val="bg1"/>
+                </a:solidFill>
+                <a:latin typeface="Consolas"/>
+                <a:cs typeface="Consolas"/>
+              </a:rPr>
+              <a:t>Apache/2.2.23</a:t>
+            </a:r>
+            <a:endParaRPr lang="en-US" sz="1200" dirty="0">
+              <a:solidFill>
+                <a:schemeClr val="bg1"/>
+              </a:solidFill>
+              <a:latin typeface="Consolas"/>
+              <a:cs typeface="Consolas"/>
+            </a:endParaRPr>
+          </a:p>
+          <a:p>
+            <a:r>
+              <a:rPr lang="en-US" sz="1200" dirty="0">
+                <a:solidFill>
+                  <a:schemeClr val="bg1"/>
+                </a:solidFill>
+                <a:latin typeface="Consolas"/>
+                <a:cs typeface="Consolas"/>
+              </a:rPr>
+              <a:t>&lt; Content-Type: application/</a:t>
+            </a:r>
+            <a:r>
+              <a:rPr lang="en-US" sz="1200" dirty="0" err="1">
+                <a:solidFill>
+                  <a:schemeClr val="bg1"/>
+                </a:solidFill>
+                <a:latin typeface="Consolas"/>
+                <a:cs typeface="Consolas"/>
+              </a:rPr>
+              <a:t>json;charset</a:t>
+            </a:r>
+            <a:r>
+              <a:rPr lang="en-US" sz="1200" dirty="0">
+                <a:solidFill>
+                  <a:schemeClr val="bg1"/>
+                </a:solidFill>
+                <a:latin typeface="Consolas"/>
+                <a:cs typeface="Consolas"/>
+              </a:rPr>
+              <a:t>=UTF-8</a:t>
+            </a:r>
+          </a:p>
+          <a:p>
+            <a:r>
+              <a:rPr lang="en-US" sz="1200" dirty="0">
+                <a:solidFill>
+                  <a:schemeClr val="bg1"/>
+                </a:solidFill>
+                <a:latin typeface="Consolas"/>
+                <a:cs typeface="Consolas"/>
+              </a:rPr>
+              <a:t>&lt; ......</a:t>
+            </a:r>
+          </a:p>
+          <a:p>
+            <a:endParaRPr lang="en-US" sz="1200" dirty="0">
+              <a:solidFill>
+                <a:schemeClr val="bg1"/>
+              </a:solidFill>
+              <a:latin typeface="Consolas"/>
+              <a:cs typeface="Consolas"/>
+            </a:endParaRPr>
+          </a:p>
+          <a:p>
+            <a:pPr marL="171450" indent="-171450">
+              <a:buFont typeface="Wingdings" charset="0"/>
+              <a:buChar char="Ø"/>
+            </a:pPr>
+            <a:endParaRPr lang="en-US" sz="1200" dirty="0">
+              <a:solidFill>
+                <a:schemeClr val="bg1"/>
+              </a:solidFill>
+              <a:latin typeface="Consolas"/>
+              <a:cs typeface="Consolas"/>
+            </a:endParaRPr>
+          </a:p>
+        </p:txBody>
+      </p:sp>
+      <p:pic>
+        <p:nvPicPr>
+          <p:cNvPr id="18" name="Picture 17"/>
+          <p:cNvPicPr>
+            <a:picLocks noChangeAspect="1"/>
+          </p:cNvPicPr>
+          <p:nvPr/>
+        </p:nvPicPr>
+        <p:blipFill>
+          <a:blip r:embed="rId3"/>
+          <a:stretch>
+            <a:fillRect/>
+          </a:stretch>
+        </p:blipFill>
+        <p:spPr>
+          <a:xfrm>
+            <a:off x="6919600" y="4838700"/>
+            <a:ext cx="961994" cy="921232"/>
+          </a:xfrm>
+          <a:prstGeom prst="rect">
+            <a:avLst/>
+          </a:prstGeom>
+        </p:spPr>
+      </p:pic>
+      <p:sp>
+        <p:nvSpPr>
+          <p:cNvPr id="19" name="TextBox 18"/>
+          <p:cNvSpPr txBox="1"/>
+          <p:nvPr/>
+        </p:nvSpPr>
+        <p:spPr>
+          <a:xfrm>
+            <a:off x="6527503" y="4337446"/>
+            <a:ext cx="1521984" cy="307777"/>
+          </a:xfrm>
+          <a:prstGeom prst="rect">
+            <a:avLst/>
+          </a:prstGeom>
+          <a:noFill/>
+        </p:spPr>
+        <p:txBody>
+          <a:bodyPr wrap="none" rtlCol="0">
+            <a:spAutoFit/>
+          </a:bodyPr>
+          <a:lstStyle/>
+          <a:p>
+            <a:r>
+              <a:rPr lang="en-US" sz="1400" dirty="0" err="1" smtClean="0"/>
+              <a:t>anotherhost.com</a:t>
+            </a:r>
+            <a:endParaRPr lang="en-US" sz="1400" dirty="0"/>
+          </a:p>
+        </p:txBody>
+      </p:sp>
+      <p:sp>
+        <p:nvSpPr>
+          <p:cNvPr id="21" name="Curved Left Arrow 20"/>
+          <p:cNvSpPr/>
+          <p:nvPr/>
+        </p:nvSpPr>
+        <p:spPr>
+          <a:xfrm>
+            <a:off x="6667011" y="4714334"/>
+            <a:ext cx="584200" cy="1302876"/>
+          </a:xfrm>
+          <a:prstGeom prst="curvedLeftArrow">
+            <a:avLst/>
+          </a:prstGeom>
+        </p:spPr>
+        <p:style>
+          <a:lnRef idx="1">
+            <a:schemeClr val="accent1"/>
+          </a:lnRef>
+          <a:fillRef idx="3">
+            <a:schemeClr val="accent1"/>
+          </a:fillRef>
+          <a:effectRef idx="2">
+            <a:schemeClr val="accent1"/>
+          </a:effectRef>
+          <a:fontRef idx="minor">
+            <a:schemeClr val="lt1"/>
+          </a:fontRef>
+        </p:style>
+        <p:txBody>
+          <a:bodyPr rtlCol="0" anchor="ctr"/>
+          <a:lstStyle/>
+          <a:p>
+            <a:pPr algn="ctr"/>
+            <a:endParaRPr lang="en-US">
+              <a:solidFill>
+                <a:schemeClr val="tx1"/>
+              </a:solidFill>
+            </a:endParaRPr>
+          </a:p>
+        </p:txBody>
+      </p:sp>
     </p:spTree>
     <p:extLst>
       <p:ext uri="{BB962C8B-B14F-4D97-AF65-F5344CB8AC3E}">
-        <p14:creationId xmlns:p14="http://schemas.microsoft.com/office/powerpoint/2010/main" val="3805536355"/>
+        <p14:creationId xmlns:p14="http://schemas.microsoft.com/office/powerpoint/2010/main" val="1916411446"/>
       </p:ext>
     </p:extLst>
   </p:cSld>
@@ -7756,14 +8612,12 @@
         </p:nvSpPr>
         <p:spPr/>
         <p:txBody>
-          <a:bodyPr>
-            <a:normAutofit fontScale="90000"/>
-          </a:bodyPr>
+          <a:bodyPr/>
           <a:lstStyle/>
           <a:p>
             <a:r>
               <a:rPr lang="en-US" dirty="0" smtClean="0"/>
-              <a:t>API’s for patient related information</a:t>
+              <a:t>HTTP overview</a:t>
             </a:r>
             <a:endParaRPr lang="en-US" dirty="0"/>
           </a:p>
@@ -7788,7 +8642,7 @@
           <a:p>
             <a:r>
               <a:rPr lang="en-US" dirty="0" smtClean="0"/>
-              <a:t>Introduction</a:t>
+              <a:t>Exercise 1</a:t>
             </a:r>
             <a:endParaRPr lang="en-US" dirty="0"/>
           </a:p>
@@ -7809,78 +8663,12 @@
           <a:bodyPr/>
           <a:lstStyle/>
           <a:p>
-            <a:r>
-              <a:rPr lang="en-US" sz="1800" dirty="0" smtClean="0"/>
-              <a:t>As opposed to the public API’s, not open data API’s</a:t>
-            </a:r>
-          </a:p>
-          <a:p>
-            <a:r>
-              <a:rPr lang="en-US" sz="1800" dirty="0" smtClean="0"/>
-              <a:t>Strong authentication of citizens</a:t>
-            </a:r>
-          </a:p>
-          <a:p>
-            <a:pPr lvl="1"/>
-            <a:r>
-              <a:rPr lang="en-US" sz="1800" dirty="0" smtClean="0"/>
-              <a:t>Demand from </a:t>
-            </a:r>
-            <a:r>
-              <a:rPr lang="en-US" sz="1800" dirty="0" err="1" smtClean="0"/>
-              <a:t>Datainspektionen</a:t>
-            </a:r>
-            <a:endParaRPr lang="en-US" sz="1800" dirty="0" smtClean="0"/>
-          </a:p>
-          <a:p>
-            <a:pPr lvl="1"/>
-            <a:r>
-              <a:rPr lang="en-US" sz="1800" dirty="0" smtClean="0"/>
-              <a:t>2 factor</a:t>
-            </a:r>
-          </a:p>
-          <a:p>
-            <a:r>
-              <a:rPr lang="en-US" sz="1800" dirty="0" smtClean="0"/>
-              <a:t>Strong authentication of API clients</a:t>
-            </a:r>
-          </a:p>
-          <a:p>
-            <a:pPr lvl="1"/>
-            <a:r>
-              <a:rPr lang="en-US" sz="1800" dirty="0" smtClean="0"/>
-              <a:t>SSL/TLS certificate issued by trusted CA</a:t>
-            </a:r>
-          </a:p>
-          <a:p>
-            <a:pPr lvl="1"/>
-            <a:r>
-              <a:rPr lang="en-US" sz="1800" dirty="0" smtClean="0"/>
-              <a:t>Mutual </a:t>
-            </a:r>
-            <a:r>
-              <a:rPr lang="en-US" sz="1800" dirty="0" err="1" smtClean="0"/>
-              <a:t>authenticaton</a:t>
-            </a:r>
-            <a:endParaRPr lang="en-US" sz="1800" dirty="0" smtClean="0"/>
-          </a:p>
-          <a:p>
-            <a:r>
-              <a:rPr lang="en-US" sz="1800" dirty="0" smtClean="0"/>
-              <a:t>Strict authorization control</a:t>
-            </a:r>
-          </a:p>
-          <a:p>
-            <a:pPr lvl="1"/>
-            <a:r>
-              <a:rPr lang="en-US" sz="1600" dirty="0" smtClean="0"/>
-              <a:t>Citizen approved </a:t>
-            </a:r>
-          </a:p>
-          <a:p>
-            <a:r>
-              <a:rPr lang="en-US" sz="1800" dirty="0" smtClean="0"/>
-              <a:t>So what’s the problem???</a:t>
+            <a:pPr marL="0" indent="0">
+              <a:buNone/>
+            </a:pPr>
+            <a:r>
+              <a:rPr lang="en-US" dirty="0" smtClean="0"/>
+              <a:t>Use Curl to make http requests against public data API</a:t>
             </a:r>
           </a:p>
         </p:txBody>
@@ -7917,7 +8705,7 @@
     </p:spTree>
     <p:extLst>
       <p:ext uri="{BB962C8B-B14F-4D97-AF65-F5344CB8AC3E}">
-        <p14:creationId xmlns:p14="http://schemas.microsoft.com/office/powerpoint/2010/main" val="910791665"/>
+        <p14:creationId xmlns:p14="http://schemas.microsoft.com/office/powerpoint/2010/main" val="3805536355"/>
       </p:ext>
     </p:extLst>
   </p:cSld>
@@ -7969,9 +8757,10 @@
           <a:lstStyle/>
           <a:p>
             <a:r>
-              <a:rPr lang="en-US" dirty="0"/>
+              <a:rPr lang="en-US" dirty="0" smtClean="0"/>
               <a:t>API’s for patient related information</a:t>
             </a:r>
+            <a:endParaRPr lang="en-US" dirty="0"/>
           </a:p>
         </p:txBody>
       </p:sp>
@@ -7994,7 +8783,7 @@
           <a:p>
             <a:r>
               <a:rPr lang="en-US" dirty="0" smtClean="0"/>
-              <a:t>The problem</a:t>
+              <a:t>Introduction</a:t>
             </a:r>
             <a:endParaRPr lang="en-US" dirty="0"/>
           </a:p>
@@ -8010,21 +8799,84 @@
             <p:ph type="body" sz="quarter" idx="13"/>
           </p:nvPr>
         </p:nvSpPr>
-        <p:spPr>
-          <a:ln w="38100" cmpd="sng">
-            <a:solidFill>
-              <a:srgbClr val="4F81BD"/>
-            </a:solidFill>
-          </a:ln>
-        </p:spPr>
+        <p:spPr/>
         <p:txBody>
           <a:bodyPr/>
           <a:lstStyle/>
           <a:p>
-            <a:pPr marL="0" indent="0">
-              <a:buNone/>
-            </a:pPr>
-            <a:endParaRPr lang="en-US" sz="1400" dirty="0"/>
+            <a:r>
+              <a:rPr lang="en-US" sz="1800" dirty="0" smtClean="0"/>
+              <a:t>As opposed to the public API’s, not open data API’s</a:t>
+            </a:r>
+          </a:p>
+          <a:p>
+            <a:r>
+              <a:rPr lang="en-US" sz="1800" dirty="0" smtClean="0"/>
+              <a:t>Strong authentication of citizens</a:t>
+            </a:r>
+          </a:p>
+          <a:p>
+            <a:pPr lvl="1"/>
+            <a:r>
+              <a:rPr lang="en-US" sz="1800" dirty="0" smtClean="0"/>
+              <a:t>Demand from </a:t>
+            </a:r>
+            <a:r>
+              <a:rPr lang="en-US" sz="1800" dirty="0" err="1" smtClean="0"/>
+              <a:t>Datainspektionen</a:t>
+            </a:r>
+            <a:endParaRPr lang="en-US" sz="1800" dirty="0" smtClean="0"/>
+          </a:p>
+          <a:p>
+            <a:pPr lvl="1"/>
+            <a:r>
+              <a:rPr lang="en-US" sz="1800" dirty="0" smtClean="0"/>
+              <a:t>2 factor</a:t>
+            </a:r>
+          </a:p>
+          <a:p>
+            <a:r>
+              <a:rPr lang="en-US" sz="1800" dirty="0" smtClean="0"/>
+              <a:t>Strong authentication of API clients</a:t>
+            </a:r>
+          </a:p>
+          <a:p>
+            <a:pPr lvl="1"/>
+            <a:r>
+              <a:rPr lang="en-US" sz="1800" dirty="0" smtClean="0"/>
+              <a:t>SSL/TLS certificate issued by trusted CA</a:t>
+            </a:r>
+          </a:p>
+          <a:p>
+            <a:pPr lvl="1"/>
+            <a:r>
+              <a:rPr lang="en-US" sz="1800" dirty="0" smtClean="0"/>
+              <a:t>Mutual </a:t>
+            </a:r>
+            <a:r>
+              <a:rPr lang="en-US" sz="1800" dirty="0" err="1" smtClean="0"/>
+              <a:t>authenticaton</a:t>
+            </a:r>
+            <a:endParaRPr lang="en-US" sz="1800" dirty="0" smtClean="0"/>
+          </a:p>
+          <a:p>
+            <a:r>
+              <a:rPr lang="en-US" sz="1800" dirty="0" smtClean="0"/>
+              <a:t>Strict authorization control</a:t>
+            </a:r>
+          </a:p>
+          <a:p>
+            <a:pPr lvl="1"/>
+            <a:r>
+              <a:rPr lang="en-US" sz="1600" dirty="0" smtClean="0"/>
+              <a:t>Citizen approved </a:t>
+            </a:r>
+          </a:p>
+          <a:p>
+            <a:r>
+              <a:rPr lang="en-US" sz="1800" dirty="0" smtClean="0"/>
+              <a:t>So what’s the problem???</a:t>
+            </a:r>
           </a:p>
         </p:txBody>
       </p:sp>
@@ -8052,6 +8904,149 @@
                 <a:defRPr/>
               </a:pPr>
               <a:t>13</a:t>
+            </a:fld>
+            <a:endParaRPr lang="sv-SE"/>
+          </a:p>
+        </p:txBody>
+      </p:sp>
+    </p:spTree>
+    <p:extLst>
+      <p:ext uri="{BB962C8B-B14F-4D97-AF65-F5344CB8AC3E}">
+        <p14:creationId xmlns:p14="http://schemas.microsoft.com/office/powerpoint/2010/main" val="910791665"/>
+      </p:ext>
+    </p:extLst>
+  </p:cSld>
+  <p:clrMapOvr>
+    <a:masterClrMapping/>
+  </p:clrMapOvr>
+  <p:timing>
+    <p:tnLst>
+      <p:par>
+        <p:cTn xmlns:p14="http://schemas.microsoft.com/office/powerpoint/2010/main" id="1" dur="indefinite" restart="never" nodeType="tmRoot"/>
+      </p:par>
+    </p:tnLst>
+  </p:timing>
+</p:sld>
+</file>
+
+<file path=ppt/slides/slide14.xml><?xml version="1.0" encoding="utf-8"?>
+<p:sld xmlns:a="http://schemas.openxmlformats.org/drawingml/2006/main" xmlns:r="http://schemas.openxmlformats.org/officeDocument/2006/relationships" xmlns:p="http://schemas.openxmlformats.org/presentationml/2006/main">
+  <p:cSld>
+    <p:spTree>
+      <p:nvGrpSpPr>
+        <p:cNvPr id="1" name=""/>
+        <p:cNvGrpSpPr/>
+        <p:nvPr/>
+      </p:nvGrpSpPr>
+      <p:grpSpPr>
+        <a:xfrm>
+          <a:off x="0" y="0"/>
+          <a:ext cx="0" cy="0"/>
+          <a:chOff x="0" y="0"/>
+          <a:chExt cx="0" cy="0"/>
+        </a:xfrm>
+      </p:grpSpPr>
+      <p:sp>
+        <p:nvSpPr>
+          <p:cNvPr id="2" name="Title 1"/>
+          <p:cNvSpPr>
+            <a:spLocks noGrp="1"/>
+          </p:cNvSpPr>
+          <p:nvPr>
+            <p:ph type="ctrTitle"/>
+          </p:nvPr>
+        </p:nvSpPr>
+        <p:spPr/>
+        <p:txBody>
+          <a:bodyPr>
+            <a:normAutofit fontScale="90000"/>
+          </a:bodyPr>
+          <a:lstStyle/>
+          <a:p>
+            <a:r>
+              <a:rPr lang="en-US" dirty="0"/>
+              <a:t>API’s for patient related information</a:t>
+            </a:r>
+          </a:p>
+        </p:txBody>
+      </p:sp>
+      <p:sp>
+        <p:nvSpPr>
+          <p:cNvPr id="3" name="Subtitle 2"/>
+          <p:cNvSpPr>
+            <a:spLocks noGrp="1"/>
+          </p:cNvSpPr>
+          <p:nvPr>
+            <p:ph type="subTitle" idx="1"/>
+          </p:nvPr>
+        </p:nvSpPr>
+        <p:spPr/>
+        <p:txBody>
+          <a:bodyPr>
+            <a:normAutofit fontScale="92500" lnSpcReduction="10000"/>
+          </a:bodyPr>
+          <a:lstStyle/>
+          <a:p>
+            <a:r>
+              <a:rPr lang="en-US" dirty="0" smtClean="0"/>
+              <a:t>The problem</a:t>
+            </a:r>
+            <a:endParaRPr lang="en-US" dirty="0"/>
+          </a:p>
+        </p:txBody>
+      </p:sp>
+      <p:sp>
+        <p:nvSpPr>
+          <p:cNvPr id="4" name="Text Placeholder 3"/>
+          <p:cNvSpPr>
+            <a:spLocks noGrp="1"/>
+          </p:cNvSpPr>
+          <p:nvPr>
+            <p:ph type="body" sz="quarter" idx="13"/>
+          </p:nvPr>
+        </p:nvSpPr>
+        <p:spPr>
+          <a:ln w="38100" cmpd="sng">
+            <a:solidFill>
+              <a:srgbClr val="4F81BD"/>
+            </a:solidFill>
+          </a:ln>
+        </p:spPr>
+        <p:txBody>
+          <a:bodyPr/>
+          <a:lstStyle/>
+          <a:p>
+            <a:pPr marL="0" indent="0">
+              <a:buNone/>
+            </a:pPr>
+            <a:endParaRPr lang="en-US" sz="1400" dirty="0"/>
+          </a:p>
+        </p:txBody>
+      </p:sp>
+      <p:sp>
+        <p:nvSpPr>
+          <p:cNvPr id="5" name="Slide Number Placeholder 4"/>
+          <p:cNvSpPr>
+            <a:spLocks noGrp="1"/>
+          </p:cNvSpPr>
+          <p:nvPr>
+            <p:ph type="sldNum" sz="quarter" idx="14"/>
+          </p:nvPr>
+        </p:nvSpPr>
+        <p:spPr/>
+        <p:txBody>
+          <a:bodyPr/>
+          <a:lstStyle/>
+          <a:p>
+            <a:pPr>
+              <a:defRPr/>
+            </a:pPr>
+            <a:fld id="{4AA01602-B999-AA4E-80A6-B21CED3A9C3C}" type="slidenum">
+              <a:rPr lang="sv-SE" smtClean="0"/>
+              <a:pPr>
+                <a:defRPr/>
+              </a:pPr>
+              <a:t>14</a:t>
             </a:fld>
             <a:endParaRPr lang="sv-SE"/>
           </a:p>
@@ -8753,7 +9748,7 @@
 </p:sld>
 </file>
 
-<file path=ppt/slides/slide14.xml><?xml version="1.0" encoding="utf-8"?>
+<file path=ppt/slides/slide15.xml><?xml version="1.0" encoding="utf-8"?>
 <p:sld xmlns:a="http://schemas.openxmlformats.org/drawingml/2006/main" xmlns:r="http://schemas.openxmlformats.org/officeDocument/2006/relationships" xmlns:p="http://schemas.openxmlformats.org/presentationml/2006/main">
   <p:cSld>
     <p:spTree>
@@ -8911,7 +9906,7 @@
               <a:pPr>
                 <a:defRPr/>
               </a:pPr>
-              <a:t>14</a:t>
+              <a:t>15</a:t>
             </a:fld>
             <a:endParaRPr lang="sv-SE"/>
           </a:p>
@@ -8937,7 +9932,7 @@
 </p:sld>
 </file>
 
-<file path=ppt/slides/slide15.xml><?xml version="1.0" encoding="utf-8"?>
+<file path=ppt/slides/slide16.xml><?xml version="1.0" encoding="utf-8"?>
 <p:sld xmlns:a="http://schemas.openxmlformats.org/drawingml/2006/main" xmlns:r="http://schemas.openxmlformats.org/officeDocument/2006/relationships" xmlns:p="http://schemas.openxmlformats.org/presentationml/2006/main">
   <p:cSld>
     <p:spTree>
@@ -9052,7 +10047,7 @@
               <a:pPr>
                 <a:defRPr/>
               </a:pPr>
-              <a:t>15</a:t>
+              <a:t>16</a:t>
             </a:fld>
             <a:endParaRPr lang="sv-SE"/>
           </a:p>
@@ -9489,7 +10484,7 @@
 </p:sld>
 </file>
 
-<file path=ppt/slides/slide16.xml><?xml version="1.0" encoding="utf-8"?>
+<file path=ppt/slides/slide17.xml><?xml version="1.0" encoding="utf-8"?>
 <p:sld xmlns:a="http://schemas.openxmlformats.org/drawingml/2006/main" xmlns:r="http://schemas.openxmlformats.org/officeDocument/2006/relationships" xmlns:p="http://schemas.openxmlformats.org/presentationml/2006/main">
   <p:cSld>
     <p:spTree>
@@ -9604,7 +10599,7 @@
               <a:pPr>
                 <a:defRPr/>
               </a:pPr>
-              <a:t>16</a:t>
+              <a:t>17</a:t>
             </a:fld>
             <a:endParaRPr lang="sv-SE"/>
           </a:p>
@@ -9660,7 +10655,7 @@
 </p:sld>
 </file>
 
-<file path=ppt/slides/slide17.xml><?xml version="1.0" encoding="utf-8"?>
+<file path=ppt/slides/slide18.xml><?xml version="1.0" encoding="utf-8"?>
 <p:sld xmlns:a="http://schemas.openxmlformats.org/drawingml/2006/main" xmlns:r="http://schemas.openxmlformats.org/officeDocument/2006/relationships" xmlns:p="http://schemas.openxmlformats.org/presentationml/2006/main">
   <p:cSld>
     <p:spTree>
@@ -9789,7 +10784,7 @@
               <a:pPr>
                 <a:defRPr/>
               </a:pPr>
-              <a:t>17</a:t>
+              <a:t>18</a:t>
             </a:fld>
             <a:endParaRPr lang="sv-SE"/>
           </a:p>
@@ -9815,7 +10810,7 @@
 </p:sld>
 </file>
 
-<file path=ppt/slides/slide18.xml><?xml version="1.0" encoding="utf-8"?>
+<file path=ppt/slides/slide19.xml><?xml version="1.0" encoding="utf-8"?>
 <p:sld xmlns:a="http://schemas.openxmlformats.org/drawingml/2006/main" xmlns:r="http://schemas.openxmlformats.org/officeDocument/2006/relationships" xmlns:p="http://schemas.openxmlformats.org/presentationml/2006/main">
   <p:cSld>
     <p:spTree>
@@ -9918,7 +10913,7 @@
               <a:pPr>
                 <a:defRPr/>
               </a:pPr>
-              <a:t>18</a:t>
+              <a:t>19</a:t>
             </a:fld>
             <a:endParaRPr lang="sv-SE"/>
           </a:p>
@@ -9974,159 +10969,6 @@
 </p:sld>
 </file>
 
-<file path=ppt/slides/slide19.xml><?xml version="1.0" encoding="utf-8"?>
-<p:sld xmlns:a="http://schemas.openxmlformats.org/drawingml/2006/main" xmlns:r="http://schemas.openxmlformats.org/officeDocument/2006/relationships" xmlns:p="http://schemas.openxmlformats.org/presentationml/2006/main">
-  <p:cSld>
-    <p:spTree>
-      <p:nvGrpSpPr>
-        <p:cNvPr id="1" name=""/>
-        <p:cNvGrpSpPr/>
-        <p:nvPr/>
-      </p:nvGrpSpPr>
-      <p:grpSpPr>
-        <a:xfrm>
-          <a:off x="0" y="0"/>
-          <a:ext cx="0" cy="0"/>
-          <a:chOff x="0" y="0"/>
-          <a:chExt cx="0" cy="0"/>
-        </a:xfrm>
-      </p:grpSpPr>
-      <p:sp>
-        <p:nvSpPr>
-          <p:cNvPr id="2" name="Title 1"/>
-          <p:cNvSpPr>
-            <a:spLocks noGrp="1"/>
-          </p:cNvSpPr>
-          <p:nvPr>
-            <p:ph type="ctrTitle"/>
-          </p:nvPr>
-        </p:nvSpPr>
-        <p:spPr/>
-        <p:txBody>
-          <a:bodyPr/>
-          <a:lstStyle/>
-          <a:p>
-            <a:r>
-              <a:rPr lang="en-US" dirty="0" smtClean="0"/>
-              <a:t>Backend</a:t>
-            </a:r>
-            <a:endParaRPr lang="en-US" dirty="0"/>
-          </a:p>
-        </p:txBody>
-      </p:sp>
-      <p:sp>
-        <p:nvSpPr>
-          <p:cNvPr id="3" name="Subtitle 2"/>
-          <p:cNvSpPr>
-            <a:spLocks noGrp="1"/>
-          </p:cNvSpPr>
-          <p:nvPr>
-            <p:ph type="subTitle" idx="1"/>
-          </p:nvPr>
-        </p:nvSpPr>
-        <p:spPr/>
-        <p:txBody>
-          <a:bodyPr>
-            <a:normAutofit fontScale="92500" lnSpcReduction="10000"/>
-          </a:bodyPr>
-          <a:lstStyle/>
-          <a:p>
-            <a:r>
-              <a:rPr lang="en-US" dirty="0" smtClean="0"/>
-              <a:t>Exercise </a:t>
-            </a:r>
-            <a:r>
-              <a:rPr lang="en-US" dirty="0"/>
-              <a:t>4</a:t>
-            </a:r>
-          </a:p>
-        </p:txBody>
-      </p:sp>
-      <p:sp>
-        <p:nvSpPr>
-          <p:cNvPr id="4" name="Text Placeholder 3"/>
-          <p:cNvSpPr>
-            <a:spLocks noGrp="1"/>
-          </p:cNvSpPr>
-          <p:nvPr>
-            <p:ph type="body" sz="quarter" idx="13"/>
-          </p:nvPr>
-        </p:nvSpPr>
-        <p:spPr/>
-        <p:txBody>
-          <a:bodyPr/>
-          <a:lstStyle/>
-          <a:p>
-            <a:pPr marL="0" indent="0">
-              <a:buNone/>
-            </a:pPr>
-            <a:r>
-              <a:rPr lang="en-US" dirty="0" smtClean="0"/>
-              <a:t>Build the app backend to handle the </a:t>
-            </a:r>
-            <a:r>
-              <a:rPr lang="en-US" dirty="0" err="1" smtClean="0"/>
-              <a:t>OAuth</a:t>
-            </a:r>
-            <a:r>
-              <a:rPr lang="en-US" dirty="0" smtClean="0"/>
-              <a:t> 2.0 integration with SDK and to provide an API for the app. </a:t>
-            </a:r>
-          </a:p>
-          <a:p>
-            <a:endParaRPr lang="en-US" dirty="0" smtClean="0"/>
-          </a:p>
-        </p:txBody>
-      </p:sp>
-      <p:sp>
-        <p:nvSpPr>
-          <p:cNvPr id="5" name="Slide Number Placeholder 4"/>
-          <p:cNvSpPr>
-            <a:spLocks noGrp="1"/>
-          </p:cNvSpPr>
-          <p:nvPr>
-            <p:ph type="sldNum" sz="quarter" idx="14"/>
-          </p:nvPr>
-        </p:nvSpPr>
-        <p:spPr/>
-        <p:txBody>
-          <a:bodyPr/>
-          <a:lstStyle/>
-          <a:p>
-            <a:pPr>
-              <a:defRPr/>
-            </a:pPr>
-            <a:fld id="{4AA01602-B999-AA4E-80A6-B21CED3A9C3C}" type="slidenum">
-              <a:rPr lang="sv-SE" smtClean="0"/>
-              <a:pPr>
-                <a:defRPr/>
-              </a:pPr>
-              <a:t>19</a:t>
-            </a:fld>
-            <a:endParaRPr lang="sv-SE"/>
-          </a:p>
-        </p:txBody>
-      </p:sp>
-    </p:spTree>
-    <p:extLst>
-      <p:ext uri="{BB962C8B-B14F-4D97-AF65-F5344CB8AC3E}">
-        <p14:creationId xmlns:p14="http://schemas.microsoft.com/office/powerpoint/2010/main" val="3668199394"/>
-      </p:ext>
-    </p:extLst>
-  </p:cSld>
-  <p:clrMapOvr>
-    <a:masterClrMapping/>
-  </p:clrMapOvr>
-  <p:timing>
-    <p:tnLst>
-      <p:par>
-        <p:cTn xmlns:p14="http://schemas.microsoft.com/office/powerpoint/2010/main" id="1" dur="indefinite" restart="never" nodeType="tmRoot"/>
-      </p:par>
-    </p:tnLst>
-  </p:timing>
-</p:sld>
-</file>
-
 <file path=ppt/slides/slide2.xml><?xml version="1.0" encoding="utf-8"?>
 <p:sld xmlns:a="http://schemas.openxmlformats.org/drawingml/2006/main" xmlns:r="http://schemas.openxmlformats.org/officeDocument/2006/relationships" xmlns:p="http://schemas.openxmlformats.org/presentationml/2006/main">
   <p:cSld>
@@ -10300,7 +11142,7 @@
           <a:p>
             <a:r>
               <a:rPr lang="en-US" dirty="0" smtClean="0"/>
-              <a:t>Frontend</a:t>
+              <a:t>Backend</a:t>
             </a:r>
             <a:endParaRPr lang="en-US" dirty="0"/>
           </a:p>
@@ -10323,7 +11165,14 @@
           </a:bodyPr>
           <a:lstStyle/>
           <a:p>
-            <a:endParaRPr lang="en-US" dirty="0"/>
+            <a:r>
+              <a:rPr lang="en-US" dirty="0" smtClean="0"/>
+              <a:t>Exercise </a:t>
+            </a:r>
+            <a:r>
+              <a:rPr lang="en-US" dirty="0"/>
+              <a:t>4</a:t>
+            </a:r>
           </a:p>
         </p:txBody>
       </p:sp>
@@ -10347,20 +11196,19 @@
             </a:pPr>
             <a:r>
               <a:rPr lang="en-US" dirty="0" smtClean="0"/>
-              <a:t>Frontend technologies</a:t>
-            </a:r>
-          </a:p>
-          <a:p>
+              <a:t>Build the app backend to handle the </a:t>
+            </a:r>
+            <a:r>
+              <a:rPr lang="en-US" dirty="0" err="1" smtClean="0"/>
+              <a:t>OAuth</a:t>
+            </a:r>
             <a:r>
               <a:rPr lang="en-US" dirty="0" smtClean="0"/>
-              <a:t>What’s happening on the frontend</a:t>
-            </a:r>
-          </a:p>
-          <a:p>
-            <a:r>
-              <a:rPr lang="en-US" dirty="0" smtClean="0"/>
-              <a:t>Short intro to Backbone</a:t>
-            </a:r>
+              <a:t> 2.0 integration with SDK and to provide an API for the app. </a:t>
+            </a:r>
+          </a:p>
+          <a:p>
+            <a:endParaRPr lang="en-US" dirty="0" smtClean="0"/>
           </a:p>
         </p:txBody>
       </p:sp>
@@ -10396,7 +11244,7 @@
     </p:spTree>
     <p:extLst>
       <p:ext uri="{BB962C8B-B14F-4D97-AF65-F5344CB8AC3E}">
-        <p14:creationId xmlns:p14="http://schemas.microsoft.com/office/powerpoint/2010/main" val="3753766513"/>
+        <p14:creationId xmlns:p14="http://schemas.microsoft.com/office/powerpoint/2010/main" val="3668199394"/>
       </p:ext>
     </p:extLst>
   </p:cSld>
@@ -10470,14 +11318,7 @@
           </a:bodyPr>
           <a:lstStyle/>
           <a:p>
-            <a:r>
-              <a:rPr lang="en-US" dirty="0" smtClean="0"/>
-              <a:t>Exercise </a:t>
-            </a:r>
-            <a:r>
-              <a:rPr lang="en-US" dirty="0"/>
-              <a:t>5</a:t>
-            </a:r>
+            <a:endParaRPr lang="en-US" dirty="0"/>
           </a:p>
         </p:txBody>
       </p:sp>
@@ -10501,17 +11342,20 @@
             </a:pPr>
             <a:r>
               <a:rPr lang="en-US" dirty="0" smtClean="0"/>
-              <a:t>Build a simple client that use the API provided by the backend. </a:t>
+              <a:t>Frontend technologies</a:t>
             </a:r>
           </a:p>
           <a:p>
             <a:r>
               <a:rPr lang="en-US" dirty="0" smtClean="0"/>
-              <a:t>Login user to create a session</a:t>
-            </a:r>
-          </a:p>
-          <a:p>
-            <a:endParaRPr lang="en-US" dirty="0" smtClean="0"/>
+              <a:t>What’s happening on the frontend</a:t>
+            </a:r>
+          </a:p>
+          <a:p>
+            <a:r>
+              <a:rPr lang="en-US" dirty="0" smtClean="0"/>
+              <a:t>Short intro to Backbone</a:t>
+            </a:r>
           </a:p>
         </p:txBody>
       </p:sp>
@@ -10547,7 +11391,7 @@
     </p:spTree>
     <p:extLst>
       <p:ext uri="{BB962C8B-B14F-4D97-AF65-F5344CB8AC3E}">
-        <p14:creationId xmlns:p14="http://schemas.microsoft.com/office/powerpoint/2010/main" val="3598812586"/>
+        <p14:creationId xmlns:p14="http://schemas.microsoft.com/office/powerpoint/2010/main" val="3753766513"/>
       </p:ext>
     </p:extLst>
   </p:cSld>
@@ -10598,7 +11442,7 @@
           <a:p>
             <a:r>
               <a:rPr lang="en-US" dirty="0" smtClean="0"/>
-              <a:t>Links</a:t>
+              <a:t>Frontend</a:t>
             </a:r>
             <a:endParaRPr lang="en-US" dirty="0"/>
           </a:p>
@@ -10621,7 +11465,14 @@
           </a:bodyPr>
           <a:lstStyle/>
           <a:p>
-            <a:endParaRPr lang="en-US"/>
+            <a:r>
+              <a:rPr lang="en-US" dirty="0" smtClean="0"/>
+              <a:t>Exercise </a:t>
+            </a:r>
+            <a:r>
+              <a:rPr lang="en-US" dirty="0"/>
+              <a:t>5</a:t>
+            </a:r>
           </a:p>
         </p:txBody>
       </p:sp>
@@ -10643,137 +11494,19 @@
             <a:pPr marL="0" indent="0">
               <a:buNone/>
             </a:pPr>
-            <a:endParaRPr lang="en-US" sz="1800" dirty="0" smtClean="0">
-              <a:hlinkClick r:id="rId2"/>
-            </a:endParaRPr>
-          </a:p>
-          <a:p>
-            <a:pPr marL="0" indent="0">
-              <a:buNone/>
-            </a:pPr>
-            <a:r>
-              <a:rPr lang="en-US" sz="1800" dirty="0"/>
-              <a:t>http://</a:t>
-            </a:r>
-            <a:r>
-              <a:rPr lang="en-US" sz="1800" dirty="0" err="1"/>
-              <a:t>www.vinnova.se</a:t>
-            </a:r>
-            <a:r>
-              <a:rPr lang="en-US" sz="1800" dirty="0" smtClean="0"/>
-              <a:t>/</a:t>
-            </a:r>
-            <a:endParaRPr lang="en-US" sz="1800" dirty="0" smtClean="0">
-              <a:hlinkClick r:id="rId2"/>
-            </a:endParaRPr>
-          </a:p>
-          <a:p>
-            <a:pPr marL="0" indent="0">
-              <a:buNone/>
-            </a:pPr>
-            <a:r>
-              <a:rPr lang="en-US" sz="1800" dirty="0">
-                <a:hlinkClick r:id="rId2"/>
-              </a:rPr>
-              <a:t>http://sdk.minavardkontakter.se</a:t>
-            </a:r>
-            <a:r>
-              <a:rPr lang="en-US" sz="1800" dirty="0" smtClean="0">
-                <a:hlinkClick r:id="rId2"/>
-              </a:rPr>
-              <a:t>/</a:t>
-            </a:r>
-          </a:p>
-          <a:p>
-            <a:pPr marL="0" indent="0">
-              <a:buNone/>
-            </a:pPr>
-            <a:r>
-              <a:rPr lang="en-US" sz="1800" dirty="0">
-                <a:hlinkClick r:id="rId2"/>
-              </a:rPr>
-              <a:t>http://oauth.net/2</a:t>
-            </a:r>
-            <a:r>
-              <a:rPr lang="en-US" sz="1800" dirty="0" smtClean="0">
-                <a:hlinkClick r:id="rId2"/>
-              </a:rPr>
-              <a:t>/</a:t>
-            </a:r>
-          </a:p>
-          <a:p>
-            <a:pPr marL="0" indent="0">
-              <a:buNone/>
-            </a:pPr>
-            <a:r>
-              <a:rPr lang="en-US" sz="1800" dirty="0">
-                <a:hlinkClick r:id="rId2"/>
-              </a:rPr>
-              <a:t>http://tools.ietf.org/html/draft-ietf-oauth-v2-31</a:t>
-            </a:r>
-            <a:endParaRPr lang="en-US" sz="1800" dirty="0" smtClean="0">
-              <a:hlinkClick r:id="rId2"/>
-            </a:endParaRPr>
-          </a:p>
-          <a:p>
-            <a:pPr marL="0" indent="0">
-              <a:buNone/>
-            </a:pPr>
-            <a:r>
-              <a:rPr lang="en-US" sz="1800" dirty="0" smtClean="0">
-                <a:hlinkClick r:id="rId2"/>
-              </a:rPr>
-              <a:t>https</a:t>
-            </a:r>
-            <a:r>
-              <a:rPr lang="en-US" sz="1800" dirty="0">
-                <a:hlinkClick r:id="rId2"/>
-              </a:rPr>
-              <a:t>://developers.google.com/accounts/docs/</a:t>
-            </a:r>
-            <a:r>
-              <a:rPr lang="en-US" sz="1800" dirty="0" smtClean="0">
-                <a:hlinkClick r:id="rId2"/>
-              </a:rPr>
-              <a:t>OAuth2</a:t>
-            </a:r>
-            <a:endParaRPr lang="en-US" sz="1800" dirty="0" smtClean="0"/>
-          </a:p>
-          <a:p>
-            <a:pPr marL="0" indent="0">
-              <a:buNone/>
-            </a:pPr>
-            <a:r>
-              <a:rPr lang="en-US" sz="1800" dirty="0">
-                <a:hlinkClick r:id="rId3"/>
-              </a:rPr>
-              <a:t>https://developers.facebook.com/docs/reference/dialogs/oauth</a:t>
-            </a:r>
-            <a:r>
-              <a:rPr lang="en-US" sz="1800" dirty="0" smtClean="0">
-                <a:hlinkClick r:id="rId3"/>
-              </a:rPr>
-              <a:t>/</a:t>
-            </a:r>
-            <a:endParaRPr lang="en-US" sz="1800" dirty="0" smtClean="0"/>
-          </a:p>
-          <a:p>
-            <a:pPr marL="0" indent="0">
-              <a:buNone/>
-            </a:pPr>
-            <a:endParaRPr lang="en-US" sz="1800" dirty="0" smtClean="0"/>
-          </a:p>
-          <a:p>
-            <a:pPr marL="0" indent="0">
-              <a:buNone/>
-            </a:pPr>
-            <a:endParaRPr lang="en-US" sz="1800" dirty="0"/>
-          </a:p>
-          <a:p>
-            <a:pPr marL="0" indent="0">
-              <a:buNone/>
-            </a:pPr>
-            <a:endParaRPr lang="en-US" sz="1800" dirty="0"/>
+            <a:r>
+              <a:rPr lang="en-US" dirty="0" smtClean="0"/>
+              <a:t>Build a simple client that use the API provided by the backend. </a:t>
+            </a:r>
+          </a:p>
+          <a:p>
+            <a:r>
+              <a:rPr lang="en-US" dirty="0" smtClean="0"/>
+              <a:t>Login user to create a session</a:t>
+            </a:r>
+          </a:p>
+          <a:p>
+            <a:endParaRPr lang="en-US" dirty="0" smtClean="0"/>
           </a:p>
         </p:txBody>
       </p:sp>
@@ -10801,6 +11534,268 @@
                 <a:defRPr/>
               </a:pPr>
               <a:t>22</a:t>
+            </a:fld>
+            <a:endParaRPr lang="sv-SE"/>
+          </a:p>
+        </p:txBody>
+      </p:sp>
+    </p:spTree>
+    <p:extLst>
+      <p:ext uri="{BB962C8B-B14F-4D97-AF65-F5344CB8AC3E}">
+        <p14:creationId xmlns:p14="http://schemas.microsoft.com/office/powerpoint/2010/main" val="3598812586"/>
+      </p:ext>
+    </p:extLst>
+  </p:cSld>
+  <p:clrMapOvr>
+    <a:masterClrMapping/>
+  </p:clrMapOvr>
+  <p:timing>
+    <p:tnLst>
+      <p:par>
+        <p:cTn xmlns:p14="http://schemas.microsoft.com/office/powerpoint/2010/main" id="1" dur="indefinite" restart="never" nodeType="tmRoot"/>
+      </p:par>
+    </p:tnLst>
+  </p:timing>
+</p:sld>
+</file>
+
+<file path=ppt/slides/slide23.xml><?xml version="1.0" encoding="utf-8"?>
+<p:sld xmlns:a="http://schemas.openxmlformats.org/drawingml/2006/main" xmlns:r="http://schemas.openxmlformats.org/officeDocument/2006/relationships" xmlns:p="http://schemas.openxmlformats.org/presentationml/2006/main">
+  <p:cSld>
+    <p:spTree>
+      <p:nvGrpSpPr>
+        <p:cNvPr id="1" name=""/>
+        <p:cNvGrpSpPr/>
+        <p:nvPr/>
+      </p:nvGrpSpPr>
+      <p:grpSpPr>
+        <a:xfrm>
+          <a:off x="0" y="0"/>
+          <a:ext cx="0" cy="0"/>
+          <a:chOff x="0" y="0"/>
+          <a:chExt cx="0" cy="0"/>
+        </a:xfrm>
+      </p:grpSpPr>
+      <p:sp>
+        <p:nvSpPr>
+          <p:cNvPr id="2" name="Title 1"/>
+          <p:cNvSpPr>
+            <a:spLocks noGrp="1"/>
+          </p:cNvSpPr>
+          <p:nvPr>
+            <p:ph type="ctrTitle"/>
+          </p:nvPr>
+        </p:nvSpPr>
+        <p:spPr/>
+        <p:txBody>
+          <a:bodyPr/>
+          <a:lstStyle/>
+          <a:p>
+            <a:r>
+              <a:rPr lang="en-US" dirty="0" smtClean="0"/>
+              <a:t>Links</a:t>
+            </a:r>
+            <a:endParaRPr lang="en-US" dirty="0"/>
+          </a:p>
+        </p:txBody>
+      </p:sp>
+      <p:sp>
+        <p:nvSpPr>
+          <p:cNvPr id="3" name="Subtitle 2"/>
+          <p:cNvSpPr>
+            <a:spLocks noGrp="1"/>
+          </p:cNvSpPr>
+          <p:nvPr>
+            <p:ph type="subTitle" idx="1"/>
+          </p:nvPr>
+        </p:nvSpPr>
+        <p:spPr/>
+        <p:txBody>
+          <a:bodyPr>
+            <a:normAutofit fontScale="92500" lnSpcReduction="10000"/>
+          </a:bodyPr>
+          <a:lstStyle/>
+          <a:p>
+            <a:endParaRPr lang="en-US"/>
+          </a:p>
+        </p:txBody>
+      </p:sp>
+      <p:sp>
+        <p:nvSpPr>
+          <p:cNvPr id="4" name="Text Placeholder 3"/>
+          <p:cNvSpPr>
+            <a:spLocks noGrp="1"/>
+          </p:cNvSpPr>
+          <p:nvPr>
+            <p:ph type="body" sz="quarter" idx="13"/>
+          </p:nvPr>
+        </p:nvSpPr>
+        <p:spPr/>
+        <p:txBody>
+          <a:bodyPr/>
+          <a:lstStyle/>
+          <a:p>
+            <a:pPr marL="0" indent="0">
+              <a:buNone/>
+            </a:pPr>
+            <a:endParaRPr lang="en-US" sz="1800" dirty="0" smtClean="0">
+              <a:hlinkClick r:id="rId2"/>
+            </a:endParaRPr>
+          </a:p>
+          <a:p>
+            <a:pPr marL="0" indent="0">
+              <a:buNone/>
+            </a:pPr>
+            <a:r>
+              <a:rPr lang="en-US" sz="1800" dirty="0"/>
+              <a:t>http://</a:t>
+            </a:r>
+            <a:r>
+              <a:rPr lang="en-US" sz="1800" dirty="0" err="1"/>
+              <a:t>www.vinnova.se</a:t>
+            </a:r>
+            <a:r>
+              <a:rPr lang="en-US" sz="1800" dirty="0" smtClean="0"/>
+              <a:t>/</a:t>
+            </a:r>
+            <a:endParaRPr lang="en-US" sz="1800" dirty="0" smtClean="0">
+              <a:hlinkClick r:id="rId2"/>
+            </a:endParaRPr>
+          </a:p>
+          <a:p>
+            <a:pPr marL="0" indent="0">
+              <a:buNone/>
+            </a:pPr>
+            <a:r>
+              <a:rPr lang="en-US" sz="1800" dirty="0">
+                <a:hlinkClick r:id="rId2"/>
+              </a:rPr>
+              <a:t>http://sdk.minavardkontakter.se</a:t>
+            </a:r>
+            <a:r>
+              <a:rPr lang="en-US" sz="1800" dirty="0" smtClean="0">
+                <a:hlinkClick r:id="rId2"/>
+              </a:rPr>
+              <a:t>/</a:t>
+            </a:r>
+          </a:p>
+          <a:p>
+            <a:pPr marL="0" indent="0">
+              <a:buNone/>
+            </a:pPr>
+            <a:r>
+              <a:rPr lang="en-US" sz="1800" dirty="0">
+                <a:hlinkClick r:id="rId2"/>
+              </a:rPr>
+              <a:t>http://oauth.net/2</a:t>
+            </a:r>
+            <a:r>
+              <a:rPr lang="en-US" sz="1800" dirty="0" smtClean="0">
+                <a:hlinkClick r:id="rId2"/>
+              </a:rPr>
+              <a:t>/</a:t>
+            </a:r>
+          </a:p>
+          <a:p>
+            <a:pPr marL="0" indent="0">
+              <a:buNone/>
+            </a:pPr>
+            <a:r>
+              <a:rPr lang="en-US" sz="1800" dirty="0">
+                <a:hlinkClick r:id="rId2"/>
+              </a:rPr>
+              <a:t>http://tools.ietf.org/html/draft-ietf-oauth-v2-31</a:t>
+            </a:r>
+            <a:endParaRPr lang="en-US" sz="1800" dirty="0" smtClean="0">
+              <a:hlinkClick r:id="rId2"/>
+            </a:endParaRPr>
+          </a:p>
+          <a:p>
+            <a:pPr marL="0" indent="0">
+              <a:buNone/>
+            </a:pPr>
+            <a:r>
+              <a:rPr lang="en-US" sz="1800" dirty="0" smtClean="0">
+                <a:hlinkClick r:id="rId2"/>
+              </a:rPr>
+              <a:t>https</a:t>
+            </a:r>
+            <a:r>
+              <a:rPr lang="en-US" sz="1800" dirty="0">
+                <a:hlinkClick r:id="rId2"/>
+              </a:rPr>
+              <a:t>://developers.google.com/accounts/docs/</a:t>
+            </a:r>
+            <a:r>
+              <a:rPr lang="en-US" sz="1800" dirty="0" smtClean="0">
+                <a:hlinkClick r:id="rId2"/>
+              </a:rPr>
+              <a:t>OAuth2</a:t>
+            </a:r>
+            <a:endParaRPr lang="en-US" sz="1800" dirty="0" smtClean="0"/>
+          </a:p>
+          <a:p>
+            <a:pPr marL="0" indent="0">
+              <a:buNone/>
+            </a:pPr>
+            <a:r>
+              <a:rPr lang="en-US" sz="1800" dirty="0">
+                <a:hlinkClick r:id="rId3"/>
+              </a:rPr>
+              <a:t>https://developers.facebook.com/docs/reference/dialogs/oauth</a:t>
+            </a:r>
+            <a:r>
+              <a:rPr lang="en-US" sz="1800" dirty="0" smtClean="0">
+                <a:hlinkClick r:id="rId3"/>
+              </a:rPr>
+              <a:t>/</a:t>
+            </a:r>
+            <a:endParaRPr lang="en-US" sz="1800" dirty="0" smtClean="0"/>
+          </a:p>
+          <a:p>
+            <a:pPr marL="0" indent="0">
+              <a:buNone/>
+            </a:pPr>
+            <a:endParaRPr lang="en-US" sz="1800" dirty="0" smtClean="0"/>
+          </a:p>
+          <a:p>
+            <a:pPr marL="0" indent="0">
+              <a:buNone/>
+            </a:pPr>
+            <a:endParaRPr lang="en-US" sz="1800" dirty="0"/>
+          </a:p>
+          <a:p>
+            <a:pPr marL="0" indent="0">
+              <a:buNone/>
+            </a:pPr>
+            <a:endParaRPr lang="en-US" sz="1800" dirty="0"/>
+          </a:p>
+        </p:txBody>
+      </p:sp>
+      <p:sp>
+        <p:nvSpPr>
+          <p:cNvPr id="5" name="Slide Number Placeholder 4"/>
+          <p:cNvSpPr>
+            <a:spLocks noGrp="1"/>
+          </p:cNvSpPr>
+          <p:nvPr>
+            <p:ph type="sldNum" sz="quarter" idx="14"/>
+          </p:nvPr>
+        </p:nvSpPr>
+        <p:spPr/>
+        <p:txBody>
+          <a:bodyPr/>
+          <a:lstStyle/>
+          <a:p>
+            <a:pPr>
+              <a:defRPr/>
+            </a:pPr>
+            <a:fld id="{4AA01602-B999-AA4E-80A6-B21CED3A9C3C}" type="slidenum">
+              <a:rPr lang="sv-SE" smtClean="0"/>
+              <a:pPr>
+                <a:defRPr/>
+              </a:pPr>
+              <a:t>23</a:t>
             </a:fld>
             <a:endParaRPr lang="sv-SE"/>
           </a:p>
@@ -11836,21 +12831,50 @@
           <a:p>
             <a:pPr lvl="1"/>
             <a:r>
-              <a:rPr lang="en-US" sz="1800" dirty="0" smtClean="0"/>
+              <a:rPr lang="en-US" sz="1600" dirty="0" smtClean="0"/>
               <a:t>CRUD mappings based on best practices within REST community.</a:t>
             </a:r>
           </a:p>
           <a:p>
             <a:r>
-              <a:rPr lang="en-US" sz="1800" dirty="0" smtClean="0"/>
-              <a:t>URL</a:t>
-            </a:r>
+              <a:rPr lang="en-US" sz="1800" dirty="0"/>
+              <a:t>URL </a:t>
+            </a:r>
+            <a:endParaRPr lang="en-US" sz="1800" dirty="0" smtClean="0"/>
           </a:p>
           <a:p>
             <a:pPr lvl="1"/>
             <a:r>
-              <a:rPr lang="en-US" sz="1800" dirty="0" smtClean="0"/>
-              <a:t>Address + parameters</a:t>
+              <a:rPr lang="en-US" sz="1600" dirty="0" smtClean="0"/>
+              <a:t>Uniform </a:t>
+            </a:r>
+            <a:r>
+              <a:rPr lang="en-US" sz="1600" dirty="0"/>
+              <a:t>Resource </a:t>
+            </a:r>
+            <a:r>
+              <a:rPr lang="en-US" sz="1600" dirty="0" smtClean="0"/>
+              <a:t>Locator </a:t>
+            </a:r>
+            <a:r>
+              <a:rPr lang="en-US" sz="1600" dirty="0"/>
+              <a:t>is used to uniquely identify a resource over the </a:t>
+            </a:r>
+            <a:r>
+              <a:rPr lang="en-US" sz="1600" dirty="0" smtClean="0"/>
+              <a:t>web</a:t>
+            </a:r>
+            <a:endParaRPr lang="en-US" sz="1600" dirty="0" smtClean="0"/>
+          </a:p>
+          <a:p>
+            <a:pPr lvl="1"/>
+            <a:r>
+              <a:rPr lang="en-US" sz="1600" dirty="0" smtClean="0"/>
+              <a:t>Address </a:t>
+            </a:r>
+            <a:r>
+              <a:rPr lang="en-US" sz="1600" dirty="0" smtClean="0"/>
+              <a:t>+ parameters</a:t>
             </a:r>
           </a:p>
           <a:p>
@@ -11866,21 +12890,21 @@
           <a:p>
             <a:pPr lvl="1"/>
             <a:r>
-              <a:rPr lang="en-US" sz="1800" dirty="0" smtClean="0"/>
+              <a:rPr lang="en-US" sz="1600" dirty="0" smtClean="0"/>
               <a:t>Accept</a:t>
             </a:r>
           </a:p>
           <a:p>
             <a:pPr lvl="1"/>
             <a:r>
-              <a:rPr lang="en-US" sz="1800" dirty="0" smtClean="0"/>
+              <a:rPr lang="en-US" sz="1600" dirty="0" smtClean="0"/>
               <a:t>Authorization</a:t>
             </a:r>
           </a:p>
           <a:p>
             <a:pPr lvl="1"/>
             <a:r>
-              <a:rPr lang="en-US" sz="1800" dirty="0" smtClean="0"/>
+              <a:rPr lang="en-US" sz="1600" dirty="0" smtClean="0"/>
               <a:t>Content-Type</a:t>
             </a:r>
           </a:p>

</xml_diff>

<commit_message>
Updated ppt with redirect info, removed duplicate slide
</commit_message>
<xml_diff>
--- a/Cadec-vårdens-apier.pptx
+++ b/Cadec-vårdens-apier.pptx
@@ -5,10 +5,10 @@
     <p:sldMasterId id="2147483648" r:id="rId1"/>
   </p:sldMasterIdLst>
   <p:notesMasterIdLst>
-    <p:notesMasterId r:id="rId25"/>
+    <p:notesMasterId r:id="rId24"/>
   </p:notesMasterIdLst>
   <p:handoutMasterIdLst>
-    <p:handoutMasterId r:id="rId26"/>
+    <p:handoutMasterId r:id="rId25"/>
   </p:handoutMasterIdLst>
   <p:sldIdLst>
     <p:sldId id="256" r:id="rId2"/>
@@ -20,20 +20,19 @@
     <p:sldId id="279" r:id="rId8"/>
     <p:sldId id="257" r:id="rId9"/>
     <p:sldId id="258" r:id="rId10"/>
-    <p:sldId id="259" r:id="rId11"/>
-    <p:sldId id="280" r:id="rId12"/>
-    <p:sldId id="261" r:id="rId13"/>
-    <p:sldId id="264" r:id="rId14"/>
-    <p:sldId id="277" r:id="rId15"/>
-    <p:sldId id="265" r:id="rId16"/>
-    <p:sldId id="272" r:id="rId17"/>
-    <p:sldId id="273" r:id="rId18"/>
-    <p:sldId id="267" r:id="rId19"/>
-    <p:sldId id="275" r:id="rId20"/>
-    <p:sldId id="269" r:id="rId21"/>
-    <p:sldId id="271" r:id="rId22"/>
-    <p:sldId id="270" r:id="rId23"/>
-    <p:sldId id="274" r:id="rId24"/>
+    <p:sldId id="280" r:id="rId11"/>
+    <p:sldId id="261" r:id="rId12"/>
+    <p:sldId id="264" r:id="rId13"/>
+    <p:sldId id="277" r:id="rId14"/>
+    <p:sldId id="265" r:id="rId15"/>
+    <p:sldId id="272" r:id="rId16"/>
+    <p:sldId id="273" r:id="rId17"/>
+    <p:sldId id="267" r:id="rId18"/>
+    <p:sldId id="275" r:id="rId19"/>
+    <p:sldId id="269" r:id="rId20"/>
+    <p:sldId id="271" r:id="rId21"/>
+    <p:sldId id="270" r:id="rId22"/>
+    <p:sldId id="274" r:id="rId23"/>
   </p:sldIdLst>
   <p:sldSz cx="9144000" cy="6858000" type="screen4x3"/>
   <p:notesSz cx="6858000" cy="9144000"/>
@@ -1941,7 +1940,7 @@
               <a:pPr>
                 <a:defRPr/>
               </a:pPr>
-              <a:t>13</a:t>
+              <a:t>12</a:t>
             </a:fld>
             <a:endParaRPr lang="sv-SE"/>
           </a:p>
@@ -2543,7 +2542,7 @@
               <a:pPr>
                 <a:defRPr/>
               </a:pPr>
-              <a:t>14</a:t>
+              <a:t>13</a:t>
             </a:fld>
             <a:endParaRPr lang="sv-SE"/>
           </a:p>
@@ -2633,7 +2632,7 @@
               <a:pPr>
                 <a:defRPr/>
               </a:pPr>
-              <a:t>15</a:t>
+              <a:t>14</a:t>
             </a:fld>
             <a:endParaRPr lang="sv-SE"/>
           </a:p>
@@ -3132,7 +3131,7 @@
               <a:pPr>
                 <a:defRPr/>
               </a:pPr>
-              <a:t>16</a:t>
+              <a:t>15</a:t>
             </a:fld>
             <a:endParaRPr lang="sv-SE"/>
           </a:p>
@@ -3378,7 +3377,7 @@
               <a:pPr>
                 <a:defRPr/>
               </a:pPr>
-              <a:t>17</a:t>
+              <a:t>16</a:t>
             </a:fld>
             <a:endParaRPr lang="sv-SE"/>
           </a:p>
@@ -7533,10 +7532,10 @@
           <a:bodyPr/>
           <a:lstStyle/>
           <a:p>
-            <a:r>
-              <a:rPr lang="en-US" dirty="0" smtClean="0"/>
-              <a:t>{SNYGG BILD}</a:t>
-            </a:r>
+            <a:pPr marL="0" indent="0">
+              <a:buNone/>
+            </a:pPr>
+            <a:endParaRPr lang="en-US" dirty="0" smtClean="0"/>
           </a:p>
         </p:txBody>
       </p:sp>
@@ -7569,10 +7568,841 @@
           </a:p>
         </p:txBody>
       </p:sp>
+      <p:pic>
+        <p:nvPicPr>
+          <p:cNvPr id="9" name="Picture 8"/>
+          <p:cNvPicPr>
+            <a:picLocks noChangeAspect="1"/>
+          </p:cNvPicPr>
+          <p:nvPr/>
+        </p:nvPicPr>
+        <p:blipFill>
+          <a:blip r:embed="rId2"/>
+          <a:stretch>
+            <a:fillRect/>
+          </a:stretch>
+        </p:blipFill>
+        <p:spPr>
+          <a:xfrm>
+            <a:off x="685800" y="3275938"/>
+            <a:ext cx="1041400" cy="998008"/>
+          </a:xfrm>
+          <a:prstGeom prst="rect">
+            <a:avLst/>
+          </a:prstGeom>
+        </p:spPr>
+      </p:pic>
+      <p:sp>
+        <p:nvSpPr>
+          <p:cNvPr id="10" name="TextBox 9"/>
+          <p:cNvSpPr txBox="1"/>
+          <p:nvPr/>
+        </p:nvSpPr>
+        <p:spPr>
+          <a:xfrm>
+            <a:off x="287338" y="2612140"/>
+            <a:ext cx="2364750" cy="523220"/>
+          </a:xfrm>
+          <a:prstGeom prst="rect">
+            <a:avLst/>
+          </a:prstGeom>
+          <a:noFill/>
+        </p:spPr>
+        <p:txBody>
+          <a:bodyPr wrap="none" rtlCol="0">
+            <a:spAutoFit/>
+          </a:bodyPr>
+          <a:lstStyle/>
+          <a:p>
+            <a:r>
+              <a:rPr lang="en-US" sz="1400" dirty="0" smtClean="0"/>
+              <a:t>Issue request from browser</a:t>
+            </a:r>
+          </a:p>
+          <a:p>
+            <a:r>
+              <a:rPr lang="en-US" sz="1400" dirty="0" smtClean="0"/>
+              <a:t>http://</a:t>
+            </a:r>
+            <a:r>
+              <a:rPr lang="en-US" sz="1400" dirty="0" err="1" smtClean="0"/>
+              <a:t>host.com</a:t>
+            </a:r>
+            <a:r>
+              <a:rPr lang="en-US" sz="1400" dirty="0" smtClean="0"/>
+              <a:t>/path</a:t>
+            </a:r>
+            <a:endParaRPr lang="en-US" sz="1400" dirty="0"/>
+          </a:p>
+        </p:txBody>
+      </p:sp>
+      <p:sp>
+        <p:nvSpPr>
+          <p:cNvPr id="12" name="Snip Single Corner Rectangle 11"/>
+          <p:cNvSpPr/>
+          <p:nvPr/>
+        </p:nvSpPr>
+        <p:spPr>
+          <a:xfrm>
+            <a:off x="2667000" y="1795992"/>
+            <a:ext cx="3746500" cy="2318808"/>
+          </a:xfrm>
+          <a:prstGeom prst="snip1Rect">
+            <a:avLst/>
+          </a:prstGeom>
+          <a:solidFill>
+            <a:schemeClr val="tx1"/>
+          </a:solidFill>
+        </p:spPr>
+        <p:style>
+          <a:lnRef idx="1">
+            <a:schemeClr val="accent1"/>
+          </a:lnRef>
+          <a:fillRef idx="3">
+            <a:schemeClr val="accent1"/>
+          </a:fillRef>
+          <a:effectRef idx="2">
+            <a:schemeClr val="accent1"/>
+          </a:effectRef>
+          <a:fontRef idx="minor">
+            <a:schemeClr val="lt1"/>
+          </a:fontRef>
+        </p:style>
+        <p:txBody>
+          <a:bodyPr rtlCol="0" anchor="t" anchorCtr="0"/>
+          <a:lstStyle/>
+          <a:p>
+            <a:r>
+              <a:rPr lang="en-US" sz="1200" dirty="0">
+                <a:solidFill>
+                  <a:schemeClr val="bg1"/>
+                </a:solidFill>
+                <a:latin typeface="Consolas"/>
+                <a:cs typeface="Consolas"/>
+              </a:rPr>
+              <a:t>&gt; GET /path HTTP/1.1</a:t>
+            </a:r>
+          </a:p>
+          <a:p>
+            <a:r>
+              <a:rPr lang="en-US" sz="1200" dirty="0">
+                <a:solidFill>
+                  <a:schemeClr val="bg1"/>
+                </a:solidFill>
+                <a:latin typeface="Consolas"/>
+                <a:cs typeface="Consolas"/>
+              </a:rPr>
+              <a:t>&gt; User-Agent: Mozilla/</a:t>
+            </a:r>
+            <a:r>
+              <a:rPr lang="en-US" sz="1200" dirty="0" smtClean="0">
+                <a:solidFill>
+                  <a:schemeClr val="bg1"/>
+                </a:solidFill>
+                <a:latin typeface="Consolas"/>
+                <a:cs typeface="Consolas"/>
+              </a:rPr>
+              <a:t>5.0</a:t>
+            </a:r>
+            <a:endParaRPr lang="en-US" sz="1200" dirty="0">
+              <a:solidFill>
+                <a:schemeClr val="bg1"/>
+              </a:solidFill>
+              <a:latin typeface="Consolas"/>
+              <a:cs typeface="Consolas"/>
+            </a:endParaRPr>
+          </a:p>
+          <a:p>
+            <a:r>
+              <a:rPr lang="en-US" sz="1200" dirty="0">
+                <a:solidFill>
+                  <a:schemeClr val="bg1"/>
+                </a:solidFill>
+                <a:latin typeface="Consolas"/>
+                <a:cs typeface="Consolas"/>
+              </a:rPr>
+              <a:t>&gt; Host: </a:t>
+            </a:r>
+            <a:r>
+              <a:rPr lang="en-US" sz="1200" dirty="0" err="1">
+                <a:solidFill>
+                  <a:schemeClr val="bg1"/>
+                </a:solidFill>
+                <a:latin typeface="Consolas"/>
+                <a:cs typeface="Consolas"/>
+              </a:rPr>
+              <a:t>host.com</a:t>
+            </a:r>
+            <a:endParaRPr lang="en-US" sz="1200" dirty="0">
+              <a:solidFill>
+                <a:schemeClr val="bg1"/>
+              </a:solidFill>
+              <a:latin typeface="Consolas"/>
+              <a:cs typeface="Consolas"/>
+            </a:endParaRPr>
+          </a:p>
+          <a:p>
+            <a:pPr marL="171450" indent="-171450">
+              <a:buFont typeface="Wingdings" charset="0"/>
+              <a:buChar char="Ø"/>
+            </a:pPr>
+            <a:r>
+              <a:rPr lang="en-US" sz="1200" dirty="0" smtClean="0">
+                <a:solidFill>
+                  <a:schemeClr val="bg1"/>
+                </a:solidFill>
+                <a:latin typeface="Consolas"/>
+                <a:cs typeface="Consolas"/>
+              </a:rPr>
+              <a:t>.</a:t>
+            </a:r>
+            <a:r>
+              <a:rPr lang="en-US" sz="1200" dirty="0">
+                <a:solidFill>
+                  <a:schemeClr val="bg1"/>
+                </a:solidFill>
+                <a:latin typeface="Consolas"/>
+                <a:cs typeface="Consolas"/>
+              </a:rPr>
+              <a:t>.....</a:t>
+            </a:r>
+            <a:r>
+              <a:rPr lang="en-US" sz="1200" dirty="0" smtClean="0">
+                <a:solidFill>
+                  <a:schemeClr val="bg1"/>
+                </a:solidFill>
+                <a:latin typeface="Consolas"/>
+                <a:cs typeface="Consolas"/>
+              </a:rPr>
+              <a:t>.</a:t>
+            </a:r>
+          </a:p>
+          <a:p>
+            <a:pPr marL="171450" indent="-171450">
+              <a:buFont typeface="Wingdings" charset="0"/>
+              <a:buChar char="Ø"/>
+            </a:pPr>
+            <a:endParaRPr lang="en-US" sz="1200" dirty="0">
+              <a:solidFill>
+                <a:schemeClr val="bg1"/>
+              </a:solidFill>
+              <a:latin typeface="Consolas"/>
+              <a:cs typeface="Consolas"/>
+            </a:endParaRPr>
+          </a:p>
+          <a:p>
+            <a:r>
+              <a:rPr lang="en-US" sz="1200" dirty="0">
+                <a:solidFill>
+                  <a:schemeClr val="bg1"/>
+                </a:solidFill>
+                <a:latin typeface="Consolas"/>
+                <a:cs typeface="Consolas"/>
+              </a:rPr>
+              <a:t>&lt; HTTP/1.1 302 Found</a:t>
+            </a:r>
+          </a:p>
+          <a:p>
+            <a:r>
+              <a:rPr lang="en-US" sz="1200" dirty="0">
+                <a:solidFill>
+                  <a:schemeClr val="bg1"/>
+                </a:solidFill>
+                <a:latin typeface="Consolas"/>
+                <a:cs typeface="Consolas"/>
+              </a:rPr>
+              <a:t>&lt; Date: Wed, </a:t>
+            </a:r>
+            <a:r>
+              <a:rPr lang="en-US" sz="1200" dirty="0" smtClean="0">
+                <a:solidFill>
+                  <a:schemeClr val="bg1"/>
+                </a:solidFill>
+                <a:latin typeface="Consolas"/>
+                <a:cs typeface="Consolas"/>
+              </a:rPr>
+              <a:t>01 </a:t>
+            </a:r>
+            <a:r>
+              <a:rPr lang="en-US" sz="1200" dirty="0">
+                <a:solidFill>
+                  <a:schemeClr val="bg1"/>
+                </a:solidFill>
+                <a:latin typeface="Consolas"/>
+                <a:cs typeface="Consolas"/>
+              </a:rPr>
+              <a:t>Jan 2013 20:11:48 GMT</a:t>
+            </a:r>
+          </a:p>
+          <a:p>
+            <a:r>
+              <a:rPr lang="en-US" sz="1200" dirty="0">
+                <a:solidFill>
+                  <a:schemeClr val="bg1"/>
+                </a:solidFill>
+                <a:latin typeface="Consolas"/>
+                <a:cs typeface="Consolas"/>
+              </a:rPr>
+              <a:t>&lt; Server: Apache/2.2.23</a:t>
+            </a:r>
+          </a:p>
+          <a:p>
+            <a:r>
+              <a:rPr lang="en-US" sz="1200" dirty="0">
+                <a:solidFill>
+                  <a:schemeClr val="bg1"/>
+                </a:solidFill>
+                <a:latin typeface="Consolas"/>
+                <a:cs typeface="Consolas"/>
+              </a:rPr>
+              <a:t>&lt; Location: http://</a:t>
+            </a:r>
+            <a:r>
+              <a:rPr lang="en-US" sz="1200" dirty="0" err="1">
+                <a:solidFill>
+                  <a:schemeClr val="bg1"/>
+                </a:solidFill>
+                <a:latin typeface="Consolas"/>
+                <a:cs typeface="Consolas"/>
+              </a:rPr>
+              <a:t>anotherhost.com</a:t>
+            </a:r>
+            <a:r>
+              <a:rPr lang="en-US" sz="1200" dirty="0">
+                <a:solidFill>
+                  <a:schemeClr val="bg1"/>
+                </a:solidFill>
+                <a:latin typeface="Consolas"/>
+                <a:cs typeface="Consolas"/>
+              </a:rPr>
+              <a:t>/path</a:t>
+            </a:r>
+          </a:p>
+          <a:p>
+            <a:r>
+              <a:rPr lang="en-US" sz="1200" dirty="0">
+                <a:solidFill>
+                  <a:schemeClr val="bg1"/>
+                </a:solidFill>
+                <a:latin typeface="Consolas"/>
+                <a:cs typeface="Consolas"/>
+              </a:rPr>
+              <a:t>&lt; ......</a:t>
+            </a:r>
+          </a:p>
+          <a:p>
+            <a:pPr marL="171450" indent="-171450">
+              <a:buFont typeface="Wingdings" charset="0"/>
+              <a:buChar char="Ø"/>
+            </a:pPr>
+            <a:endParaRPr lang="en-US" sz="1200" dirty="0">
+              <a:solidFill>
+                <a:schemeClr val="bg1"/>
+              </a:solidFill>
+              <a:latin typeface="Consolas"/>
+              <a:cs typeface="Consolas"/>
+            </a:endParaRPr>
+          </a:p>
+        </p:txBody>
+      </p:sp>
+      <p:pic>
+        <p:nvPicPr>
+          <p:cNvPr id="13" name="Picture 12"/>
+          <p:cNvPicPr>
+            <a:picLocks noChangeAspect="1"/>
+          </p:cNvPicPr>
+          <p:nvPr/>
+        </p:nvPicPr>
+        <p:blipFill>
+          <a:blip r:embed="rId3"/>
+          <a:stretch>
+            <a:fillRect/>
+          </a:stretch>
+        </p:blipFill>
+        <p:spPr>
+          <a:xfrm>
+            <a:off x="6908503" y="2585844"/>
+            <a:ext cx="961994" cy="921232"/>
+          </a:xfrm>
+          <a:prstGeom prst="rect">
+            <a:avLst/>
+          </a:prstGeom>
+        </p:spPr>
+      </p:pic>
+      <p:sp>
+        <p:nvSpPr>
+          <p:cNvPr id="15" name="TextBox 14"/>
+          <p:cNvSpPr txBox="1"/>
+          <p:nvPr/>
+        </p:nvSpPr>
+        <p:spPr>
+          <a:xfrm>
+            <a:off x="6705303" y="2013157"/>
+            <a:ext cx="913068" cy="307777"/>
+          </a:xfrm>
+          <a:prstGeom prst="rect">
+            <a:avLst/>
+          </a:prstGeom>
+          <a:noFill/>
+        </p:spPr>
+        <p:txBody>
+          <a:bodyPr wrap="none" rtlCol="0">
+            <a:spAutoFit/>
+          </a:bodyPr>
+          <a:lstStyle/>
+          <a:p>
+            <a:r>
+              <a:rPr lang="en-US" sz="1400" dirty="0" err="1"/>
+              <a:t>h</a:t>
+            </a:r>
+            <a:r>
+              <a:rPr lang="en-US" sz="1400" dirty="0" err="1" smtClean="0"/>
+              <a:t>ost.com</a:t>
+            </a:r>
+            <a:endParaRPr lang="en-US" sz="1400" dirty="0"/>
+          </a:p>
+        </p:txBody>
+      </p:sp>
+      <p:sp>
+        <p:nvSpPr>
+          <p:cNvPr id="16" name="Curved Left Arrow 15"/>
+          <p:cNvSpPr/>
+          <p:nvPr/>
+        </p:nvSpPr>
+        <p:spPr>
+          <a:xfrm>
+            <a:off x="6616402" y="2395021"/>
+            <a:ext cx="584200" cy="1302876"/>
+          </a:xfrm>
+          <a:prstGeom prst="curvedLeftArrow">
+            <a:avLst/>
+          </a:prstGeom>
+        </p:spPr>
+        <p:style>
+          <a:lnRef idx="1">
+            <a:schemeClr val="accent1"/>
+          </a:lnRef>
+          <a:fillRef idx="3">
+            <a:schemeClr val="accent1"/>
+          </a:fillRef>
+          <a:effectRef idx="2">
+            <a:schemeClr val="accent1"/>
+          </a:effectRef>
+          <a:fontRef idx="minor">
+            <a:schemeClr val="lt1"/>
+          </a:fontRef>
+        </p:style>
+        <p:txBody>
+          <a:bodyPr rtlCol="0" anchor="ctr"/>
+          <a:lstStyle/>
+          <a:p>
+            <a:pPr algn="ctr"/>
+            <a:endParaRPr lang="en-US">
+              <a:solidFill>
+                <a:schemeClr val="tx1"/>
+              </a:solidFill>
+            </a:endParaRPr>
+          </a:p>
+        </p:txBody>
+      </p:sp>
+      <p:sp>
+        <p:nvSpPr>
+          <p:cNvPr id="17" name="Snip Single Corner Rectangle 16"/>
+          <p:cNvSpPr/>
+          <p:nvPr/>
+        </p:nvSpPr>
+        <p:spPr>
+          <a:xfrm>
+            <a:off x="2667000" y="4221692"/>
+            <a:ext cx="3758902" cy="2255308"/>
+          </a:xfrm>
+          <a:prstGeom prst="snip1Rect">
+            <a:avLst/>
+          </a:prstGeom>
+          <a:solidFill>
+            <a:schemeClr val="tx1"/>
+          </a:solidFill>
+        </p:spPr>
+        <p:style>
+          <a:lnRef idx="1">
+            <a:schemeClr val="accent1"/>
+          </a:lnRef>
+          <a:fillRef idx="3">
+            <a:schemeClr val="accent1"/>
+          </a:fillRef>
+          <a:effectRef idx="2">
+            <a:schemeClr val="accent1"/>
+          </a:effectRef>
+          <a:fontRef idx="minor">
+            <a:schemeClr val="lt1"/>
+          </a:fontRef>
+        </p:style>
+        <p:txBody>
+          <a:bodyPr rtlCol="0" anchor="t" anchorCtr="0"/>
+          <a:lstStyle/>
+          <a:p>
+            <a:r>
+              <a:rPr lang="en-US" sz="1200" dirty="0">
+                <a:solidFill>
+                  <a:schemeClr val="bg1"/>
+                </a:solidFill>
+                <a:latin typeface="Consolas"/>
+                <a:cs typeface="Consolas"/>
+              </a:rPr>
+              <a:t>&gt; GET /path HTTP/1.1</a:t>
+            </a:r>
+          </a:p>
+          <a:p>
+            <a:r>
+              <a:rPr lang="en-US" sz="1200" dirty="0">
+                <a:solidFill>
+                  <a:schemeClr val="bg1"/>
+                </a:solidFill>
+                <a:latin typeface="Consolas"/>
+                <a:cs typeface="Consolas"/>
+              </a:rPr>
+              <a:t>&gt; User-Agent: Mozilla/</a:t>
+            </a:r>
+            <a:r>
+              <a:rPr lang="en-US" sz="1200" dirty="0" smtClean="0">
+                <a:solidFill>
+                  <a:schemeClr val="bg1"/>
+                </a:solidFill>
+                <a:latin typeface="Consolas"/>
+                <a:cs typeface="Consolas"/>
+              </a:rPr>
+              <a:t>5.0</a:t>
+            </a:r>
+            <a:endParaRPr lang="en-US" sz="1200" dirty="0">
+              <a:solidFill>
+                <a:schemeClr val="bg1"/>
+              </a:solidFill>
+              <a:latin typeface="Consolas"/>
+              <a:cs typeface="Consolas"/>
+            </a:endParaRPr>
+          </a:p>
+          <a:p>
+            <a:r>
+              <a:rPr lang="en-US" sz="1200" dirty="0">
+                <a:solidFill>
+                  <a:schemeClr val="bg1"/>
+                </a:solidFill>
+                <a:latin typeface="Consolas"/>
+                <a:cs typeface="Consolas"/>
+              </a:rPr>
+              <a:t>&gt; Host: </a:t>
+            </a:r>
+            <a:r>
+              <a:rPr lang="en-US" sz="1200" dirty="0" err="1" smtClean="0">
+                <a:solidFill>
+                  <a:schemeClr val="bg1"/>
+                </a:solidFill>
+                <a:latin typeface="Consolas"/>
+                <a:cs typeface="Consolas"/>
+              </a:rPr>
+              <a:t>anotherhost.com</a:t>
+            </a:r>
+            <a:endParaRPr lang="en-US" sz="1200" dirty="0">
+              <a:solidFill>
+                <a:schemeClr val="bg1"/>
+              </a:solidFill>
+              <a:latin typeface="Consolas"/>
+              <a:cs typeface="Consolas"/>
+            </a:endParaRPr>
+          </a:p>
+          <a:p>
+            <a:pPr marL="171450" indent="-171450">
+              <a:buFont typeface="Wingdings" charset="0"/>
+              <a:buChar char="Ø"/>
+            </a:pPr>
+            <a:r>
+              <a:rPr lang="en-US" sz="1200" dirty="0" smtClean="0">
+                <a:solidFill>
+                  <a:schemeClr val="bg1"/>
+                </a:solidFill>
+                <a:latin typeface="Consolas"/>
+                <a:cs typeface="Consolas"/>
+              </a:rPr>
+              <a:t>.</a:t>
+            </a:r>
+            <a:r>
+              <a:rPr lang="en-US" sz="1200" dirty="0">
+                <a:solidFill>
+                  <a:schemeClr val="bg1"/>
+                </a:solidFill>
+                <a:latin typeface="Consolas"/>
+                <a:cs typeface="Consolas"/>
+              </a:rPr>
+              <a:t>.....</a:t>
+            </a:r>
+            <a:r>
+              <a:rPr lang="en-US" sz="1200" dirty="0" smtClean="0">
+                <a:solidFill>
+                  <a:schemeClr val="bg1"/>
+                </a:solidFill>
+                <a:latin typeface="Consolas"/>
+                <a:cs typeface="Consolas"/>
+              </a:rPr>
+              <a:t>.</a:t>
+            </a:r>
+          </a:p>
+          <a:p>
+            <a:pPr marL="171450" indent="-171450">
+              <a:buFont typeface="Wingdings" charset="0"/>
+              <a:buChar char="Ø"/>
+            </a:pPr>
+            <a:endParaRPr lang="en-US" sz="1200" dirty="0">
+              <a:solidFill>
+                <a:schemeClr val="bg1"/>
+              </a:solidFill>
+              <a:latin typeface="Consolas"/>
+              <a:cs typeface="Consolas"/>
+            </a:endParaRPr>
+          </a:p>
+          <a:p>
+            <a:r>
+              <a:rPr lang="en-US" sz="1200" dirty="0">
+                <a:solidFill>
+                  <a:schemeClr val="bg1"/>
+                </a:solidFill>
+                <a:latin typeface="Consolas"/>
+                <a:cs typeface="Consolas"/>
+              </a:rPr>
+              <a:t>&lt; HTTP/1.1 200 OK</a:t>
+            </a:r>
+          </a:p>
+          <a:p>
+            <a:r>
+              <a:rPr lang="en-US" sz="1200" dirty="0">
+                <a:solidFill>
+                  <a:schemeClr val="bg1"/>
+                </a:solidFill>
+                <a:latin typeface="Consolas"/>
+                <a:cs typeface="Consolas"/>
+              </a:rPr>
+              <a:t>&lt; Date: Wed, </a:t>
+            </a:r>
+            <a:r>
+              <a:rPr lang="en-US" sz="1200" dirty="0" smtClean="0">
+                <a:solidFill>
+                  <a:schemeClr val="bg1"/>
+                </a:solidFill>
+                <a:latin typeface="Consolas"/>
+                <a:cs typeface="Consolas"/>
+              </a:rPr>
+              <a:t>01 </a:t>
+            </a:r>
+            <a:r>
+              <a:rPr lang="en-US" sz="1200" dirty="0">
+                <a:solidFill>
+                  <a:schemeClr val="bg1"/>
+                </a:solidFill>
+                <a:latin typeface="Consolas"/>
+                <a:cs typeface="Consolas"/>
+              </a:rPr>
+              <a:t>Jan 2013 </a:t>
+            </a:r>
+            <a:r>
+              <a:rPr lang="en-US" sz="1200" dirty="0" smtClean="0">
+                <a:solidFill>
+                  <a:schemeClr val="bg1"/>
+                </a:solidFill>
+                <a:latin typeface="Consolas"/>
+                <a:cs typeface="Consolas"/>
+              </a:rPr>
+              <a:t>20:11:49 </a:t>
+            </a:r>
+            <a:r>
+              <a:rPr lang="en-US" sz="1200" dirty="0">
+                <a:solidFill>
+                  <a:schemeClr val="bg1"/>
+                </a:solidFill>
+                <a:latin typeface="Consolas"/>
+                <a:cs typeface="Consolas"/>
+              </a:rPr>
+              <a:t>GMT</a:t>
+            </a:r>
+          </a:p>
+          <a:p>
+            <a:r>
+              <a:rPr lang="en-US" sz="1200" dirty="0">
+                <a:solidFill>
+                  <a:schemeClr val="bg1"/>
+                </a:solidFill>
+                <a:latin typeface="Consolas"/>
+                <a:cs typeface="Consolas"/>
+              </a:rPr>
+              <a:t>&lt; Server: Apache/2.2.23</a:t>
+            </a:r>
+          </a:p>
+          <a:p>
+            <a:r>
+              <a:rPr lang="en-US" sz="1200" dirty="0">
+                <a:solidFill>
+                  <a:schemeClr val="bg1"/>
+                </a:solidFill>
+                <a:latin typeface="Consolas"/>
+                <a:cs typeface="Consolas"/>
+              </a:rPr>
+              <a:t>&lt; Content-Type: application/</a:t>
+            </a:r>
+            <a:r>
+              <a:rPr lang="en-US" sz="1200" dirty="0" err="1">
+                <a:solidFill>
+                  <a:schemeClr val="bg1"/>
+                </a:solidFill>
+                <a:latin typeface="Consolas"/>
+                <a:cs typeface="Consolas"/>
+              </a:rPr>
+              <a:t>json;charset</a:t>
+            </a:r>
+            <a:r>
+              <a:rPr lang="en-US" sz="1200" dirty="0">
+                <a:solidFill>
+                  <a:schemeClr val="bg1"/>
+                </a:solidFill>
+                <a:latin typeface="Consolas"/>
+                <a:cs typeface="Consolas"/>
+              </a:rPr>
+              <a:t>=UTF-8</a:t>
+            </a:r>
+          </a:p>
+          <a:p>
+            <a:r>
+              <a:rPr lang="en-US" sz="1200" dirty="0">
+                <a:solidFill>
+                  <a:schemeClr val="bg1"/>
+                </a:solidFill>
+                <a:latin typeface="Consolas"/>
+                <a:cs typeface="Consolas"/>
+              </a:rPr>
+              <a:t>&lt; ......</a:t>
+            </a:r>
+          </a:p>
+          <a:p>
+            <a:endParaRPr lang="en-US" sz="1200" dirty="0">
+              <a:solidFill>
+                <a:schemeClr val="bg1"/>
+              </a:solidFill>
+              <a:latin typeface="Consolas"/>
+              <a:cs typeface="Consolas"/>
+            </a:endParaRPr>
+          </a:p>
+          <a:p>
+            <a:pPr marL="171450" indent="-171450">
+              <a:buFont typeface="Wingdings" charset="0"/>
+              <a:buChar char="Ø"/>
+            </a:pPr>
+            <a:endParaRPr lang="en-US" sz="1200" dirty="0">
+              <a:solidFill>
+                <a:schemeClr val="bg1"/>
+              </a:solidFill>
+              <a:latin typeface="Consolas"/>
+              <a:cs typeface="Consolas"/>
+            </a:endParaRPr>
+          </a:p>
+        </p:txBody>
+      </p:sp>
+      <p:pic>
+        <p:nvPicPr>
+          <p:cNvPr id="18" name="Picture 17"/>
+          <p:cNvPicPr>
+            <a:picLocks noChangeAspect="1"/>
+          </p:cNvPicPr>
+          <p:nvPr/>
+        </p:nvPicPr>
+        <p:blipFill>
+          <a:blip r:embed="rId3"/>
+          <a:stretch>
+            <a:fillRect/>
+          </a:stretch>
+        </p:blipFill>
+        <p:spPr>
+          <a:xfrm>
+            <a:off x="6919600" y="4838700"/>
+            <a:ext cx="961994" cy="921232"/>
+          </a:xfrm>
+          <a:prstGeom prst="rect">
+            <a:avLst/>
+          </a:prstGeom>
+        </p:spPr>
+      </p:pic>
+      <p:sp>
+        <p:nvSpPr>
+          <p:cNvPr id="19" name="TextBox 18"/>
+          <p:cNvSpPr txBox="1"/>
+          <p:nvPr/>
+        </p:nvSpPr>
+        <p:spPr>
+          <a:xfrm>
+            <a:off x="6527503" y="4337446"/>
+            <a:ext cx="1521984" cy="307777"/>
+          </a:xfrm>
+          <a:prstGeom prst="rect">
+            <a:avLst/>
+          </a:prstGeom>
+          <a:noFill/>
+        </p:spPr>
+        <p:txBody>
+          <a:bodyPr wrap="none" rtlCol="0">
+            <a:spAutoFit/>
+          </a:bodyPr>
+          <a:lstStyle/>
+          <a:p>
+            <a:r>
+              <a:rPr lang="en-US" sz="1400" dirty="0" err="1" smtClean="0"/>
+              <a:t>anotherhost.com</a:t>
+            </a:r>
+            <a:endParaRPr lang="en-US" sz="1400" dirty="0"/>
+          </a:p>
+        </p:txBody>
+      </p:sp>
+      <p:sp>
+        <p:nvSpPr>
+          <p:cNvPr id="21" name="Curved Left Arrow 20"/>
+          <p:cNvSpPr/>
+          <p:nvPr/>
+        </p:nvSpPr>
+        <p:spPr>
+          <a:xfrm>
+            <a:off x="6667011" y="4714334"/>
+            <a:ext cx="584200" cy="1302876"/>
+          </a:xfrm>
+          <a:prstGeom prst="curvedLeftArrow">
+            <a:avLst/>
+          </a:prstGeom>
+        </p:spPr>
+        <p:style>
+          <a:lnRef idx="1">
+            <a:schemeClr val="accent1"/>
+          </a:lnRef>
+          <a:fillRef idx="3">
+            <a:schemeClr val="accent1"/>
+          </a:fillRef>
+          <a:effectRef idx="2">
+            <a:schemeClr val="accent1"/>
+          </a:effectRef>
+          <a:fontRef idx="minor">
+            <a:schemeClr val="lt1"/>
+          </a:fontRef>
+        </p:style>
+        <p:txBody>
+          <a:bodyPr rtlCol="0" anchor="ctr"/>
+          <a:lstStyle/>
+          <a:p>
+            <a:pPr algn="ctr"/>
+            <a:endParaRPr lang="en-US">
+              <a:solidFill>
+                <a:schemeClr val="tx1"/>
+              </a:solidFill>
+            </a:endParaRPr>
+          </a:p>
+        </p:txBody>
+      </p:sp>
     </p:spTree>
     <p:extLst>
       <p:ext uri="{BB962C8B-B14F-4D97-AF65-F5344CB8AC3E}">
-        <p14:creationId xmlns:p14="http://schemas.microsoft.com/office/powerpoint/2010/main" val="2100865221"/>
+        <p14:creationId xmlns:p14="http://schemas.microsoft.com/office/powerpoint/2010/main" val="1916411446"/>
       </p:ext>
     </p:extLst>
   </p:cSld>
@@ -7648,7 +8478,7 @@
           <a:p>
             <a:r>
               <a:rPr lang="en-US" dirty="0" smtClean="0"/>
-              <a:t>Example: Redirect, how does it work?</a:t>
+              <a:t>Exercise 1</a:t>
             </a:r>
             <a:endParaRPr lang="en-US" dirty="0"/>
           </a:p>
@@ -7672,7 +8502,10 @@
             <a:pPr marL="0" indent="0">
               <a:buNone/>
             </a:pPr>
-            <a:endParaRPr lang="en-US" dirty="0" smtClean="0"/>
+            <a:r>
+              <a:rPr lang="en-US" dirty="0" smtClean="0"/>
+              <a:t>Use Curl to make http requests against public data API</a:t>
+            </a:r>
           </a:p>
         </p:txBody>
       </p:sp>
@@ -7705,868 +8538,10 @@
           </a:p>
         </p:txBody>
       </p:sp>
-      <p:pic>
-        <p:nvPicPr>
-          <p:cNvPr id="9" name="Picture 8"/>
-          <p:cNvPicPr>
-            <a:picLocks noChangeAspect="1"/>
-          </p:cNvPicPr>
-          <p:nvPr/>
-        </p:nvPicPr>
-        <p:blipFill>
-          <a:blip r:embed="rId2"/>
-          <a:stretch>
-            <a:fillRect/>
-          </a:stretch>
-        </p:blipFill>
-        <p:spPr>
-          <a:xfrm>
-            <a:off x="685800" y="3275938"/>
-            <a:ext cx="1041400" cy="998008"/>
-          </a:xfrm>
-          <a:prstGeom prst="rect">
-            <a:avLst/>
-          </a:prstGeom>
-        </p:spPr>
-      </p:pic>
-      <p:sp>
-        <p:nvSpPr>
-          <p:cNvPr id="10" name="TextBox 9"/>
-          <p:cNvSpPr txBox="1"/>
-          <p:nvPr/>
-        </p:nvSpPr>
-        <p:spPr>
-          <a:xfrm>
-            <a:off x="287338" y="2612140"/>
-            <a:ext cx="2364750" cy="523220"/>
-          </a:xfrm>
-          <a:prstGeom prst="rect">
-            <a:avLst/>
-          </a:prstGeom>
-          <a:noFill/>
-        </p:spPr>
-        <p:txBody>
-          <a:bodyPr wrap="none" rtlCol="0">
-            <a:spAutoFit/>
-          </a:bodyPr>
-          <a:lstStyle/>
-          <a:p>
-            <a:r>
-              <a:rPr lang="en-US" sz="1400" dirty="0" smtClean="0"/>
-              <a:t>Issue request from browser</a:t>
-            </a:r>
-          </a:p>
-          <a:p>
-            <a:r>
-              <a:rPr lang="en-US" sz="1400" dirty="0" smtClean="0"/>
-              <a:t>http://</a:t>
-            </a:r>
-            <a:r>
-              <a:rPr lang="en-US" sz="1400" dirty="0" err="1" smtClean="0"/>
-              <a:t>host.com</a:t>
-            </a:r>
-            <a:r>
-              <a:rPr lang="en-US" sz="1400" dirty="0" smtClean="0"/>
-              <a:t>/path</a:t>
-            </a:r>
-            <a:endParaRPr lang="en-US" sz="1400" dirty="0"/>
-          </a:p>
-        </p:txBody>
-      </p:sp>
-      <p:sp>
-        <p:nvSpPr>
-          <p:cNvPr id="12" name="Snip Single Corner Rectangle 11"/>
-          <p:cNvSpPr/>
-          <p:nvPr/>
-        </p:nvSpPr>
-        <p:spPr>
-          <a:xfrm>
-            <a:off x="2667000" y="1795992"/>
-            <a:ext cx="3746500" cy="2318808"/>
-          </a:xfrm>
-          <a:prstGeom prst="snip1Rect">
-            <a:avLst/>
-          </a:prstGeom>
-          <a:solidFill>
-            <a:schemeClr val="tx1"/>
-          </a:solidFill>
-        </p:spPr>
-        <p:style>
-          <a:lnRef idx="1">
-            <a:schemeClr val="accent1"/>
-          </a:lnRef>
-          <a:fillRef idx="3">
-            <a:schemeClr val="accent1"/>
-          </a:fillRef>
-          <a:effectRef idx="2">
-            <a:schemeClr val="accent1"/>
-          </a:effectRef>
-          <a:fontRef idx="minor">
-            <a:schemeClr val="lt1"/>
-          </a:fontRef>
-        </p:style>
-        <p:txBody>
-          <a:bodyPr rtlCol="0" anchor="t" anchorCtr="0"/>
-          <a:lstStyle/>
-          <a:p>
-            <a:r>
-              <a:rPr lang="en-US" sz="1200" dirty="0">
-                <a:solidFill>
-                  <a:schemeClr val="bg1"/>
-                </a:solidFill>
-                <a:latin typeface="Consolas"/>
-                <a:cs typeface="Consolas"/>
-              </a:rPr>
-              <a:t>&gt; GET /path HTTP/1.1</a:t>
-            </a:r>
-          </a:p>
-          <a:p>
-            <a:r>
-              <a:rPr lang="en-US" sz="1200" dirty="0">
-                <a:solidFill>
-                  <a:schemeClr val="bg1"/>
-                </a:solidFill>
-                <a:latin typeface="Consolas"/>
-                <a:cs typeface="Consolas"/>
-              </a:rPr>
-              <a:t>&gt; User-Agent: Mozilla/</a:t>
-            </a:r>
-            <a:r>
-              <a:rPr lang="en-US" sz="1200" dirty="0" smtClean="0">
-                <a:solidFill>
-                  <a:schemeClr val="bg1"/>
-                </a:solidFill>
-                <a:latin typeface="Consolas"/>
-                <a:cs typeface="Consolas"/>
-              </a:rPr>
-              <a:t>5.0</a:t>
-            </a:r>
-            <a:endParaRPr lang="en-US" sz="1200" dirty="0">
-              <a:solidFill>
-                <a:schemeClr val="bg1"/>
-              </a:solidFill>
-              <a:latin typeface="Consolas"/>
-              <a:cs typeface="Consolas"/>
-            </a:endParaRPr>
-          </a:p>
-          <a:p>
-            <a:r>
-              <a:rPr lang="en-US" sz="1200" dirty="0">
-                <a:solidFill>
-                  <a:schemeClr val="bg1"/>
-                </a:solidFill>
-                <a:latin typeface="Consolas"/>
-                <a:cs typeface="Consolas"/>
-              </a:rPr>
-              <a:t>&gt; Host: </a:t>
-            </a:r>
-            <a:r>
-              <a:rPr lang="en-US" sz="1200" dirty="0" err="1">
-                <a:solidFill>
-                  <a:schemeClr val="bg1"/>
-                </a:solidFill>
-                <a:latin typeface="Consolas"/>
-                <a:cs typeface="Consolas"/>
-              </a:rPr>
-              <a:t>host.com</a:t>
-            </a:r>
-            <a:endParaRPr lang="en-US" sz="1200" dirty="0">
-              <a:solidFill>
-                <a:schemeClr val="bg1"/>
-              </a:solidFill>
-              <a:latin typeface="Consolas"/>
-              <a:cs typeface="Consolas"/>
-            </a:endParaRPr>
-          </a:p>
-          <a:p>
-            <a:pPr marL="171450" indent="-171450">
-              <a:buFont typeface="Wingdings" charset="0"/>
-              <a:buChar char="Ø"/>
-            </a:pPr>
-            <a:r>
-              <a:rPr lang="en-US" sz="1200" dirty="0" smtClean="0">
-                <a:solidFill>
-                  <a:schemeClr val="bg1"/>
-                </a:solidFill>
-                <a:latin typeface="Consolas"/>
-                <a:cs typeface="Consolas"/>
-              </a:rPr>
-              <a:t>.</a:t>
-            </a:r>
-            <a:r>
-              <a:rPr lang="en-US" sz="1200" dirty="0">
-                <a:solidFill>
-                  <a:schemeClr val="bg1"/>
-                </a:solidFill>
-                <a:latin typeface="Consolas"/>
-                <a:cs typeface="Consolas"/>
-              </a:rPr>
-              <a:t>.....</a:t>
-            </a:r>
-            <a:r>
-              <a:rPr lang="en-US" sz="1200" dirty="0" smtClean="0">
-                <a:solidFill>
-                  <a:schemeClr val="bg1"/>
-                </a:solidFill>
-                <a:latin typeface="Consolas"/>
-                <a:cs typeface="Consolas"/>
-              </a:rPr>
-              <a:t>.</a:t>
-            </a:r>
-          </a:p>
-          <a:p>
-            <a:pPr marL="171450" indent="-171450">
-              <a:buFont typeface="Wingdings" charset="0"/>
-              <a:buChar char="Ø"/>
-            </a:pPr>
-            <a:endParaRPr lang="en-US" sz="1200" dirty="0">
-              <a:solidFill>
-                <a:schemeClr val="bg1"/>
-              </a:solidFill>
-              <a:latin typeface="Consolas"/>
-              <a:cs typeface="Consolas"/>
-            </a:endParaRPr>
-          </a:p>
-          <a:p>
-            <a:r>
-              <a:rPr lang="en-US" sz="1200" dirty="0">
-                <a:solidFill>
-                  <a:schemeClr val="bg1"/>
-                </a:solidFill>
-                <a:latin typeface="Consolas"/>
-                <a:cs typeface="Consolas"/>
-              </a:rPr>
-              <a:t>&lt; HTTP/1.1 302 Found</a:t>
-            </a:r>
-          </a:p>
-          <a:p>
-            <a:r>
-              <a:rPr lang="en-US" sz="1200" dirty="0">
-                <a:solidFill>
-                  <a:schemeClr val="bg1"/>
-                </a:solidFill>
-                <a:latin typeface="Consolas"/>
-                <a:cs typeface="Consolas"/>
-              </a:rPr>
-              <a:t>&lt; Date: Wed, </a:t>
-            </a:r>
-            <a:r>
-              <a:rPr lang="en-US" sz="1200" dirty="0" smtClean="0">
-                <a:solidFill>
-                  <a:schemeClr val="bg1"/>
-                </a:solidFill>
-                <a:latin typeface="Consolas"/>
-                <a:cs typeface="Consolas"/>
-              </a:rPr>
-              <a:t>01 </a:t>
-            </a:r>
-            <a:r>
-              <a:rPr lang="en-US" sz="1200" dirty="0">
-                <a:solidFill>
-                  <a:schemeClr val="bg1"/>
-                </a:solidFill>
-                <a:latin typeface="Consolas"/>
-                <a:cs typeface="Consolas"/>
-              </a:rPr>
-              <a:t>Jan 2013 20:11:48 GMT</a:t>
-            </a:r>
-          </a:p>
-          <a:p>
-            <a:r>
-              <a:rPr lang="en-US" sz="1200" dirty="0">
-                <a:solidFill>
-                  <a:schemeClr val="bg1"/>
-                </a:solidFill>
-                <a:latin typeface="Consolas"/>
-                <a:cs typeface="Consolas"/>
-              </a:rPr>
-              <a:t>&lt; Server: Apache/2.2.23</a:t>
-            </a:r>
-          </a:p>
-          <a:p>
-            <a:r>
-              <a:rPr lang="en-US" sz="1200" dirty="0">
-                <a:solidFill>
-                  <a:schemeClr val="bg1"/>
-                </a:solidFill>
-                <a:latin typeface="Consolas"/>
-                <a:cs typeface="Consolas"/>
-              </a:rPr>
-              <a:t>&lt; Location: http://</a:t>
-            </a:r>
-            <a:r>
-              <a:rPr lang="en-US" sz="1200" dirty="0" err="1">
-                <a:solidFill>
-                  <a:schemeClr val="bg1"/>
-                </a:solidFill>
-                <a:latin typeface="Consolas"/>
-                <a:cs typeface="Consolas"/>
-              </a:rPr>
-              <a:t>anotherhost.com</a:t>
-            </a:r>
-            <a:r>
-              <a:rPr lang="en-US" sz="1200" dirty="0">
-                <a:solidFill>
-                  <a:schemeClr val="bg1"/>
-                </a:solidFill>
-                <a:latin typeface="Consolas"/>
-                <a:cs typeface="Consolas"/>
-              </a:rPr>
-              <a:t>/path</a:t>
-            </a:r>
-          </a:p>
-          <a:p>
-            <a:r>
-              <a:rPr lang="en-US" sz="1200" dirty="0">
-                <a:solidFill>
-                  <a:schemeClr val="bg1"/>
-                </a:solidFill>
-                <a:latin typeface="Consolas"/>
-                <a:cs typeface="Consolas"/>
-              </a:rPr>
-              <a:t>&lt; ......</a:t>
-            </a:r>
-          </a:p>
-          <a:p>
-            <a:pPr marL="171450" indent="-171450">
-              <a:buFont typeface="Wingdings" charset="0"/>
-              <a:buChar char="Ø"/>
-            </a:pPr>
-            <a:endParaRPr lang="en-US" sz="1200" dirty="0">
-              <a:solidFill>
-                <a:schemeClr val="bg1"/>
-              </a:solidFill>
-              <a:latin typeface="Consolas"/>
-              <a:cs typeface="Consolas"/>
-            </a:endParaRPr>
-          </a:p>
-        </p:txBody>
-      </p:sp>
-      <p:pic>
-        <p:nvPicPr>
-          <p:cNvPr id="13" name="Picture 12"/>
-          <p:cNvPicPr>
-            <a:picLocks noChangeAspect="1"/>
-          </p:cNvPicPr>
-          <p:nvPr/>
-        </p:nvPicPr>
-        <p:blipFill>
-          <a:blip r:embed="rId3"/>
-          <a:stretch>
-            <a:fillRect/>
-          </a:stretch>
-        </p:blipFill>
-        <p:spPr>
-          <a:xfrm>
-            <a:off x="6908503" y="2585844"/>
-            <a:ext cx="961994" cy="921232"/>
-          </a:xfrm>
-          <a:prstGeom prst="rect">
-            <a:avLst/>
-          </a:prstGeom>
-        </p:spPr>
-      </p:pic>
-      <p:sp>
-        <p:nvSpPr>
-          <p:cNvPr id="15" name="TextBox 14"/>
-          <p:cNvSpPr txBox="1"/>
-          <p:nvPr/>
-        </p:nvSpPr>
-        <p:spPr>
-          <a:xfrm>
-            <a:off x="6705303" y="2013157"/>
-            <a:ext cx="913068" cy="307777"/>
-          </a:xfrm>
-          <a:prstGeom prst="rect">
-            <a:avLst/>
-          </a:prstGeom>
-          <a:noFill/>
-        </p:spPr>
-        <p:txBody>
-          <a:bodyPr wrap="none" rtlCol="0">
-            <a:spAutoFit/>
-          </a:bodyPr>
-          <a:lstStyle/>
-          <a:p>
-            <a:r>
-              <a:rPr lang="en-US" sz="1400" dirty="0" err="1"/>
-              <a:t>h</a:t>
-            </a:r>
-            <a:r>
-              <a:rPr lang="en-US" sz="1400" dirty="0" err="1" smtClean="0"/>
-              <a:t>ost.com</a:t>
-            </a:r>
-            <a:endParaRPr lang="en-US" sz="1400" dirty="0"/>
-          </a:p>
-        </p:txBody>
-      </p:sp>
-      <p:sp>
-        <p:nvSpPr>
-          <p:cNvPr id="16" name="Curved Left Arrow 15"/>
-          <p:cNvSpPr/>
-          <p:nvPr/>
-        </p:nvSpPr>
-        <p:spPr>
-          <a:xfrm>
-            <a:off x="6616402" y="2395021"/>
-            <a:ext cx="584200" cy="1302876"/>
-          </a:xfrm>
-          <a:prstGeom prst="curvedLeftArrow">
-            <a:avLst/>
-          </a:prstGeom>
-        </p:spPr>
-        <p:style>
-          <a:lnRef idx="1">
-            <a:schemeClr val="accent1"/>
-          </a:lnRef>
-          <a:fillRef idx="3">
-            <a:schemeClr val="accent1"/>
-          </a:fillRef>
-          <a:effectRef idx="2">
-            <a:schemeClr val="accent1"/>
-          </a:effectRef>
-          <a:fontRef idx="minor">
-            <a:schemeClr val="lt1"/>
-          </a:fontRef>
-        </p:style>
-        <p:txBody>
-          <a:bodyPr rtlCol="0" anchor="ctr"/>
-          <a:lstStyle/>
-          <a:p>
-            <a:pPr algn="ctr"/>
-            <a:endParaRPr lang="en-US">
-              <a:solidFill>
-                <a:schemeClr val="tx1"/>
-              </a:solidFill>
-            </a:endParaRPr>
-          </a:p>
-        </p:txBody>
-      </p:sp>
-      <p:sp>
-        <p:nvSpPr>
-          <p:cNvPr id="17" name="Snip Single Corner Rectangle 16"/>
-          <p:cNvSpPr/>
-          <p:nvPr/>
-        </p:nvSpPr>
-        <p:spPr>
-          <a:xfrm>
-            <a:off x="2667000" y="4221692"/>
-            <a:ext cx="3758902" cy="2255308"/>
-          </a:xfrm>
-          <a:prstGeom prst="snip1Rect">
-            <a:avLst/>
-          </a:prstGeom>
-          <a:solidFill>
-            <a:schemeClr val="tx1"/>
-          </a:solidFill>
-        </p:spPr>
-        <p:style>
-          <a:lnRef idx="1">
-            <a:schemeClr val="accent1"/>
-          </a:lnRef>
-          <a:fillRef idx="3">
-            <a:schemeClr val="accent1"/>
-          </a:fillRef>
-          <a:effectRef idx="2">
-            <a:schemeClr val="accent1"/>
-          </a:effectRef>
-          <a:fontRef idx="minor">
-            <a:schemeClr val="lt1"/>
-          </a:fontRef>
-        </p:style>
-        <p:txBody>
-          <a:bodyPr rtlCol="0" anchor="t" anchorCtr="0"/>
-          <a:lstStyle/>
-          <a:p>
-            <a:r>
-              <a:rPr lang="en-US" sz="1200" dirty="0">
-                <a:solidFill>
-                  <a:schemeClr val="bg1"/>
-                </a:solidFill>
-                <a:latin typeface="Consolas"/>
-                <a:cs typeface="Consolas"/>
-              </a:rPr>
-              <a:t>&gt; GET /path HTTP/1.1</a:t>
-            </a:r>
-          </a:p>
-          <a:p>
-            <a:r>
-              <a:rPr lang="en-US" sz="1200" dirty="0">
-                <a:solidFill>
-                  <a:schemeClr val="bg1"/>
-                </a:solidFill>
-                <a:latin typeface="Consolas"/>
-                <a:cs typeface="Consolas"/>
-              </a:rPr>
-              <a:t>&gt; User-Agent: Mozilla/</a:t>
-            </a:r>
-            <a:r>
-              <a:rPr lang="en-US" sz="1200" dirty="0" smtClean="0">
-                <a:solidFill>
-                  <a:schemeClr val="bg1"/>
-                </a:solidFill>
-                <a:latin typeface="Consolas"/>
-                <a:cs typeface="Consolas"/>
-              </a:rPr>
-              <a:t>5.0</a:t>
-            </a:r>
-            <a:endParaRPr lang="en-US" sz="1200" dirty="0">
-              <a:solidFill>
-                <a:schemeClr val="bg1"/>
-              </a:solidFill>
-              <a:latin typeface="Consolas"/>
-              <a:cs typeface="Consolas"/>
-            </a:endParaRPr>
-          </a:p>
-          <a:p>
-            <a:r>
-              <a:rPr lang="en-US" sz="1200" dirty="0">
-                <a:solidFill>
-                  <a:schemeClr val="bg1"/>
-                </a:solidFill>
-                <a:latin typeface="Consolas"/>
-                <a:cs typeface="Consolas"/>
-              </a:rPr>
-              <a:t>&gt; Host: </a:t>
-            </a:r>
-            <a:r>
-              <a:rPr lang="en-US" sz="1200" dirty="0" err="1" smtClean="0">
-                <a:solidFill>
-                  <a:schemeClr val="bg1"/>
-                </a:solidFill>
-                <a:latin typeface="Consolas"/>
-                <a:cs typeface="Consolas"/>
-              </a:rPr>
-              <a:t>anotherhost.com</a:t>
-            </a:r>
-            <a:endParaRPr lang="en-US" sz="1200" dirty="0">
-              <a:solidFill>
-                <a:schemeClr val="bg1"/>
-              </a:solidFill>
-              <a:latin typeface="Consolas"/>
-              <a:cs typeface="Consolas"/>
-            </a:endParaRPr>
-          </a:p>
-          <a:p>
-            <a:pPr marL="171450" indent="-171450">
-              <a:buFont typeface="Wingdings" charset="0"/>
-              <a:buChar char="Ø"/>
-            </a:pPr>
-            <a:r>
-              <a:rPr lang="en-US" sz="1200" dirty="0" smtClean="0">
-                <a:solidFill>
-                  <a:schemeClr val="bg1"/>
-                </a:solidFill>
-                <a:latin typeface="Consolas"/>
-                <a:cs typeface="Consolas"/>
-              </a:rPr>
-              <a:t>.</a:t>
-            </a:r>
-            <a:r>
-              <a:rPr lang="en-US" sz="1200" dirty="0">
-                <a:solidFill>
-                  <a:schemeClr val="bg1"/>
-                </a:solidFill>
-                <a:latin typeface="Consolas"/>
-                <a:cs typeface="Consolas"/>
-              </a:rPr>
-              <a:t>.....</a:t>
-            </a:r>
-            <a:r>
-              <a:rPr lang="en-US" sz="1200" dirty="0" smtClean="0">
-                <a:solidFill>
-                  <a:schemeClr val="bg1"/>
-                </a:solidFill>
-                <a:latin typeface="Consolas"/>
-                <a:cs typeface="Consolas"/>
-              </a:rPr>
-              <a:t>.</a:t>
-            </a:r>
-          </a:p>
-          <a:p>
-            <a:pPr marL="171450" indent="-171450">
-              <a:buFont typeface="Wingdings" charset="0"/>
-              <a:buChar char="Ø"/>
-            </a:pPr>
-            <a:endParaRPr lang="en-US" sz="1200" dirty="0">
-              <a:solidFill>
-                <a:schemeClr val="bg1"/>
-              </a:solidFill>
-              <a:latin typeface="Consolas"/>
-              <a:cs typeface="Consolas"/>
-            </a:endParaRPr>
-          </a:p>
-          <a:p>
-            <a:r>
-              <a:rPr lang="en-US" sz="1200" dirty="0">
-                <a:solidFill>
-                  <a:schemeClr val="bg1"/>
-                </a:solidFill>
-                <a:latin typeface="Consolas"/>
-                <a:cs typeface="Consolas"/>
-              </a:rPr>
-              <a:t>&lt; HTTP/1.1 200 OK</a:t>
-            </a:r>
-          </a:p>
-          <a:p>
-            <a:r>
-              <a:rPr lang="en-US" sz="1200" dirty="0">
-                <a:solidFill>
-                  <a:schemeClr val="bg1"/>
-                </a:solidFill>
-                <a:latin typeface="Consolas"/>
-                <a:cs typeface="Consolas"/>
-              </a:rPr>
-              <a:t>&lt; Date: Wed, </a:t>
-            </a:r>
-            <a:r>
-              <a:rPr lang="en-US" sz="1200" dirty="0" smtClean="0">
-                <a:solidFill>
-                  <a:schemeClr val="bg1"/>
-                </a:solidFill>
-                <a:latin typeface="Consolas"/>
-                <a:cs typeface="Consolas"/>
-              </a:rPr>
-              <a:t>01 </a:t>
-            </a:r>
-            <a:r>
-              <a:rPr lang="en-US" sz="1200" dirty="0">
-                <a:solidFill>
-                  <a:schemeClr val="bg1"/>
-                </a:solidFill>
-                <a:latin typeface="Consolas"/>
-                <a:cs typeface="Consolas"/>
-              </a:rPr>
-              <a:t>Jan 2013 </a:t>
-            </a:r>
-            <a:r>
-              <a:rPr lang="en-US" sz="1200" dirty="0" smtClean="0">
-                <a:solidFill>
-                  <a:schemeClr val="bg1"/>
-                </a:solidFill>
-                <a:latin typeface="Consolas"/>
-                <a:cs typeface="Consolas"/>
-              </a:rPr>
-              <a:t>20:11:49 </a:t>
-            </a:r>
-            <a:r>
-              <a:rPr lang="en-US" sz="1200" dirty="0">
-                <a:solidFill>
-                  <a:schemeClr val="bg1"/>
-                </a:solidFill>
-                <a:latin typeface="Consolas"/>
-                <a:cs typeface="Consolas"/>
-              </a:rPr>
-              <a:t>GMT</a:t>
-            </a:r>
-          </a:p>
-          <a:p>
-            <a:r>
-              <a:rPr lang="en-US" sz="1200" dirty="0">
-                <a:solidFill>
-                  <a:schemeClr val="bg1"/>
-                </a:solidFill>
-                <a:latin typeface="Consolas"/>
-                <a:cs typeface="Consolas"/>
-              </a:rPr>
-              <a:t>&lt; Server</a:t>
-            </a:r>
-            <a:r>
-              <a:rPr lang="en-US" sz="1200">
-                <a:solidFill>
-                  <a:schemeClr val="bg1"/>
-                </a:solidFill>
-                <a:latin typeface="Consolas"/>
-                <a:cs typeface="Consolas"/>
-              </a:rPr>
-              <a:t>: </a:t>
-            </a:r>
-            <a:r>
-              <a:rPr lang="en-US" sz="1200">
-                <a:solidFill>
-                  <a:schemeClr val="bg1"/>
-                </a:solidFill>
-                <a:latin typeface="Consolas"/>
-                <a:cs typeface="Consolas"/>
-              </a:rPr>
-              <a:t>Apache/2.2.23</a:t>
-            </a:r>
-            <a:endParaRPr lang="en-US" sz="1200" dirty="0">
-              <a:solidFill>
-                <a:schemeClr val="bg1"/>
-              </a:solidFill>
-              <a:latin typeface="Consolas"/>
-              <a:cs typeface="Consolas"/>
-            </a:endParaRPr>
-          </a:p>
-          <a:p>
-            <a:r>
-              <a:rPr lang="en-US" sz="1200" dirty="0">
-                <a:solidFill>
-                  <a:schemeClr val="bg1"/>
-                </a:solidFill>
-                <a:latin typeface="Consolas"/>
-                <a:cs typeface="Consolas"/>
-              </a:rPr>
-              <a:t>&lt; Content-Type: application/</a:t>
-            </a:r>
-            <a:r>
-              <a:rPr lang="en-US" sz="1200" dirty="0" err="1">
-                <a:solidFill>
-                  <a:schemeClr val="bg1"/>
-                </a:solidFill>
-                <a:latin typeface="Consolas"/>
-                <a:cs typeface="Consolas"/>
-              </a:rPr>
-              <a:t>json;charset</a:t>
-            </a:r>
-            <a:r>
-              <a:rPr lang="en-US" sz="1200" dirty="0">
-                <a:solidFill>
-                  <a:schemeClr val="bg1"/>
-                </a:solidFill>
-                <a:latin typeface="Consolas"/>
-                <a:cs typeface="Consolas"/>
-              </a:rPr>
-              <a:t>=UTF-8</a:t>
-            </a:r>
-          </a:p>
-          <a:p>
-            <a:r>
-              <a:rPr lang="en-US" sz="1200" dirty="0">
-                <a:solidFill>
-                  <a:schemeClr val="bg1"/>
-                </a:solidFill>
-                <a:latin typeface="Consolas"/>
-                <a:cs typeface="Consolas"/>
-              </a:rPr>
-              <a:t>&lt; ......</a:t>
-            </a:r>
-          </a:p>
-          <a:p>
-            <a:endParaRPr lang="en-US" sz="1200" dirty="0">
-              <a:solidFill>
-                <a:schemeClr val="bg1"/>
-              </a:solidFill>
-              <a:latin typeface="Consolas"/>
-              <a:cs typeface="Consolas"/>
-            </a:endParaRPr>
-          </a:p>
-          <a:p>
-            <a:pPr marL="171450" indent="-171450">
-              <a:buFont typeface="Wingdings" charset="0"/>
-              <a:buChar char="Ø"/>
-            </a:pPr>
-            <a:endParaRPr lang="en-US" sz="1200" dirty="0">
-              <a:solidFill>
-                <a:schemeClr val="bg1"/>
-              </a:solidFill>
-              <a:latin typeface="Consolas"/>
-              <a:cs typeface="Consolas"/>
-            </a:endParaRPr>
-          </a:p>
-        </p:txBody>
-      </p:sp>
-      <p:pic>
-        <p:nvPicPr>
-          <p:cNvPr id="18" name="Picture 17"/>
-          <p:cNvPicPr>
-            <a:picLocks noChangeAspect="1"/>
-          </p:cNvPicPr>
-          <p:nvPr/>
-        </p:nvPicPr>
-        <p:blipFill>
-          <a:blip r:embed="rId3"/>
-          <a:stretch>
-            <a:fillRect/>
-          </a:stretch>
-        </p:blipFill>
-        <p:spPr>
-          <a:xfrm>
-            <a:off x="6919600" y="4838700"/>
-            <a:ext cx="961994" cy="921232"/>
-          </a:xfrm>
-          <a:prstGeom prst="rect">
-            <a:avLst/>
-          </a:prstGeom>
-        </p:spPr>
-      </p:pic>
-      <p:sp>
-        <p:nvSpPr>
-          <p:cNvPr id="19" name="TextBox 18"/>
-          <p:cNvSpPr txBox="1"/>
-          <p:nvPr/>
-        </p:nvSpPr>
-        <p:spPr>
-          <a:xfrm>
-            <a:off x="6527503" y="4337446"/>
-            <a:ext cx="1521984" cy="307777"/>
-          </a:xfrm>
-          <a:prstGeom prst="rect">
-            <a:avLst/>
-          </a:prstGeom>
-          <a:noFill/>
-        </p:spPr>
-        <p:txBody>
-          <a:bodyPr wrap="none" rtlCol="0">
-            <a:spAutoFit/>
-          </a:bodyPr>
-          <a:lstStyle/>
-          <a:p>
-            <a:r>
-              <a:rPr lang="en-US" sz="1400" dirty="0" err="1" smtClean="0"/>
-              <a:t>anotherhost.com</a:t>
-            </a:r>
-            <a:endParaRPr lang="en-US" sz="1400" dirty="0"/>
-          </a:p>
-        </p:txBody>
-      </p:sp>
-      <p:sp>
-        <p:nvSpPr>
-          <p:cNvPr id="21" name="Curved Left Arrow 20"/>
-          <p:cNvSpPr/>
-          <p:nvPr/>
-        </p:nvSpPr>
-        <p:spPr>
-          <a:xfrm>
-            <a:off x="6667011" y="4714334"/>
-            <a:ext cx="584200" cy="1302876"/>
-          </a:xfrm>
-          <a:prstGeom prst="curvedLeftArrow">
-            <a:avLst/>
-          </a:prstGeom>
-        </p:spPr>
-        <p:style>
-          <a:lnRef idx="1">
-            <a:schemeClr val="accent1"/>
-          </a:lnRef>
-          <a:fillRef idx="3">
-            <a:schemeClr val="accent1"/>
-          </a:fillRef>
-          <a:effectRef idx="2">
-            <a:schemeClr val="accent1"/>
-          </a:effectRef>
-          <a:fontRef idx="minor">
-            <a:schemeClr val="lt1"/>
-          </a:fontRef>
-        </p:style>
-        <p:txBody>
-          <a:bodyPr rtlCol="0" anchor="ctr"/>
-          <a:lstStyle/>
-          <a:p>
-            <a:pPr algn="ctr"/>
-            <a:endParaRPr lang="en-US">
-              <a:solidFill>
-                <a:schemeClr val="tx1"/>
-              </a:solidFill>
-            </a:endParaRPr>
-          </a:p>
-        </p:txBody>
-      </p:sp>
     </p:spTree>
     <p:extLst>
       <p:ext uri="{BB962C8B-B14F-4D97-AF65-F5344CB8AC3E}">
-        <p14:creationId xmlns:p14="http://schemas.microsoft.com/office/powerpoint/2010/main" val="1916411446"/>
+        <p14:creationId xmlns:p14="http://schemas.microsoft.com/office/powerpoint/2010/main" val="3805536355"/>
       </p:ext>
     </p:extLst>
   </p:cSld>
@@ -8612,12 +8587,14 @@
         </p:nvSpPr>
         <p:spPr/>
         <p:txBody>
-          <a:bodyPr/>
+          <a:bodyPr>
+            <a:normAutofit fontScale="90000"/>
+          </a:bodyPr>
           <a:lstStyle/>
           <a:p>
             <a:r>
               <a:rPr lang="en-US" dirty="0" smtClean="0"/>
-              <a:t>HTTP overview</a:t>
+              <a:t>API’s for patient related information</a:t>
             </a:r>
             <a:endParaRPr lang="en-US" dirty="0"/>
           </a:p>
@@ -8642,7 +8619,7 @@
           <a:p>
             <a:r>
               <a:rPr lang="en-US" dirty="0" smtClean="0"/>
-              <a:t>Exercise 1</a:t>
+              <a:t>Introduction</a:t>
             </a:r>
             <a:endParaRPr lang="en-US" dirty="0"/>
           </a:p>
@@ -8663,12 +8640,78 @@
           <a:bodyPr/>
           <a:lstStyle/>
           <a:p>
-            <a:pPr marL="0" indent="0">
-              <a:buNone/>
-            </a:pPr>
-            <a:r>
-              <a:rPr lang="en-US" dirty="0" smtClean="0"/>
-              <a:t>Use Curl to make http requests against public data API</a:t>
+            <a:r>
+              <a:rPr lang="en-US" sz="1800" dirty="0" smtClean="0"/>
+              <a:t>As opposed to the public API’s, not open data API’s</a:t>
+            </a:r>
+          </a:p>
+          <a:p>
+            <a:r>
+              <a:rPr lang="en-US" sz="1800" dirty="0" smtClean="0"/>
+              <a:t>Strong authentication of citizens</a:t>
+            </a:r>
+          </a:p>
+          <a:p>
+            <a:pPr lvl="1"/>
+            <a:r>
+              <a:rPr lang="en-US" sz="1800" dirty="0" smtClean="0"/>
+              <a:t>Demand from </a:t>
+            </a:r>
+            <a:r>
+              <a:rPr lang="en-US" sz="1800" dirty="0" err="1" smtClean="0"/>
+              <a:t>Datainspektionen</a:t>
+            </a:r>
+            <a:endParaRPr lang="en-US" sz="1800" dirty="0" smtClean="0"/>
+          </a:p>
+          <a:p>
+            <a:pPr lvl="1"/>
+            <a:r>
+              <a:rPr lang="en-US" sz="1800" dirty="0" smtClean="0"/>
+              <a:t>2 factor</a:t>
+            </a:r>
+          </a:p>
+          <a:p>
+            <a:r>
+              <a:rPr lang="en-US" sz="1800" dirty="0" smtClean="0"/>
+              <a:t>Strong authentication of API clients</a:t>
+            </a:r>
+          </a:p>
+          <a:p>
+            <a:pPr lvl="1"/>
+            <a:r>
+              <a:rPr lang="en-US" sz="1800" dirty="0" smtClean="0"/>
+              <a:t>SSL/TLS certificate issued by trusted CA</a:t>
+            </a:r>
+          </a:p>
+          <a:p>
+            <a:pPr lvl="1"/>
+            <a:r>
+              <a:rPr lang="en-US" sz="1800" dirty="0" smtClean="0"/>
+              <a:t>Mutual </a:t>
+            </a:r>
+            <a:r>
+              <a:rPr lang="en-US" sz="1800" dirty="0" err="1" smtClean="0"/>
+              <a:t>authenticaton</a:t>
+            </a:r>
+            <a:endParaRPr lang="en-US" sz="1800" dirty="0" smtClean="0"/>
+          </a:p>
+          <a:p>
+            <a:r>
+              <a:rPr lang="en-US" sz="1800" dirty="0" smtClean="0"/>
+              <a:t>Strict authorization control</a:t>
+            </a:r>
+          </a:p>
+          <a:p>
+            <a:pPr lvl="1"/>
+            <a:r>
+              <a:rPr lang="en-US" sz="1600" dirty="0" smtClean="0"/>
+              <a:t>Citizen approved </a:t>
+            </a:r>
+          </a:p>
+          <a:p>
+            <a:r>
+              <a:rPr lang="en-US" sz="1800" dirty="0" smtClean="0"/>
+              <a:t>So what’s the problem???</a:t>
             </a:r>
           </a:p>
         </p:txBody>
@@ -8705,7 +8748,7 @@
     </p:spTree>
     <p:extLst>
       <p:ext uri="{BB962C8B-B14F-4D97-AF65-F5344CB8AC3E}">
-        <p14:creationId xmlns:p14="http://schemas.microsoft.com/office/powerpoint/2010/main" val="3805536355"/>
+        <p14:creationId xmlns:p14="http://schemas.microsoft.com/office/powerpoint/2010/main" val="910791665"/>
       </p:ext>
     </p:extLst>
   </p:cSld>
@@ -8757,10 +8800,9 @@
           <a:lstStyle/>
           <a:p>
             <a:r>
-              <a:rPr lang="en-US" dirty="0" smtClean="0"/>
+              <a:rPr lang="en-US" dirty="0"/>
               <a:t>API’s for patient related information</a:t>
             </a:r>
-            <a:endParaRPr lang="en-US" dirty="0"/>
           </a:p>
         </p:txBody>
       </p:sp>
@@ -8783,7 +8825,7 @@
           <a:p>
             <a:r>
               <a:rPr lang="en-US" dirty="0" smtClean="0"/>
-              <a:t>Introduction</a:t>
+              <a:t>The problem</a:t>
             </a:r>
             <a:endParaRPr lang="en-US" dirty="0"/>
           </a:p>
@@ -8799,84 +8841,21 @@
             <p:ph type="body" sz="quarter" idx="13"/>
           </p:nvPr>
         </p:nvSpPr>
-        <p:spPr/>
+        <p:spPr>
+          <a:ln w="38100" cmpd="sng">
+            <a:solidFill>
+              <a:srgbClr val="4F81BD"/>
+            </a:solidFill>
+          </a:ln>
+        </p:spPr>
         <p:txBody>
           <a:bodyPr/>
           <a:lstStyle/>
           <a:p>
-            <a:r>
-              <a:rPr lang="en-US" sz="1800" dirty="0" smtClean="0"/>
-              <a:t>As opposed to the public API’s, not open data API’s</a:t>
-            </a:r>
-          </a:p>
-          <a:p>
-            <a:r>
-              <a:rPr lang="en-US" sz="1800" dirty="0" smtClean="0"/>
-              <a:t>Strong authentication of citizens</a:t>
-            </a:r>
-          </a:p>
-          <a:p>
-            <a:pPr lvl="1"/>
-            <a:r>
-              <a:rPr lang="en-US" sz="1800" dirty="0" smtClean="0"/>
-              <a:t>Demand from </a:t>
-            </a:r>
-            <a:r>
-              <a:rPr lang="en-US" sz="1800" dirty="0" err="1" smtClean="0"/>
-              <a:t>Datainspektionen</a:t>
-            </a:r>
-            <a:endParaRPr lang="en-US" sz="1800" dirty="0" smtClean="0"/>
-          </a:p>
-          <a:p>
-            <a:pPr lvl="1"/>
-            <a:r>
-              <a:rPr lang="en-US" sz="1800" dirty="0" smtClean="0"/>
-              <a:t>2 factor</a:t>
-            </a:r>
-          </a:p>
-          <a:p>
-            <a:r>
-              <a:rPr lang="en-US" sz="1800" dirty="0" smtClean="0"/>
-              <a:t>Strong authentication of API clients</a:t>
-            </a:r>
-          </a:p>
-          <a:p>
-            <a:pPr lvl="1"/>
-            <a:r>
-              <a:rPr lang="en-US" sz="1800" dirty="0" smtClean="0"/>
-              <a:t>SSL/TLS certificate issued by trusted CA</a:t>
-            </a:r>
-          </a:p>
-          <a:p>
-            <a:pPr lvl="1"/>
-            <a:r>
-              <a:rPr lang="en-US" sz="1800" dirty="0" smtClean="0"/>
-              <a:t>Mutual </a:t>
-            </a:r>
-            <a:r>
-              <a:rPr lang="en-US" sz="1800" dirty="0" err="1" smtClean="0"/>
-              <a:t>authenticaton</a:t>
-            </a:r>
-            <a:endParaRPr lang="en-US" sz="1800" dirty="0" smtClean="0"/>
-          </a:p>
-          <a:p>
-            <a:r>
-              <a:rPr lang="en-US" sz="1800" dirty="0" smtClean="0"/>
-              <a:t>Strict authorization control</a:t>
-            </a:r>
-          </a:p>
-          <a:p>
-            <a:pPr lvl="1"/>
-            <a:r>
-              <a:rPr lang="en-US" sz="1600" dirty="0" smtClean="0"/>
-              <a:t>Citizen approved </a:t>
-            </a:r>
-          </a:p>
-          <a:p>
-            <a:r>
-              <a:rPr lang="en-US" sz="1800" dirty="0" smtClean="0"/>
-              <a:t>So what’s the problem???</a:t>
-            </a:r>
+            <a:pPr marL="0" indent="0">
+              <a:buNone/>
+            </a:pPr>
+            <a:endParaRPr lang="en-US" sz="1400" dirty="0"/>
           </a:p>
         </p:txBody>
       </p:sp>
@@ -8904,149 +8883,6 @@
                 <a:defRPr/>
               </a:pPr>
               <a:t>13</a:t>
-            </a:fld>
-            <a:endParaRPr lang="sv-SE"/>
-          </a:p>
-        </p:txBody>
-      </p:sp>
-    </p:spTree>
-    <p:extLst>
-      <p:ext uri="{BB962C8B-B14F-4D97-AF65-F5344CB8AC3E}">
-        <p14:creationId xmlns:p14="http://schemas.microsoft.com/office/powerpoint/2010/main" val="910791665"/>
-      </p:ext>
-    </p:extLst>
-  </p:cSld>
-  <p:clrMapOvr>
-    <a:masterClrMapping/>
-  </p:clrMapOvr>
-  <p:timing>
-    <p:tnLst>
-      <p:par>
-        <p:cTn xmlns:p14="http://schemas.microsoft.com/office/powerpoint/2010/main" id="1" dur="indefinite" restart="never" nodeType="tmRoot"/>
-      </p:par>
-    </p:tnLst>
-  </p:timing>
-</p:sld>
-</file>
-
-<file path=ppt/slides/slide14.xml><?xml version="1.0" encoding="utf-8"?>
-<p:sld xmlns:a="http://schemas.openxmlformats.org/drawingml/2006/main" xmlns:r="http://schemas.openxmlformats.org/officeDocument/2006/relationships" xmlns:p="http://schemas.openxmlformats.org/presentationml/2006/main">
-  <p:cSld>
-    <p:spTree>
-      <p:nvGrpSpPr>
-        <p:cNvPr id="1" name=""/>
-        <p:cNvGrpSpPr/>
-        <p:nvPr/>
-      </p:nvGrpSpPr>
-      <p:grpSpPr>
-        <a:xfrm>
-          <a:off x="0" y="0"/>
-          <a:ext cx="0" cy="0"/>
-          <a:chOff x="0" y="0"/>
-          <a:chExt cx="0" cy="0"/>
-        </a:xfrm>
-      </p:grpSpPr>
-      <p:sp>
-        <p:nvSpPr>
-          <p:cNvPr id="2" name="Title 1"/>
-          <p:cNvSpPr>
-            <a:spLocks noGrp="1"/>
-          </p:cNvSpPr>
-          <p:nvPr>
-            <p:ph type="ctrTitle"/>
-          </p:nvPr>
-        </p:nvSpPr>
-        <p:spPr/>
-        <p:txBody>
-          <a:bodyPr>
-            <a:normAutofit fontScale="90000"/>
-          </a:bodyPr>
-          <a:lstStyle/>
-          <a:p>
-            <a:r>
-              <a:rPr lang="en-US" dirty="0"/>
-              <a:t>API’s for patient related information</a:t>
-            </a:r>
-          </a:p>
-        </p:txBody>
-      </p:sp>
-      <p:sp>
-        <p:nvSpPr>
-          <p:cNvPr id="3" name="Subtitle 2"/>
-          <p:cNvSpPr>
-            <a:spLocks noGrp="1"/>
-          </p:cNvSpPr>
-          <p:nvPr>
-            <p:ph type="subTitle" idx="1"/>
-          </p:nvPr>
-        </p:nvSpPr>
-        <p:spPr/>
-        <p:txBody>
-          <a:bodyPr>
-            <a:normAutofit fontScale="92500" lnSpcReduction="10000"/>
-          </a:bodyPr>
-          <a:lstStyle/>
-          <a:p>
-            <a:r>
-              <a:rPr lang="en-US" dirty="0" smtClean="0"/>
-              <a:t>The problem</a:t>
-            </a:r>
-            <a:endParaRPr lang="en-US" dirty="0"/>
-          </a:p>
-        </p:txBody>
-      </p:sp>
-      <p:sp>
-        <p:nvSpPr>
-          <p:cNvPr id="4" name="Text Placeholder 3"/>
-          <p:cNvSpPr>
-            <a:spLocks noGrp="1"/>
-          </p:cNvSpPr>
-          <p:nvPr>
-            <p:ph type="body" sz="quarter" idx="13"/>
-          </p:nvPr>
-        </p:nvSpPr>
-        <p:spPr>
-          <a:ln w="38100" cmpd="sng">
-            <a:solidFill>
-              <a:srgbClr val="4F81BD"/>
-            </a:solidFill>
-          </a:ln>
-        </p:spPr>
-        <p:txBody>
-          <a:bodyPr/>
-          <a:lstStyle/>
-          <a:p>
-            <a:pPr marL="0" indent="0">
-              <a:buNone/>
-            </a:pPr>
-            <a:endParaRPr lang="en-US" sz="1400" dirty="0"/>
-          </a:p>
-        </p:txBody>
-      </p:sp>
-      <p:sp>
-        <p:nvSpPr>
-          <p:cNvPr id="5" name="Slide Number Placeholder 4"/>
-          <p:cNvSpPr>
-            <a:spLocks noGrp="1"/>
-          </p:cNvSpPr>
-          <p:nvPr>
-            <p:ph type="sldNum" sz="quarter" idx="14"/>
-          </p:nvPr>
-        </p:nvSpPr>
-        <p:spPr/>
-        <p:txBody>
-          <a:bodyPr/>
-          <a:lstStyle/>
-          <a:p>
-            <a:pPr>
-              <a:defRPr/>
-            </a:pPr>
-            <a:fld id="{4AA01602-B999-AA4E-80A6-B21CED3A9C3C}" type="slidenum">
-              <a:rPr lang="sv-SE" smtClean="0"/>
-              <a:pPr>
-                <a:defRPr/>
-              </a:pPr>
-              <a:t>14</a:t>
             </a:fld>
             <a:endParaRPr lang="sv-SE"/>
           </a:p>
@@ -9748,7 +9584,7 @@
 </p:sld>
 </file>
 
-<file path=ppt/slides/slide15.xml><?xml version="1.0" encoding="utf-8"?>
+<file path=ppt/slides/slide14.xml><?xml version="1.0" encoding="utf-8"?>
 <p:sld xmlns:a="http://schemas.openxmlformats.org/drawingml/2006/main" xmlns:r="http://schemas.openxmlformats.org/officeDocument/2006/relationships" xmlns:p="http://schemas.openxmlformats.org/presentationml/2006/main">
   <p:cSld>
     <p:spTree>
@@ -9906,7 +9742,7 @@
               <a:pPr>
                 <a:defRPr/>
               </a:pPr>
-              <a:t>15</a:t>
+              <a:t>14</a:t>
             </a:fld>
             <a:endParaRPr lang="sv-SE"/>
           </a:p>
@@ -9932,7 +9768,7 @@
 </p:sld>
 </file>
 
-<file path=ppt/slides/slide16.xml><?xml version="1.0" encoding="utf-8"?>
+<file path=ppt/slides/slide15.xml><?xml version="1.0" encoding="utf-8"?>
 <p:sld xmlns:a="http://schemas.openxmlformats.org/drawingml/2006/main" xmlns:r="http://schemas.openxmlformats.org/officeDocument/2006/relationships" xmlns:p="http://schemas.openxmlformats.org/presentationml/2006/main">
   <p:cSld>
     <p:spTree>
@@ -10047,7 +9883,7 @@
               <a:pPr>
                 <a:defRPr/>
               </a:pPr>
-              <a:t>16</a:t>
+              <a:t>15</a:t>
             </a:fld>
             <a:endParaRPr lang="sv-SE"/>
           </a:p>
@@ -10484,7 +10320,7 @@
 </p:sld>
 </file>
 
-<file path=ppt/slides/slide17.xml><?xml version="1.0" encoding="utf-8"?>
+<file path=ppt/slides/slide16.xml><?xml version="1.0" encoding="utf-8"?>
 <p:sld xmlns:a="http://schemas.openxmlformats.org/drawingml/2006/main" xmlns:r="http://schemas.openxmlformats.org/officeDocument/2006/relationships" xmlns:p="http://schemas.openxmlformats.org/presentationml/2006/main">
   <p:cSld>
     <p:spTree>
@@ -10599,7 +10435,7 @@
               <a:pPr>
                 <a:defRPr/>
               </a:pPr>
-              <a:t>17</a:t>
+              <a:t>16</a:t>
             </a:fld>
             <a:endParaRPr lang="sv-SE"/>
           </a:p>
@@ -10655,7 +10491,7 @@
 </p:sld>
 </file>
 
-<file path=ppt/slides/slide18.xml><?xml version="1.0" encoding="utf-8"?>
+<file path=ppt/slides/slide17.xml><?xml version="1.0" encoding="utf-8"?>
 <p:sld xmlns:a="http://schemas.openxmlformats.org/drawingml/2006/main" xmlns:r="http://schemas.openxmlformats.org/officeDocument/2006/relationships" xmlns:p="http://schemas.openxmlformats.org/presentationml/2006/main">
   <p:cSld>
     <p:spTree>
@@ -10784,7 +10620,7 @@
               <a:pPr>
                 <a:defRPr/>
               </a:pPr>
-              <a:t>18</a:t>
+              <a:t>17</a:t>
             </a:fld>
             <a:endParaRPr lang="sv-SE"/>
           </a:p>
@@ -10810,7 +10646,7 @@
 </p:sld>
 </file>
 
-<file path=ppt/slides/slide19.xml><?xml version="1.0" encoding="utf-8"?>
+<file path=ppt/slides/slide18.xml><?xml version="1.0" encoding="utf-8"?>
 <p:sld xmlns:a="http://schemas.openxmlformats.org/drawingml/2006/main" xmlns:r="http://schemas.openxmlformats.org/officeDocument/2006/relationships" xmlns:p="http://schemas.openxmlformats.org/presentationml/2006/main">
   <p:cSld>
     <p:spTree>
@@ -10913,7 +10749,7 @@
               <a:pPr>
                 <a:defRPr/>
               </a:pPr>
-              <a:t>19</a:t>
+              <a:t>18</a:t>
             </a:fld>
             <a:endParaRPr lang="sv-SE"/>
           </a:p>
@@ -10969,6 +10805,159 @@
 </p:sld>
 </file>
 
+<file path=ppt/slides/slide19.xml><?xml version="1.0" encoding="utf-8"?>
+<p:sld xmlns:a="http://schemas.openxmlformats.org/drawingml/2006/main" xmlns:r="http://schemas.openxmlformats.org/officeDocument/2006/relationships" xmlns:p="http://schemas.openxmlformats.org/presentationml/2006/main">
+  <p:cSld>
+    <p:spTree>
+      <p:nvGrpSpPr>
+        <p:cNvPr id="1" name=""/>
+        <p:cNvGrpSpPr/>
+        <p:nvPr/>
+      </p:nvGrpSpPr>
+      <p:grpSpPr>
+        <a:xfrm>
+          <a:off x="0" y="0"/>
+          <a:ext cx="0" cy="0"/>
+          <a:chOff x="0" y="0"/>
+          <a:chExt cx="0" cy="0"/>
+        </a:xfrm>
+      </p:grpSpPr>
+      <p:sp>
+        <p:nvSpPr>
+          <p:cNvPr id="2" name="Title 1"/>
+          <p:cNvSpPr>
+            <a:spLocks noGrp="1"/>
+          </p:cNvSpPr>
+          <p:nvPr>
+            <p:ph type="ctrTitle"/>
+          </p:nvPr>
+        </p:nvSpPr>
+        <p:spPr/>
+        <p:txBody>
+          <a:bodyPr/>
+          <a:lstStyle/>
+          <a:p>
+            <a:r>
+              <a:rPr lang="en-US" dirty="0" smtClean="0"/>
+              <a:t>Backend</a:t>
+            </a:r>
+            <a:endParaRPr lang="en-US" dirty="0"/>
+          </a:p>
+        </p:txBody>
+      </p:sp>
+      <p:sp>
+        <p:nvSpPr>
+          <p:cNvPr id="3" name="Subtitle 2"/>
+          <p:cNvSpPr>
+            <a:spLocks noGrp="1"/>
+          </p:cNvSpPr>
+          <p:nvPr>
+            <p:ph type="subTitle" idx="1"/>
+          </p:nvPr>
+        </p:nvSpPr>
+        <p:spPr/>
+        <p:txBody>
+          <a:bodyPr>
+            <a:normAutofit fontScale="92500" lnSpcReduction="10000"/>
+          </a:bodyPr>
+          <a:lstStyle/>
+          <a:p>
+            <a:r>
+              <a:rPr lang="en-US" dirty="0" smtClean="0"/>
+              <a:t>Exercise </a:t>
+            </a:r>
+            <a:r>
+              <a:rPr lang="en-US" dirty="0"/>
+              <a:t>4</a:t>
+            </a:r>
+          </a:p>
+        </p:txBody>
+      </p:sp>
+      <p:sp>
+        <p:nvSpPr>
+          <p:cNvPr id="4" name="Text Placeholder 3"/>
+          <p:cNvSpPr>
+            <a:spLocks noGrp="1"/>
+          </p:cNvSpPr>
+          <p:nvPr>
+            <p:ph type="body" sz="quarter" idx="13"/>
+          </p:nvPr>
+        </p:nvSpPr>
+        <p:spPr/>
+        <p:txBody>
+          <a:bodyPr/>
+          <a:lstStyle/>
+          <a:p>
+            <a:pPr marL="0" indent="0">
+              <a:buNone/>
+            </a:pPr>
+            <a:r>
+              <a:rPr lang="en-US" dirty="0" smtClean="0"/>
+              <a:t>Build the app backend to handle the </a:t>
+            </a:r>
+            <a:r>
+              <a:rPr lang="en-US" dirty="0" err="1" smtClean="0"/>
+              <a:t>OAuth</a:t>
+            </a:r>
+            <a:r>
+              <a:rPr lang="en-US" dirty="0" smtClean="0"/>
+              <a:t> 2.0 integration with SDK and to provide an API for the app. </a:t>
+            </a:r>
+          </a:p>
+          <a:p>
+            <a:endParaRPr lang="en-US" dirty="0" smtClean="0"/>
+          </a:p>
+        </p:txBody>
+      </p:sp>
+      <p:sp>
+        <p:nvSpPr>
+          <p:cNvPr id="5" name="Slide Number Placeholder 4"/>
+          <p:cNvSpPr>
+            <a:spLocks noGrp="1"/>
+          </p:cNvSpPr>
+          <p:nvPr>
+            <p:ph type="sldNum" sz="quarter" idx="14"/>
+          </p:nvPr>
+        </p:nvSpPr>
+        <p:spPr/>
+        <p:txBody>
+          <a:bodyPr/>
+          <a:lstStyle/>
+          <a:p>
+            <a:pPr>
+              <a:defRPr/>
+            </a:pPr>
+            <a:fld id="{4AA01602-B999-AA4E-80A6-B21CED3A9C3C}" type="slidenum">
+              <a:rPr lang="sv-SE" smtClean="0"/>
+              <a:pPr>
+                <a:defRPr/>
+              </a:pPr>
+              <a:t>19</a:t>
+            </a:fld>
+            <a:endParaRPr lang="sv-SE"/>
+          </a:p>
+        </p:txBody>
+      </p:sp>
+    </p:spTree>
+    <p:extLst>
+      <p:ext uri="{BB962C8B-B14F-4D97-AF65-F5344CB8AC3E}">
+        <p14:creationId xmlns:p14="http://schemas.microsoft.com/office/powerpoint/2010/main" val="3668199394"/>
+      </p:ext>
+    </p:extLst>
+  </p:cSld>
+  <p:clrMapOvr>
+    <a:masterClrMapping/>
+  </p:clrMapOvr>
+  <p:timing>
+    <p:tnLst>
+      <p:par>
+        <p:cTn xmlns:p14="http://schemas.microsoft.com/office/powerpoint/2010/main" id="1" dur="indefinite" restart="never" nodeType="tmRoot"/>
+      </p:par>
+    </p:tnLst>
+  </p:timing>
+</p:sld>
+</file>
+
 <file path=ppt/slides/slide2.xml><?xml version="1.0" encoding="utf-8"?>
 <p:sld xmlns:a="http://schemas.openxmlformats.org/drawingml/2006/main" xmlns:r="http://schemas.openxmlformats.org/officeDocument/2006/relationships" xmlns:p="http://schemas.openxmlformats.org/presentationml/2006/main">
   <p:cSld>
@@ -11142,7 +11131,7 @@
           <a:p>
             <a:r>
               <a:rPr lang="en-US" dirty="0" smtClean="0"/>
-              <a:t>Backend</a:t>
+              <a:t>Frontend</a:t>
             </a:r>
             <a:endParaRPr lang="en-US" dirty="0"/>
           </a:p>
@@ -11165,14 +11154,7 @@
           </a:bodyPr>
           <a:lstStyle/>
           <a:p>
-            <a:r>
-              <a:rPr lang="en-US" dirty="0" smtClean="0"/>
-              <a:t>Exercise </a:t>
-            </a:r>
-            <a:r>
-              <a:rPr lang="en-US" dirty="0"/>
-              <a:t>4</a:t>
-            </a:r>
+            <a:endParaRPr lang="en-US" dirty="0"/>
           </a:p>
         </p:txBody>
       </p:sp>
@@ -11196,19 +11178,20 @@
             </a:pPr>
             <a:r>
               <a:rPr lang="en-US" dirty="0" smtClean="0"/>
-              <a:t>Build the app backend to handle the </a:t>
-            </a:r>
-            <a:r>
-              <a:rPr lang="en-US" dirty="0" err="1" smtClean="0"/>
-              <a:t>OAuth</a:t>
-            </a:r>
+              <a:t>Frontend technologies</a:t>
+            </a:r>
+          </a:p>
+          <a:p>
             <a:r>
               <a:rPr lang="en-US" dirty="0" smtClean="0"/>
-              <a:t> 2.0 integration with SDK and to provide an API for the app. </a:t>
-            </a:r>
-          </a:p>
-          <a:p>
-            <a:endParaRPr lang="en-US" dirty="0" smtClean="0"/>
+              <a:t>What’s happening on the frontend</a:t>
+            </a:r>
+          </a:p>
+          <a:p>
+            <a:r>
+              <a:rPr lang="en-US" dirty="0" smtClean="0"/>
+              <a:t>Short intro to Backbone</a:t>
+            </a:r>
           </a:p>
         </p:txBody>
       </p:sp>
@@ -11244,7 +11227,7 @@
     </p:spTree>
     <p:extLst>
       <p:ext uri="{BB962C8B-B14F-4D97-AF65-F5344CB8AC3E}">
-        <p14:creationId xmlns:p14="http://schemas.microsoft.com/office/powerpoint/2010/main" val="3668199394"/>
+        <p14:creationId xmlns:p14="http://schemas.microsoft.com/office/powerpoint/2010/main" val="3753766513"/>
       </p:ext>
     </p:extLst>
   </p:cSld>
@@ -11318,7 +11301,14 @@
           </a:bodyPr>
           <a:lstStyle/>
           <a:p>
-            <a:endParaRPr lang="en-US" dirty="0"/>
+            <a:r>
+              <a:rPr lang="en-US" dirty="0" smtClean="0"/>
+              <a:t>Exercise </a:t>
+            </a:r>
+            <a:r>
+              <a:rPr lang="en-US" dirty="0"/>
+              <a:t>5</a:t>
+            </a:r>
           </a:p>
         </p:txBody>
       </p:sp>
@@ -11342,20 +11332,17 @@
             </a:pPr>
             <a:r>
               <a:rPr lang="en-US" dirty="0" smtClean="0"/>
-              <a:t>Frontend technologies</a:t>
+              <a:t>Build a simple client that use the API provided by the backend. </a:t>
             </a:r>
           </a:p>
           <a:p>
             <a:r>
               <a:rPr lang="en-US" dirty="0" smtClean="0"/>
-              <a:t>What’s happening on the frontend</a:t>
-            </a:r>
-          </a:p>
-          <a:p>
-            <a:r>
-              <a:rPr lang="en-US" dirty="0" smtClean="0"/>
-              <a:t>Short intro to Backbone</a:t>
-            </a:r>
+              <a:t>Login user to create a session</a:t>
+            </a:r>
+          </a:p>
+          <a:p>
+            <a:endParaRPr lang="en-US" dirty="0" smtClean="0"/>
           </a:p>
         </p:txBody>
       </p:sp>
@@ -11391,7 +11378,7 @@
     </p:spTree>
     <p:extLst>
       <p:ext uri="{BB962C8B-B14F-4D97-AF65-F5344CB8AC3E}">
-        <p14:creationId xmlns:p14="http://schemas.microsoft.com/office/powerpoint/2010/main" val="3753766513"/>
+        <p14:creationId xmlns:p14="http://schemas.microsoft.com/office/powerpoint/2010/main" val="3598812586"/>
       </p:ext>
     </p:extLst>
   </p:cSld>
@@ -11442,7 +11429,7 @@
           <a:p>
             <a:r>
               <a:rPr lang="en-US" dirty="0" smtClean="0"/>
-              <a:t>Frontend</a:t>
+              <a:t>Links</a:t>
             </a:r>
             <a:endParaRPr lang="en-US" dirty="0"/>
           </a:p>
@@ -11465,14 +11452,7 @@
           </a:bodyPr>
           <a:lstStyle/>
           <a:p>
-            <a:r>
-              <a:rPr lang="en-US" dirty="0" smtClean="0"/>
-              <a:t>Exercise </a:t>
-            </a:r>
-            <a:r>
-              <a:rPr lang="en-US" dirty="0"/>
-              <a:t>5</a:t>
-            </a:r>
+            <a:endParaRPr lang="en-US"/>
           </a:p>
         </p:txBody>
       </p:sp>
@@ -11494,19 +11474,137 @@
             <a:pPr marL="0" indent="0">
               <a:buNone/>
             </a:pPr>
-            <a:r>
-              <a:rPr lang="en-US" dirty="0" smtClean="0"/>
-              <a:t>Build a simple client that use the API provided by the backend. </a:t>
-            </a:r>
-          </a:p>
-          <a:p>
-            <a:r>
-              <a:rPr lang="en-US" dirty="0" smtClean="0"/>
-              <a:t>Login user to create a session</a:t>
-            </a:r>
-          </a:p>
-          <a:p>
-            <a:endParaRPr lang="en-US" dirty="0" smtClean="0"/>
+            <a:endParaRPr lang="en-US" sz="1800" dirty="0" smtClean="0">
+              <a:hlinkClick r:id="rId2"/>
+            </a:endParaRPr>
+          </a:p>
+          <a:p>
+            <a:pPr marL="0" indent="0">
+              <a:buNone/>
+            </a:pPr>
+            <a:r>
+              <a:rPr lang="en-US" sz="1800" dirty="0"/>
+              <a:t>http://</a:t>
+            </a:r>
+            <a:r>
+              <a:rPr lang="en-US" sz="1800" dirty="0" err="1"/>
+              <a:t>www.vinnova.se</a:t>
+            </a:r>
+            <a:r>
+              <a:rPr lang="en-US" sz="1800" dirty="0" smtClean="0"/>
+              <a:t>/</a:t>
+            </a:r>
+            <a:endParaRPr lang="en-US" sz="1800" dirty="0" smtClean="0">
+              <a:hlinkClick r:id="rId2"/>
+            </a:endParaRPr>
+          </a:p>
+          <a:p>
+            <a:pPr marL="0" indent="0">
+              <a:buNone/>
+            </a:pPr>
+            <a:r>
+              <a:rPr lang="en-US" sz="1800" dirty="0">
+                <a:hlinkClick r:id="rId2"/>
+              </a:rPr>
+              <a:t>http://sdk.minavardkontakter.se</a:t>
+            </a:r>
+            <a:r>
+              <a:rPr lang="en-US" sz="1800" dirty="0" smtClean="0">
+                <a:hlinkClick r:id="rId2"/>
+              </a:rPr>
+              <a:t>/</a:t>
+            </a:r>
+          </a:p>
+          <a:p>
+            <a:pPr marL="0" indent="0">
+              <a:buNone/>
+            </a:pPr>
+            <a:r>
+              <a:rPr lang="en-US" sz="1800" dirty="0">
+                <a:hlinkClick r:id="rId2"/>
+              </a:rPr>
+              <a:t>http://oauth.net/2</a:t>
+            </a:r>
+            <a:r>
+              <a:rPr lang="en-US" sz="1800" dirty="0" smtClean="0">
+                <a:hlinkClick r:id="rId2"/>
+              </a:rPr>
+              <a:t>/</a:t>
+            </a:r>
+          </a:p>
+          <a:p>
+            <a:pPr marL="0" indent="0">
+              <a:buNone/>
+            </a:pPr>
+            <a:r>
+              <a:rPr lang="en-US" sz="1800" dirty="0">
+                <a:hlinkClick r:id="rId2"/>
+              </a:rPr>
+              <a:t>http://tools.ietf.org/html/draft-ietf-oauth-v2-31</a:t>
+            </a:r>
+            <a:endParaRPr lang="en-US" sz="1800" dirty="0" smtClean="0">
+              <a:hlinkClick r:id="rId2"/>
+            </a:endParaRPr>
+          </a:p>
+          <a:p>
+            <a:pPr marL="0" indent="0">
+              <a:buNone/>
+            </a:pPr>
+            <a:r>
+              <a:rPr lang="en-US" sz="1800" dirty="0" smtClean="0">
+                <a:hlinkClick r:id="rId2"/>
+              </a:rPr>
+              <a:t>https</a:t>
+            </a:r>
+            <a:r>
+              <a:rPr lang="en-US" sz="1800" dirty="0">
+                <a:hlinkClick r:id="rId2"/>
+              </a:rPr>
+              <a:t>://developers.google.com/accounts/docs/</a:t>
+            </a:r>
+            <a:r>
+              <a:rPr lang="en-US" sz="1800" dirty="0" smtClean="0">
+                <a:hlinkClick r:id="rId2"/>
+              </a:rPr>
+              <a:t>OAuth2</a:t>
+            </a:r>
+            <a:endParaRPr lang="en-US" sz="1800" dirty="0" smtClean="0"/>
+          </a:p>
+          <a:p>
+            <a:pPr marL="0" indent="0">
+              <a:buNone/>
+            </a:pPr>
+            <a:r>
+              <a:rPr lang="en-US" sz="1800" dirty="0">
+                <a:hlinkClick r:id="rId3"/>
+              </a:rPr>
+              <a:t>https://developers.facebook.com/docs/reference/dialogs/oauth</a:t>
+            </a:r>
+            <a:r>
+              <a:rPr lang="en-US" sz="1800" dirty="0" smtClean="0">
+                <a:hlinkClick r:id="rId3"/>
+              </a:rPr>
+              <a:t>/</a:t>
+            </a:r>
+            <a:endParaRPr lang="en-US" sz="1800" dirty="0" smtClean="0"/>
+          </a:p>
+          <a:p>
+            <a:pPr marL="0" indent="0">
+              <a:buNone/>
+            </a:pPr>
+            <a:endParaRPr lang="en-US" sz="1800" dirty="0" smtClean="0"/>
+          </a:p>
+          <a:p>
+            <a:pPr marL="0" indent="0">
+              <a:buNone/>
+            </a:pPr>
+            <a:endParaRPr lang="en-US" sz="1800" dirty="0"/>
+          </a:p>
+          <a:p>
+            <a:pPr marL="0" indent="0">
+              <a:buNone/>
+            </a:pPr>
+            <a:endParaRPr lang="en-US" sz="1800" dirty="0"/>
           </a:p>
         </p:txBody>
       </p:sp>
@@ -11534,268 +11632,6 @@
                 <a:defRPr/>
               </a:pPr>
               <a:t>22</a:t>
-            </a:fld>
-            <a:endParaRPr lang="sv-SE"/>
-          </a:p>
-        </p:txBody>
-      </p:sp>
-    </p:spTree>
-    <p:extLst>
-      <p:ext uri="{BB962C8B-B14F-4D97-AF65-F5344CB8AC3E}">
-        <p14:creationId xmlns:p14="http://schemas.microsoft.com/office/powerpoint/2010/main" val="3598812586"/>
-      </p:ext>
-    </p:extLst>
-  </p:cSld>
-  <p:clrMapOvr>
-    <a:masterClrMapping/>
-  </p:clrMapOvr>
-  <p:timing>
-    <p:tnLst>
-      <p:par>
-        <p:cTn xmlns:p14="http://schemas.microsoft.com/office/powerpoint/2010/main" id="1" dur="indefinite" restart="never" nodeType="tmRoot"/>
-      </p:par>
-    </p:tnLst>
-  </p:timing>
-</p:sld>
-</file>
-
-<file path=ppt/slides/slide23.xml><?xml version="1.0" encoding="utf-8"?>
-<p:sld xmlns:a="http://schemas.openxmlformats.org/drawingml/2006/main" xmlns:r="http://schemas.openxmlformats.org/officeDocument/2006/relationships" xmlns:p="http://schemas.openxmlformats.org/presentationml/2006/main">
-  <p:cSld>
-    <p:spTree>
-      <p:nvGrpSpPr>
-        <p:cNvPr id="1" name=""/>
-        <p:cNvGrpSpPr/>
-        <p:nvPr/>
-      </p:nvGrpSpPr>
-      <p:grpSpPr>
-        <a:xfrm>
-          <a:off x="0" y="0"/>
-          <a:ext cx="0" cy="0"/>
-          <a:chOff x="0" y="0"/>
-          <a:chExt cx="0" cy="0"/>
-        </a:xfrm>
-      </p:grpSpPr>
-      <p:sp>
-        <p:nvSpPr>
-          <p:cNvPr id="2" name="Title 1"/>
-          <p:cNvSpPr>
-            <a:spLocks noGrp="1"/>
-          </p:cNvSpPr>
-          <p:nvPr>
-            <p:ph type="ctrTitle"/>
-          </p:nvPr>
-        </p:nvSpPr>
-        <p:spPr/>
-        <p:txBody>
-          <a:bodyPr/>
-          <a:lstStyle/>
-          <a:p>
-            <a:r>
-              <a:rPr lang="en-US" dirty="0" smtClean="0"/>
-              <a:t>Links</a:t>
-            </a:r>
-            <a:endParaRPr lang="en-US" dirty="0"/>
-          </a:p>
-        </p:txBody>
-      </p:sp>
-      <p:sp>
-        <p:nvSpPr>
-          <p:cNvPr id="3" name="Subtitle 2"/>
-          <p:cNvSpPr>
-            <a:spLocks noGrp="1"/>
-          </p:cNvSpPr>
-          <p:nvPr>
-            <p:ph type="subTitle" idx="1"/>
-          </p:nvPr>
-        </p:nvSpPr>
-        <p:spPr/>
-        <p:txBody>
-          <a:bodyPr>
-            <a:normAutofit fontScale="92500" lnSpcReduction="10000"/>
-          </a:bodyPr>
-          <a:lstStyle/>
-          <a:p>
-            <a:endParaRPr lang="en-US"/>
-          </a:p>
-        </p:txBody>
-      </p:sp>
-      <p:sp>
-        <p:nvSpPr>
-          <p:cNvPr id="4" name="Text Placeholder 3"/>
-          <p:cNvSpPr>
-            <a:spLocks noGrp="1"/>
-          </p:cNvSpPr>
-          <p:nvPr>
-            <p:ph type="body" sz="quarter" idx="13"/>
-          </p:nvPr>
-        </p:nvSpPr>
-        <p:spPr/>
-        <p:txBody>
-          <a:bodyPr/>
-          <a:lstStyle/>
-          <a:p>
-            <a:pPr marL="0" indent="0">
-              <a:buNone/>
-            </a:pPr>
-            <a:endParaRPr lang="en-US" sz="1800" dirty="0" smtClean="0">
-              <a:hlinkClick r:id="rId2"/>
-            </a:endParaRPr>
-          </a:p>
-          <a:p>
-            <a:pPr marL="0" indent="0">
-              <a:buNone/>
-            </a:pPr>
-            <a:r>
-              <a:rPr lang="en-US" sz="1800" dirty="0"/>
-              <a:t>http://</a:t>
-            </a:r>
-            <a:r>
-              <a:rPr lang="en-US" sz="1800" dirty="0" err="1"/>
-              <a:t>www.vinnova.se</a:t>
-            </a:r>
-            <a:r>
-              <a:rPr lang="en-US" sz="1800" dirty="0" smtClean="0"/>
-              <a:t>/</a:t>
-            </a:r>
-            <a:endParaRPr lang="en-US" sz="1800" dirty="0" smtClean="0">
-              <a:hlinkClick r:id="rId2"/>
-            </a:endParaRPr>
-          </a:p>
-          <a:p>
-            <a:pPr marL="0" indent="0">
-              <a:buNone/>
-            </a:pPr>
-            <a:r>
-              <a:rPr lang="en-US" sz="1800" dirty="0">
-                <a:hlinkClick r:id="rId2"/>
-              </a:rPr>
-              <a:t>http://sdk.minavardkontakter.se</a:t>
-            </a:r>
-            <a:r>
-              <a:rPr lang="en-US" sz="1800" dirty="0" smtClean="0">
-                <a:hlinkClick r:id="rId2"/>
-              </a:rPr>
-              <a:t>/</a:t>
-            </a:r>
-          </a:p>
-          <a:p>
-            <a:pPr marL="0" indent="0">
-              <a:buNone/>
-            </a:pPr>
-            <a:r>
-              <a:rPr lang="en-US" sz="1800" dirty="0">
-                <a:hlinkClick r:id="rId2"/>
-              </a:rPr>
-              <a:t>http://oauth.net/2</a:t>
-            </a:r>
-            <a:r>
-              <a:rPr lang="en-US" sz="1800" dirty="0" smtClean="0">
-                <a:hlinkClick r:id="rId2"/>
-              </a:rPr>
-              <a:t>/</a:t>
-            </a:r>
-          </a:p>
-          <a:p>
-            <a:pPr marL="0" indent="0">
-              <a:buNone/>
-            </a:pPr>
-            <a:r>
-              <a:rPr lang="en-US" sz="1800" dirty="0">
-                <a:hlinkClick r:id="rId2"/>
-              </a:rPr>
-              <a:t>http://tools.ietf.org/html/draft-ietf-oauth-v2-31</a:t>
-            </a:r>
-            <a:endParaRPr lang="en-US" sz="1800" dirty="0" smtClean="0">
-              <a:hlinkClick r:id="rId2"/>
-            </a:endParaRPr>
-          </a:p>
-          <a:p>
-            <a:pPr marL="0" indent="0">
-              <a:buNone/>
-            </a:pPr>
-            <a:r>
-              <a:rPr lang="en-US" sz="1800" dirty="0" smtClean="0">
-                <a:hlinkClick r:id="rId2"/>
-              </a:rPr>
-              <a:t>https</a:t>
-            </a:r>
-            <a:r>
-              <a:rPr lang="en-US" sz="1800" dirty="0">
-                <a:hlinkClick r:id="rId2"/>
-              </a:rPr>
-              <a:t>://developers.google.com/accounts/docs/</a:t>
-            </a:r>
-            <a:r>
-              <a:rPr lang="en-US" sz="1800" dirty="0" smtClean="0">
-                <a:hlinkClick r:id="rId2"/>
-              </a:rPr>
-              <a:t>OAuth2</a:t>
-            </a:r>
-            <a:endParaRPr lang="en-US" sz="1800" dirty="0" smtClean="0"/>
-          </a:p>
-          <a:p>
-            <a:pPr marL="0" indent="0">
-              <a:buNone/>
-            </a:pPr>
-            <a:r>
-              <a:rPr lang="en-US" sz="1800" dirty="0">
-                <a:hlinkClick r:id="rId3"/>
-              </a:rPr>
-              <a:t>https://developers.facebook.com/docs/reference/dialogs/oauth</a:t>
-            </a:r>
-            <a:r>
-              <a:rPr lang="en-US" sz="1800" dirty="0" smtClean="0">
-                <a:hlinkClick r:id="rId3"/>
-              </a:rPr>
-              <a:t>/</a:t>
-            </a:r>
-            <a:endParaRPr lang="en-US" sz="1800" dirty="0" smtClean="0"/>
-          </a:p>
-          <a:p>
-            <a:pPr marL="0" indent="0">
-              <a:buNone/>
-            </a:pPr>
-            <a:endParaRPr lang="en-US" sz="1800" dirty="0" smtClean="0"/>
-          </a:p>
-          <a:p>
-            <a:pPr marL="0" indent="0">
-              <a:buNone/>
-            </a:pPr>
-            <a:endParaRPr lang="en-US" sz="1800" dirty="0"/>
-          </a:p>
-          <a:p>
-            <a:pPr marL="0" indent="0">
-              <a:buNone/>
-            </a:pPr>
-            <a:endParaRPr lang="en-US" sz="1800" dirty="0"/>
-          </a:p>
-        </p:txBody>
-      </p:sp>
-      <p:sp>
-        <p:nvSpPr>
-          <p:cNvPr id="5" name="Slide Number Placeholder 4"/>
-          <p:cNvSpPr>
-            <a:spLocks noGrp="1"/>
-          </p:cNvSpPr>
-          <p:nvPr>
-            <p:ph type="sldNum" sz="quarter" idx="14"/>
-          </p:nvPr>
-        </p:nvSpPr>
-        <p:spPr/>
-        <p:txBody>
-          <a:bodyPr/>
-          <a:lstStyle/>
-          <a:p>
-            <a:pPr>
-              <a:defRPr/>
-            </a:pPr>
-            <a:fld id="{4AA01602-B999-AA4E-80A6-B21CED3A9C3C}" type="slidenum">
-              <a:rPr lang="sv-SE" smtClean="0"/>
-              <a:pPr>
-                <a:defRPr/>
-              </a:pPr>
-              <a:t>23</a:t>
             </a:fld>
             <a:endParaRPr lang="sv-SE"/>
           </a:p>

</xml_diff>

<commit_message>
Updated ppt with lab info
</commit_message>
<xml_diff>
--- a/Cadec-vårdens-apier.pptx
+++ b/Cadec-vårdens-apier.pptx
@@ -5,10 +5,10 @@
     <p:sldMasterId id="2147483648" r:id="rId1"/>
   </p:sldMasterIdLst>
   <p:notesMasterIdLst>
-    <p:notesMasterId r:id="rId24"/>
+    <p:notesMasterId r:id="rId25"/>
   </p:notesMasterIdLst>
   <p:handoutMasterIdLst>
-    <p:handoutMasterId r:id="rId25"/>
+    <p:handoutMasterId r:id="rId26"/>
   </p:handoutMasterIdLst>
   <p:sldIdLst>
     <p:sldId id="256" r:id="rId2"/>
@@ -28,11 +28,12 @@
     <p:sldId id="272" r:id="rId16"/>
     <p:sldId id="273" r:id="rId17"/>
     <p:sldId id="267" r:id="rId18"/>
-    <p:sldId id="275" r:id="rId19"/>
-    <p:sldId id="269" r:id="rId20"/>
-    <p:sldId id="271" r:id="rId21"/>
-    <p:sldId id="270" r:id="rId22"/>
-    <p:sldId id="274" r:id="rId23"/>
+    <p:sldId id="283" r:id="rId19"/>
+    <p:sldId id="275" r:id="rId20"/>
+    <p:sldId id="269" r:id="rId21"/>
+    <p:sldId id="271" r:id="rId22"/>
+    <p:sldId id="270" r:id="rId23"/>
+    <p:sldId id="274" r:id="rId24"/>
   </p:sldIdLst>
   <p:sldSz cx="9144000" cy="6858000" type="screen4x3"/>
   <p:notesSz cx="6858000" cy="9144000"/>
@@ -11543,20 +11544,14 @@
         </p:nvSpPr>
         <p:spPr/>
         <p:txBody>
-          <a:bodyPr/>
+          <a:bodyPr>
+            <a:normAutofit fontScale="90000"/>
+          </a:bodyPr>
           <a:lstStyle/>
           <a:p>
             <a:r>
-              <a:rPr lang="en-US" dirty="0" smtClean="0"/>
-              <a:t>Simple </a:t>
-            </a:r>
-            <a:r>
-              <a:rPr lang="en-US" dirty="0" err="1" smtClean="0"/>
-              <a:t>OAuth</a:t>
-            </a:r>
-            <a:r>
-              <a:rPr lang="en-US" dirty="0" smtClean="0"/>
-              <a:t> 2.0 API Client</a:t>
+              <a:rPr lang="en-US" dirty="0"/>
+              <a:t>API’s containing patient related data</a:t>
             </a:r>
             <a:endParaRPr lang="en-US" dirty="0"/>
           </a:p>
@@ -11581,7 +11576,11 @@
           <a:p>
             <a:r>
               <a:rPr lang="en-US" dirty="0" smtClean="0"/>
-              <a:t>Exercise 3</a:t>
+              <a:t>Exercise </a:t>
+            </a:r>
+            <a:r>
+              <a:rPr lang="en-US" dirty="0" smtClean="0"/>
+              <a:t>2</a:t>
             </a:r>
             <a:endParaRPr lang="en-US" dirty="0"/>
           </a:p>
@@ -11606,17 +11605,18 @@
               <a:buNone/>
             </a:pPr>
             <a:r>
+              <a:rPr lang="en-US" dirty="0"/>
+              <a:t>Use Curl to make http requests against </a:t>
+            </a:r>
+            <a:r>
               <a:rPr lang="en-US" dirty="0" smtClean="0"/>
-              <a:t>Get familiar with </a:t>
-            </a:r>
-            <a:r>
-              <a:rPr lang="en-US" dirty="0" err="1" smtClean="0"/>
-              <a:t>OAuth</a:t>
+              <a:t>API</a:t>
             </a:r>
             <a:r>
               <a:rPr lang="en-US" dirty="0" smtClean="0"/>
-              <a:t> 2.0 and SDK by using a simple client letting the user authorize access.</a:t>
-            </a:r>
+              <a:t>´s containing patient related data.</a:t>
+            </a:r>
+            <a:endParaRPr lang="en-US" dirty="0"/>
           </a:p>
         </p:txBody>
       </p:sp>
@@ -11702,8 +11702,16 @@
           <a:lstStyle/>
           <a:p>
             <a:r>
+              <a:rPr lang="en-US" dirty="0" smtClean="0"/>
+              <a:t>Simple </a:t>
+            </a:r>
+            <a:r>
               <a:rPr lang="en-US" dirty="0" err="1" smtClean="0"/>
-              <a:t>Kaffe</a:t>
+              <a:t>OAuth</a:t>
+            </a:r>
+            <a:r>
+              <a:rPr lang="en-US" dirty="0" smtClean="0"/>
+              <a:t> 2.0 API Client</a:t>
             </a:r>
             <a:endParaRPr lang="en-US" dirty="0"/>
           </a:p>
@@ -11726,7 +11734,11 @@
           </a:bodyPr>
           <a:lstStyle/>
           <a:p>
-            <a:endParaRPr lang="en-US"/>
+            <a:r>
+              <a:rPr lang="en-US" dirty="0" smtClean="0"/>
+              <a:t>Exercise 3</a:t>
+            </a:r>
+            <a:endParaRPr lang="en-US" dirty="0"/>
           </a:p>
         </p:txBody>
       </p:sp>
@@ -11745,7 +11757,21 @@
           <a:bodyPr/>
           <a:lstStyle/>
           <a:p>
-            <a:endParaRPr lang="en-US" dirty="0"/>
+            <a:pPr marL="0" indent="0">
+              <a:buNone/>
+            </a:pPr>
+            <a:r>
+              <a:rPr lang="en-US" dirty="0" smtClean="0"/>
+              <a:t>Get familiar with </a:t>
+            </a:r>
+            <a:r>
+              <a:rPr lang="en-US" dirty="0" err="1" smtClean="0"/>
+              <a:t>OAuth</a:t>
+            </a:r>
+            <a:r>
+              <a:rPr lang="en-US" dirty="0" smtClean="0"/>
+              <a:t> 2.0 and SDK by using a simple client letting the user authorize access.</a:t>
+            </a:r>
           </a:p>
         </p:txBody>
       </p:sp>
@@ -11773,6 +11799,135 @@
                 <a:defRPr/>
               </a:pPr>
               <a:t>18</a:t>
+            </a:fld>
+            <a:endParaRPr lang="sv-SE"/>
+          </a:p>
+        </p:txBody>
+      </p:sp>
+    </p:spTree>
+    <p:extLst>
+      <p:ext uri="{BB962C8B-B14F-4D97-AF65-F5344CB8AC3E}">
+        <p14:creationId xmlns:p14="http://schemas.microsoft.com/office/powerpoint/2010/main" val="873325611"/>
+      </p:ext>
+    </p:extLst>
+  </p:cSld>
+  <p:clrMapOvr>
+    <a:masterClrMapping/>
+  </p:clrMapOvr>
+  <p:timing>
+    <p:tnLst>
+      <p:par>
+        <p:cTn xmlns:p14="http://schemas.microsoft.com/office/powerpoint/2010/main" id="1" dur="indefinite" restart="never" nodeType="tmRoot"/>
+      </p:par>
+    </p:tnLst>
+  </p:timing>
+</p:sld>
+</file>
+
+<file path=ppt/slides/slide19.xml><?xml version="1.0" encoding="utf-8"?>
+<p:sld xmlns:a="http://schemas.openxmlformats.org/drawingml/2006/main" xmlns:r="http://schemas.openxmlformats.org/officeDocument/2006/relationships" xmlns:p="http://schemas.openxmlformats.org/presentationml/2006/main">
+  <p:cSld>
+    <p:spTree>
+      <p:nvGrpSpPr>
+        <p:cNvPr id="1" name=""/>
+        <p:cNvGrpSpPr/>
+        <p:nvPr/>
+      </p:nvGrpSpPr>
+      <p:grpSpPr>
+        <a:xfrm>
+          <a:off x="0" y="0"/>
+          <a:ext cx="0" cy="0"/>
+          <a:chOff x="0" y="0"/>
+          <a:chExt cx="0" cy="0"/>
+        </a:xfrm>
+      </p:grpSpPr>
+      <p:sp>
+        <p:nvSpPr>
+          <p:cNvPr id="2" name="Title 1"/>
+          <p:cNvSpPr>
+            <a:spLocks noGrp="1"/>
+          </p:cNvSpPr>
+          <p:nvPr>
+            <p:ph type="ctrTitle"/>
+          </p:nvPr>
+        </p:nvSpPr>
+        <p:spPr/>
+        <p:txBody>
+          <a:bodyPr/>
+          <a:lstStyle/>
+          <a:p>
+            <a:r>
+              <a:rPr lang="en-US" dirty="0" err="1" smtClean="0"/>
+              <a:t>Kaffe</a:t>
+            </a:r>
+            <a:endParaRPr lang="en-US" dirty="0"/>
+          </a:p>
+        </p:txBody>
+      </p:sp>
+      <p:sp>
+        <p:nvSpPr>
+          <p:cNvPr id="3" name="Subtitle 2"/>
+          <p:cNvSpPr>
+            <a:spLocks noGrp="1"/>
+          </p:cNvSpPr>
+          <p:nvPr>
+            <p:ph type="subTitle" idx="1"/>
+          </p:nvPr>
+        </p:nvSpPr>
+        <p:spPr/>
+        <p:txBody>
+          <a:bodyPr>
+            <a:normAutofit fontScale="92500" lnSpcReduction="10000"/>
+          </a:bodyPr>
+          <a:lstStyle/>
+          <a:p>
+            <a:endParaRPr lang="en-US"/>
+          </a:p>
+        </p:txBody>
+      </p:sp>
+      <p:sp>
+        <p:nvSpPr>
+          <p:cNvPr id="4" name="Text Placeholder 3"/>
+          <p:cNvSpPr>
+            <a:spLocks noGrp="1"/>
+          </p:cNvSpPr>
+          <p:nvPr>
+            <p:ph type="body" sz="quarter" idx="13"/>
+          </p:nvPr>
+        </p:nvSpPr>
+        <p:spPr/>
+        <p:txBody>
+          <a:bodyPr/>
+          <a:lstStyle/>
+          <a:p>
+            <a:endParaRPr lang="en-US" dirty="0"/>
+          </a:p>
+        </p:txBody>
+      </p:sp>
+      <p:sp>
+        <p:nvSpPr>
+          <p:cNvPr id="5" name="Slide Number Placeholder 4"/>
+          <p:cNvSpPr>
+            <a:spLocks noGrp="1"/>
+          </p:cNvSpPr>
+          <p:nvPr>
+            <p:ph type="sldNum" sz="quarter" idx="14"/>
+          </p:nvPr>
+        </p:nvSpPr>
+        <p:spPr/>
+        <p:txBody>
+          <a:bodyPr/>
+          <a:lstStyle/>
+          <a:p>
+            <a:pPr>
+              <a:defRPr/>
+            </a:pPr>
+            <a:fld id="{4AA01602-B999-AA4E-80A6-B21CED3A9C3C}" type="slidenum">
+              <a:rPr lang="sv-SE" smtClean="0"/>
+              <a:pPr>
+                <a:defRPr/>
+              </a:pPr>
+              <a:t>19</a:t>
             </a:fld>
             <a:endParaRPr lang="sv-SE"/>
           </a:p>
@@ -11828,159 +11983,6 @@
 </p:sld>
 </file>
 
-<file path=ppt/slides/slide19.xml><?xml version="1.0" encoding="utf-8"?>
-<p:sld xmlns:a="http://schemas.openxmlformats.org/drawingml/2006/main" xmlns:r="http://schemas.openxmlformats.org/officeDocument/2006/relationships" xmlns:p="http://schemas.openxmlformats.org/presentationml/2006/main">
-  <p:cSld>
-    <p:spTree>
-      <p:nvGrpSpPr>
-        <p:cNvPr id="1" name=""/>
-        <p:cNvGrpSpPr/>
-        <p:nvPr/>
-      </p:nvGrpSpPr>
-      <p:grpSpPr>
-        <a:xfrm>
-          <a:off x="0" y="0"/>
-          <a:ext cx="0" cy="0"/>
-          <a:chOff x="0" y="0"/>
-          <a:chExt cx="0" cy="0"/>
-        </a:xfrm>
-      </p:grpSpPr>
-      <p:sp>
-        <p:nvSpPr>
-          <p:cNvPr id="2" name="Title 1"/>
-          <p:cNvSpPr>
-            <a:spLocks noGrp="1"/>
-          </p:cNvSpPr>
-          <p:nvPr>
-            <p:ph type="ctrTitle"/>
-          </p:nvPr>
-        </p:nvSpPr>
-        <p:spPr/>
-        <p:txBody>
-          <a:bodyPr/>
-          <a:lstStyle/>
-          <a:p>
-            <a:r>
-              <a:rPr lang="en-US" dirty="0" smtClean="0"/>
-              <a:t>Backend</a:t>
-            </a:r>
-            <a:endParaRPr lang="en-US" dirty="0"/>
-          </a:p>
-        </p:txBody>
-      </p:sp>
-      <p:sp>
-        <p:nvSpPr>
-          <p:cNvPr id="3" name="Subtitle 2"/>
-          <p:cNvSpPr>
-            <a:spLocks noGrp="1"/>
-          </p:cNvSpPr>
-          <p:nvPr>
-            <p:ph type="subTitle" idx="1"/>
-          </p:nvPr>
-        </p:nvSpPr>
-        <p:spPr/>
-        <p:txBody>
-          <a:bodyPr>
-            <a:normAutofit fontScale="92500" lnSpcReduction="10000"/>
-          </a:bodyPr>
-          <a:lstStyle/>
-          <a:p>
-            <a:r>
-              <a:rPr lang="en-US" dirty="0" smtClean="0"/>
-              <a:t>Exercise </a:t>
-            </a:r>
-            <a:r>
-              <a:rPr lang="en-US" dirty="0"/>
-              <a:t>4</a:t>
-            </a:r>
-          </a:p>
-        </p:txBody>
-      </p:sp>
-      <p:sp>
-        <p:nvSpPr>
-          <p:cNvPr id="4" name="Text Placeholder 3"/>
-          <p:cNvSpPr>
-            <a:spLocks noGrp="1"/>
-          </p:cNvSpPr>
-          <p:nvPr>
-            <p:ph type="body" sz="quarter" idx="13"/>
-          </p:nvPr>
-        </p:nvSpPr>
-        <p:spPr/>
-        <p:txBody>
-          <a:bodyPr/>
-          <a:lstStyle/>
-          <a:p>
-            <a:pPr marL="0" indent="0">
-              <a:buNone/>
-            </a:pPr>
-            <a:r>
-              <a:rPr lang="en-US" dirty="0" smtClean="0"/>
-              <a:t>Build the app backend to handle the </a:t>
-            </a:r>
-            <a:r>
-              <a:rPr lang="en-US" dirty="0" err="1" smtClean="0"/>
-              <a:t>OAuth</a:t>
-            </a:r>
-            <a:r>
-              <a:rPr lang="en-US" dirty="0" smtClean="0"/>
-              <a:t> 2.0 integration with SDK and to provide an API for the app. </a:t>
-            </a:r>
-          </a:p>
-          <a:p>
-            <a:endParaRPr lang="en-US" dirty="0" smtClean="0"/>
-          </a:p>
-        </p:txBody>
-      </p:sp>
-      <p:sp>
-        <p:nvSpPr>
-          <p:cNvPr id="5" name="Slide Number Placeholder 4"/>
-          <p:cNvSpPr>
-            <a:spLocks noGrp="1"/>
-          </p:cNvSpPr>
-          <p:nvPr>
-            <p:ph type="sldNum" sz="quarter" idx="14"/>
-          </p:nvPr>
-        </p:nvSpPr>
-        <p:spPr/>
-        <p:txBody>
-          <a:bodyPr/>
-          <a:lstStyle/>
-          <a:p>
-            <a:pPr>
-              <a:defRPr/>
-            </a:pPr>
-            <a:fld id="{4AA01602-B999-AA4E-80A6-B21CED3A9C3C}" type="slidenum">
-              <a:rPr lang="sv-SE" smtClean="0"/>
-              <a:pPr>
-                <a:defRPr/>
-              </a:pPr>
-              <a:t>19</a:t>
-            </a:fld>
-            <a:endParaRPr lang="sv-SE"/>
-          </a:p>
-        </p:txBody>
-      </p:sp>
-    </p:spTree>
-    <p:extLst>
-      <p:ext uri="{BB962C8B-B14F-4D97-AF65-F5344CB8AC3E}">
-        <p14:creationId xmlns:p14="http://schemas.microsoft.com/office/powerpoint/2010/main" val="3668199394"/>
-      </p:ext>
-    </p:extLst>
-  </p:cSld>
-  <p:clrMapOvr>
-    <a:masterClrMapping/>
-  </p:clrMapOvr>
-  <p:timing>
-    <p:tnLst>
-      <p:par>
-        <p:cTn xmlns:p14="http://schemas.microsoft.com/office/powerpoint/2010/main" id="1" dur="indefinite" restart="never" nodeType="tmRoot"/>
-      </p:par>
-    </p:tnLst>
-  </p:timing>
-</p:sld>
-</file>
-
 <file path=ppt/slides/slide2.xml><?xml version="1.0" encoding="utf-8"?>
 <p:sld xmlns:a="http://schemas.openxmlformats.org/drawingml/2006/main" xmlns:r="http://schemas.openxmlformats.org/officeDocument/2006/relationships" xmlns:p="http://schemas.openxmlformats.org/presentationml/2006/main">
   <p:cSld>
@@ -12154,7 +12156,7 @@
           <a:p>
             <a:r>
               <a:rPr lang="en-US" dirty="0" smtClean="0"/>
-              <a:t>Frontend</a:t>
+              <a:t>Backend</a:t>
             </a:r>
             <a:endParaRPr lang="en-US" dirty="0"/>
           </a:p>
@@ -12177,7 +12179,14 @@
           </a:bodyPr>
           <a:lstStyle/>
           <a:p>
-            <a:endParaRPr lang="en-US" dirty="0"/>
+            <a:r>
+              <a:rPr lang="en-US" dirty="0" smtClean="0"/>
+              <a:t>Exercise </a:t>
+            </a:r>
+            <a:r>
+              <a:rPr lang="en-US" dirty="0"/>
+              <a:t>4</a:t>
+            </a:r>
           </a:p>
         </p:txBody>
       </p:sp>
@@ -12201,20 +12210,19 @@
             </a:pPr>
             <a:r>
               <a:rPr lang="en-US" dirty="0" smtClean="0"/>
-              <a:t>Frontend technologies</a:t>
-            </a:r>
-          </a:p>
-          <a:p>
+              <a:t>Build the app backend to handle the </a:t>
+            </a:r>
+            <a:r>
+              <a:rPr lang="en-US" dirty="0" err="1" smtClean="0"/>
+              <a:t>OAuth</a:t>
+            </a:r>
             <a:r>
               <a:rPr lang="en-US" dirty="0" smtClean="0"/>
-              <a:t>What’s happening on the frontend</a:t>
-            </a:r>
-          </a:p>
-          <a:p>
-            <a:r>
-              <a:rPr lang="en-US" dirty="0" smtClean="0"/>
-              <a:t>Short intro to Backbone</a:t>
-            </a:r>
+              <a:t> 2.0 integration with SDK and to provide an API for the app. </a:t>
+            </a:r>
+          </a:p>
+          <a:p>
+            <a:endParaRPr lang="en-US" dirty="0" smtClean="0"/>
           </a:p>
         </p:txBody>
       </p:sp>
@@ -12250,7 +12258,7 @@
     </p:spTree>
     <p:extLst>
       <p:ext uri="{BB962C8B-B14F-4D97-AF65-F5344CB8AC3E}">
-        <p14:creationId xmlns:p14="http://schemas.microsoft.com/office/powerpoint/2010/main" val="3753766513"/>
+        <p14:creationId xmlns:p14="http://schemas.microsoft.com/office/powerpoint/2010/main" val="3668199394"/>
       </p:ext>
     </p:extLst>
   </p:cSld>
@@ -12324,14 +12332,7 @@
           </a:bodyPr>
           <a:lstStyle/>
           <a:p>
-            <a:r>
-              <a:rPr lang="en-US" dirty="0" smtClean="0"/>
-              <a:t>Exercise </a:t>
-            </a:r>
-            <a:r>
-              <a:rPr lang="en-US" dirty="0"/>
-              <a:t>5</a:t>
-            </a:r>
+            <a:endParaRPr lang="en-US" dirty="0"/>
           </a:p>
         </p:txBody>
       </p:sp>
@@ -12355,17 +12356,20 @@
             </a:pPr>
             <a:r>
               <a:rPr lang="en-US" dirty="0" smtClean="0"/>
-              <a:t>Build a simple client that use the API provided by the backend. </a:t>
+              <a:t>Frontend technologies</a:t>
             </a:r>
           </a:p>
           <a:p>
             <a:r>
               <a:rPr lang="en-US" dirty="0" smtClean="0"/>
-              <a:t>Login user to create a session</a:t>
-            </a:r>
-          </a:p>
-          <a:p>
-            <a:endParaRPr lang="en-US" dirty="0" smtClean="0"/>
+              <a:t>What’s happening on the frontend</a:t>
+            </a:r>
+          </a:p>
+          <a:p>
+            <a:r>
+              <a:rPr lang="en-US" dirty="0" smtClean="0"/>
+              <a:t>Short intro to Backbone</a:t>
+            </a:r>
           </a:p>
         </p:txBody>
       </p:sp>
@@ -12401,7 +12405,7 @@
     </p:spTree>
     <p:extLst>
       <p:ext uri="{BB962C8B-B14F-4D97-AF65-F5344CB8AC3E}">
-        <p14:creationId xmlns:p14="http://schemas.microsoft.com/office/powerpoint/2010/main" val="3598812586"/>
+        <p14:creationId xmlns:p14="http://schemas.microsoft.com/office/powerpoint/2010/main" val="3753766513"/>
       </p:ext>
     </p:extLst>
   </p:cSld>
@@ -12452,7 +12456,7 @@
           <a:p>
             <a:r>
               <a:rPr lang="en-US" dirty="0" smtClean="0"/>
-              <a:t>Links</a:t>
+              <a:t>Frontend</a:t>
             </a:r>
             <a:endParaRPr lang="en-US" dirty="0"/>
           </a:p>
@@ -12475,7 +12479,14 @@
           </a:bodyPr>
           <a:lstStyle/>
           <a:p>
-            <a:endParaRPr lang="en-US"/>
+            <a:r>
+              <a:rPr lang="en-US" dirty="0" smtClean="0"/>
+              <a:t>Exercise </a:t>
+            </a:r>
+            <a:r>
+              <a:rPr lang="en-US" dirty="0"/>
+              <a:t>5</a:t>
+            </a:r>
           </a:p>
         </p:txBody>
       </p:sp>
@@ -12497,137 +12508,19 @@
             <a:pPr marL="0" indent="0">
               <a:buNone/>
             </a:pPr>
-            <a:endParaRPr lang="en-US" sz="1800" dirty="0" smtClean="0">
-              <a:hlinkClick r:id="rId2"/>
-            </a:endParaRPr>
-          </a:p>
-          <a:p>
-            <a:pPr marL="0" indent="0">
-              <a:buNone/>
-            </a:pPr>
-            <a:r>
-              <a:rPr lang="en-US" sz="1800" dirty="0"/>
-              <a:t>http://</a:t>
-            </a:r>
-            <a:r>
-              <a:rPr lang="en-US" sz="1800" dirty="0" err="1"/>
-              <a:t>www.vinnova.se</a:t>
-            </a:r>
-            <a:r>
-              <a:rPr lang="en-US" sz="1800" dirty="0" smtClean="0"/>
-              <a:t>/</a:t>
-            </a:r>
-            <a:endParaRPr lang="en-US" sz="1800" dirty="0" smtClean="0">
-              <a:hlinkClick r:id="rId2"/>
-            </a:endParaRPr>
-          </a:p>
-          <a:p>
-            <a:pPr marL="0" indent="0">
-              <a:buNone/>
-            </a:pPr>
-            <a:r>
-              <a:rPr lang="en-US" sz="1800" dirty="0">
-                <a:hlinkClick r:id="rId2"/>
-              </a:rPr>
-              <a:t>http://sdk.minavardkontakter.se</a:t>
-            </a:r>
-            <a:r>
-              <a:rPr lang="en-US" sz="1800" dirty="0" smtClean="0">
-                <a:hlinkClick r:id="rId2"/>
-              </a:rPr>
-              <a:t>/</a:t>
-            </a:r>
-          </a:p>
-          <a:p>
-            <a:pPr marL="0" indent="0">
-              <a:buNone/>
-            </a:pPr>
-            <a:r>
-              <a:rPr lang="en-US" sz="1800" dirty="0">
-                <a:hlinkClick r:id="rId2"/>
-              </a:rPr>
-              <a:t>http://oauth.net/2</a:t>
-            </a:r>
-            <a:r>
-              <a:rPr lang="en-US" sz="1800" dirty="0" smtClean="0">
-                <a:hlinkClick r:id="rId2"/>
-              </a:rPr>
-              <a:t>/</a:t>
-            </a:r>
-          </a:p>
-          <a:p>
-            <a:pPr marL="0" indent="0">
-              <a:buNone/>
-            </a:pPr>
-            <a:r>
-              <a:rPr lang="en-US" sz="1800" dirty="0">
-                <a:hlinkClick r:id="rId2"/>
-              </a:rPr>
-              <a:t>http://tools.ietf.org/html/draft-ietf-oauth-v2-31</a:t>
-            </a:r>
-            <a:endParaRPr lang="en-US" sz="1800" dirty="0" smtClean="0">
-              <a:hlinkClick r:id="rId2"/>
-            </a:endParaRPr>
-          </a:p>
-          <a:p>
-            <a:pPr marL="0" indent="0">
-              <a:buNone/>
-            </a:pPr>
-            <a:r>
-              <a:rPr lang="en-US" sz="1800" dirty="0" smtClean="0">
-                <a:hlinkClick r:id="rId2"/>
-              </a:rPr>
-              <a:t>https</a:t>
-            </a:r>
-            <a:r>
-              <a:rPr lang="en-US" sz="1800" dirty="0">
-                <a:hlinkClick r:id="rId2"/>
-              </a:rPr>
-              <a:t>://developers.google.com/accounts/docs/</a:t>
-            </a:r>
-            <a:r>
-              <a:rPr lang="en-US" sz="1800" dirty="0" smtClean="0">
-                <a:hlinkClick r:id="rId2"/>
-              </a:rPr>
-              <a:t>OAuth2</a:t>
-            </a:r>
-            <a:endParaRPr lang="en-US" sz="1800" dirty="0" smtClean="0"/>
-          </a:p>
-          <a:p>
-            <a:pPr marL="0" indent="0">
-              <a:buNone/>
-            </a:pPr>
-            <a:r>
-              <a:rPr lang="en-US" sz="1800" dirty="0">
-                <a:hlinkClick r:id="rId3"/>
-              </a:rPr>
-              <a:t>https://developers.facebook.com/docs/reference/dialogs/oauth</a:t>
-            </a:r>
-            <a:r>
-              <a:rPr lang="en-US" sz="1800" dirty="0" smtClean="0">
-                <a:hlinkClick r:id="rId3"/>
-              </a:rPr>
-              <a:t>/</a:t>
-            </a:r>
-            <a:endParaRPr lang="en-US" sz="1800" dirty="0" smtClean="0"/>
-          </a:p>
-          <a:p>
-            <a:pPr marL="0" indent="0">
-              <a:buNone/>
-            </a:pPr>
-            <a:endParaRPr lang="en-US" sz="1800" dirty="0" smtClean="0"/>
-          </a:p>
-          <a:p>
-            <a:pPr marL="0" indent="0">
-              <a:buNone/>
-            </a:pPr>
-            <a:endParaRPr lang="en-US" sz="1800" dirty="0"/>
-          </a:p>
-          <a:p>
-            <a:pPr marL="0" indent="0">
-              <a:buNone/>
-            </a:pPr>
-            <a:endParaRPr lang="en-US" sz="1800" dirty="0"/>
+            <a:r>
+              <a:rPr lang="en-US" dirty="0" smtClean="0"/>
+              <a:t>Build a simple client that use the API provided by the backend. </a:t>
+            </a:r>
+          </a:p>
+          <a:p>
+            <a:r>
+              <a:rPr lang="en-US" dirty="0" smtClean="0"/>
+              <a:t>Login user to create a session</a:t>
+            </a:r>
+          </a:p>
+          <a:p>
+            <a:endParaRPr lang="en-US" dirty="0" smtClean="0"/>
           </a:p>
         </p:txBody>
       </p:sp>
@@ -12655,6 +12548,268 @@
                 <a:defRPr/>
               </a:pPr>
               <a:t>22</a:t>
+            </a:fld>
+            <a:endParaRPr lang="sv-SE"/>
+          </a:p>
+        </p:txBody>
+      </p:sp>
+    </p:spTree>
+    <p:extLst>
+      <p:ext uri="{BB962C8B-B14F-4D97-AF65-F5344CB8AC3E}">
+        <p14:creationId xmlns:p14="http://schemas.microsoft.com/office/powerpoint/2010/main" val="3598812586"/>
+      </p:ext>
+    </p:extLst>
+  </p:cSld>
+  <p:clrMapOvr>
+    <a:masterClrMapping/>
+  </p:clrMapOvr>
+  <p:timing>
+    <p:tnLst>
+      <p:par>
+        <p:cTn xmlns:p14="http://schemas.microsoft.com/office/powerpoint/2010/main" id="1" dur="indefinite" restart="never" nodeType="tmRoot"/>
+      </p:par>
+    </p:tnLst>
+  </p:timing>
+</p:sld>
+</file>
+
+<file path=ppt/slides/slide23.xml><?xml version="1.0" encoding="utf-8"?>
+<p:sld xmlns:a="http://schemas.openxmlformats.org/drawingml/2006/main" xmlns:r="http://schemas.openxmlformats.org/officeDocument/2006/relationships" xmlns:p="http://schemas.openxmlformats.org/presentationml/2006/main">
+  <p:cSld>
+    <p:spTree>
+      <p:nvGrpSpPr>
+        <p:cNvPr id="1" name=""/>
+        <p:cNvGrpSpPr/>
+        <p:nvPr/>
+      </p:nvGrpSpPr>
+      <p:grpSpPr>
+        <a:xfrm>
+          <a:off x="0" y="0"/>
+          <a:ext cx="0" cy="0"/>
+          <a:chOff x="0" y="0"/>
+          <a:chExt cx="0" cy="0"/>
+        </a:xfrm>
+      </p:grpSpPr>
+      <p:sp>
+        <p:nvSpPr>
+          <p:cNvPr id="2" name="Title 1"/>
+          <p:cNvSpPr>
+            <a:spLocks noGrp="1"/>
+          </p:cNvSpPr>
+          <p:nvPr>
+            <p:ph type="ctrTitle"/>
+          </p:nvPr>
+        </p:nvSpPr>
+        <p:spPr/>
+        <p:txBody>
+          <a:bodyPr/>
+          <a:lstStyle/>
+          <a:p>
+            <a:r>
+              <a:rPr lang="en-US" dirty="0" smtClean="0"/>
+              <a:t>Links</a:t>
+            </a:r>
+            <a:endParaRPr lang="en-US" dirty="0"/>
+          </a:p>
+        </p:txBody>
+      </p:sp>
+      <p:sp>
+        <p:nvSpPr>
+          <p:cNvPr id="3" name="Subtitle 2"/>
+          <p:cNvSpPr>
+            <a:spLocks noGrp="1"/>
+          </p:cNvSpPr>
+          <p:nvPr>
+            <p:ph type="subTitle" idx="1"/>
+          </p:nvPr>
+        </p:nvSpPr>
+        <p:spPr/>
+        <p:txBody>
+          <a:bodyPr>
+            <a:normAutofit fontScale="92500" lnSpcReduction="10000"/>
+          </a:bodyPr>
+          <a:lstStyle/>
+          <a:p>
+            <a:endParaRPr lang="en-US"/>
+          </a:p>
+        </p:txBody>
+      </p:sp>
+      <p:sp>
+        <p:nvSpPr>
+          <p:cNvPr id="4" name="Text Placeholder 3"/>
+          <p:cNvSpPr>
+            <a:spLocks noGrp="1"/>
+          </p:cNvSpPr>
+          <p:nvPr>
+            <p:ph type="body" sz="quarter" idx="13"/>
+          </p:nvPr>
+        </p:nvSpPr>
+        <p:spPr/>
+        <p:txBody>
+          <a:bodyPr/>
+          <a:lstStyle/>
+          <a:p>
+            <a:pPr marL="0" indent="0">
+              <a:buNone/>
+            </a:pPr>
+            <a:endParaRPr lang="en-US" sz="1800" dirty="0" smtClean="0">
+              <a:hlinkClick r:id="rId2"/>
+            </a:endParaRPr>
+          </a:p>
+          <a:p>
+            <a:pPr marL="0" indent="0">
+              <a:buNone/>
+            </a:pPr>
+            <a:r>
+              <a:rPr lang="en-US" sz="1800" dirty="0"/>
+              <a:t>http://</a:t>
+            </a:r>
+            <a:r>
+              <a:rPr lang="en-US" sz="1800" dirty="0" err="1"/>
+              <a:t>www.vinnova.se</a:t>
+            </a:r>
+            <a:r>
+              <a:rPr lang="en-US" sz="1800" dirty="0" smtClean="0"/>
+              <a:t>/</a:t>
+            </a:r>
+            <a:endParaRPr lang="en-US" sz="1800" dirty="0" smtClean="0">
+              <a:hlinkClick r:id="rId2"/>
+            </a:endParaRPr>
+          </a:p>
+          <a:p>
+            <a:pPr marL="0" indent="0">
+              <a:buNone/>
+            </a:pPr>
+            <a:r>
+              <a:rPr lang="en-US" sz="1800" dirty="0">
+                <a:hlinkClick r:id="rId2"/>
+              </a:rPr>
+              <a:t>http://sdk.minavardkontakter.se</a:t>
+            </a:r>
+            <a:r>
+              <a:rPr lang="en-US" sz="1800" dirty="0" smtClean="0">
+                <a:hlinkClick r:id="rId2"/>
+              </a:rPr>
+              <a:t>/</a:t>
+            </a:r>
+          </a:p>
+          <a:p>
+            <a:pPr marL="0" indent="0">
+              <a:buNone/>
+            </a:pPr>
+            <a:r>
+              <a:rPr lang="en-US" sz="1800" dirty="0">
+                <a:hlinkClick r:id="rId2"/>
+              </a:rPr>
+              <a:t>http://oauth.net/2</a:t>
+            </a:r>
+            <a:r>
+              <a:rPr lang="en-US" sz="1800" dirty="0" smtClean="0">
+                <a:hlinkClick r:id="rId2"/>
+              </a:rPr>
+              <a:t>/</a:t>
+            </a:r>
+          </a:p>
+          <a:p>
+            <a:pPr marL="0" indent="0">
+              <a:buNone/>
+            </a:pPr>
+            <a:r>
+              <a:rPr lang="en-US" sz="1800" dirty="0">
+                <a:hlinkClick r:id="rId2"/>
+              </a:rPr>
+              <a:t>http://tools.ietf.org/html/draft-ietf-oauth-v2-31</a:t>
+            </a:r>
+            <a:endParaRPr lang="en-US" sz="1800" dirty="0" smtClean="0">
+              <a:hlinkClick r:id="rId2"/>
+            </a:endParaRPr>
+          </a:p>
+          <a:p>
+            <a:pPr marL="0" indent="0">
+              <a:buNone/>
+            </a:pPr>
+            <a:r>
+              <a:rPr lang="en-US" sz="1800" dirty="0" smtClean="0">
+                <a:hlinkClick r:id="rId2"/>
+              </a:rPr>
+              <a:t>https</a:t>
+            </a:r>
+            <a:r>
+              <a:rPr lang="en-US" sz="1800" dirty="0">
+                <a:hlinkClick r:id="rId2"/>
+              </a:rPr>
+              <a:t>://developers.google.com/accounts/docs/</a:t>
+            </a:r>
+            <a:r>
+              <a:rPr lang="en-US" sz="1800" dirty="0" smtClean="0">
+                <a:hlinkClick r:id="rId2"/>
+              </a:rPr>
+              <a:t>OAuth2</a:t>
+            </a:r>
+            <a:endParaRPr lang="en-US" sz="1800" dirty="0" smtClean="0"/>
+          </a:p>
+          <a:p>
+            <a:pPr marL="0" indent="0">
+              <a:buNone/>
+            </a:pPr>
+            <a:r>
+              <a:rPr lang="en-US" sz="1800" dirty="0">
+                <a:hlinkClick r:id="rId3"/>
+              </a:rPr>
+              <a:t>https://developers.facebook.com/docs/reference/dialogs/oauth</a:t>
+            </a:r>
+            <a:r>
+              <a:rPr lang="en-US" sz="1800" dirty="0" smtClean="0">
+                <a:hlinkClick r:id="rId3"/>
+              </a:rPr>
+              <a:t>/</a:t>
+            </a:r>
+            <a:endParaRPr lang="en-US" sz="1800" dirty="0" smtClean="0"/>
+          </a:p>
+          <a:p>
+            <a:pPr marL="0" indent="0">
+              <a:buNone/>
+            </a:pPr>
+            <a:endParaRPr lang="en-US" sz="1800" dirty="0" smtClean="0"/>
+          </a:p>
+          <a:p>
+            <a:pPr marL="0" indent="0">
+              <a:buNone/>
+            </a:pPr>
+            <a:endParaRPr lang="en-US" sz="1800" dirty="0"/>
+          </a:p>
+          <a:p>
+            <a:pPr marL="0" indent="0">
+              <a:buNone/>
+            </a:pPr>
+            <a:endParaRPr lang="en-US" sz="1800" dirty="0"/>
+          </a:p>
+        </p:txBody>
+      </p:sp>
+      <p:sp>
+        <p:nvSpPr>
+          <p:cNvPr id="5" name="Slide Number Placeholder 4"/>
+          <p:cNvSpPr>
+            <a:spLocks noGrp="1"/>
+          </p:cNvSpPr>
+          <p:nvPr>
+            <p:ph type="sldNum" sz="quarter" idx="14"/>
+          </p:nvPr>
+        </p:nvSpPr>
+        <p:spPr/>
+        <p:txBody>
+          <a:bodyPr/>
+          <a:lstStyle/>
+          <a:p>
+            <a:pPr>
+              <a:defRPr/>
+            </a:pPr>
+            <a:fld id="{4AA01602-B999-AA4E-80A6-B21CED3A9C3C}" type="slidenum">
+              <a:rPr lang="sv-SE" smtClean="0"/>
+              <a:pPr>
+                <a:defRPr/>
+              </a:pPr>
+              <a:t>23</a:t>
             </a:fld>
             <a:endParaRPr lang="sv-SE"/>
           </a:p>

</xml_diff>

<commit_message>
Updated ppt with SDK, Frontend and small changes
</commit_message>
<xml_diff>
--- a/Cadec-vårdens-apier.pptx
+++ b/Cadec-vårdens-apier.pptx
@@ -5,10 +5,10 @@
     <p:sldMasterId id="2147483648" r:id="rId1"/>
   </p:sldMasterIdLst>
   <p:notesMasterIdLst>
-    <p:notesMasterId r:id="rId25"/>
+    <p:notesMasterId r:id="rId27"/>
   </p:notesMasterIdLst>
   <p:handoutMasterIdLst>
-    <p:handoutMasterId r:id="rId26"/>
+    <p:handoutMasterId r:id="rId28"/>
   </p:handoutMasterIdLst>
   <p:sldIdLst>
     <p:sldId id="256" r:id="rId2"/>
@@ -30,10 +30,12 @@
     <p:sldId id="267" r:id="rId18"/>
     <p:sldId id="283" r:id="rId19"/>
     <p:sldId id="275" r:id="rId20"/>
-    <p:sldId id="269" r:id="rId21"/>
-    <p:sldId id="271" r:id="rId22"/>
-    <p:sldId id="270" r:id="rId23"/>
-    <p:sldId id="274" r:id="rId24"/>
+    <p:sldId id="285" r:id="rId21"/>
+    <p:sldId id="269" r:id="rId22"/>
+    <p:sldId id="271" r:id="rId23"/>
+    <p:sldId id="270" r:id="rId24"/>
+    <p:sldId id="284" r:id="rId25"/>
+    <p:sldId id="274" r:id="rId26"/>
   </p:sldIdLst>
   <p:sldSz cx="9144000" cy="6858000" type="screen4x3"/>
   <p:notesSz cx="6858000" cy="9144000"/>
@@ -264,7 +266,7 @@
               <a:pPr>
                 <a:defRPr/>
               </a:pPr>
-              <a:t>2013-01-02</a:t>
+              <a:t>2013-01-04</a:t>
             </a:fld>
             <a:endParaRPr lang="sv-SE"/>
           </a:p>
@@ -464,7 +466,7 @@
               <a:pPr>
                 <a:defRPr/>
               </a:pPr>
-              <a:t>2013-01-02</a:t>
+              <a:t>2013-01-04</a:t>
             </a:fld>
             <a:endParaRPr lang="sv-SE"/>
           </a:p>
@@ -1071,7 +1073,19 @@
             </a:r>
             <a:r>
               <a:rPr lang="en-US" baseline="0" dirty="0" err="1" smtClean="0"/>
-              <a:t>tex.</a:t>
+              <a:t>tex</a:t>
+            </a:r>
+            <a:r>
+              <a:rPr lang="en-US" baseline="0" dirty="0" smtClean="0"/>
+              <a:t> </a:t>
+            </a:r>
+            <a:r>
+              <a:rPr lang="en-US" baseline="0" dirty="0" err="1" smtClean="0"/>
+              <a:t>kallekula</a:t>
+            </a:r>
+            <a:r>
+              <a:rPr lang="en-US" baseline="0" dirty="0" smtClean="0"/>
+              <a:t>.</a:t>
             </a:r>
             <a:endParaRPr lang="en-US" dirty="0"/>
           </a:p>
@@ -1227,7 +1241,6 @@
               <a:rPr lang="en-US" baseline="0" dirty="0" smtClean="0"/>
               <a:t>. </a:t>
             </a:r>
-            <a:endParaRPr lang="en-US" baseline="0" dirty="0" smtClean="0"/>
           </a:p>
           <a:p>
             <a:r>
@@ -1477,46 +1490,50 @@
           <a:p>
             <a:r>
               <a:rPr lang="en-US" baseline="0" dirty="0" smtClean="0"/>
-              <a:t>	1. </a:t>
-            </a:r>
-            <a:r>
-              <a:rPr lang="en-US" baseline="0" dirty="0" err="1" smtClean="0"/>
+              <a:t>	</a:t>
+            </a:r>
+            <a:r>
+              <a:rPr lang="en-US" b="1" baseline="0" dirty="0" smtClean="0"/>
+              <a:t>1. </a:t>
+            </a:r>
+            <a:r>
+              <a:rPr lang="en-US" b="1" baseline="0" dirty="0" err="1" smtClean="0"/>
               <a:t>Öppen</a:t>
             </a:r>
             <a:r>
-              <a:rPr lang="en-US" baseline="0" dirty="0" smtClean="0"/>
+              <a:rPr lang="en-US" b="1" baseline="0" dirty="0" smtClean="0"/>
               <a:t>-data-</a:t>
             </a:r>
             <a:r>
-              <a:rPr lang="en-US" baseline="0" dirty="0" err="1" smtClean="0"/>
+              <a:rPr lang="en-US" b="1" baseline="0" dirty="0" err="1" smtClean="0"/>
               <a:t>APIer</a:t>
             </a:r>
             <a:r>
-              <a:rPr lang="en-US" baseline="0" dirty="0" smtClean="0"/>
+              <a:rPr lang="en-US" b="1" baseline="0" dirty="0" smtClean="0"/>
               <a:t> (</a:t>
             </a:r>
             <a:r>
-              <a:rPr lang="en-US" baseline="0" dirty="0" err="1" smtClean="0"/>
+              <a:rPr lang="en-US" b="1" baseline="0" dirty="0" err="1" smtClean="0"/>
               <a:t>APIer</a:t>
             </a:r>
             <a:r>
-              <a:rPr lang="en-US" baseline="0" dirty="0" smtClean="0"/>
-              <a:t> </a:t>
-            </a:r>
-            <a:r>
-              <a:rPr lang="en-US" baseline="0" dirty="0" err="1" smtClean="0"/>
+              <a:rPr lang="en-US" b="1" baseline="0" dirty="0" smtClean="0"/>
+              <a:t> </a:t>
+            </a:r>
+            <a:r>
+              <a:rPr lang="en-US" b="1" baseline="0" dirty="0" err="1" smtClean="0"/>
               <a:t>för</a:t>
             </a:r>
             <a:r>
-              <a:rPr lang="en-US" baseline="0" dirty="0" smtClean="0"/>
-              <a:t> </a:t>
-            </a:r>
-            <a:r>
-              <a:rPr lang="en-US" baseline="0" dirty="0" err="1" smtClean="0"/>
+              <a:rPr lang="en-US" b="1" baseline="0" dirty="0" smtClean="0"/>
+              <a:t> </a:t>
+            </a:r>
+            <a:r>
+              <a:rPr lang="en-US" b="1" baseline="0" dirty="0" err="1" smtClean="0"/>
               <a:t>offentlig</a:t>
             </a:r>
             <a:r>
-              <a:rPr lang="en-US" baseline="0" dirty="0" smtClean="0"/>
+              <a:rPr lang="en-US" b="1" baseline="0" dirty="0" smtClean="0"/>
               <a:t> data)</a:t>
             </a:r>
           </a:p>
@@ -1809,54 +1826,58 @@
           <a:p>
             <a:r>
               <a:rPr lang="en-US" baseline="0" dirty="0" smtClean="0"/>
-              <a:t>	2. </a:t>
-            </a:r>
-            <a:r>
-              <a:rPr lang="en-US" baseline="0" dirty="0" err="1" smtClean="0"/>
+              <a:t>	</a:t>
+            </a:r>
+            <a:r>
+              <a:rPr lang="en-US" b="1" baseline="0" dirty="0" smtClean="0"/>
+              <a:t>2. </a:t>
+            </a:r>
+            <a:r>
+              <a:rPr lang="en-US" b="1" baseline="0" dirty="0" err="1" smtClean="0"/>
               <a:t>Patientdata-APIer</a:t>
             </a:r>
             <a:r>
-              <a:rPr lang="en-US" baseline="0" dirty="0" smtClean="0"/>
+              <a:rPr lang="en-US" b="1" baseline="0" dirty="0" smtClean="0"/>
               <a:t> (</a:t>
             </a:r>
             <a:r>
-              <a:rPr lang="en-US" baseline="0" dirty="0" err="1" smtClean="0"/>
+              <a:rPr lang="en-US" b="1" baseline="0" dirty="0" err="1" smtClean="0"/>
               <a:t>APIer</a:t>
             </a:r>
             <a:r>
-              <a:rPr lang="en-US" baseline="0" dirty="0" smtClean="0"/>
-              <a:t> </a:t>
-            </a:r>
-            <a:r>
-              <a:rPr lang="en-US" baseline="0" dirty="0" err="1" smtClean="0"/>
+              <a:rPr lang="en-US" b="1" baseline="0" dirty="0" smtClean="0"/>
+              <a:t> </a:t>
+            </a:r>
+            <a:r>
+              <a:rPr lang="en-US" b="1" baseline="0" dirty="0" err="1" smtClean="0"/>
               <a:t>för</a:t>
             </a:r>
             <a:r>
-              <a:rPr lang="en-US" baseline="0" dirty="0" smtClean="0"/>
-              <a:t> </a:t>
-            </a:r>
-            <a:r>
-              <a:rPr lang="en-US" baseline="0" dirty="0" err="1" smtClean="0"/>
+              <a:rPr lang="en-US" b="1" baseline="0" dirty="0" smtClean="0"/>
+              <a:t> </a:t>
+            </a:r>
+            <a:r>
+              <a:rPr lang="en-US" b="1" baseline="0" dirty="0" err="1" smtClean="0"/>
               <a:t>patientbunden</a:t>
             </a:r>
             <a:r>
-              <a:rPr lang="en-US" baseline="0" dirty="0" smtClean="0"/>
+              <a:rPr lang="en-US" b="1" baseline="0" dirty="0" smtClean="0"/>
               <a:t> data </a:t>
             </a:r>
             <a:r>
-              <a:rPr lang="en-US" baseline="0" dirty="0" err="1" smtClean="0"/>
+              <a:rPr lang="en-US" b="1" baseline="0" dirty="0" err="1" smtClean="0"/>
               <a:t>för</a:t>
             </a:r>
             <a:r>
-              <a:rPr lang="en-US" baseline="0" dirty="0" smtClean="0"/>
-              <a:t> </a:t>
-            </a:r>
-            <a:r>
-              <a:rPr lang="en-US" baseline="0" dirty="0" err="1" smtClean="0"/>
+              <a:rPr lang="en-US" b="1" baseline="0" dirty="0" smtClean="0"/>
+              <a:t> </a:t>
+            </a:r>
+            <a:r>
+              <a:rPr lang="en-US" b="1" baseline="0" dirty="0" err="1" smtClean="0"/>
               <a:t>tredje</a:t>
             </a:r>
             <a:r>
-              <a:rPr lang="en-US" baseline="0" dirty="0" smtClean="0"/>
+              <a:rPr lang="en-US" b="1" baseline="0" dirty="0" smtClean="0"/>
               <a:t> part)</a:t>
             </a:r>
           </a:p>
@@ -1913,6 +1934,108 @@
               <a:rPr lang="en-US" baseline="0" dirty="0" smtClean="0"/>
               <a:t>)</a:t>
             </a:r>
+          </a:p>
+          <a:p>
+            <a:endParaRPr lang="en-US" baseline="0" dirty="0" smtClean="0"/>
+          </a:p>
+          <a:p>
+            <a:r>
+              <a:rPr lang="en-US" baseline="0" dirty="0" err="1" smtClean="0"/>
+              <a:t>Klicka</a:t>
+            </a:r>
+            <a:r>
+              <a:rPr lang="en-US" baseline="0" dirty="0" smtClean="0"/>
+              <a:t> </a:t>
+            </a:r>
+            <a:r>
+              <a:rPr lang="en-US" baseline="0" dirty="0" err="1" smtClean="0"/>
+              <a:t>på</a:t>
+            </a:r>
+            <a:r>
+              <a:rPr lang="en-US" baseline="0" dirty="0" smtClean="0"/>
+              <a:t> </a:t>
+            </a:r>
+            <a:r>
+              <a:rPr lang="en-US" baseline="0" dirty="0" err="1" smtClean="0"/>
+              <a:t>bilden</a:t>
+            </a:r>
+            <a:r>
+              <a:rPr lang="en-US" baseline="0" dirty="0" smtClean="0"/>
+              <a:t> </a:t>
+            </a:r>
+            <a:r>
+              <a:rPr lang="en-US" baseline="0" dirty="0" err="1" smtClean="0"/>
+              <a:t>för</a:t>
+            </a:r>
+            <a:r>
+              <a:rPr lang="en-US" baseline="0" dirty="0" smtClean="0"/>
+              <a:t> </a:t>
+            </a:r>
+            <a:r>
+              <a:rPr lang="en-US" baseline="0" dirty="0" err="1" smtClean="0"/>
+              <a:t>att</a:t>
+            </a:r>
+            <a:r>
+              <a:rPr lang="en-US" baseline="0" dirty="0" smtClean="0"/>
+              <a:t> </a:t>
+            </a:r>
+            <a:r>
+              <a:rPr lang="en-US" baseline="0" dirty="0" err="1" smtClean="0"/>
+              <a:t>komma</a:t>
+            </a:r>
+            <a:r>
+              <a:rPr lang="en-US" baseline="0" dirty="0" smtClean="0"/>
+              <a:t> till SDK </a:t>
+            </a:r>
+            <a:r>
+              <a:rPr lang="en-US" baseline="0" dirty="0" err="1" smtClean="0"/>
+              <a:t>och</a:t>
+            </a:r>
+            <a:r>
+              <a:rPr lang="en-US" baseline="0" dirty="0" smtClean="0"/>
+              <a:t> visa </a:t>
+            </a:r>
+            <a:r>
+              <a:rPr lang="en-US" baseline="0" dirty="0" err="1" smtClean="0"/>
+              <a:t>kort</a:t>
+            </a:r>
+            <a:r>
+              <a:rPr lang="en-US" baseline="0" dirty="0" smtClean="0"/>
+              <a:t> </a:t>
+            </a:r>
+            <a:r>
+              <a:rPr lang="en-US" baseline="0" dirty="0" err="1" smtClean="0"/>
+              <a:t>vad</a:t>
+            </a:r>
+            <a:r>
+              <a:rPr lang="en-US" baseline="0" dirty="0" smtClean="0"/>
+              <a:t> </a:t>
+            </a:r>
+            <a:r>
+              <a:rPr lang="en-US" baseline="0" dirty="0" err="1" smtClean="0"/>
+              <a:t>som</a:t>
+            </a:r>
+            <a:r>
+              <a:rPr lang="en-US" baseline="0" dirty="0" smtClean="0"/>
+              <a:t> </a:t>
+            </a:r>
+            <a:r>
+              <a:rPr lang="en-US" baseline="0" dirty="0" err="1" smtClean="0"/>
+              <a:t>finns</a:t>
+            </a:r>
+            <a:r>
+              <a:rPr lang="en-US" baseline="0" dirty="0" smtClean="0"/>
+              <a:t> </a:t>
+            </a:r>
+            <a:r>
+              <a:rPr lang="en-US" baseline="0" dirty="0" err="1" smtClean="0"/>
+              <a:t>där</a:t>
+            </a:r>
+            <a:r>
+              <a:rPr lang="en-US" baseline="0" dirty="0" smtClean="0"/>
+              <a:t>.</a:t>
+            </a:r>
+            <a:endParaRPr lang="en-US" baseline="0" dirty="0" smtClean="0"/>
           </a:p>
           <a:p>
             <a:endParaRPr lang="en-US" dirty="0" smtClean="0"/>
@@ -2367,11 +2490,7 @@
             </a:r>
             <a:r>
               <a:rPr lang="en-US" baseline="0" dirty="0" smtClean="0"/>
-              <a:t> </a:t>
-            </a:r>
-            <a:r>
-              <a:rPr lang="en-US" baseline="0" dirty="0" smtClean="0"/>
-              <a:t>-&gt; </a:t>
+              <a:t> -&gt; </a:t>
             </a:r>
             <a:r>
               <a:rPr lang="en-US" baseline="0" dirty="0" err="1" smtClean="0"/>
@@ -3436,11 +3555,7 @@
           <a:p>
             <a:r>
               <a:rPr lang="en-US" dirty="0" smtClean="0"/>
-              <a:t>Resource </a:t>
-            </a:r>
-            <a:r>
-              <a:rPr lang="en-US" dirty="0" smtClean="0"/>
-              <a:t>Owner: En roll </a:t>
+              <a:t>Resource Owner: En roll </a:t>
             </a:r>
             <a:r>
               <a:rPr lang="en-US" dirty="0" err="1" smtClean="0"/>
@@ -9353,19 +9468,7 @@
           <a:p>
             <a:r>
               <a:rPr lang="en-US" dirty="0" smtClean="0"/>
-              <a:t>API’s </a:t>
-            </a:r>
-            <a:r>
-              <a:rPr lang="en-US" dirty="0" smtClean="0"/>
-              <a:t>containing patient </a:t>
-            </a:r>
-            <a:r>
-              <a:rPr lang="en-US" dirty="0" smtClean="0"/>
-              <a:t>related </a:t>
-            </a:r>
-            <a:r>
-              <a:rPr lang="en-US" dirty="0" smtClean="0"/>
-              <a:t>data</a:t>
+              <a:t>API’s containing patient related data</a:t>
             </a:r>
             <a:endParaRPr lang="en-US" dirty="0"/>
           </a:p>
@@ -9440,7 +9543,6 @@
               <a:rPr lang="en-US" sz="1800" dirty="0" smtClean="0"/>
               <a:t>2-factor</a:t>
             </a:r>
-            <a:endParaRPr lang="en-US" sz="1800" dirty="0" smtClean="0"/>
           </a:p>
           <a:p>
             <a:r>
@@ -9575,7 +9677,6 @@
               <a:rPr lang="en-US" dirty="0"/>
               <a:t>API’s containing patient related data</a:t>
             </a:r>
-            <a:endParaRPr lang="en-US" dirty="0"/>
           </a:p>
         </p:txBody>
       </p:sp>
@@ -9601,38 +9702,6 @@
               <a:t>The problem</a:t>
             </a:r>
             <a:endParaRPr lang="en-US" dirty="0"/>
-          </a:p>
-        </p:txBody>
-      </p:sp>
-      <p:sp>
-        <p:nvSpPr>
-          <p:cNvPr id="4" name="Text Placeholder 3"/>
-          <p:cNvSpPr>
-            <a:spLocks noGrp="1"/>
-          </p:cNvSpPr>
-          <p:nvPr>
-            <p:ph type="body" sz="quarter" idx="13"/>
-          </p:nvPr>
-        </p:nvSpPr>
-        <p:spPr>
-          <a:ln w="38100" cmpd="sng">
-            <a:solidFill>
-              <a:srgbClr val="4F81BD"/>
-            </a:solidFill>
-          </a:ln>
-        </p:spPr>
-        <p:txBody>
-          <a:bodyPr/>
-          <a:lstStyle/>
-          <a:p>
-            <a:pPr marL="0" indent="0">
-              <a:buNone/>
-            </a:pPr>
-            <a:r>
-              <a:rPr lang="en-US" sz="1400" dirty="0" smtClean="0"/>
-              <a:t>Simple solution ??</a:t>
-            </a:r>
-            <a:endParaRPr lang="en-US" sz="1400" dirty="0"/>
           </a:p>
         </p:txBody>
       </p:sp>
@@ -9757,48 +9826,6 @@
           </p:txBody>
         </p:sp>
       </p:grpSp>
-      <p:sp>
-        <p:nvSpPr>
-          <p:cNvPr id="8" name="Rectangle 7"/>
-          <p:cNvSpPr/>
-          <p:nvPr/>
-        </p:nvSpPr>
-        <p:spPr>
-          <a:xfrm>
-            <a:off x="3937000" y="4076700"/>
-            <a:ext cx="3556000" cy="469900"/>
-          </a:xfrm>
-          <a:prstGeom prst="rect">
-            <a:avLst/>
-          </a:prstGeom>
-        </p:spPr>
-        <p:style>
-          <a:lnRef idx="1">
-            <a:schemeClr val="accent1"/>
-          </a:lnRef>
-          <a:fillRef idx="3">
-            <a:schemeClr val="accent1"/>
-          </a:fillRef>
-          <a:effectRef idx="2">
-            <a:schemeClr val="accent1"/>
-          </a:effectRef>
-          <a:fontRef idx="minor">
-            <a:schemeClr val="lt1"/>
-          </a:fontRef>
-        </p:style>
-        <p:txBody>
-          <a:bodyPr rtlCol="0" anchor="ctr"/>
-          <a:lstStyle/>
-          <a:p>
-            <a:pPr algn="ctr"/>
-            <a:r>
-              <a:rPr lang="en-US" dirty="0" smtClean="0"/>
-              <a:t>API</a:t>
-            </a:r>
-            <a:endParaRPr lang="en-US" dirty="0"/>
-          </a:p>
-        </p:txBody>
-      </p:sp>
       <p:grpSp>
         <p:nvGrpSpPr>
           <p:cNvPr id="6" name="Group 5"/>
@@ -9890,231 +9917,288 @@
           </p:txBody>
         </p:sp>
       </p:grpSp>
-      <p:sp>
-        <p:nvSpPr>
-          <p:cNvPr id="26" name="Rectangle 25"/>
-          <p:cNvSpPr/>
+      <p:grpSp>
+        <p:nvGrpSpPr>
+          <p:cNvPr id="7" name="Group 6"/>
+          <p:cNvGrpSpPr/>
           <p:nvPr/>
-        </p:nvSpPr>
-        <p:spPr>
+        </p:nvGrpSpPr>
+        <p:grpSpPr>
           <a:xfrm>
-            <a:off x="3937000" y="4775200"/>
-            <a:ext cx="1066800" cy="673100"/>
+            <a:off x="3937000" y="4076700"/>
+            <a:ext cx="3556000" cy="1371600"/>
+            <a:chOff x="3937000" y="4076700"/>
+            <a:chExt cx="3556000" cy="1371600"/>
           </a:xfrm>
-          <a:prstGeom prst="rect">
-            <a:avLst/>
-          </a:prstGeom>
-        </p:spPr>
-        <p:style>
-          <a:lnRef idx="1">
-            <a:schemeClr val="accent1"/>
-          </a:lnRef>
-          <a:fillRef idx="3">
-            <a:schemeClr val="accent1"/>
-          </a:fillRef>
-          <a:effectRef idx="2">
-            <a:schemeClr val="accent1"/>
-          </a:effectRef>
-          <a:fontRef idx="minor">
-            <a:schemeClr val="lt1"/>
-          </a:fontRef>
-        </p:style>
-        <p:txBody>
-          <a:bodyPr rtlCol="0" anchor="ctr"/>
-          <a:lstStyle/>
-          <a:p>
-            <a:pPr algn="ctr"/>
-            <a:r>
-              <a:rPr lang="en-US" sz="1400" dirty="0" smtClean="0"/>
-              <a:t>Citizens medical records</a:t>
-            </a:r>
-            <a:endParaRPr lang="en-US" sz="1400" dirty="0"/>
-          </a:p>
-        </p:txBody>
-      </p:sp>
-      <p:sp>
-        <p:nvSpPr>
-          <p:cNvPr id="29" name="Rectangle 28"/>
-          <p:cNvSpPr/>
-          <p:nvPr/>
-        </p:nvSpPr>
-        <p:spPr>
-          <a:xfrm>
-            <a:off x="5207000" y="4775200"/>
-            <a:ext cx="1011963" cy="673100"/>
-          </a:xfrm>
-          <a:prstGeom prst="rect">
-            <a:avLst/>
-          </a:prstGeom>
-        </p:spPr>
-        <p:style>
-          <a:lnRef idx="1">
-            <a:schemeClr val="accent1"/>
-          </a:lnRef>
-          <a:fillRef idx="3">
-            <a:schemeClr val="accent1"/>
-          </a:fillRef>
-          <a:effectRef idx="2">
-            <a:schemeClr val="accent1"/>
-          </a:effectRef>
-          <a:fontRef idx="minor">
-            <a:schemeClr val="lt1"/>
-          </a:fontRef>
-        </p:style>
-        <p:txBody>
-          <a:bodyPr rtlCol="0" anchor="ctr"/>
-          <a:lstStyle/>
-          <a:p>
-            <a:pPr algn="ctr"/>
-            <a:r>
-              <a:rPr lang="en-US" sz="1400" dirty="0" smtClean="0"/>
-              <a:t>Citizens medical records</a:t>
-            </a:r>
-            <a:endParaRPr lang="en-US" sz="1400" dirty="0"/>
-          </a:p>
-        </p:txBody>
-      </p:sp>
-      <p:sp>
-        <p:nvSpPr>
-          <p:cNvPr id="30" name="Rectangle 29"/>
-          <p:cNvSpPr/>
-          <p:nvPr/>
-        </p:nvSpPr>
-        <p:spPr>
-          <a:xfrm>
-            <a:off x="6413500" y="4775200"/>
-            <a:ext cx="1079500" cy="673100"/>
-          </a:xfrm>
-          <a:prstGeom prst="rect">
-            <a:avLst/>
-          </a:prstGeom>
-        </p:spPr>
-        <p:style>
-          <a:lnRef idx="1">
-            <a:schemeClr val="accent1"/>
-          </a:lnRef>
-          <a:fillRef idx="3">
-            <a:schemeClr val="accent1"/>
-          </a:fillRef>
-          <a:effectRef idx="2">
-            <a:schemeClr val="accent1"/>
-          </a:effectRef>
-          <a:fontRef idx="minor">
-            <a:schemeClr val="lt1"/>
-          </a:fontRef>
-        </p:style>
-        <p:txBody>
-          <a:bodyPr rtlCol="0" anchor="ctr"/>
-          <a:lstStyle/>
-          <a:p>
-            <a:pPr algn="ctr"/>
-            <a:r>
-              <a:rPr lang="en-US" sz="1400" dirty="0" smtClean="0"/>
-              <a:t>Citizens medical records</a:t>
-            </a:r>
-            <a:endParaRPr lang="en-US" sz="1400" dirty="0"/>
-          </a:p>
-        </p:txBody>
-      </p:sp>
-      <p:cxnSp>
-        <p:nvCxnSpPr>
-          <p:cNvPr id="31" name="Straight Connector 30"/>
-          <p:cNvCxnSpPr>
-            <a:stCxn id="8" idx="2"/>
-            <a:endCxn id="26" idx="0"/>
-          </p:cNvCxnSpPr>
-          <p:nvPr/>
-        </p:nvCxnSpPr>
-        <p:spPr>
-          <a:xfrm flipH="1">
-            <a:off x="4470400" y="4546600"/>
-            <a:ext cx="1244600" cy="228600"/>
-          </a:xfrm>
-          <a:prstGeom prst="line">
-            <a:avLst/>
-          </a:prstGeom>
-        </p:spPr>
-        <p:style>
-          <a:lnRef idx="2">
-            <a:schemeClr val="accent1"/>
-          </a:lnRef>
-          <a:fillRef idx="0">
-            <a:schemeClr val="accent1"/>
-          </a:fillRef>
-          <a:effectRef idx="1">
-            <a:schemeClr val="accent1"/>
-          </a:effectRef>
-          <a:fontRef idx="minor">
-            <a:schemeClr val="tx1"/>
-          </a:fontRef>
-        </p:style>
-      </p:cxnSp>
-      <p:cxnSp>
-        <p:nvCxnSpPr>
-          <p:cNvPr id="33" name="Straight Connector 32"/>
-          <p:cNvCxnSpPr>
-            <a:stCxn id="8" idx="2"/>
-            <a:endCxn id="29" idx="0"/>
-          </p:cNvCxnSpPr>
-          <p:nvPr/>
-        </p:nvCxnSpPr>
-        <p:spPr>
-          <a:xfrm flipH="1">
-            <a:off x="5712982" y="4546600"/>
-            <a:ext cx="2018" cy="228600"/>
-          </a:xfrm>
-          <a:prstGeom prst="line">
-            <a:avLst/>
-          </a:prstGeom>
-        </p:spPr>
-        <p:style>
-          <a:lnRef idx="2">
-            <a:schemeClr val="accent1"/>
-          </a:lnRef>
-          <a:fillRef idx="0">
-            <a:schemeClr val="accent1"/>
-          </a:fillRef>
-          <a:effectRef idx="1">
-            <a:schemeClr val="accent1"/>
-          </a:effectRef>
-          <a:fontRef idx="minor">
-            <a:schemeClr val="tx1"/>
-          </a:fontRef>
-        </p:style>
-      </p:cxnSp>
-      <p:cxnSp>
-        <p:nvCxnSpPr>
-          <p:cNvPr id="35" name="Straight Connector 34"/>
-          <p:cNvCxnSpPr>
-            <a:stCxn id="8" idx="2"/>
-            <a:endCxn id="30" idx="0"/>
-          </p:cNvCxnSpPr>
-          <p:nvPr/>
-        </p:nvCxnSpPr>
-        <p:spPr>
-          <a:xfrm>
-            <a:off x="5715000" y="4546600"/>
-            <a:ext cx="1238250" cy="228600"/>
-          </a:xfrm>
-          <a:prstGeom prst="line">
-            <a:avLst/>
-          </a:prstGeom>
-        </p:spPr>
-        <p:style>
-          <a:lnRef idx="2">
-            <a:schemeClr val="accent1"/>
-          </a:lnRef>
-          <a:fillRef idx="0">
-            <a:schemeClr val="accent1"/>
-          </a:fillRef>
-          <a:effectRef idx="1">
-            <a:schemeClr val="accent1"/>
-          </a:effectRef>
-          <a:fontRef idx="minor">
-            <a:schemeClr val="tx1"/>
-          </a:fontRef>
-        </p:style>
-      </p:cxnSp>
+        </p:grpSpPr>
+        <p:sp>
+          <p:nvSpPr>
+            <p:cNvPr id="8" name="Rectangle 7"/>
+            <p:cNvSpPr/>
+            <p:nvPr/>
+          </p:nvSpPr>
+          <p:spPr>
+            <a:xfrm>
+              <a:off x="3937000" y="4076700"/>
+              <a:ext cx="3556000" cy="469900"/>
+            </a:xfrm>
+            <a:prstGeom prst="rect">
+              <a:avLst/>
+            </a:prstGeom>
+          </p:spPr>
+          <p:style>
+            <a:lnRef idx="1">
+              <a:schemeClr val="accent1"/>
+            </a:lnRef>
+            <a:fillRef idx="3">
+              <a:schemeClr val="accent1"/>
+            </a:fillRef>
+            <a:effectRef idx="2">
+              <a:schemeClr val="accent1"/>
+            </a:effectRef>
+            <a:fontRef idx="minor">
+              <a:schemeClr val="lt1"/>
+            </a:fontRef>
+          </p:style>
+          <p:txBody>
+            <a:bodyPr rtlCol="0" anchor="ctr"/>
+            <a:lstStyle/>
+            <a:p>
+              <a:pPr algn="ctr"/>
+              <a:r>
+                <a:rPr lang="en-US" dirty="0" smtClean="0"/>
+                <a:t>API</a:t>
+              </a:r>
+              <a:endParaRPr lang="en-US" dirty="0"/>
+            </a:p>
+          </p:txBody>
+        </p:sp>
+        <p:sp>
+          <p:nvSpPr>
+            <p:cNvPr id="26" name="Rectangle 25"/>
+            <p:cNvSpPr/>
+            <p:nvPr/>
+          </p:nvSpPr>
+          <p:spPr>
+            <a:xfrm>
+              <a:off x="3937000" y="4775200"/>
+              <a:ext cx="1066800" cy="673100"/>
+            </a:xfrm>
+            <a:prstGeom prst="rect">
+              <a:avLst/>
+            </a:prstGeom>
+          </p:spPr>
+          <p:style>
+            <a:lnRef idx="1">
+              <a:schemeClr val="accent1"/>
+            </a:lnRef>
+            <a:fillRef idx="3">
+              <a:schemeClr val="accent1"/>
+            </a:fillRef>
+            <a:effectRef idx="2">
+              <a:schemeClr val="accent1"/>
+            </a:effectRef>
+            <a:fontRef idx="minor">
+              <a:schemeClr val="lt1"/>
+            </a:fontRef>
+          </p:style>
+          <p:txBody>
+            <a:bodyPr rtlCol="0" anchor="ctr"/>
+            <a:lstStyle/>
+            <a:p>
+              <a:pPr algn="ctr"/>
+              <a:r>
+                <a:rPr lang="en-US" sz="1400" dirty="0" smtClean="0"/>
+                <a:t>Citizens medical records</a:t>
+              </a:r>
+              <a:endParaRPr lang="en-US" sz="1400" dirty="0"/>
+            </a:p>
+          </p:txBody>
+        </p:sp>
+        <p:sp>
+          <p:nvSpPr>
+            <p:cNvPr id="29" name="Rectangle 28"/>
+            <p:cNvSpPr/>
+            <p:nvPr/>
+          </p:nvSpPr>
+          <p:spPr>
+            <a:xfrm>
+              <a:off x="5207000" y="4775200"/>
+              <a:ext cx="1011963" cy="673100"/>
+            </a:xfrm>
+            <a:prstGeom prst="rect">
+              <a:avLst/>
+            </a:prstGeom>
+          </p:spPr>
+          <p:style>
+            <a:lnRef idx="1">
+              <a:schemeClr val="accent1"/>
+            </a:lnRef>
+            <a:fillRef idx="3">
+              <a:schemeClr val="accent1"/>
+            </a:fillRef>
+            <a:effectRef idx="2">
+              <a:schemeClr val="accent1"/>
+            </a:effectRef>
+            <a:fontRef idx="minor">
+              <a:schemeClr val="lt1"/>
+            </a:fontRef>
+          </p:style>
+          <p:txBody>
+            <a:bodyPr rtlCol="0" anchor="ctr"/>
+            <a:lstStyle/>
+            <a:p>
+              <a:pPr algn="ctr"/>
+              <a:r>
+                <a:rPr lang="en-US" sz="1400" dirty="0" smtClean="0"/>
+                <a:t>Citizens medical records</a:t>
+              </a:r>
+              <a:endParaRPr lang="en-US" sz="1400" dirty="0"/>
+            </a:p>
+          </p:txBody>
+        </p:sp>
+        <p:sp>
+          <p:nvSpPr>
+            <p:cNvPr id="30" name="Rectangle 29"/>
+            <p:cNvSpPr/>
+            <p:nvPr/>
+          </p:nvSpPr>
+          <p:spPr>
+            <a:xfrm>
+              <a:off x="6413500" y="4775200"/>
+              <a:ext cx="1079500" cy="673100"/>
+            </a:xfrm>
+            <a:prstGeom prst="rect">
+              <a:avLst/>
+            </a:prstGeom>
+          </p:spPr>
+          <p:style>
+            <a:lnRef idx="1">
+              <a:schemeClr val="accent1"/>
+            </a:lnRef>
+            <a:fillRef idx="3">
+              <a:schemeClr val="accent1"/>
+            </a:fillRef>
+            <a:effectRef idx="2">
+              <a:schemeClr val="accent1"/>
+            </a:effectRef>
+            <a:fontRef idx="minor">
+              <a:schemeClr val="lt1"/>
+            </a:fontRef>
+          </p:style>
+          <p:txBody>
+            <a:bodyPr rtlCol="0" anchor="ctr"/>
+            <a:lstStyle/>
+            <a:p>
+              <a:pPr algn="ctr"/>
+              <a:r>
+                <a:rPr lang="en-US" sz="1400" dirty="0" smtClean="0"/>
+                <a:t>Citizens medical records</a:t>
+              </a:r>
+              <a:endParaRPr lang="en-US" sz="1400" dirty="0"/>
+            </a:p>
+          </p:txBody>
+        </p:sp>
+        <p:cxnSp>
+          <p:nvCxnSpPr>
+            <p:cNvPr id="31" name="Straight Connector 30"/>
+            <p:cNvCxnSpPr>
+              <a:stCxn id="8" idx="2"/>
+              <a:endCxn id="26" idx="0"/>
+            </p:cNvCxnSpPr>
+            <p:nvPr/>
+          </p:nvCxnSpPr>
+          <p:spPr>
+            <a:xfrm flipH="1">
+              <a:off x="4470400" y="4546600"/>
+              <a:ext cx="1244600" cy="228600"/>
+            </a:xfrm>
+            <a:prstGeom prst="line">
+              <a:avLst/>
+            </a:prstGeom>
+          </p:spPr>
+          <p:style>
+            <a:lnRef idx="2">
+              <a:schemeClr val="accent1"/>
+            </a:lnRef>
+            <a:fillRef idx="0">
+              <a:schemeClr val="accent1"/>
+            </a:fillRef>
+            <a:effectRef idx="1">
+              <a:schemeClr val="accent1"/>
+            </a:effectRef>
+            <a:fontRef idx="minor">
+              <a:schemeClr val="tx1"/>
+            </a:fontRef>
+          </p:style>
+        </p:cxnSp>
+        <p:cxnSp>
+          <p:nvCxnSpPr>
+            <p:cNvPr id="33" name="Straight Connector 32"/>
+            <p:cNvCxnSpPr>
+              <a:stCxn id="8" idx="2"/>
+              <a:endCxn id="29" idx="0"/>
+            </p:cNvCxnSpPr>
+            <p:nvPr/>
+          </p:nvCxnSpPr>
+          <p:spPr>
+            <a:xfrm flipH="1">
+              <a:off x="5712982" y="4546600"/>
+              <a:ext cx="2018" cy="228600"/>
+            </a:xfrm>
+            <a:prstGeom prst="line">
+              <a:avLst/>
+            </a:prstGeom>
+          </p:spPr>
+          <p:style>
+            <a:lnRef idx="2">
+              <a:schemeClr val="accent1"/>
+            </a:lnRef>
+            <a:fillRef idx="0">
+              <a:schemeClr val="accent1"/>
+            </a:fillRef>
+            <a:effectRef idx="1">
+              <a:schemeClr val="accent1"/>
+            </a:effectRef>
+            <a:fontRef idx="minor">
+              <a:schemeClr val="tx1"/>
+            </a:fontRef>
+          </p:style>
+        </p:cxnSp>
+        <p:cxnSp>
+          <p:nvCxnSpPr>
+            <p:cNvPr id="35" name="Straight Connector 34"/>
+            <p:cNvCxnSpPr>
+              <a:stCxn id="8" idx="2"/>
+              <a:endCxn id="30" idx="0"/>
+            </p:cNvCxnSpPr>
+            <p:nvPr/>
+          </p:nvCxnSpPr>
+          <p:spPr>
+            <a:xfrm>
+              <a:off x="5715000" y="4546600"/>
+              <a:ext cx="1238250" cy="228600"/>
+            </a:xfrm>
+            <a:prstGeom prst="line">
+              <a:avLst/>
+            </a:prstGeom>
+          </p:spPr>
+          <p:style>
+            <a:lnRef idx="2">
+              <a:schemeClr val="accent1"/>
+            </a:lnRef>
+            <a:fillRef idx="0">
+              <a:schemeClr val="accent1"/>
+            </a:fillRef>
+            <a:effectRef idx="1">
+              <a:schemeClr val="accent1"/>
+            </a:effectRef>
+            <a:fontRef idx="minor">
+              <a:schemeClr val="tx1"/>
+            </a:fontRef>
+          </p:style>
+        </p:cxnSp>
+      </p:grpSp>
       <p:grpSp>
         <p:nvGrpSpPr>
           <p:cNvPr id="11" name="Group 10"/>
@@ -10351,6 +10435,25 @@
               <a:t>?</a:t>
             </a:r>
             <a:endParaRPr lang="en-US" sz="1400" dirty="0"/>
+          </a:p>
+        </p:txBody>
+      </p:sp>
+      <p:sp>
+        <p:nvSpPr>
+          <p:cNvPr id="9" name="Text Placeholder 8"/>
+          <p:cNvSpPr>
+            <a:spLocks noGrp="1"/>
+          </p:cNvSpPr>
+          <p:nvPr>
+            <p:ph type="body" sz="quarter" idx="13"/>
+          </p:nvPr>
+        </p:nvSpPr>
+        <p:spPr/>
+        <p:txBody>
+          <a:bodyPr/>
+          <a:lstStyle/>
+          <a:p>
+            <a:endParaRPr lang="en-US"/>
           </a:p>
         </p:txBody>
       </p:sp>
@@ -10627,7 +10730,6 @@
               <a:rPr lang="en-US" dirty="0"/>
               <a:t>API’s containing patient related data</a:t>
             </a:r>
-            <a:endParaRPr lang="en-US" dirty="0"/>
           </a:p>
         </p:txBody>
       </p:sp>
@@ -10706,29 +10808,13 @@
             <a:pPr lvl="1"/>
             <a:r>
               <a:rPr lang="en-US" dirty="0" smtClean="0"/>
-              <a:t>But still </a:t>
-            </a:r>
+              <a:t>But still authenticated as 20121212-1212 against MVK while authorizing the client</a:t>
+            </a:r>
+          </a:p>
+          <a:p>
             <a:r>
               <a:rPr lang="en-US" dirty="0" smtClean="0"/>
-              <a:t>authenticated as 20121212-1212 </a:t>
-            </a:r>
-            <a:r>
-              <a:rPr lang="en-US" dirty="0" smtClean="0"/>
-              <a:t>against MVK while authorizing the </a:t>
-            </a:r>
-            <a:r>
-              <a:rPr lang="en-US" dirty="0" smtClean="0"/>
-              <a:t>client</a:t>
-            </a:r>
-          </a:p>
-          <a:p>
-            <a:r>
-              <a:rPr lang="en-US" dirty="0" smtClean="0"/>
-              <a:t>Twitter</a:t>
-            </a:r>
-            <a:r>
-              <a:rPr lang="en-US" dirty="0" smtClean="0"/>
-              <a:t>, Facebook </a:t>
+              <a:t>Twitter, Facebook </a:t>
             </a:r>
             <a:r>
               <a:rPr lang="en-US" dirty="0" err="1" smtClean="0"/>
@@ -10828,7 +10914,6 @@
               <a:rPr lang="en-US" dirty="0"/>
               <a:t>API’s containing patient related data</a:t>
             </a:r>
-            <a:endParaRPr lang="en-US" dirty="0"/>
           </a:p>
         </p:txBody>
       </p:sp>
@@ -11381,7 +11466,6 @@
               <a:rPr lang="en-US" dirty="0"/>
               <a:t>API’s containing patient related data</a:t>
             </a:r>
-            <a:endParaRPr lang="en-US" dirty="0"/>
           </a:p>
         </p:txBody>
       </p:sp>
@@ -11553,7 +11637,6 @@
               <a:rPr lang="en-US" dirty="0"/>
               <a:t>API’s containing patient related data</a:t>
             </a:r>
-            <a:endParaRPr lang="en-US" dirty="0"/>
           </a:p>
         </p:txBody>
       </p:sp>
@@ -11576,11 +11659,7 @@
           <a:p>
             <a:r>
               <a:rPr lang="en-US" dirty="0" smtClean="0"/>
-              <a:t>Exercise </a:t>
-            </a:r>
-            <a:r>
-              <a:rPr lang="en-US" dirty="0" smtClean="0"/>
-              <a:t>2</a:t>
+              <a:t>Exercise 2</a:t>
             </a:r>
             <a:endParaRPr lang="en-US" dirty="0"/>
           </a:p>
@@ -11610,11 +11689,7 @@
             </a:r>
             <a:r>
               <a:rPr lang="en-US" dirty="0" smtClean="0"/>
-              <a:t>API</a:t>
-            </a:r>
-            <a:r>
-              <a:rPr lang="en-US" dirty="0" smtClean="0"/>
-              <a:t>´s containing patient related data.</a:t>
+              <a:t>API´s containing patient related data.</a:t>
             </a:r>
             <a:endParaRPr lang="en-US" dirty="0"/>
           </a:p>
@@ -11698,20 +11773,14 @@
         </p:nvSpPr>
         <p:spPr/>
         <p:txBody>
-          <a:bodyPr/>
+          <a:bodyPr>
+            <a:normAutofit fontScale="90000"/>
+          </a:bodyPr>
           <a:lstStyle/>
           <a:p>
             <a:r>
-              <a:rPr lang="en-US" dirty="0" smtClean="0"/>
-              <a:t>Simple </a:t>
-            </a:r>
-            <a:r>
-              <a:rPr lang="en-US" dirty="0" err="1" smtClean="0"/>
-              <a:t>OAuth</a:t>
-            </a:r>
-            <a:r>
-              <a:rPr lang="en-US" dirty="0" smtClean="0"/>
-              <a:t> 2.0 API Client</a:t>
+              <a:rPr lang="en-US" dirty="0"/>
+              <a:t>API’s containing patient related data</a:t>
             </a:r>
             <a:endParaRPr lang="en-US" dirty="0"/>
           </a:p>
@@ -11736,7 +11805,19 @@
           <a:p>
             <a:r>
               <a:rPr lang="en-US" dirty="0" smtClean="0"/>
-              <a:t>Exercise 3</a:t>
+              <a:t>Exercise </a:t>
+            </a:r>
+            <a:r>
+              <a:rPr lang="en-US" dirty="0" smtClean="0"/>
+              <a:t>3, Simple </a:t>
+            </a:r>
+            <a:r>
+              <a:rPr lang="en-US" dirty="0" err="1" smtClean="0"/>
+              <a:t>OAuth</a:t>
+            </a:r>
+            <a:r>
+              <a:rPr lang="en-US" dirty="0" smtClean="0"/>
+              <a:t> 2.0 API Client </a:t>
             </a:r>
             <a:endParaRPr lang="en-US" dirty="0"/>
           </a:p>
@@ -12051,11 +12132,7 @@
           <a:p>
             <a:r>
               <a:rPr lang="en-US" sz="1800" dirty="0" smtClean="0"/>
-              <a:t>Practical </a:t>
-            </a:r>
-            <a:r>
-              <a:rPr lang="en-US" sz="1800" dirty="0" smtClean="0"/>
-              <a:t>info</a:t>
+              <a:t>Practical info</a:t>
             </a:r>
           </a:p>
           <a:p>
@@ -12080,21 +12157,8 @@
           <a:p>
             <a:r>
               <a:rPr lang="en-US" sz="1800" dirty="0" smtClean="0"/>
-              <a:t>API’s </a:t>
-            </a:r>
-            <a:r>
-              <a:rPr lang="en-US" sz="1800" dirty="0" smtClean="0"/>
-              <a:t>containing patient </a:t>
-            </a:r>
-            <a:r>
-              <a:rPr lang="en-US" sz="1800" dirty="0" smtClean="0"/>
-              <a:t>related </a:t>
-            </a:r>
-            <a:r>
-              <a:rPr lang="en-US" sz="1800" dirty="0" smtClean="0"/>
-              <a:t>data</a:t>
-            </a:r>
-            <a:endParaRPr lang="en-US" sz="1800" dirty="0" smtClean="0"/>
+              <a:t>API’s containing patient related data</a:t>
+            </a:r>
           </a:p>
           <a:p>
             <a:pPr lvl="1"/>
@@ -12250,7 +12314,7 @@
           <a:p>
             <a:r>
               <a:rPr lang="en-US" dirty="0" smtClean="0"/>
-              <a:t>Backend</a:t>
+              <a:t>Building the App</a:t>
             </a:r>
             <a:endParaRPr lang="en-US" dirty="0"/>
           </a:p>
@@ -12275,12 +12339,9 @@
           <a:p>
             <a:r>
               <a:rPr lang="en-US" dirty="0" smtClean="0"/>
-              <a:t>Exercise </a:t>
-            </a:r>
-            <a:r>
-              <a:rPr lang="en-US" dirty="0"/>
-              <a:t>4</a:t>
-            </a:r>
+              <a:t>Backend</a:t>
+            </a:r>
+            <a:endParaRPr lang="en-US" dirty="0"/>
           </a:p>
         </p:txBody>
       </p:sp>
@@ -12302,20 +12363,6 @@
             <a:pPr marL="0" indent="0">
               <a:buNone/>
             </a:pPr>
-            <a:r>
-              <a:rPr lang="en-US" dirty="0" smtClean="0"/>
-              <a:t>Build the app backend to handle the </a:t>
-            </a:r>
-            <a:r>
-              <a:rPr lang="en-US" dirty="0" err="1" smtClean="0"/>
-              <a:t>OAuth</a:t>
-            </a:r>
-            <a:r>
-              <a:rPr lang="en-US" dirty="0" smtClean="0"/>
-              <a:t> 2.0 integration with SDK and to provide an API for the app. </a:t>
-            </a:r>
-          </a:p>
-          <a:p>
             <a:endParaRPr lang="en-US" dirty="0" smtClean="0"/>
           </a:p>
         </p:txBody>
@@ -12352,7 +12399,7 @@
     </p:spTree>
     <p:extLst>
       <p:ext uri="{BB962C8B-B14F-4D97-AF65-F5344CB8AC3E}">
-        <p14:creationId xmlns:p14="http://schemas.microsoft.com/office/powerpoint/2010/main" val="3668199394"/>
+        <p14:creationId xmlns:p14="http://schemas.microsoft.com/office/powerpoint/2010/main" val="3828188418"/>
       </p:ext>
     </p:extLst>
   </p:cSld>
@@ -12403,7 +12450,7 @@
           <a:p>
             <a:r>
               <a:rPr lang="en-US" dirty="0" smtClean="0"/>
-              <a:t>Frontend</a:t>
+              <a:t>Building the App</a:t>
             </a:r>
             <a:endParaRPr lang="en-US" dirty="0"/>
           </a:p>
@@ -12426,6 +12473,14 @@
           </a:bodyPr>
           <a:lstStyle/>
           <a:p>
+            <a:r>
+              <a:rPr lang="en-US" dirty="0" smtClean="0"/>
+              <a:t>Exercise </a:t>
+            </a:r>
+            <a:r>
+              <a:rPr lang="en-US" dirty="0" smtClean="0"/>
+              <a:t>4, backend</a:t>
+            </a:r>
             <a:endParaRPr lang="en-US" dirty="0"/>
           </a:p>
         </p:txBody>
@@ -12450,20 +12505,23 @@
             </a:pPr>
             <a:r>
               <a:rPr lang="en-US" dirty="0" smtClean="0"/>
-              <a:t>Frontend technologies</a:t>
-            </a:r>
-          </a:p>
-          <a:p>
+              <a:t>Complete the </a:t>
+            </a:r>
             <a:r>
               <a:rPr lang="en-US" dirty="0" smtClean="0"/>
-              <a:t>What’s happening on the frontend</a:t>
-            </a:r>
-          </a:p>
-          <a:p>
+              <a:t>app backend to handle the </a:t>
+            </a:r>
+            <a:r>
+              <a:rPr lang="en-US" dirty="0" err="1" smtClean="0"/>
+              <a:t>OAuth</a:t>
+            </a:r>
             <a:r>
               <a:rPr lang="en-US" dirty="0" smtClean="0"/>
-              <a:t>Short intro to Backbone</a:t>
-            </a:r>
+              <a:t> 2.0 integration with SDK and to provide an API for the app. </a:t>
+            </a:r>
+          </a:p>
+          <a:p>
+            <a:endParaRPr lang="en-US" dirty="0" smtClean="0"/>
           </a:p>
         </p:txBody>
       </p:sp>
@@ -12499,7 +12557,7 @@
     </p:spTree>
     <p:extLst>
       <p:ext uri="{BB962C8B-B14F-4D97-AF65-F5344CB8AC3E}">
-        <p14:creationId xmlns:p14="http://schemas.microsoft.com/office/powerpoint/2010/main" val="3753766513"/>
+        <p14:creationId xmlns:p14="http://schemas.microsoft.com/office/powerpoint/2010/main" val="3668199394"/>
       </p:ext>
     </p:extLst>
   </p:cSld>
@@ -12550,7 +12608,7 @@
           <a:p>
             <a:r>
               <a:rPr lang="en-US" dirty="0" smtClean="0"/>
-              <a:t>Frontend</a:t>
+              <a:t>Building the App</a:t>
             </a:r>
             <a:endParaRPr lang="en-US" dirty="0"/>
           </a:p>
@@ -12575,12 +12633,9 @@
           <a:p>
             <a:r>
               <a:rPr lang="en-US" dirty="0" smtClean="0"/>
-              <a:t>Exercise </a:t>
-            </a:r>
-            <a:r>
-              <a:rPr lang="en-US" dirty="0"/>
-              <a:t>5</a:t>
-            </a:r>
+              <a:t>Frontend</a:t>
+            </a:r>
+            <a:endParaRPr lang="en-US" dirty="0"/>
           </a:p>
         </p:txBody>
       </p:sp>
@@ -12604,17 +12659,29 @@
             </a:pPr>
             <a:r>
               <a:rPr lang="en-US" dirty="0" smtClean="0"/>
-              <a:t>Build a simple client that use the API provided by the backend. </a:t>
+              <a:t>Frontend technologies</a:t>
             </a:r>
           </a:p>
           <a:p>
             <a:r>
               <a:rPr lang="en-US" dirty="0" smtClean="0"/>
-              <a:t>Login user to create a session</a:t>
-            </a:r>
-          </a:p>
-          <a:p>
+              <a:t>What’s happening on the </a:t>
+            </a:r>
+            <a:r>
+              <a:rPr lang="en-US" dirty="0" smtClean="0"/>
+              <a:t>frontend?</a:t>
+            </a:r>
             <a:endParaRPr lang="en-US" dirty="0" smtClean="0"/>
+          </a:p>
+          <a:p>
+            <a:r>
+              <a:rPr lang="en-US" dirty="0" smtClean="0"/>
+              <a:t>Very short </a:t>
+            </a:r>
+            <a:r>
+              <a:rPr lang="en-US" dirty="0" smtClean="0"/>
+              <a:t>intro to Backbone</a:t>
+            </a:r>
           </a:p>
         </p:txBody>
       </p:sp>
@@ -12650,7 +12717,7 @@
     </p:spTree>
     <p:extLst>
       <p:ext uri="{BB962C8B-B14F-4D97-AF65-F5344CB8AC3E}">
-        <p14:creationId xmlns:p14="http://schemas.microsoft.com/office/powerpoint/2010/main" val="3598812586"/>
+        <p14:creationId xmlns:p14="http://schemas.microsoft.com/office/powerpoint/2010/main" val="3753766513"/>
       </p:ext>
     </p:extLst>
   </p:cSld>
@@ -12701,7 +12768,7 @@
           <a:p>
             <a:r>
               <a:rPr lang="en-US" dirty="0" smtClean="0"/>
-              <a:t>Links</a:t>
+              <a:t>Building the App</a:t>
             </a:r>
             <a:endParaRPr lang="en-US" dirty="0"/>
           </a:p>
@@ -12724,7 +12791,15 @@
           </a:bodyPr>
           <a:lstStyle/>
           <a:p>
-            <a:endParaRPr lang="en-US"/>
+            <a:r>
+              <a:rPr lang="en-US" dirty="0" smtClean="0"/>
+              <a:t>Exercise </a:t>
+            </a:r>
+            <a:r>
+              <a:rPr lang="en-US" dirty="0" smtClean="0"/>
+              <a:t>5, frontend</a:t>
+            </a:r>
+            <a:endParaRPr lang="en-US" dirty="0"/>
           </a:p>
         </p:txBody>
       </p:sp>
@@ -12738,7 +12813,12 @@
             <p:ph type="body" sz="quarter" idx="13"/>
           </p:nvPr>
         </p:nvSpPr>
-        <p:spPr/>
+        <p:spPr>
+          <a:xfrm>
+            <a:off x="685800" y="1895027"/>
+            <a:ext cx="4902199" cy="3780000"/>
+          </a:xfrm>
+        </p:spPr>
         <p:txBody>
           <a:bodyPr/>
           <a:lstStyle/>
@@ -12746,137 +12826,28 @@
             <a:pPr marL="0" indent="0">
               <a:buNone/>
             </a:pPr>
-            <a:endParaRPr lang="en-US" sz="1800" dirty="0" smtClean="0">
-              <a:hlinkClick r:id="rId2"/>
-            </a:endParaRPr>
-          </a:p>
-          <a:p>
-            <a:pPr marL="0" indent="0">
-              <a:buNone/>
-            </a:pPr>
-            <a:r>
-              <a:rPr lang="en-US" sz="1800" dirty="0"/>
-              <a:t>http://</a:t>
-            </a:r>
-            <a:r>
-              <a:rPr lang="en-US" sz="1800" dirty="0" err="1"/>
-              <a:t>www.vinnova.se</a:t>
-            </a:r>
-            <a:r>
-              <a:rPr lang="en-US" sz="1800" dirty="0" smtClean="0"/>
-              <a:t>/</a:t>
-            </a:r>
-            <a:endParaRPr lang="en-US" sz="1800" dirty="0" smtClean="0">
-              <a:hlinkClick r:id="rId2"/>
-            </a:endParaRPr>
-          </a:p>
-          <a:p>
-            <a:pPr marL="0" indent="0">
-              <a:buNone/>
-            </a:pPr>
-            <a:r>
-              <a:rPr lang="en-US" sz="1800" dirty="0">
-                <a:hlinkClick r:id="rId2"/>
-              </a:rPr>
-              <a:t>http://sdk.minavardkontakter.se</a:t>
-            </a:r>
-            <a:r>
-              <a:rPr lang="en-US" sz="1800" dirty="0" smtClean="0">
-                <a:hlinkClick r:id="rId2"/>
-              </a:rPr>
-              <a:t>/</a:t>
-            </a:r>
-          </a:p>
-          <a:p>
-            <a:pPr marL="0" indent="0">
-              <a:buNone/>
-            </a:pPr>
-            <a:r>
-              <a:rPr lang="en-US" sz="1800" dirty="0">
-                <a:hlinkClick r:id="rId2"/>
-              </a:rPr>
-              <a:t>http://oauth.net/2</a:t>
-            </a:r>
-            <a:r>
-              <a:rPr lang="en-US" sz="1800" dirty="0" smtClean="0">
-                <a:hlinkClick r:id="rId2"/>
-              </a:rPr>
-              <a:t>/</a:t>
-            </a:r>
-          </a:p>
-          <a:p>
-            <a:pPr marL="0" indent="0">
-              <a:buNone/>
-            </a:pPr>
-            <a:r>
-              <a:rPr lang="en-US" sz="1800" dirty="0">
-                <a:hlinkClick r:id="rId2"/>
-              </a:rPr>
-              <a:t>http://tools.ietf.org/html/draft-ietf-oauth-v2-31</a:t>
-            </a:r>
-            <a:endParaRPr lang="en-US" sz="1800" dirty="0" smtClean="0">
-              <a:hlinkClick r:id="rId2"/>
-            </a:endParaRPr>
-          </a:p>
-          <a:p>
-            <a:pPr marL="0" indent="0">
-              <a:buNone/>
-            </a:pPr>
-            <a:r>
-              <a:rPr lang="en-US" sz="1800" dirty="0" smtClean="0">
-                <a:hlinkClick r:id="rId2"/>
-              </a:rPr>
-              <a:t>https</a:t>
-            </a:r>
-            <a:r>
-              <a:rPr lang="en-US" sz="1800" dirty="0">
-                <a:hlinkClick r:id="rId2"/>
-              </a:rPr>
-              <a:t>://developers.google.com/accounts/docs/</a:t>
-            </a:r>
-            <a:r>
-              <a:rPr lang="en-US" sz="1800" dirty="0" smtClean="0">
-                <a:hlinkClick r:id="rId2"/>
-              </a:rPr>
-              <a:t>OAuth2</a:t>
-            </a:r>
-            <a:endParaRPr lang="en-US" sz="1800" dirty="0" smtClean="0"/>
-          </a:p>
-          <a:p>
-            <a:pPr marL="0" indent="0">
-              <a:buNone/>
-            </a:pPr>
-            <a:r>
-              <a:rPr lang="en-US" sz="1800" dirty="0">
-                <a:hlinkClick r:id="rId3"/>
-              </a:rPr>
-              <a:t>https://developers.facebook.com/docs/reference/dialogs/oauth</a:t>
-            </a:r>
-            <a:r>
-              <a:rPr lang="en-US" sz="1800" dirty="0" smtClean="0">
-                <a:hlinkClick r:id="rId3"/>
-              </a:rPr>
-              <a:t>/</a:t>
-            </a:r>
-            <a:endParaRPr lang="en-US" sz="1800" dirty="0" smtClean="0"/>
-          </a:p>
-          <a:p>
-            <a:pPr marL="0" indent="0">
-              <a:buNone/>
-            </a:pPr>
-            <a:endParaRPr lang="en-US" sz="1800" dirty="0" smtClean="0"/>
-          </a:p>
-          <a:p>
-            <a:pPr marL="0" indent="0">
-              <a:buNone/>
-            </a:pPr>
-            <a:endParaRPr lang="en-US" sz="1800" dirty="0"/>
-          </a:p>
-          <a:p>
-            <a:pPr marL="0" indent="0">
-              <a:buNone/>
-            </a:pPr>
-            <a:endParaRPr lang="en-US" sz="1800" dirty="0"/>
+            <a:r>
+              <a:rPr lang="en-US" dirty="0" smtClean="0"/>
+              <a:t>Complete a </a:t>
+            </a:r>
+            <a:r>
+              <a:rPr lang="en-US" dirty="0" smtClean="0"/>
+              <a:t>simple client that use the API provided by the backend. </a:t>
+            </a:r>
+          </a:p>
+          <a:p>
+            <a:r>
+              <a:rPr lang="en-US" dirty="0" smtClean="0"/>
+              <a:t>Login user to create a </a:t>
+            </a:r>
+            <a:r>
+              <a:rPr lang="en-US" dirty="0" smtClean="0"/>
+              <a:t>session</a:t>
+            </a:r>
+            <a:endParaRPr lang="en-US" dirty="0" smtClean="0"/>
+          </a:p>
+          <a:p>
+            <a:endParaRPr lang="en-US" dirty="0" smtClean="0"/>
           </a:p>
         </p:txBody>
       </p:sp>
@@ -12904,6 +12875,475 @@
                 <a:defRPr/>
               </a:pPr>
               <a:t>23</a:t>
+            </a:fld>
+            <a:endParaRPr lang="sv-SE"/>
+          </a:p>
+        </p:txBody>
+      </p:sp>
+      <p:pic>
+        <p:nvPicPr>
+          <p:cNvPr id="6" name="Picture 5" descr="Screen Shot 2013-01-04 at 14.07.17.png"/>
+          <p:cNvPicPr>
+            <a:picLocks noChangeAspect="1"/>
+          </p:cNvPicPr>
+          <p:nvPr/>
+        </p:nvPicPr>
+        <p:blipFill>
+          <a:blip r:embed="rId2">
+            <a:extLst>
+              <a:ext uri="{28A0092B-C50C-407E-A947-70E740481C1C}">
+                <a14:useLocalDpi xmlns:a14="http://schemas.microsoft.com/office/drawing/2010/main" val="0"/>
+              </a:ext>
+            </a:extLst>
+          </a:blip>
+          <a:stretch>
+            <a:fillRect/>
+          </a:stretch>
+        </p:blipFill>
+        <p:spPr>
+          <a:xfrm>
+            <a:off x="5798476" y="1329270"/>
+            <a:ext cx="2926424" cy="4512777"/>
+          </a:xfrm>
+          <a:prstGeom prst="rect">
+            <a:avLst/>
+          </a:prstGeom>
+        </p:spPr>
+      </p:pic>
+    </p:spTree>
+    <p:extLst>
+      <p:ext uri="{BB962C8B-B14F-4D97-AF65-F5344CB8AC3E}">
+        <p14:creationId xmlns:p14="http://schemas.microsoft.com/office/powerpoint/2010/main" val="3598812586"/>
+      </p:ext>
+    </p:extLst>
+  </p:cSld>
+  <p:clrMapOvr>
+    <a:masterClrMapping/>
+  </p:clrMapOvr>
+  <p:timing>
+    <p:tnLst>
+      <p:par>
+        <p:cTn xmlns:p14="http://schemas.microsoft.com/office/powerpoint/2010/main" id="1" dur="indefinite" restart="never" nodeType="tmRoot"/>
+      </p:par>
+    </p:tnLst>
+  </p:timing>
+</p:sld>
+</file>
+
+<file path=ppt/slides/slide24.xml><?xml version="1.0" encoding="utf-8"?>
+<p:sld xmlns:a="http://schemas.openxmlformats.org/drawingml/2006/main" xmlns:r="http://schemas.openxmlformats.org/officeDocument/2006/relationships" xmlns:p="http://schemas.openxmlformats.org/presentationml/2006/main">
+  <p:cSld>
+    <p:spTree>
+      <p:nvGrpSpPr>
+        <p:cNvPr id="1" name=""/>
+        <p:cNvGrpSpPr/>
+        <p:nvPr/>
+      </p:nvGrpSpPr>
+      <p:grpSpPr>
+        <a:xfrm>
+          <a:off x="0" y="0"/>
+          <a:ext cx="0" cy="0"/>
+          <a:chOff x="0" y="0"/>
+          <a:chExt cx="0" cy="0"/>
+        </a:xfrm>
+      </p:grpSpPr>
+      <p:sp>
+        <p:nvSpPr>
+          <p:cNvPr id="2" name="Title 1"/>
+          <p:cNvSpPr>
+            <a:spLocks noGrp="1"/>
+          </p:cNvSpPr>
+          <p:nvPr>
+            <p:ph type="ctrTitle"/>
+          </p:nvPr>
+        </p:nvSpPr>
+        <p:spPr/>
+        <p:txBody>
+          <a:bodyPr/>
+          <a:lstStyle/>
+          <a:p>
+            <a:r>
+              <a:rPr lang="en-US" dirty="0" smtClean="0"/>
+              <a:t>Summary</a:t>
+            </a:r>
+            <a:endParaRPr lang="en-US" dirty="0"/>
+          </a:p>
+        </p:txBody>
+      </p:sp>
+      <p:sp>
+        <p:nvSpPr>
+          <p:cNvPr id="3" name="Subtitle 2"/>
+          <p:cNvSpPr>
+            <a:spLocks noGrp="1"/>
+          </p:cNvSpPr>
+          <p:nvPr>
+            <p:ph type="subTitle" idx="1"/>
+          </p:nvPr>
+        </p:nvSpPr>
+        <p:spPr/>
+        <p:txBody>
+          <a:bodyPr>
+            <a:normAutofit fontScale="92500" lnSpcReduction="10000"/>
+          </a:bodyPr>
+          <a:lstStyle/>
+          <a:p>
+            <a:endParaRPr lang="en-US"/>
+          </a:p>
+        </p:txBody>
+      </p:sp>
+      <p:sp>
+        <p:nvSpPr>
+          <p:cNvPr id="4" name="Text Placeholder 3"/>
+          <p:cNvSpPr>
+            <a:spLocks noGrp="1"/>
+          </p:cNvSpPr>
+          <p:nvPr>
+            <p:ph type="body" sz="quarter" idx="13"/>
+          </p:nvPr>
+        </p:nvSpPr>
+        <p:spPr/>
+        <p:txBody>
+          <a:bodyPr/>
+          <a:lstStyle/>
+          <a:p>
+            <a:r>
+              <a:rPr lang="en-US" dirty="0" smtClean="0"/>
+              <a:t>Introduction to SDK by VINNOVA</a:t>
+            </a:r>
+          </a:p>
+          <a:p>
+            <a:r>
+              <a:rPr lang="en-US" dirty="0" smtClean="0"/>
+              <a:t>HTTP overview</a:t>
+            </a:r>
+          </a:p>
+          <a:p>
+            <a:r>
+              <a:rPr lang="en-US" dirty="0" err="1" smtClean="0"/>
+              <a:t>OAuth</a:t>
+            </a:r>
+            <a:r>
+              <a:rPr lang="en-US" dirty="0" smtClean="0"/>
+              <a:t> 2.0</a:t>
+            </a:r>
+          </a:p>
+          <a:p>
+            <a:r>
+              <a:rPr lang="en-US" smtClean="0"/>
+              <a:t>Simple application</a:t>
+            </a:r>
+            <a:endParaRPr lang="en-US" dirty="0" smtClean="0"/>
+          </a:p>
+          <a:p>
+            <a:pPr marL="0" indent="0">
+              <a:buNone/>
+            </a:pPr>
+            <a:endParaRPr lang="en-US" dirty="0" smtClean="0"/>
+          </a:p>
+          <a:p>
+            <a:pPr marL="0" indent="0">
+              <a:buNone/>
+            </a:pPr>
+            <a:r>
+              <a:rPr lang="en-US" dirty="0" smtClean="0"/>
+              <a:t>Questions?</a:t>
+            </a:r>
+            <a:endParaRPr lang="en-US" dirty="0" smtClean="0"/>
+          </a:p>
+          <a:p>
+            <a:pPr marL="0" indent="0">
+              <a:buNone/>
+            </a:pPr>
+            <a:endParaRPr lang="en-US" dirty="0"/>
+          </a:p>
+        </p:txBody>
+      </p:sp>
+      <p:sp>
+        <p:nvSpPr>
+          <p:cNvPr id="5" name="Slide Number Placeholder 4"/>
+          <p:cNvSpPr>
+            <a:spLocks noGrp="1"/>
+          </p:cNvSpPr>
+          <p:nvPr>
+            <p:ph type="sldNum" sz="quarter" idx="14"/>
+          </p:nvPr>
+        </p:nvSpPr>
+        <p:spPr/>
+        <p:txBody>
+          <a:bodyPr/>
+          <a:lstStyle/>
+          <a:p>
+            <a:pPr>
+              <a:defRPr/>
+            </a:pPr>
+            <a:fld id="{4AA01602-B999-AA4E-80A6-B21CED3A9C3C}" type="slidenum">
+              <a:rPr lang="sv-SE" smtClean="0"/>
+              <a:pPr>
+                <a:defRPr/>
+              </a:pPr>
+              <a:t>24</a:t>
+            </a:fld>
+            <a:endParaRPr lang="sv-SE"/>
+          </a:p>
+        </p:txBody>
+      </p:sp>
+    </p:spTree>
+    <p:extLst>
+      <p:ext uri="{BB962C8B-B14F-4D97-AF65-F5344CB8AC3E}">
+        <p14:creationId xmlns:p14="http://schemas.microsoft.com/office/powerpoint/2010/main" val="919221336"/>
+      </p:ext>
+    </p:extLst>
+  </p:cSld>
+  <p:clrMapOvr>
+    <a:masterClrMapping/>
+  </p:clrMapOvr>
+  <p:timing>
+    <p:tnLst>
+      <p:par>
+        <p:cTn xmlns:p14="http://schemas.microsoft.com/office/powerpoint/2010/main" id="1" dur="indefinite" restart="never" nodeType="tmRoot"/>
+      </p:par>
+    </p:tnLst>
+  </p:timing>
+</p:sld>
+</file>
+
+<file path=ppt/slides/slide25.xml><?xml version="1.0" encoding="utf-8"?>
+<p:sld xmlns:a="http://schemas.openxmlformats.org/drawingml/2006/main" xmlns:r="http://schemas.openxmlformats.org/officeDocument/2006/relationships" xmlns:p="http://schemas.openxmlformats.org/presentationml/2006/main">
+  <p:cSld>
+    <p:spTree>
+      <p:nvGrpSpPr>
+        <p:cNvPr id="1" name=""/>
+        <p:cNvGrpSpPr/>
+        <p:nvPr/>
+      </p:nvGrpSpPr>
+      <p:grpSpPr>
+        <a:xfrm>
+          <a:off x="0" y="0"/>
+          <a:ext cx="0" cy="0"/>
+          <a:chOff x="0" y="0"/>
+          <a:chExt cx="0" cy="0"/>
+        </a:xfrm>
+      </p:grpSpPr>
+      <p:sp>
+        <p:nvSpPr>
+          <p:cNvPr id="2" name="Title 1"/>
+          <p:cNvSpPr>
+            <a:spLocks noGrp="1"/>
+          </p:cNvSpPr>
+          <p:nvPr>
+            <p:ph type="ctrTitle"/>
+          </p:nvPr>
+        </p:nvSpPr>
+        <p:spPr/>
+        <p:txBody>
+          <a:bodyPr/>
+          <a:lstStyle/>
+          <a:p>
+            <a:r>
+              <a:rPr lang="en-US" dirty="0" smtClean="0"/>
+              <a:t>Links</a:t>
+            </a:r>
+            <a:endParaRPr lang="en-US" dirty="0"/>
+          </a:p>
+        </p:txBody>
+      </p:sp>
+      <p:sp>
+        <p:nvSpPr>
+          <p:cNvPr id="3" name="Subtitle 2"/>
+          <p:cNvSpPr>
+            <a:spLocks noGrp="1"/>
+          </p:cNvSpPr>
+          <p:nvPr>
+            <p:ph type="subTitle" idx="1"/>
+          </p:nvPr>
+        </p:nvSpPr>
+        <p:spPr/>
+        <p:txBody>
+          <a:bodyPr>
+            <a:normAutofit fontScale="92500" lnSpcReduction="10000"/>
+          </a:bodyPr>
+          <a:lstStyle/>
+          <a:p>
+            <a:endParaRPr lang="en-US"/>
+          </a:p>
+        </p:txBody>
+      </p:sp>
+      <p:sp>
+        <p:nvSpPr>
+          <p:cNvPr id="4" name="Text Placeholder 3"/>
+          <p:cNvSpPr>
+            <a:spLocks noGrp="1"/>
+          </p:cNvSpPr>
+          <p:nvPr>
+            <p:ph type="body" sz="quarter" idx="13"/>
+          </p:nvPr>
+        </p:nvSpPr>
+        <p:spPr/>
+        <p:txBody>
+          <a:bodyPr/>
+          <a:lstStyle/>
+          <a:p>
+            <a:pPr marL="0" indent="0">
+              <a:buNone/>
+            </a:pPr>
+            <a:endParaRPr lang="en-US" sz="1800" dirty="0" smtClean="0">
+              <a:hlinkClick r:id="rId2"/>
+            </a:endParaRPr>
+          </a:p>
+          <a:p>
+            <a:pPr marL="0" indent="0">
+              <a:buNone/>
+            </a:pPr>
+            <a:r>
+              <a:rPr lang="en-US" sz="1800" dirty="0"/>
+              <a:t>http://</a:t>
+            </a:r>
+            <a:r>
+              <a:rPr lang="en-US" sz="1800" dirty="0" err="1"/>
+              <a:t>www.vinnova.se</a:t>
+            </a:r>
+            <a:r>
+              <a:rPr lang="en-US" sz="1800" dirty="0" smtClean="0"/>
+              <a:t>/</a:t>
+            </a:r>
+            <a:endParaRPr lang="en-US" sz="1800" dirty="0" smtClean="0">
+              <a:hlinkClick r:id="rId2"/>
+            </a:endParaRPr>
+          </a:p>
+          <a:p>
+            <a:pPr marL="0" indent="0">
+              <a:buNone/>
+            </a:pPr>
+            <a:r>
+              <a:rPr lang="en-US" sz="1800" dirty="0">
+                <a:hlinkClick r:id="rId2"/>
+              </a:rPr>
+              <a:t>http://sdk.minavardkontakter.se</a:t>
+            </a:r>
+            <a:r>
+              <a:rPr lang="en-US" sz="1800" dirty="0" smtClean="0">
+                <a:hlinkClick r:id="rId2"/>
+              </a:rPr>
+              <a:t>/</a:t>
+            </a:r>
+          </a:p>
+          <a:p>
+            <a:pPr marL="0" indent="0">
+              <a:buNone/>
+            </a:pPr>
+            <a:r>
+              <a:rPr lang="en-US" sz="1800" dirty="0">
+                <a:hlinkClick r:id="rId2"/>
+              </a:rPr>
+              <a:t>http://oauth.net/2</a:t>
+            </a:r>
+            <a:r>
+              <a:rPr lang="en-US" sz="1800" dirty="0" smtClean="0">
+                <a:hlinkClick r:id="rId2"/>
+              </a:rPr>
+              <a:t>/</a:t>
+            </a:r>
+          </a:p>
+          <a:p>
+            <a:pPr marL="0" indent="0">
+              <a:buNone/>
+            </a:pPr>
+            <a:r>
+              <a:rPr lang="en-US" sz="1800" dirty="0">
+                <a:hlinkClick r:id="rId2"/>
+              </a:rPr>
+              <a:t>http://tools.ietf.org/html/draft-ietf-oauth-v2-31</a:t>
+            </a:r>
+            <a:endParaRPr lang="en-US" sz="1800" dirty="0" smtClean="0">
+              <a:hlinkClick r:id="rId2"/>
+            </a:endParaRPr>
+          </a:p>
+          <a:p>
+            <a:pPr marL="0" indent="0">
+              <a:buNone/>
+            </a:pPr>
+            <a:r>
+              <a:rPr lang="en-US" sz="1800" dirty="0" smtClean="0">
+                <a:hlinkClick r:id="rId2"/>
+              </a:rPr>
+              <a:t>https</a:t>
+            </a:r>
+            <a:r>
+              <a:rPr lang="en-US" sz="1800" dirty="0">
+                <a:hlinkClick r:id="rId2"/>
+              </a:rPr>
+              <a:t>://developers.google.com/accounts/docs/</a:t>
+            </a:r>
+            <a:r>
+              <a:rPr lang="en-US" sz="1800" dirty="0" smtClean="0">
+                <a:hlinkClick r:id="rId2"/>
+              </a:rPr>
+              <a:t>OAuth2</a:t>
+            </a:r>
+            <a:endParaRPr lang="en-US" sz="1800" dirty="0" smtClean="0"/>
+          </a:p>
+          <a:p>
+            <a:pPr marL="0" indent="0">
+              <a:buNone/>
+            </a:pPr>
+            <a:r>
+              <a:rPr lang="en-US" sz="1800" dirty="0">
+                <a:hlinkClick r:id="rId3"/>
+              </a:rPr>
+              <a:t>https://developers.facebook.com/docs/reference/dialogs/oauth</a:t>
+            </a:r>
+            <a:r>
+              <a:rPr lang="en-US" sz="1800" dirty="0" smtClean="0">
+                <a:hlinkClick r:id="rId3"/>
+              </a:rPr>
+              <a:t>/</a:t>
+            </a:r>
+            <a:endParaRPr lang="en-US" sz="1800" dirty="0" smtClean="0"/>
+          </a:p>
+          <a:p>
+            <a:pPr marL="0" indent="0">
+              <a:buNone/>
+            </a:pPr>
+            <a:endParaRPr lang="en-US" sz="1800" dirty="0" smtClean="0"/>
+          </a:p>
+          <a:p>
+            <a:pPr marL="0" indent="0">
+              <a:buNone/>
+            </a:pPr>
+            <a:endParaRPr lang="en-US" sz="1800" dirty="0"/>
+          </a:p>
+          <a:p>
+            <a:pPr marL="0" indent="0">
+              <a:buNone/>
+            </a:pPr>
+            <a:endParaRPr lang="en-US" sz="1800" dirty="0"/>
+          </a:p>
+        </p:txBody>
+      </p:sp>
+      <p:sp>
+        <p:nvSpPr>
+          <p:cNvPr id="5" name="Slide Number Placeholder 4"/>
+          <p:cNvSpPr>
+            <a:spLocks noGrp="1"/>
+          </p:cNvSpPr>
+          <p:nvPr>
+            <p:ph type="sldNum" sz="quarter" idx="14"/>
+          </p:nvPr>
+        </p:nvSpPr>
+        <p:spPr/>
+        <p:txBody>
+          <a:bodyPr/>
+          <a:lstStyle/>
+          <a:p>
+            <a:pPr>
+              <a:defRPr/>
+            </a:pPr>
+            <a:fld id="{4AA01602-B999-AA4E-80A6-B21CED3A9C3C}" type="slidenum">
+              <a:rPr lang="sv-SE" smtClean="0"/>
+              <a:pPr>
+                <a:defRPr/>
+              </a:pPr>
+              <a:t>25</a:t>
             </a:fld>
             <a:endParaRPr lang="sv-SE"/>
           </a:p>
@@ -13375,13 +13815,7 @@
               <a:rPr lang="en-US" dirty="0" smtClean="0">
                 <a:hlinkClick r:id="rId3"/>
               </a:rPr>
-              <a:t>SDK by </a:t>
-            </a:r>
-            <a:r>
-              <a:rPr lang="en-US" dirty="0" smtClean="0">
-                <a:hlinkClick r:id="rId3"/>
-              </a:rPr>
-              <a:t>VINNOVA</a:t>
+              <a:t>SDK by VINNOVA</a:t>
             </a:r>
             <a:endParaRPr lang="en-US" dirty="0" smtClean="0"/>
           </a:p>
@@ -13390,7 +13824,6 @@
               <a:rPr lang="en-US" dirty="0" smtClean="0"/>
               <a:t>Background</a:t>
             </a:r>
-            <a:endParaRPr lang="en-US" dirty="0" smtClean="0"/>
           </a:p>
         </p:txBody>
       </p:sp>
@@ -13988,17 +14421,12 @@
               <a:rPr lang="en-US" sz="1600" dirty="0" smtClean="0"/>
               <a:t>web</a:t>
             </a:r>
-            <a:endParaRPr lang="en-US" sz="1600" dirty="0" smtClean="0"/>
           </a:p>
           <a:p>
             <a:pPr lvl="1"/>
             <a:r>
               <a:rPr lang="en-US" sz="1600" dirty="0" smtClean="0"/>
-              <a:t>Address </a:t>
-            </a:r>
-            <a:r>
-              <a:rPr lang="en-US" sz="1600" dirty="0" smtClean="0"/>
-              <a:t>+ parameters</a:t>
+              <a:t>Address + parameters</a:t>
             </a:r>
           </a:p>
           <a:p>

</xml_diff>